<commit_message>
Updates to presentation and code descriptions
</commit_message>
<xml_diff>
--- a/SPC_Presentation.pptx
+++ b/SPC_Presentation.pptx
@@ -5,15 +5,23 @@
     <p:sldMasterId id="2147483648" r:id="rId1"/>
   </p:sldMasterIdLst>
   <p:notesMasterIdLst>
-    <p:notesMasterId r:id="rId8"/>
+    <p:notesMasterId r:id="rId16"/>
   </p:notesMasterIdLst>
   <p:sldIdLst>
     <p:sldId id="256" r:id="rId2"/>
     <p:sldId id="336" r:id="rId3"/>
     <p:sldId id="337" r:id="rId4"/>
     <p:sldId id="338" r:id="rId5"/>
-    <p:sldId id="339" r:id="rId6"/>
-    <p:sldId id="340" r:id="rId7"/>
+    <p:sldId id="341" r:id="rId6"/>
+    <p:sldId id="342" r:id="rId7"/>
+    <p:sldId id="343" r:id="rId8"/>
+    <p:sldId id="344" r:id="rId9"/>
+    <p:sldId id="345" r:id="rId10"/>
+    <p:sldId id="349" r:id="rId11"/>
+    <p:sldId id="346" r:id="rId12"/>
+    <p:sldId id="347" r:id="rId13"/>
+    <p:sldId id="339" r:id="rId14"/>
+    <p:sldId id="340" r:id="rId15"/>
   </p:sldIdLst>
   <p:sldSz cx="12192000" cy="6858000"/>
   <p:notesSz cx="12192000" cy="6858000"/>
@@ -123,7 +131,7 @@
           <a:p>
             <a:fld id="{52CF3C78-BFF9-4137-8833-13E3D0B09D8B}" type="datetimeFigureOut">
               <a:rPr lang="it-IT" smtClean="0"/>
-              <a:t>24/12/2025</a:t>
+              <a:t>27/12/2025</a:t>
             </a:fld>
             <a:endParaRPr lang="it-IT" dirty="0"/>
           </a:p>
@@ -541,7 +549,7 @@
           <a:p>
             <a:fld id="{1D8BD707-D9CF-40AE-B4C6-C98DA3205C09}" type="datetimeFigureOut">
               <a:rPr lang="en-US"/>
-              <a:t>12/24/2025</a:t>
+              <a:t>12/27/2025</a:t>
             </a:fld>
             <a:endParaRPr lang="en-US" dirty="0"/>
           </a:p>
@@ -718,7 +726,7 @@
           <a:p>
             <a:fld id="{1D8BD707-D9CF-40AE-B4C6-C98DA3205C09}" type="datetimeFigureOut">
               <a:rPr lang="en-US"/>
-              <a:t>12/24/2025</a:t>
+              <a:t>12/27/2025</a:t>
             </a:fld>
             <a:endParaRPr lang="en-US" dirty="0"/>
           </a:p>
@@ -932,7 +940,7 @@
           <a:p>
             <a:fld id="{1D8BD707-D9CF-40AE-B4C6-C98DA3205C09}" type="datetimeFigureOut">
               <a:rPr lang="en-US"/>
-              <a:t>12/24/2025</a:t>
+              <a:t>12/27/2025</a:t>
             </a:fld>
             <a:endParaRPr lang="en-US" dirty="0"/>
           </a:p>
@@ -1080,7 +1088,7 @@
           <a:p>
             <a:fld id="{1D8BD707-D9CF-40AE-B4C6-C98DA3205C09}" type="datetimeFigureOut">
               <a:rPr lang="en-US"/>
-              <a:t>12/24/2025</a:t>
+              <a:t>12/27/2025</a:t>
             </a:fld>
             <a:endParaRPr lang="en-US" dirty="0"/>
           </a:p>
@@ -1199,7 +1207,7 @@
           <a:p>
             <a:fld id="{1D8BD707-D9CF-40AE-B4C6-C98DA3205C09}" type="datetimeFigureOut">
               <a:rPr lang="en-US"/>
-              <a:t>12/24/2025</a:t>
+              <a:t>12/27/2025</a:t>
             </a:fld>
             <a:endParaRPr lang="en-US" dirty="0"/>
           </a:p>
@@ -1496,7 +1504,7 @@
           <a:p>
             <a:fld id="{1D8BD707-D9CF-40AE-B4C6-C98DA3205C09}" type="datetimeFigureOut">
               <a:rPr lang="en-US"/>
-              <a:t>12/24/2025</a:t>
+              <a:t>12/27/2025</a:t>
             </a:fld>
             <a:endParaRPr lang="en-US" dirty="0"/>
           </a:p>
@@ -2032,6 +2040,639 @@
 </p:sld>
 </file>
 
+<file path=ppt/slides/slide10.xml><?xml version="1.0" encoding="utf-8"?>
+<p:sld xmlns:a="http://schemas.openxmlformats.org/drawingml/2006/main" xmlns:r="http://schemas.openxmlformats.org/officeDocument/2006/relationships" xmlns:p="http://schemas.openxmlformats.org/presentationml/2006/main">
+  <p:cSld>
+    <p:spTree>
+      <p:nvGrpSpPr>
+        <p:cNvPr id="1" name="">
+          <a:extLst>
+            <a:ext uri="{FF2B5EF4-FFF2-40B4-BE49-F238E27FC236}">
+              <a16:creationId xmlns:a16="http://schemas.microsoft.com/office/drawing/2014/main" id="{DE25A748-8538-F760-9E6B-4F27E13A3FAF}"/>
+            </a:ext>
+          </a:extLst>
+        </p:cNvPr>
+        <p:cNvGrpSpPr/>
+        <p:nvPr/>
+      </p:nvGrpSpPr>
+      <p:grpSpPr>
+        <a:xfrm>
+          <a:off x="0" y="0"/>
+          <a:ext cx="0" cy="0"/>
+          <a:chOff x="0" y="0"/>
+          <a:chExt cx="0" cy="0"/>
+        </a:xfrm>
+      </p:grpSpPr>
+      <p:sp>
+        <p:nvSpPr>
+          <p:cNvPr id="10" name="Titolo 9">
+            <a:extLst>
+              <a:ext uri="{FF2B5EF4-FFF2-40B4-BE49-F238E27FC236}">
+                <a16:creationId xmlns:a16="http://schemas.microsoft.com/office/drawing/2014/main" id="{E760A000-055B-7F77-DE2E-D83FE64AA70F}"/>
+              </a:ext>
+            </a:extLst>
+          </p:cNvPr>
+          <p:cNvSpPr>
+            <a:spLocks noGrp="1"/>
+          </p:cNvSpPr>
+          <p:nvPr>
+            <p:ph type="title"/>
+          </p:nvPr>
+        </p:nvSpPr>
+        <p:spPr>
+          <a:xfrm>
+            <a:off x="761999" y="457200"/>
+            <a:ext cx="9691687" cy="538609"/>
+          </a:xfrm>
+        </p:spPr>
+        <p:txBody>
+          <a:bodyPr/>
+          <a:lstStyle/>
+          <a:p>
+            <a:r>
+              <a:rPr lang="en-GB" noProof="0" dirty="0">
+                <a:latin typeface="Arial Black" panose="020B0A04020102020204" pitchFamily="34" charset="0"/>
+              </a:rPr>
+              <a:t>Proposed solution – </a:t>
+            </a:r>
+            <a:r>
+              <a:rPr lang="en-GB" dirty="0">
+                <a:latin typeface="Arial Black" panose="020B0A04020102020204" pitchFamily="34" charset="0"/>
+              </a:rPr>
+              <a:t>MPC step 1</a:t>
+            </a:r>
+            <a:endParaRPr lang="en-GB" noProof="0" dirty="0">
+              <a:latin typeface="Arial Black" panose="020B0A04020102020204" pitchFamily="34" charset="0"/>
+            </a:endParaRPr>
+          </a:p>
+        </p:txBody>
+      </p:sp>
+      <p:sp>
+        <p:nvSpPr>
+          <p:cNvPr id="2" name="CasellaDiTesto 1">
+            <a:extLst>
+              <a:ext uri="{FF2B5EF4-FFF2-40B4-BE49-F238E27FC236}">
+                <a16:creationId xmlns:a16="http://schemas.microsoft.com/office/drawing/2014/main" id="{0367F24C-DB9D-043A-C3E0-240A6426CF81}"/>
+              </a:ext>
+            </a:extLst>
+          </p:cNvPr>
+          <p:cNvSpPr txBox="1"/>
+          <p:nvPr/>
+        </p:nvSpPr>
+        <p:spPr>
+          <a:xfrm>
+            <a:off x="723900" y="1191645"/>
+            <a:ext cx="10744200" cy="461665"/>
+          </a:xfrm>
+          <a:prstGeom prst="rect">
+            <a:avLst/>
+          </a:prstGeom>
+          <a:noFill/>
+        </p:spPr>
+        <p:txBody>
+          <a:bodyPr wrap="square">
+            <a:spAutoFit/>
+          </a:bodyPr>
+          <a:lstStyle/>
+          <a:p>
+            <a:pPr algn="just"/>
+            <a:r>
+              <a:rPr lang="it-IT" sz="2400" dirty="0">
+                <a:latin typeface="Arial" panose="020B0604020202020204" pitchFamily="34" charset="0"/>
+                <a:cs typeface="Arial" panose="020B0604020202020204" pitchFamily="34" charset="0"/>
+              </a:rPr>
+              <a:t>AAA</a:t>
+            </a:r>
+            <a:endParaRPr lang="it-IT" sz="2400" noProof="0" dirty="0">
+              <a:latin typeface="Arial" panose="020B0604020202020204" pitchFamily="34" charset="0"/>
+              <a:cs typeface="Arial" panose="020B0604020202020204" pitchFamily="34" charset="0"/>
+            </a:endParaRPr>
+          </a:p>
+        </p:txBody>
+      </p:sp>
+    </p:spTree>
+    <p:extLst>
+      <p:ext uri="{BB962C8B-B14F-4D97-AF65-F5344CB8AC3E}">
+        <p14:creationId xmlns:p14="http://schemas.microsoft.com/office/powerpoint/2010/main" val="1531629937"/>
+      </p:ext>
+    </p:extLst>
+  </p:cSld>
+  <p:clrMapOvr>
+    <a:masterClrMapping/>
+  </p:clrMapOvr>
+</p:sld>
+</file>
+
+<file path=ppt/slides/slide11.xml><?xml version="1.0" encoding="utf-8"?>
+<p:sld xmlns:a="http://schemas.openxmlformats.org/drawingml/2006/main" xmlns:r="http://schemas.openxmlformats.org/officeDocument/2006/relationships" xmlns:p="http://schemas.openxmlformats.org/presentationml/2006/main">
+  <p:cSld>
+    <p:spTree>
+      <p:nvGrpSpPr>
+        <p:cNvPr id="1" name="">
+          <a:extLst>
+            <a:ext uri="{FF2B5EF4-FFF2-40B4-BE49-F238E27FC236}">
+              <a16:creationId xmlns:a16="http://schemas.microsoft.com/office/drawing/2014/main" id="{BC32A103-772A-6F4E-43CD-BAD0F96AE080}"/>
+            </a:ext>
+          </a:extLst>
+        </p:cNvPr>
+        <p:cNvGrpSpPr/>
+        <p:nvPr/>
+      </p:nvGrpSpPr>
+      <p:grpSpPr>
+        <a:xfrm>
+          <a:off x="0" y="0"/>
+          <a:ext cx="0" cy="0"/>
+          <a:chOff x="0" y="0"/>
+          <a:chExt cx="0" cy="0"/>
+        </a:xfrm>
+      </p:grpSpPr>
+      <p:sp>
+        <p:nvSpPr>
+          <p:cNvPr id="10" name="Titolo 9">
+            <a:extLst>
+              <a:ext uri="{FF2B5EF4-FFF2-40B4-BE49-F238E27FC236}">
+                <a16:creationId xmlns:a16="http://schemas.microsoft.com/office/drawing/2014/main" id="{EB99D7A1-39CC-A3DC-F5B5-B982E07118B9}"/>
+              </a:ext>
+            </a:extLst>
+          </p:cNvPr>
+          <p:cNvSpPr>
+            <a:spLocks noGrp="1"/>
+          </p:cNvSpPr>
+          <p:nvPr>
+            <p:ph type="title"/>
+          </p:nvPr>
+        </p:nvSpPr>
+        <p:spPr>
+          <a:xfrm>
+            <a:off x="761999" y="457200"/>
+            <a:ext cx="9691687" cy="538609"/>
+          </a:xfrm>
+        </p:spPr>
+        <p:txBody>
+          <a:bodyPr/>
+          <a:lstStyle/>
+          <a:p>
+            <a:r>
+              <a:rPr lang="en-GB" noProof="0" dirty="0">
+                <a:latin typeface="Arial Black" panose="020B0A04020102020204" pitchFamily="34" charset="0"/>
+              </a:rPr>
+              <a:t>Proposed solution – </a:t>
+            </a:r>
+            <a:r>
+              <a:rPr lang="en-GB" dirty="0">
+                <a:latin typeface="Arial Black" panose="020B0A04020102020204" pitchFamily="34" charset="0"/>
+              </a:rPr>
+              <a:t>MPC step 2</a:t>
+            </a:r>
+            <a:endParaRPr lang="en-GB" noProof="0" dirty="0">
+              <a:latin typeface="Arial Black" panose="020B0A04020102020204" pitchFamily="34" charset="0"/>
+            </a:endParaRPr>
+          </a:p>
+        </p:txBody>
+      </p:sp>
+      <p:sp>
+        <p:nvSpPr>
+          <p:cNvPr id="2" name="CasellaDiTesto 1">
+            <a:extLst>
+              <a:ext uri="{FF2B5EF4-FFF2-40B4-BE49-F238E27FC236}">
+                <a16:creationId xmlns:a16="http://schemas.microsoft.com/office/drawing/2014/main" id="{1AD414A0-A715-1469-0125-37B4B3F31316}"/>
+              </a:ext>
+            </a:extLst>
+          </p:cNvPr>
+          <p:cNvSpPr txBox="1"/>
+          <p:nvPr/>
+        </p:nvSpPr>
+        <p:spPr>
+          <a:xfrm>
+            <a:off x="723900" y="1191645"/>
+            <a:ext cx="10744200" cy="461665"/>
+          </a:xfrm>
+          <a:prstGeom prst="rect">
+            <a:avLst/>
+          </a:prstGeom>
+          <a:noFill/>
+        </p:spPr>
+        <p:txBody>
+          <a:bodyPr wrap="square">
+            <a:spAutoFit/>
+          </a:bodyPr>
+          <a:lstStyle/>
+          <a:p>
+            <a:pPr algn="just"/>
+            <a:r>
+              <a:rPr lang="it-IT" sz="2400" dirty="0">
+                <a:latin typeface="Arial" panose="020B0604020202020204" pitchFamily="34" charset="0"/>
+                <a:cs typeface="Arial" panose="020B0604020202020204" pitchFamily="34" charset="0"/>
+              </a:rPr>
+              <a:t>AAA</a:t>
+            </a:r>
+            <a:endParaRPr lang="it-IT" sz="2400" noProof="0" dirty="0">
+              <a:latin typeface="Arial" panose="020B0604020202020204" pitchFamily="34" charset="0"/>
+              <a:cs typeface="Arial" panose="020B0604020202020204" pitchFamily="34" charset="0"/>
+            </a:endParaRPr>
+          </a:p>
+        </p:txBody>
+      </p:sp>
+    </p:spTree>
+    <p:extLst>
+      <p:ext uri="{BB962C8B-B14F-4D97-AF65-F5344CB8AC3E}">
+        <p14:creationId xmlns:p14="http://schemas.microsoft.com/office/powerpoint/2010/main" val="3531124739"/>
+      </p:ext>
+    </p:extLst>
+  </p:cSld>
+  <p:clrMapOvr>
+    <a:masterClrMapping/>
+  </p:clrMapOvr>
+</p:sld>
+</file>
+
+<file path=ppt/slides/slide12.xml><?xml version="1.0" encoding="utf-8"?>
+<p:sld xmlns:a="http://schemas.openxmlformats.org/drawingml/2006/main" xmlns:r="http://schemas.openxmlformats.org/officeDocument/2006/relationships" xmlns:p="http://schemas.openxmlformats.org/presentationml/2006/main">
+  <p:cSld>
+    <p:spTree>
+      <p:nvGrpSpPr>
+        <p:cNvPr id="1" name="">
+          <a:extLst>
+            <a:ext uri="{FF2B5EF4-FFF2-40B4-BE49-F238E27FC236}">
+              <a16:creationId xmlns:a16="http://schemas.microsoft.com/office/drawing/2014/main" id="{C8759C14-EBB6-6344-2910-2927E71A651A}"/>
+            </a:ext>
+          </a:extLst>
+        </p:cNvPr>
+        <p:cNvGrpSpPr/>
+        <p:nvPr/>
+      </p:nvGrpSpPr>
+      <p:grpSpPr>
+        <a:xfrm>
+          <a:off x="0" y="0"/>
+          <a:ext cx="0" cy="0"/>
+          <a:chOff x="0" y="0"/>
+          <a:chExt cx="0" cy="0"/>
+        </a:xfrm>
+      </p:grpSpPr>
+      <p:sp>
+        <p:nvSpPr>
+          <p:cNvPr id="10" name="Titolo 9">
+            <a:extLst>
+              <a:ext uri="{FF2B5EF4-FFF2-40B4-BE49-F238E27FC236}">
+                <a16:creationId xmlns:a16="http://schemas.microsoft.com/office/drawing/2014/main" id="{D2762B76-6482-5725-B41E-FD5833AEE37D}"/>
+              </a:ext>
+            </a:extLst>
+          </p:cNvPr>
+          <p:cNvSpPr>
+            <a:spLocks noGrp="1"/>
+          </p:cNvSpPr>
+          <p:nvPr>
+            <p:ph type="title"/>
+          </p:nvPr>
+        </p:nvSpPr>
+        <p:spPr>
+          <a:xfrm>
+            <a:off x="761999" y="457200"/>
+            <a:ext cx="9691687" cy="538609"/>
+          </a:xfrm>
+        </p:spPr>
+        <p:txBody>
+          <a:bodyPr/>
+          <a:lstStyle/>
+          <a:p>
+            <a:r>
+              <a:rPr lang="en-GB" noProof="0" dirty="0">
+                <a:latin typeface="Arial Black" panose="020B0A04020102020204" pitchFamily="34" charset="0"/>
+              </a:rPr>
+              <a:t>Proposed solution – </a:t>
+            </a:r>
+            <a:r>
+              <a:rPr lang="en-GB" dirty="0">
+                <a:latin typeface="Arial Black" panose="020B0A04020102020204" pitchFamily="34" charset="0"/>
+              </a:rPr>
+              <a:t>MPC step 3</a:t>
+            </a:r>
+            <a:endParaRPr lang="en-GB" noProof="0" dirty="0">
+              <a:latin typeface="Arial Black" panose="020B0A04020102020204" pitchFamily="34" charset="0"/>
+            </a:endParaRPr>
+          </a:p>
+        </p:txBody>
+      </p:sp>
+      <p:sp>
+        <p:nvSpPr>
+          <p:cNvPr id="2" name="CasellaDiTesto 1">
+            <a:extLst>
+              <a:ext uri="{FF2B5EF4-FFF2-40B4-BE49-F238E27FC236}">
+                <a16:creationId xmlns:a16="http://schemas.microsoft.com/office/drawing/2014/main" id="{3A93BD2B-FED2-0A1F-5ED0-9735CB6DBB4E}"/>
+              </a:ext>
+            </a:extLst>
+          </p:cNvPr>
+          <p:cNvSpPr txBox="1"/>
+          <p:nvPr/>
+        </p:nvSpPr>
+        <p:spPr>
+          <a:xfrm>
+            <a:off x="723900" y="1191645"/>
+            <a:ext cx="10744200" cy="461665"/>
+          </a:xfrm>
+          <a:prstGeom prst="rect">
+            <a:avLst/>
+          </a:prstGeom>
+          <a:noFill/>
+        </p:spPr>
+        <p:txBody>
+          <a:bodyPr wrap="square">
+            <a:spAutoFit/>
+          </a:bodyPr>
+          <a:lstStyle/>
+          <a:p>
+            <a:pPr algn="just"/>
+            <a:r>
+              <a:rPr lang="it-IT" sz="2400" dirty="0">
+                <a:latin typeface="Arial" panose="020B0604020202020204" pitchFamily="34" charset="0"/>
+                <a:cs typeface="Arial" panose="020B0604020202020204" pitchFamily="34" charset="0"/>
+              </a:rPr>
+              <a:t>AAA</a:t>
+            </a:r>
+            <a:endParaRPr lang="it-IT" sz="2400" noProof="0" dirty="0">
+              <a:latin typeface="Arial" panose="020B0604020202020204" pitchFamily="34" charset="0"/>
+              <a:cs typeface="Arial" panose="020B0604020202020204" pitchFamily="34" charset="0"/>
+            </a:endParaRPr>
+          </a:p>
+        </p:txBody>
+      </p:sp>
+    </p:spTree>
+    <p:extLst>
+      <p:ext uri="{BB962C8B-B14F-4D97-AF65-F5344CB8AC3E}">
+        <p14:creationId xmlns:p14="http://schemas.microsoft.com/office/powerpoint/2010/main" val="2857548665"/>
+      </p:ext>
+    </p:extLst>
+  </p:cSld>
+  <p:clrMapOvr>
+    <a:masterClrMapping/>
+  </p:clrMapOvr>
+</p:sld>
+</file>
+
+<file path=ppt/slides/slide13.xml><?xml version="1.0" encoding="utf-8"?>
+<p:sld xmlns:a="http://schemas.openxmlformats.org/drawingml/2006/main" xmlns:r="http://schemas.openxmlformats.org/officeDocument/2006/relationships" xmlns:p="http://schemas.openxmlformats.org/presentationml/2006/main">
+  <p:cSld>
+    <p:spTree>
+      <p:nvGrpSpPr>
+        <p:cNvPr id="1" name="">
+          <a:extLst>
+            <a:ext uri="{FF2B5EF4-FFF2-40B4-BE49-F238E27FC236}">
+              <a16:creationId xmlns:a16="http://schemas.microsoft.com/office/drawing/2014/main" id="{5255A212-F7F3-E3A6-4384-717E60898F7B}"/>
+            </a:ext>
+          </a:extLst>
+        </p:cNvPr>
+        <p:cNvGrpSpPr/>
+        <p:nvPr/>
+      </p:nvGrpSpPr>
+      <p:grpSpPr>
+        <a:xfrm>
+          <a:off x="0" y="0"/>
+          <a:ext cx="0" cy="0"/>
+          <a:chOff x="0" y="0"/>
+          <a:chExt cx="0" cy="0"/>
+        </a:xfrm>
+      </p:grpSpPr>
+      <p:sp>
+        <p:nvSpPr>
+          <p:cNvPr id="10" name="Titolo 9">
+            <a:extLst>
+              <a:ext uri="{FF2B5EF4-FFF2-40B4-BE49-F238E27FC236}">
+                <a16:creationId xmlns:a16="http://schemas.microsoft.com/office/drawing/2014/main" id="{8895E181-0BB5-68A0-F54D-4F4FCCFB8F29}"/>
+              </a:ext>
+            </a:extLst>
+          </p:cNvPr>
+          <p:cNvSpPr>
+            <a:spLocks noGrp="1"/>
+          </p:cNvSpPr>
+          <p:nvPr>
+            <p:ph type="title"/>
+          </p:nvPr>
+        </p:nvSpPr>
+        <p:spPr>
+          <a:xfrm>
+            <a:off x="762000" y="457200"/>
+            <a:ext cx="8991600" cy="1077218"/>
+          </a:xfrm>
+        </p:spPr>
+        <p:txBody>
+          <a:bodyPr/>
+          <a:lstStyle/>
+          <a:p>
+            <a:r>
+              <a:rPr lang="en-GB" noProof="0" dirty="0">
+                <a:latin typeface="Arial Black" panose="020B0A04020102020204" pitchFamily="34" charset="0"/>
+              </a:rPr>
+              <a:t>Practical implementation – </a:t>
+            </a:r>
+            <a:br>
+              <a:rPr lang="en-GB" noProof="0" dirty="0">
+                <a:latin typeface="Arial Black" panose="020B0A04020102020204" pitchFamily="34" charset="0"/>
+              </a:rPr>
+            </a:br>
+            <a:endParaRPr lang="en-GB" noProof="0" dirty="0">
+              <a:latin typeface="Arial Black" panose="020B0A04020102020204" pitchFamily="34" charset="0"/>
+            </a:endParaRPr>
+          </a:p>
+        </p:txBody>
+      </p:sp>
+      <p:sp>
+        <p:nvSpPr>
+          <p:cNvPr id="4" name="CasellaDiTesto 3">
+            <a:extLst>
+              <a:ext uri="{FF2B5EF4-FFF2-40B4-BE49-F238E27FC236}">
+                <a16:creationId xmlns:a16="http://schemas.microsoft.com/office/drawing/2014/main" id="{BE214AF7-BD5F-1697-AC34-4C091718BD70}"/>
+              </a:ext>
+            </a:extLst>
+          </p:cNvPr>
+          <p:cNvSpPr txBox="1"/>
+          <p:nvPr/>
+        </p:nvSpPr>
+        <p:spPr>
+          <a:xfrm>
+            <a:off x="762000" y="1676400"/>
+            <a:ext cx="9677400" cy="1200329"/>
+          </a:xfrm>
+          <a:prstGeom prst="rect">
+            <a:avLst/>
+          </a:prstGeom>
+          <a:noFill/>
+        </p:spPr>
+        <p:txBody>
+          <a:bodyPr wrap="square">
+            <a:spAutoFit/>
+          </a:bodyPr>
+          <a:lstStyle/>
+          <a:p>
+            <a:pPr algn="just"/>
+            <a:r>
+              <a:rPr lang="en-GB" sz="2400" noProof="0" dirty="0">
+                <a:latin typeface="Arial" panose="020B0604020202020204" pitchFamily="34" charset="0"/>
+                <a:cs typeface="Arial" panose="020B0604020202020204" pitchFamily="34" charset="0"/>
+              </a:rPr>
+              <a:t>a</a:t>
+            </a:r>
+            <a:endParaRPr lang="en-GB" sz="2400" i="1" noProof="0" dirty="0">
+              <a:latin typeface="Arial" panose="020B0604020202020204" pitchFamily="34" charset="0"/>
+              <a:cs typeface="Arial" panose="020B0604020202020204" pitchFamily="34" charset="0"/>
+            </a:endParaRPr>
+          </a:p>
+          <a:p>
+            <a:pPr algn="just"/>
+            <a:endParaRPr lang="en-GB" sz="2400" noProof="0" dirty="0">
+              <a:latin typeface="Arial" panose="020B0604020202020204" pitchFamily="34" charset="0"/>
+              <a:cs typeface="Arial" panose="020B0604020202020204" pitchFamily="34" charset="0"/>
+            </a:endParaRPr>
+          </a:p>
+          <a:p>
+            <a:pPr algn="just"/>
+            <a:endParaRPr lang="en-GB" sz="2400" noProof="0" dirty="0">
+              <a:latin typeface="Arial" panose="020B0604020202020204" pitchFamily="34" charset="0"/>
+              <a:cs typeface="Arial" panose="020B0604020202020204" pitchFamily="34" charset="0"/>
+            </a:endParaRPr>
+          </a:p>
+        </p:txBody>
+      </p:sp>
+    </p:spTree>
+    <p:extLst>
+      <p:ext uri="{BB962C8B-B14F-4D97-AF65-F5344CB8AC3E}">
+        <p14:creationId xmlns:p14="http://schemas.microsoft.com/office/powerpoint/2010/main" val="2424430597"/>
+      </p:ext>
+    </p:extLst>
+  </p:cSld>
+  <p:clrMapOvr>
+    <a:masterClrMapping/>
+  </p:clrMapOvr>
+</p:sld>
+</file>
+
+<file path=ppt/slides/slide14.xml><?xml version="1.0" encoding="utf-8"?>
+<p:sld xmlns:a="http://schemas.openxmlformats.org/drawingml/2006/main" xmlns:r="http://schemas.openxmlformats.org/officeDocument/2006/relationships" xmlns:p="http://schemas.openxmlformats.org/presentationml/2006/main">
+  <p:cSld>
+    <p:spTree>
+      <p:nvGrpSpPr>
+        <p:cNvPr id="1" name="">
+          <a:extLst>
+            <a:ext uri="{FF2B5EF4-FFF2-40B4-BE49-F238E27FC236}">
+              <a16:creationId xmlns:a16="http://schemas.microsoft.com/office/drawing/2014/main" id="{67FFD052-A6E4-4EA3-40C9-0D7F9ED82C6C}"/>
+            </a:ext>
+          </a:extLst>
+        </p:cNvPr>
+        <p:cNvGrpSpPr/>
+        <p:nvPr/>
+      </p:nvGrpSpPr>
+      <p:grpSpPr>
+        <a:xfrm>
+          <a:off x="0" y="0"/>
+          <a:ext cx="0" cy="0"/>
+          <a:chOff x="0" y="0"/>
+          <a:chExt cx="0" cy="0"/>
+        </a:xfrm>
+      </p:grpSpPr>
+      <p:sp>
+        <p:nvSpPr>
+          <p:cNvPr id="10" name="Titolo 9">
+            <a:extLst>
+              <a:ext uri="{FF2B5EF4-FFF2-40B4-BE49-F238E27FC236}">
+                <a16:creationId xmlns:a16="http://schemas.microsoft.com/office/drawing/2014/main" id="{14853C74-3D76-BB45-5EBD-2082D50CCEE3}"/>
+              </a:ext>
+            </a:extLst>
+          </p:cNvPr>
+          <p:cNvSpPr>
+            <a:spLocks noGrp="1"/>
+          </p:cNvSpPr>
+          <p:nvPr>
+            <p:ph type="title"/>
+          </p:nvPr>
+        </p:nvSpPr>
+        <p:spPr>
+          <a:xfrm>
+            <a:off x="762000" y="457200"/>
+            <a:ext cx="8991600" cy="538609"/>
+          </a:xfrm>
+        </p:spPr>
+        <p:txBody>
+          <a:bodyPr/>
+          <a:lstStyle/>
+          <a:p>
+            <a:r>
+              <a:rPr lang="en-GB" noProof="0" dirty="0">
+                <a:latin typeface="Arial Black" panose="020B0A04020102020204" pitchFamily="34" charset="0"/>
+              </a:rPr>
+              <a:t>Results</a:t>
+            </a:r>
+          </a:p>
+        </p:txBody>
+      </p:sp>
+      <p:sp>
+        <p:nvSpPr>
+          <p:cNvPr id="4" name="CasellaDiTesto 3">
+            <a:extLst>
+              <a:ext uri="{FF2B5EF4-FFF2-40B4-BE49-F238E27FC236}">
+                <a16:creationId xmlns:a16="http://schemas.microsoft.com/office/drawing/2014/main" id="{D2E4F1D8-6E3E-1635-DEBC-9C2A6FBDE9CC}"/>
+              </a:ext>
+            </a:extLst>
+          </p:cNvPr>
+          <p:cNvSpPr txBox="1"/>
+          <p:nvPr/>
+        </p:nvSpPr>
+        <p:spPr>
+          <a:xfrm>
+            <a:off x="762000" y="1676400"/>
+            <a:ext cx="9677400" cy="1200329"/>
+          </a:xfrm>
+          <a:prstGeom prst="rect">
+            <a:avLst/>
+          </a:prstGeom>
+          <a:noFill/>
+        </p:spPr>
+        <p:txBody>
+          <a:bodyPr wrap="square">
+            <a:spAutoFit/>
+          </a:bodyPr>
+          <a:lstStyle/>
+          <a:p>
+            <a:pPr algn="just"/>
+            <a:r>
+              <a:rPr lang="en-GB" sz="2400" noProof="0" dirty="0">
+                <a:latin typeface="Arial" panose="020B0604020202020204" pitchFamily="34" charset="0"/>
+                <a:cs typeface="Arial" panose="020B0604020202020204" pitchFamily="34" charset="0"/>
+              </a:rPr>
+              <a:t>a</a:t>
+            </a:r>
+            <a:endParaRPr lang="en-GB" sz="2400" i="1" noProof="0" dirty="0">
+              <a:latin typeface="Arial" panose="020B0604020202020204" pitchFamily="34" charset="0"/>
+              <a:cs typeface="Arial" panose="020B0604020202020204" pitchFamily="34" charset="0"/>
+            </a:endParaRPr>
+          </a:p>
+          <a:p>
+            <a:pPr algn="just"/>
+            <a:endParaRPr lang="en-GB" sz="2400" noProof="0" dirty="0">
+              <a:latin typeface="Arial" panose="020B0604020202020204" pitchFamily="34" charset="0"/>
+              <a:cs typeface="Arial" panose="020B0604020202020204" pitchFamily="34" charset="0"/>
+            </a:endParaRPr>
+          </a:p>
+          <a:p>
+            <a:pPr algn="just"/>
+            <a:endParaRPr lang="en-GB" sz="2400" noProof="0" dirty="0">
+              <a:latin typeface="Arial" panose="020B0604020202020204" pitchFamily="34" charset="0"/>
+              <a:cs typeface="Arial" panose="020B0604020202020204" pitchFamily="34" charset="0"/>
+            </a:endParaRPr>
+          </a:p>
+        </p:txBody>
+      </p:sp>
+    </p:spTree>
+    <p:extLst>
+      <p:ext uri="{BB962C8B-B14F-4D97-AF65-F5344CB8AC3E}">
+        <p14:creationId xmlns:p14="http://schemas.microsoft.com/office/powerpoint/2010/main" val="2274619447"/>
+      </p:ext>
+    </p:extLst>
+  </p:cSld>
+  <p:clrMapOvr>
+    <a:masterClrMapping/>
+  </p:clrMapOvr>
+</p:sld>
+</file>
+
 <file path=ppt/slides/slide2.xml><?xml version="1.0" encoding="utf-8"?>
 <p:sld xmlns:a="http://schemas.openxmlformats.org/drawingml/2006/main" xmlns:r="http://schemas.openxmlformats.org/officeDocument/2006/relationships" xmlns:p="http://schemas.openxmlformats.org/presentationml/2006/main">
   <p:cSld>
@@ -2451,7 +3092,7 @@
         <p:spPr>
           <a:xfrm>
             <a:off x="762000" y="1676400"/>
-            <a:ext cx="9677400" cy="4154984"/>
+            <a:ext cx="9753600" cy="3785652"/>
           </a:xfrm>
           <a:prstGeom prst="rect">
             <a:avLst/>
@@ -2532,7 +3173,7 @@
                 <a:latin typeface="Arial" panose="020B0604020202020204" pitchFamily="34" charset="0"/>
                 <a:cs typeface="Arial" panose="020B0604020202020204" pitchFamily="34" charset="0"/>
               </a:rPr>
-              <a:t>system inputs</a:t>
+              <a:t>system inputs			is the noise sequence</a:t>
             </a:r>
           </a:p>
           <a:p>
@@ -2549,7 +3190,7 @@
                 <a:latin typeface="Arial" panose="020B0604020202020204" pitchFamily="34" charset="0"/>
                 <a:cs typeface="Arial" panose="020B0604020202020204" pitchFamily="34" charset="0"/>
               </a:rPr>
-              <a:t>system outputs</a:t>
+              <a:t>system outputs		</a:t>
             </a:r>
           </a:p>
           <a:p>
@@ -2559,15 +3200,64 @@
                 <a:latin typeface="Arial" panose="020B0604020202020204" pitchFamily="34" charset="0"/>
                 <a:cs typeface="Arial" panose="020B0604020202020204" pitchFamily="34" charset="0"/>
               </a:rPr>
-              <a:t>	  are the system states</a:t>
-            </a:r>
-            <a:endParaRPr lang="en-GB" sz="2400" noProof="0" dirty="0">
-              <a:latin typeface="Arial" panose="020B0604020202020204" pitchFamily="34" charset="0"/>
-              <a:cs typeface="Arial" panose="020B0604020202020204" pitchFamily="34" charset="0"/>
-            </a:endParaRPr>
-          </a:p>
-          <a:p>
-            <a:pPr algn="just"/>
+              <a:t>	  are the system states		</a:t>
+            </a:r>
+            <a:r>
+              <a:rPr lang="en-GB" sz="2400" noProof="0" dirty="0">
+                <a:latin typeface="Arial" panose="020B0604020202020204" pitchFamily="34" charset="0"/>
+                <a:cs typeface="Arial" panose="020B0604020202020204" pitchFamily="34" charset="0"/>
+              </a:rPr>
+              <a:t> only </a:t>
+            </a:r>
+            <a:r>
+              <a:rPr lang="en-GB" sz="2400" noProof="0" dirty="0" err="1">
+                <a:latin typeface="Arial" panose="020B0604020202020204" pitchFamily="34" charset="0"/>
+                <a:cs typeface="Arial" panose="020B0604020202020204" pitchFamily="34" charset="0"/>
+              </a:rPr>
+              <a:t>y</a:t>
+            </a:r>
+            <a:r>
+              <a:rPr lang="en-GB" sz="1200" noProof="0" dirty="0" err="1">
+                <a:latin typeface="Arial" panose="020B0604020202020204" pitchFamily="34" charset="0"/>
+                <a:cs typeface="Arial" panose="020B0604020202020204" pitchFamily="34" charset="0"/>
+              </a:rPr>
+              <a:t>t</a:t>
+            </a:r>
+            <a:r>
+              <a:rPr lang="en-GB" sz="2400" noProof="0" dirty="0">
+                <a:latin typeface="Arial" panose="020B0604020202020204" pitchFamily="34" charset="0"/>
+                <a:cs typeface="Arial" panose="020B0604020202020204" pitchFamily="34" charset="0"/>
+              </a:rPr>
+              <a:t> and </a:t>
+            </a:r>
+            <a:r>
+              <a:rPr lang="en-GB" sz="2400" noProof="0" dirty="0" err="1">
+                <a:latin typeface="Arial" panose="020B0604020202020204" pitchFamily="34" charset="0"/>
+                <a:cs typeface="Arial" panose="020B0604020202020204" pitchFamily="34" charset="0"/>
+              </a:rPr>
+              <a:t>u</a:t>
+            </a:r>
+            <a:r>
+              <a:rPr lang="en-GB" sz="1200" noProof="0" dirty="0" err="1">
+                <a:latin typeface="Arial" panose="020B0604020202020204" pitchFamily="34" charset="0"/>
+                <a:cs typeface="Arial" panose="020B0604020202020204" pitchFamily="34" charset="0"/>
+              </a:rPr>
+              <a:t>t</a:t>
+            </a:r>
+            <a:r>
+              <a:rPr lang="en-GB" sz="2400" noProof="0" dirty="0">
+                <a:latin typeface="Arial" panose="020B0604020202020204" pitchFamily="34" charset="0"/>
+                <a:cs typeface="Arial" panose="020B0604020202020204" pitchFamily="34" charset="0"/>
+              </a:rPr>
+              <a:t> are </a:t>
+            </a:r>
+            <a:r>
+              <a:rPr lang="en-GB" sz="2400" i="1" dirty="0">
+                <a:latin typeface="Arial" panose="020B0604020202020204" pitchFamily="34" charset="0"/>
+                <a:cs typeface="Arial" panose="020B0604020202020204" pitchFamily="34" charset="0"/>
+              </a:rPr>
+              <a:t>known 	</a:t>
+            </a:r>
             <a:endParaRPr lang="en-GB" sz="2400" noProof="0" dirty="0">
               <a:latin typeface="Arial" panose="020B0604020202020204" pitchFamily="34" charset="0"/>
               <a:cs typeface="Arial" panose="020B0604020202020204" pitchFamily="34" charset="0"/>
@@ -2763,6 +3453,100 @@
           </a:extLst>
         </p:spPr>
       </p:pic>
+      <p:pic>
+        <p:nvPicPr>
+          <p:cNvPr id="2" name="Picture 2">
+            <a:extLst>
+              <a:ext uri="{FF2B5EF4-FFF2-40B4-BE49-F238E27FC236}">
+                <a16:creationId xmlns:a16="http://schemas.microsoft.com/office/drawing/2014/main" id="{804C8C31-9EE7-2A9B-EBD8-FEC10261F0A6}"/>
+              </a:ext>
+            </a:extLst>
+          </p:cNvPr>
+          <p:cNvPicPr>
+            <a:picLocks noChangeAspect="1" noChangeArrowheads="1"/>
+          </p:cNvPicPr>
+          <p:nvPr/>
+        </p:nvPicPr>
+        <p:blipFill>
+          <a:blip r:embed="rId6">
+            <a:extLst>
+              <a:ext uri="{28A0092B-C50C-407E-A947-70E740481C1C}">
+                <a14:useLocalDpi xmlns:a14="http://schemas.microsoft.com/office/drawing/2010/main" val="0"/>
+              </a:ext>
+            </a:extLst>
+          </a:blip>
+          <a:srcRect/>
+          <a:stretch>
+            <a:fillRect/>
+          </a:stretch>
+        </p:blipFill>
+        <p:spPr bwMode="auto">
+          <a:xfrm>
+            <a:off x="5867400" y="4313058"/>
+            <a:ext cx="222779" cy="325600"/>
+          </a:xfrm>
+          <a:prstGeom prst="rect">
+            <a:avLst/>
+          </a:prstGeom>
+          <a:noFill/>
+          <a:extLst>
+            <a:ext uri="{909E8E84-426E-40DD-AFC4-6F175D3DCCD1}">
+              <a14:hiddenFill xmlns:a14="http://schemas.microsoft.com/office/drawing/2010/main">
+                <a:solidFill>
+                  <a:srgbClr val="FFFFFF"/>
+                </a:solidFill>
+              </a14:hiddenFill>
+            </a:ext>
+          </a:extLst>
+        </p:spPr>
+      </p:pic>
+      <p:pic>
+        <p:nvPicPr>
+          <p:cNvPr id="1028" name="Picture 4">
+            <a:extLst>
+              <a:ext uri="{FF2B5EF4-FFF2-40B4-BE49-F238E27FC236}">
+                <a16:creationId xmlns:a16="http://schemas.microsoft.com/office/drawing/2014/main" id="{664E0D3B-0AF6-84B0-7A69-CCAC1BA764C9}"/>
+              </a:ext>
+            </a:extLst>
+          </p:cNvPr>
+          <p:cNvPicPr>
+            <a:picLocks noChangeAspect="1" noChangeArrowheads="1"/>
+          </p:cNvPicPr>
+          <p:nvPr/>
+        </p:nvPicPr>
+        <p:blipFill>
+          <a:blip r:embed="rId7">
+            <a:extLst>
+              <a:ext uri="{28A0092B-C50C-407E-A947-70E740481C1C}">
+                <a14:useLocalDpi xmlns:a14="http://schemas.microsoft.com/office/drawing/2010/main" val="0"/>
+              </a:ext>
+            </a:extLst>
+          </a:blip>
+          <a:srcRect/>
+          <a:stretch>
+            <a:fillRect/>
+          </a:stretch>
+        </p:blipFill>
+        <p:spPr bwMode="auto">
+          <a:xfrm>
+            <a:off x="6172200" y="4343400"/>
+            <a:ext cx="1039810" cy="253287"/>
+          </a:xfrm>
+          <a:prstGeom prst="rect">
+            <a:avLst/>
+          </a:prstGeom>
+          <a:noFill/>
+          <a:extLst>
+            <a:ext uri="{909E8E84-426E-40DD-AFC4-6F175D3DCCD1}">
+              <a14:hiddenFill xmlns:a14="http://schemas.microsoft.com/office/drawing/2010/main">
+                <a:solidFill>
+                  <a:srgbClr val="FFFFFF"/>
+                </a:solidFill>
+              </a14:hiddenFill>
+            </a:ext>
+          </a:extLst>
+        </p:spPr>
+      </p:pic>
     </p:spTree>
     <p:extLst>
       <p:ext uri="{BB962C8B-B14F-4D97-AF65-F5344CB8AC3E}">
@@ -2784,7 +3568,7 @@
         <p:cNvPr id="1" name="">
           <a:extLst>
             <a:ext uri="{FF2B5EF4-FFF2-40B4-BE49-F238E27FC236}">
-              <a16:creationId xmlns:a16="http://schemas.microsoft.com/office/drawing/2014/main" id="{5255A212-F7F3-E3A6-4384-717E60898F7B}"/>
+              <a16:creationId xmlns:a16="http://schemas.microsoft.com/office/drawing/2014/main" id="{222B7DE3-51CD-6B5A-2B5E-0306F45D4ED2}"/>
             </a:ext>
           </a:extLst>
         </p:cNvPr>
@@ -2804,7 +3588,7 @@
           <p:cNvPr id="10" name="Titolo 9">
             <a:extLst>
               <a:ext uri="{FF2B5EF4-FFF2-40B4-BE49-F238E27FC236}">
-                <a16:creationId xmlns:a16="http://schemas.microsoft.com/office/drawing/2014/main" id="{8895E181-0BB5-68A0-F54D-4F4FCCFB8F29}"/>
+                <a16:creationId xmlns:a16="http://schemas.microsoft.com/office/drawing/2014/main" id="{4C25E8CD-460D-EA59-6695-FF3B1931BDB9}"/>
               </a:ext>
             </a:extLst>
           </p:cNvPr>
@@ -2829,7 +3613,7 @@
               <a:rPr lang="en-GB" noProof="0" dirty="0">
                 <a:latin typeface="Arial Black" panose="020B0A04020102020204" pitchFamily="34" charset="0"/>
               </a:rPr>
-              <a:t>Practical implementation – </a:t>
+              <a:t>Proposed solution –  </a:t>
             </a:r>
             <a:br>
               <a:rPr lang="en-GB" noProof="0" dirty="0">
@@ -2840,7 +3624,7 @@
               <a:rPr lang="en-GB" noProof="0" dirty="0">
                 <a:latin typeface="Arial Black" panose="020B0A04020102020204" pitchFamily="34" charset="0"/>
               </a:rPr>
-              <a:t>system setting</a:t>
+              <a:t>Block Hankel matrices definition</a:t>
             </a:r>
           </a:p>
         </p:txBody>
@@ -2850,7 +3634,7 @@
           <p:cNvPr id="4" name="CasellaDiTesto 3">
             <a:extLst>
               <a:ext uri="{FF2B5EF4-FFF2-40B4-BE49-F238E27FC236}">
-                <a16:creationId xmlns:a16="http://schemas.microsoft.com/office/drawing/2014/main" id="{BE214AF7-BD5F-1697-AC34-4C091718BD70}"/>
+                <a16:creationId xmlns:a16="http://schemas.microsoft.com/office/drawing/2014/main" id="{59CB48FC-5C86-0F21-A5FE-DF198C688242}"/>
               </a:ext>
             </a:extLst>
           </p:cNvPr>
@@ -2860,7 +3644,7 @@
         <p:spPr>
           <a:xfrm>
             <a:off x="762000" y="1676400"/>
-            <a:ext cx="9677400" cy="1200329"/>
+            <a:ext cx="10744200" cy="4893647"/>
           </a:xfrm>
           <a:prstGeom prst="rect">
             <a:avLst/>
@@ -2875,13 +3659,120 @@
           <a:p>
             <a:pPr algn="just"/>
             <a:r>
-              <a:rPr lang="en-GB" sz="2400" noProof="0" dirty="0">
+              <a:rPr lang="en-GB" sz="2400" dirty="0">
                 <a:latin typeface="Arial" panose="020B0604020202020204" pitchFamily="34" charset="0"/>
                 <a:cs typeface="Arial" panose="020B0604020202020204" pitchFamily="34" charset="0"/>
               </a:rPr>
-              <a:t>a</a:t>
-            </a:r>
-            <a:endParaRPr lang="en-GB" sz="2400" i="1" noProof="0" dirty="0">
+              <a:t>The SPC algorithm starts by defining the block Hankel matrices for inputs, outputs and noise, assuming k= </a:t>
+            </a:r>
+            <a:r>
+              <a:rPr lang="en-GB" sz="2400" dirty="0" err="1">
+                <a:latin typeface="Arial" panose="020B0604020202020204" pitchFamily="34" charset="0"/>
+                <a:cs typeface="Arial" panose="020B0604020202020204" pitchFamily="34" charset="0"/>
+              </a:rPr>
+              <a:t>N+M+j</a:t>
+            </a:r>
+            <a:r>
+              <a:rPr lang="en-GB" sz="2400" dirty="0">
+                <a:latin typeface="Arial" panose="020B0604020202020204" pitchFamily="34" charset="0"/>
+                <a:cs typeface="Arial" panose="020B0604020202020204" pitchFamily="34" charset="0"/>
+              </a:rPr>
+              <a:t> total samples for all three signals:</a:t>
+            </a:r>
+          </a:p>
+          <a:p>
+            <a:pPr algn="just"/>
+            <a:endParaRPr lang="en-GB" sz="2400" dirty="0">
+              <a:latin typeface="Arial" panose="020B0604020202020204" pitchFamily="34" charset="0"/>
+              <a:cs typeface="Arial" panose="020B0604020202020204" pitchFamily="34" charset="0"/>
+            </a:endParaRPr>
+          </a:p>
+          <a:p>
+            <a:pPr algn="just"/>
+            <a:endParaRPr lang="en-GB" sz="2400" dirty="0">
+              <a:latin typeface="Arial" panose="020B0604020202020204" pitchFamily="34" charset="0"/>
+              <a:cs typeface="Arial" panose="020B0604020202020204" pitchFamily="34" charset="0"/>
+            </a:endParaRPr>
+          </a:p>
+          <a:p>
+            <a:pPr algn="just"/>
+            <a:endParaRPr lang="en-GB" sz="2400" dirty="0">
+              <a:latin typeface="Arial" panose="020B0604020202020204" pitchFamily="34" charset="0"/>
+              <a:cs typeface="Arial" panose="020B0604020202020204" pitchFamily="34" charset="0"/>
+            </a:endParaRPr>
+          </a:p>
+          <a:p>
+            <a:pPr algn="just"/>
+            <a:endParaRPr lang="en-GB" sz="2400" dirty="0">
+              <a:latin typeface="Arial" panose="020B0604020202020204" pitchFamily="34" charset="0"/>
+              <a:cs typeface="Arial" panose="020B0604020202020204" pitchFamily="34" charset="0"/>
+            </a:endParaRPr>
+          </a:p>
+          <a:p>
+            <a:pPr algn="just"/>
+            <a:endParaRPr lang="en-GB" sz="2400" dirty="0">
+              <a:latin typeface="Arial" panose="020B0604020202020204" pitchFamily="34" charset="0"/>
+              <a:cs typeface="Arial" panose="020B0604020202020204" pitchFamily="34" charset="0"/>
+            </a:endParaRPr>
+          </a:p>
+          <a:p>
+            <a:pPr algn="just"/>
+            <a:endParaRPr lang="en-GB" sz="2400" dirty="0">
+              <a:latin typeface="Arial" panose="020B0604020202020204" pitchFamily="34" charset="0"/>
+              <a:cs typeface="Arial" panose="020B0604020202020204" pitchFamily="34" charset="0"/>
+            </a:endParaRPr>
+          </a:p>
+          <a:p>
+            <a:pPr algn="just"/>
+            <a:r>
+              <a:rPr lang="en-GB" sz="2400" dirty="0">
+                <a:latin typeface="Arial" panose="020B0604020202020204" pitchFamily="34" charset="0"/>
+                <a:cs typeface="Arial" panose="020B0604020202020204" pitchFamily="34" charset="0"/>
+              </a:rPr>
+              <a:t>We define the matrices			     in the same way.</a:t>
+            </a:r>
+          </a:p>
+          <a:p>
+            <a:pPr algn="just"/>
+            <a:endParaRPr lang="en-GB" dirty="0">
+              <a:latin typeface="Arial" panose="020B0604020202020204" pitchFamily="34" charset="0"/>
+              <a:cs typeface="Arial" panose="020B0604020202020204" pitchFamily="34" charset="0"/>
+            </a:endParaRPr>
+          </a:p>
+          <a:p>
+            <a:pPr algn="just"/>
+            <a:r>
+              <a:rPr lang="en-GB" sz="2400" i="1" dirty="0">
+                <a:latin typeface="Arial" panose="020B0604020202020204" pitchFamily="34" charset="0"/>
+                <a:cs typeface="Arial" panose="020B0604020202020204" pitchFamily="34" charset="0"/>
+              </a:rPr>
+              <a:t>p </a:t>
+            </a:r>
+            <a:r>
+              <a:rPr lang="en-GB" sz="2400" dirty="0">
+                <a:latin typeface="Arial" panose="020B0604020202020204" pitchFamily="34" charset="0"/>
+                <a:cs typeface="Arial" panose="020B0604020202020204" pitchFamily="34" charset="0"/>
+              </a:rPr>
+              <a:t>represents “past” matrices, with M being the number of “past” data points</a:t>
+            </a:r>
+          </a:p>
+          <a:p>
+            <a:pPr algn="just"/>
+            <a:r>
+              <a:rPr lang="en-GB" sz="2400" i="1" dirty="0">
+                <a:latin typeface="Arial" panose="020B0604020202020204" pitchFamily="34" charset="0"/>
+                <a:cs typeface="Arial" panose="020B0604020202020204" pitchFamily="34" charset="0"/>
+              </a:rPr>
+              <a:t>f </a:t>
+            </a:r>
+            <a:r>
+              <a:rPr lang="en-GB" sz="2400" dirty="0">
+                <a:latin typeface="Arial" panose="020B0604020202020204" pitchFamily="34" charset="0"/>
+                <a:cs typeface="Arial" panose="020B0604020202020204" pitchFamily="34" charset="0"/>
+              </a:rPr>
+              <a:t>represents “future”	matrices, with N being the number of “future” data points</a:t>
+            </a:r>
+            <a:endParaRPr lang="en-GB" sz="2400" noProof="0" dirty="0">
               <a:latin typeface="Arial" panose="020B0604020202020204" pitchFamily="34" charset="0"/>
               <a:cs typeface="Arial" panose="020B0604020202020204" pitchFamily="34" charset="0"/>
             </a:endParaRPr>
@@ -2893,19 +3784,153 @@
               <a:cs typeface="Arial" panose="020B0604020202020204" pitchFamily="34" charset="0"/>
             </a:endParaRPr>
           </a:p>
-          <a:p>
-            <a:pPr algn="just"/>
-            <a:endParaRPr lang="en-GB" sz="2400" noProof="0" dirty="0">
-              <a:latin typeface="Arial" panose="020B0604020202020204" pitchFamily="34" charset="0"/>
-              <a:cs typeface="Arial" panose="020B0604020202020204" pitchFamily="34" charset="0"/>
-            </a:endParaRPr>
-          </a:p>
         </p:txBody>
       </p:sp>
+      <p:pic>
+        <p:nvPicPr>
+          <p:cNvPr id="2053" name="Picture 5">
+            <a:extLst>
+              <a:ext uri="{FF2B5EF4-FFF2-40B4-BE49-F238E27FC236}">
+                <a16:creationId xmlns:a16="http://schemas.microsoft.com/office/drawing/2014/main" id="{4F164D35-540F-683B-ECC3-C08E58382EA6}"/>
+              </a:ext>
+            </a:extLst>
+          </p:cNvPr>
+          <p:cNvPicPr>
+            <a:picLocks noChangeAspect="1" noChangeArrowheads="1"/>
+          </p:cNvPicPr>
+          <p:nvPr/>
+        </p:nvPicPr>
+        <p:blipFill>
+          <a:blip r:embed="rId2">
+            <a:extLst>
+              <a:ext uri="{28A0092B-C50C-407E-A947-70E740481C1C}">
+                <a14:useLocalDpi xmlns:a14="http://schemas.microsoft.com/office/drawing/2010/main" val="0"/>
+              </a:ext>
+            </a:extLst>
+          </a:blip>
+          <a:srcRect/>
+          <a:stretch>
+            <a:fillRect/>
+          </a:stretch>
+        </p:blipFill>
+        <p:spPr bwMode="auto">
+          <a:xfrm>
+            <a:off x="990600" y="2653755"/>
+            <a:ext cx="4191000" cy="1478221"/>
+          </a:xfrm>
+          <a:prstGeom prst="rect">
+            <a:avLst/>
+          </a:prstGeom>
+          <a:noFill/>
+          <a:extLst>
+            <a:ext uri="{909E8E84-426E-40DD-AFC4-6F175D3DCCD1}">
+              <a14:hiddenFill xmlns:a14="http://schemas.microsoft.com/office/drawing/2010/main">
+                <a:solidFill>
+                  <a:srgbClr val="FFFFFF"/>
+                </a:solidFill>
+              </a14:hiddenFill>
+            </a:ext>
+          </a:extLst>
+        </p:spPr>
+      </p:pic>
+      <p:pic>
+        <p:nvPicPr>
+          <p:cNvPr id="2054" name="Picture 6">
+            <a:extLst>
+              <a:ext uri="{FF2B5EF4-FFF2-40B4-BE49-F238E27FC236}">
+                <a16:creationId xmlns:a16="http://schemas.microsoft.com/office/drawing/2014/main" id="{347E99B8-3CE4-4F97-7F95-CF09DA3AEBFC}"/>
+              </a:ext>
+            </a:extLst>
+          </p:cNvPr>
+          <p:cNvPicPr>
+            <a:picLocks noChangeAspect="1" noChangeArrowheads="1"/>
+          </p:cNvPicPr>
+          <p:nvPr/>
+        </p:nvPicPr>
+        <p:blipFill>
+          <a:blip r:embed="rId3">
+            <a:extLst>
+              <a:ext uri="{28A0092B-C50C-407E-A947-70E740481C1C}">
+                <a14:useLocalDpi xmlns:a14="http://schemas.microsoft.com/office/drawing/2010/main" val="0"/>
+              </a:ext>
+            </a:extLst>
+          </a:blip>
+          <a:srcRect/>
+          <a:stretch>
+            <a:fillRect/>
+          </a:stretch>
+        </p:blipFill>
+        <p:spPr bwMode="auto">
+          <a:xfrm>
+            <a:off x="6366774" y="2667000"/>
+            <a:ext cx="4682226" cy="1459706"/>
+          </a:xfrm>
+          <a:prstGeom prst="rect">
+            <a:avLst/>
+          </a:prstGeom>
+          <a:noFill/>
+          <a:extLst>
+            <a:ext uri="{909E8E84-426E-40DD-AFC4-6F175D3DCCD1}">
+              <a14:hiddenFill xmlns:a14="http://schemas.microsoft.com/office/drawing/2010/main">
+                <a:solidFill>
+                  <a:srgbClr val="FFFFFF"/>
+                </a:solidFill>
+              </a14:hiddenFill>
+            </a:ext>
+          </a:extLst>
+        </p:spPr>
+      </p:pic>
+      <p:pic>
+        <p:nvPicPr>
+          <p:cNvPr id="2056" name="Picture 8">
+            <a:extLst>
+              <a:ext uri="{FF2B5EF4-FFF2-40B4-BE49-F238E27FC236}">
+                <a16:creationId xmlns:a16="http://schemas.microsoft.com/office/drawing/2014/main" id="{5B787739-D46B-F10D-E3AA-16E4AC3E91D6}"/>
+              </a:ext>
+            </a:extLst>
+          </p:cNvPr>
+          <p:cNvPicPr>
+            <a:picLocks noChangeAspect="1" noChangeArrowheads="1"/>
+          </p:cNvPicPr>
+          <p:nvPr/>
+        </p:nvPicPr>
+        <p:blipFill>
+          <a:blip r:embed="rId4">
+            <a:extLst>
+              <a:ext uri="{28A0092B-C50C-407E-A947-70E740481C1C}">
+                <a14:useLocalDpi xmlns:a14="http://schemas.microsoft.com/office/drawing/2010/main" val="0"/>
+              </a:ext>
+            </a:extLst>
+          </a:blip>
+          <a:srcRect/>
+          <a:stretch>
+            <a:fillRect/>
+          </a:stretch>
+        </p:blipFill>
+        <p:spPr bwMode="auto">
+          <a:xfrm>
+            <a:off x="4114800" y="4646620"/>
+            <a:ext cx="2514600" cy="469594"/>
+          </a:xfrm>
+          <a:prstGeom prst="rect">
+            <a:avLst/>
+          </a:prstGeom>
+          <a:noFill/>
+          <a:extLst>
+            <a:ext uri="{909E8E84-426E-40DD-AFC4-6F175D3DCCD1}">
+              <a14:hiddenFill xmlns:a14="http://schemas.microsoft.com/office/drawing/2010/main">
+                <a:solidFill>
+                  <a:srgbClr val="FFFFFF"/>
+                </a:solidFill>
+              </a14:hiddenFill>
+            </a:ext>
+          </a:extLst>
+        </p:spPr>
+      </p:pic>
     </p:spTree>
     <p:extLst>
       <p:ext uri="{BB962C8B-B14F-4D97-AF65-F5344CB8AC3E}">
-        <p14:creationId xmlns:p14="http://schemas.microsoft.com/office/powerpoint/2010/main" val="2424430597"/>
+        <p14:creationId xmlns:p14="http://schemas.microsoft.com/office/powerpoint/2010/main" val="2009057202"/>
       </p:ext>
     </p:extLst>
   </p:cSld>
@@ -2923,7 +3948,7 @@
         <p:cNvPr id="1" name="">
           <a:extLst>
             <a:ext uri="{FF2B5EF4-FFF2-40B4-BE49-F238E27FC236}">
-              <a16:creationId xmlns:a16="http://schemas.microsoft.com/office/drawing/2014/main" id="{67FFD052-A6E4-4EA3-40C9-0D7F9ED82C6C}"/>
+              <a16:creationId xmlns:a16="http://schemas.microsoft.com/office/drawing/2014/main" id="{83053F32-E3E6-C505-8515-922310E3DD88}"/>
             </a:ext>
           </a:extLst>
         </p:cNvPr>
@@ -2943,7 +3968,7 @@
           <p:cNvPr id="10" name="Titolo 9">
             <a:extLst>
               <a:ext uri="{FF2B5EF4-FFF2-40B4-BE49-F238E27FC236}">
-                <a16:creationId xmlns:a16="http://schemas.microsoft.com/office/drawing/2014/main" id="{14853C74-3D76-BB45-5EBD-2082D50CCEE3}"/>
+                <a16:creationId xmlns:a16="http://schemas.microsoft.com/office/drawing/2014/main" id="{6953E27C-10B1-A2E6-6AC4-7B493C8B4777}"/>
               </a:ext>
             </a:extLst>
           </p:cNvPr>
@@ -2956,8 +3981,8 @@
         </p:nvSpPr>
         <p:spPr>
           <a:xfrm>
-            <a:off x="762000" y="457200"/>
-            <a:ext cx="8991600" cy="538609"/>
+            <a:off x="761999" y="457200"/>
+            <a:ext cx="9691687" cy="1615827"/>
           </a:xfrm>
         </p:spPr>
         <p:txBody>
@@ -2968,17 +3993,619 @@
               <a:rPr lang="en-GB" noProof="0" dirty="0">
                 <a:latin typeface="Arial Black" panose="020B0A04020102020204" pitchFamily="34" charset="0"/>
               </a:rPr>
-              <a:t>Results</a:t>
-            </a:r>
+              <a:t>Proposed solution –  </a:t>
+            </a:r>
+            <a:br>
+              <a:rPr lang="en-GB" noProof="0" dirty="0">
+                <a:latin typeface="Arial Black" panose="020B0A04020102020204" pitchFamily="34" charset="0"/>
+              </a:rPr>
+            </a:br>
+            <a:r>
+              <a:rPr lang="en-GB" dirty="0">
+                <a:latin typeface="Arial Black" panose="020B0A04020102020204" pitchFamily="34" charset="0"/>
+              </a:rPr>
+              <a:t>Defining the predictor and LS problem</a:t>
+            </a:r>
+            <a:endParaRPr lang="en-GB" noProof="0" dirty="0">
+              <a:latin typeface="Arial Black" panose="020B0A04020102020204" pitchFamily="34" charset="0"/>
+            </a:endParaRPr>
+          </a:p>
+        </p:txBody>
+      </p:sp>
+      <mc:AlternateContent xmlns:mc="http://schemas.openxmlformats.org/markup-compatibility/2006">
+        <mc:Choice xmlns:a14="http://schemas.microsoft.com/office/drawing/2010/main" Requires="a14">
+          <p:sp>
+            <p:nvSpPr>
+              <p:cNvPr id="4" name="CasellaDiTesto 3">
+                <a:extLst>
+                  <a:ext uri="{FF2B5EF4-FFF2-40B4-BE49-F238E27FC236}">
+                    <a16:creationId xmlns:a16="http://schemas.microsoft.com/office/drawing/2014/main" id="{A9F1D71B-7C26-282E-A5F7-6C13EFA9D5D8}"/>
+                  </a:ext>
+                </a:extLst>
+              </p:cNvPr>
+              <p:cNvSpPr txBox="1"/>
+              <p:nvPr/>
+            </p:nvSpPr>
+            <p:spPr>
+              <a:xfrm>
+                <a:off x="762000" y="1676400"/>
+                <a:ext cx="10744200" cy="3498650"/>
+              </a:xfrm>
+              <a:prstGeom prst="rect">
+                <a:avLst/>
+              </a:prstGeom>
+              <a:noFill/>
+            </p:spPr>
+            <p:txBody>
+              <a:bodyPr wrap="square">
+                <a:spAutoFit/>
+              </a:bodyPr>
+              <a:lstStyle/>
+              <a:p>
+                <a:pPr algn="just"/>
+                <a:r>
+                  <a:rPr lang="en-GB" sz="2400" noProof="0" dirty="0">
+                    <a:latin typeface="Arial" panose="020B0604020202020204" pitchFamily="34" charset="0"/>
+                    <a:cs typeface="Arial" panose="020B0604020202020204" pitchFamily="34" charset="0"/>
+                  </a:rPr>
+                  <a:t>Using past </a:t>
+                </a:r>
+                <a:r>
+                  <a:rPr lang="en-GB" sz="2400" dirty="0">
+                    <a:latin typeface="Arial" panose="020B0604020202020204" pitchFamily="34" charset="0"/>
+                    <a:cs typeface="Arial" panose="020B0604020202020204" pitchFamily="34" charset="0"/>
+                  </a:rPr>
+                  <a:t>matrices we can build matrix</a:t>
+                </a:r>
+              </a:p>
+              <a:p>
+                <a:pPr algn="just"/>
+                <a:endParaRPr lang="en-GB" sz="2400" noProof="0" dirty="0">
+                  <a:latin typeface="Arial" panose="020B0604020202020204" pitchFamily="34" charset="0"/>
+                  <a:cs typeface="Arial" panose="020B0604020202020204" pitchFamily="34" charset="0"/>
+                </a:endParaRPr>
+              </a:p>
+              <a:p>
+                <a:pPr algn="just"/>
+                <a:endParaRPr lang="en-GB" sz="2400" noProof="0" dirty="0">
+                  <a:latin typeface="Arial" panose="020B0604020202020204" pitchFamily="34" charset="0"/>
+                  <a:cs typeface="Arial" panose="020B0604020202020204" pitchFamily="34" charset="0"/>
+                </a:endParaRPr>
+              </a:p>
+              <a:p>
+                <a:pPr algn="just"/>
+                <a:r>
+                  <a:rPr lang="en-GB" sz="2400" dirty="0">
+                    <a:latin typeface="Arial" panose="020B0604020202020204" pitchFamily="34" charset="0"/>
+                    <a:cs typeface="Arial" panose="020B0604020202020204" pitchFamily="34" charset="0"/>
+                  </a:rPr>
+                  <a:t>And then try to find a linear predictor of the outputs:</a:t>
+                </a:r>
+              </a:p>
+              <a:p>
+                <a:pPr algn="just"/>
+                <a:endParaRPr lang="en-GB" sz="2400" dirty="0">
+                  <a:latin typeface="Arial" panose="020B0604020202020204" pitchFamily="34" charset="0"/>
+                  <a:cs typeface="Arial" panose="020B0604020202020204" pitchFamily="34" charset="0"/>
+                </a:endParaRPr>
+              </a:p>
+              <a:p>
+                <a:pPr algn="just"/>
+                <a14:m>
+                  <m:oMathPara xmlns:m="http://schemas.openxmlformats.org/officeDocument/2006/math">
+                    <m:oMathParaPr>
+                      <m:jc m:val="centerGroup"/>
+                    </m:oMathParaPr>
+                    <m:oMath xmlns:m="http://schemas.openxmlformats.org/officeDocument/2006/math">
+                      <m:sSub>
+                        <m:sSubPr>
+                          <m:ctrlPr>
+                            <a:rPr lang="en-GB" sz="2400" i="1" noProof="0" smtClean="0">
+                              <a:latin typeface="Cambria Math" panose="02040503050406030204" pitchFamily="18" charset="0"/>
+                              <a:cs typeface="Arial" panose="020B0604020202020204" pitchFamily="34" charset="0"/>
+                            </a:rPr>
+                          </m:ctrlPr>
+                        </m:sSubPr>
+                        <m:e>
+                          <m:acc>
+                            <m:accPr>
+                              <m:chr m:val="̂"/>
+                              <m:ctrlPr>
+                                <a:rPr lang="it-IT" sz="2400" b="0" i="1" noProof="0" smtClean="0">
+                                  <a:latin typeface="Cambria Math" panose="02040503050406030204" pitchFamily="18" charset="0"/>
+                                  <a:cs typeface="Arial" panose="020B0604020202020204" pitchFamily="34" charset="0"/>
+                                </a:rPr>
+                              </m:ctrlPr>
+                            </m:accPr>
+                            <m:e>
+                              <m:r>
+                                <a:rPr lang="it-IT" sz="2400" b="0" i="1" noProof="0" smtClean="0">
+                                  <a:latin typeface="Cambria Math" panose="02040503050406030204" pitchFamily="18" charset="0"/>
+                                  <a:cs typeface="Arial" panose="020B0604020202020204" pitchFamily="34" charset="0"/>
+                                </a:rPr>
+                                <m:t>𝑌</m:t>
+                              </m:r>
+                            </m:e>
+                          </m:acc>
+                        </m:e>
+                        <m:sub>
+                          <m:r>
+                            <a:rPr lang="it-IT" sz="2400" b="0" i="1" noProof="0" smtClean="0">
+                              <a:latin typeface="Cambria Math" panose="02040503050406030204" pitchFamily="18" charset="0"/>
+                              <a:cs typeface="Arial" panose="020B0604020202020204" pitchFamily="34" charset="0"/>
+                            </a:rPr>
+                            <m:t>𝑓</m:t>
+                          </m:r>
+                        </m:sub>
+                      </m:sSub>
+                      <m:r>
+                        <a:rPr lang="it-IT" sz="2400" b="0" i="1" noProof="0" smtClean="0">
+                          <a:latin typeface="Cambria Math" panose="02040503050406030204" pitchFamily="18" charset="0"/>
+                          <a:cs typeface="Arial" panose="020B0604020202020204" pitchFamily="34" charset="0"/>
+                        </a:rPr>
+                        <m:t>=</m:t>
+                      </m:r>
+                      <m:sSub>
+                        <m:sSubPr>
+                          <m:ctrlPr>
+                            <a:rPr lang="it-IT" sz="2400" b="0" i="1" noProof="0" smtClean="0">
+                              <a:latin typeface="Cambria Math" panose="02040503050406030204" pitchFamily="18" charset="0"/>
+                              <a:cs typeface="Arial" panose="020B0604020202020204" pitchFamily="34" charset="0"/>
+                            </a:rPr>
+                          </m:ctrlPr>
+                        </m:sSubPr>
+                        <m:e>
+                          <m:r>
+                            <a:rPr lang="it-IT" sz="2400" b="0" i="1" noProof="0" smtClean="0">
+                              <a:latin typeface="Cambria Math" panose="02040503050406030204" pitchFamily="18" charset="0"/>
+                              <a:cs typeface="Arial" panose="020B0604020202020204" pitchFamily="34" charset="0"/>
+                            </a:rPr>
+                            <m:t>𝐿</m:t>
+                          </m:r>
+                        </m:e>
+                        <m:sub>
+                          <m:r>
+                            <a:rPr lang="it-IT" sz="2400" b="0" i="1" noProof="0" smtClean="0">
+                              <a:latin typeface="Cambria Math" panose="02040503050406030204" pitchFamily="18" charset="0"/>
+                              <a:cs typeface="Arial" panose="020B0604020202020204" pitchFamily="34" charset="0"/>
+                            </a:rPr>
+                            <m:t>𝑤</m:t>
+                          </m:r>
+                        </m:sub>
+                      </m:sSub>
+                      <m:sSub>
+                        <m:sSubPr>
+                          <m:ctrlPr>
+                            <a:rPr lang="it-IT" sz="2400" b="0" i="1" noProof="0" smtClean="0">
+                              <a:latin typeface="Cambria Math" panose="02040503050406030204" pitchFamily="18" charset="0"/>
+                              <a:cs typeface="Arial" panose="020B0604020202020204" pitchFamily="34" charset="0"/>
+                            </a:rPr>
+                          </m:ctrlPr>
+                        </m:sSubPr>
+                        <m:e>
+                          <m:r>
+                            <a:rPr lang="it-IT" sz="2400" b="0" i="1" noProof="0" smtClean="0">
+                              <a:latin typeface="Cambria Math" panose="02040503050406030204" pitchFamily="18" charset="0"/>
+                              <a:cs typeface="Arial" panose="020B0604020202020204" pitchFamily="34" charset="0"/>
+                            </a:rPr>
+                            <m:t>𝑊</m:t>
+                          </m:r>
+                        </m:e>
+                        <m:sub>
+                          <m:r>
+                            <a:rPr lang="it-IT" sz="2400" b="0" i="1" noProof="0" smtClean="0">
+                              <a:latin typeface="Cambria Math" panose="02040503050406030204" pitchFamily="18" charset="0"/>
+                              <a:cs typeface="Arial" panose="020B0604020202020204" pitchFamily="34" charset="0"/>
+                            </a:rPr>
+                            <m:t>𝑝</m:t>
+                          </m:r>
+                        </m:sub>
+                      </m:sSub>
+                      <m:r>
+                        <a:rPr lang="it-IT" sz="2400" b="0" i="1" noProof="0" smtClean="0">
+                          <a:latin typeface="Cambria Math" panose="02040503050406030204" pitchFamily="18" charset="0"/>
+                          <a:cs typeface="Arial" panose="020B0604020202020204" pitchFamily="34" charset="0"/>
+                        </a:rPr>
+                        <m:t>+</m:t>
+                      </m:r>
+                      <m:sSub>
+                        <m:sSubPr>
+                          <m:ctrlPr>
+                            <a:rPr lang="it-IT" sz="2400" b="0" i="1" noProof="0" smtClean="0">
+                              <a:latin typeface="Cambria Math" panose="02040503050406030204" pitchFamily="18" charset="0"/>
+                              <a:cs typeface="Arial" panose="020B0604020202020204" pitchFamily="34" charset="0"/>
+                            </a:rPr>
+                          </m:ctrlPr>
+                        </m:sSubPr>
+                        <m:e>
+                          <m:r>
+                            <a:rPr lang="it-IT" sz="2400" b="0" i="1" noProof="0" smtClean="0">
+                              <a:latin typeface="Cambria Math" panose="02040503050406030204" pitchFamily="18" charset="0"/>
+                              <a:cs typeface="Arial" panose="020B0604020202020204" pitchFamily="34" charset="0"/>
+                            </a:rPr>
+                            <m:t>𝐿</m:t>
+                          </m:r>
+                        </m:e>
+                        <m:sub>
+                          <m:r>
+                            <a:rPr lang="it-IT" sz="2400" b="0" i="1" noProof="0" smtClean="0">
+                              <a:latin typeface="Cambria Math" panose="02040503050406030204" pitchFamily="18" charset="0"/>
+                              <a:cs typeface="Arial" panose="020B0604020202020204" pitchFamily="34" charset="0"/>
+                            </a:rPr>
+                            <m:t>𝑢</m:t>
+                          </m:r>
+                        </m:sub>
+                      </m:sSub>
+                      <m:sSub>
+                        <m:sSubPr>
+                          <m:ctrlPr>
+                            <a:rPr lang="it-IT" sz="2400" b="0" i="1" noProof="0" smtClean="0">
+                              <a:latin typeface="Cambria Math" panose="02040503050406030204" pitchFamily="18" charset="0"/>
+                              <a:cs typeface="Arial" panose="020B0604020202020204" pitchFamily="34" charset="0"/>
+                            </a:rPr>
+                          </m:ctrlPr>
+                        </m:sSubPr>
+                        <m:e>
+                          <m:r>
+                            <a:rPr lang="it-IT" sz="2400" b="0" i="1" noProof="0" smtClean="0">
+                              <a:latin typeface="Cambria Math" panose="02040503050406030204" pitchFamily="18" charset="0"/>
+                              <a:cs typeface="Arial" panose="020B0604020202020204" pitchFamily="34" charset="0"/>
+                            </a:rPr>
+                            <m:t>𝑈</m:t>
+                          </m:r>
+                        </m:e>
+                        <m:sub>
+                          <m:r>
+                            <a:rPr lang="it-IT" sz="2400" b="0" i="1" noProof="0" smtClean="0">
+                              <a:latin typeface="Cambria Math" panose="02040503050406030204" pitchFamily="18" charset="0"/>
+                              <a:cs typeface="Arial" panose="020B0604020202020204" pitchFamily="34" charset="0"/>
+                            </a:rPr>
+                            <m:t>𝑓</m:t>
+                          </m:r>
+                        </m:sub>
+                      </m:sSub>
+                    </m:oMath>
+                  </m:oMathPara>
+                </a14:m>
+                <a:endParaRPr lang="en-GB" sz="2400" noProof="0" dirty="0">
+                  <a:latin typeface="Arial" panose="020B0604020202020204" pitchFamily="34" charset="0"/>
+                  <a:cs typeface="Arial" panose="020B0604020202020204" pitchFamily="34" charset="0"/>
+                </a:endParaRPr>
+              </a:p>
+              <a:p>
+                <a:pPr algn="just"/>
+                <a:endParaRPr lang="en-GB" sz="2400" dirty="0">
+                  <a:latin typeface="Arial" panose="020B0604020202020204" pitchFamily="34" charset="0"/>
+                  <a:cs typeface="Arial" panose="020B0604020202020204" pitchFamily="34" charset="0"/>
+                </a:endParaRPr>
+              </a:p>
+              <a:p>
+                <a:pPr algn="just"/>
+                <a:r>
+                  <a:rPr lang="en-GB" sz="2400" noProof="0" dirty="0">
+                    <a:latin typeface="Arial" panose="020B0604020202020204" pitchFamily="34" charset="0"/>
+                    <a:cs typeface="Arial" panose="020B0604020202020204" pitchFamily="34" charset="0"/>
+                  </a:rPr>
+                  <a:t>To find this predictor we need to find </a:t>
+                </a:r>
+                <a14:m>
+                  <m:oMath xmlns:m="http://schemas.openxmlformats.org/officeDocument/2006/math">
+                    <m:sSub>
+                      <m:sSubPr>
+                        <m:ctrlPr>
+                          <a:rPr lang="it-IT" sz="2400" b="0" i="1" noProof="0" smtClean="0">
+                            <a:latin typeface="Cambria Math" panose="02040503050406030204" pitchFamily="18" charset="0"/>
+                            <a:cs typeface="Arial" panose="020B0604020202020204" pitchFamily="34" charset="0"/>
+                          </a:rPr>
+                        </m:ctrlPr>
+                      </m:sSubPr>
+                      <m:e>
+                        <m:r>
+                          <a:rPr lang="it-IT" sz="2400" b="0" i="1" noProof="0" smtClean="0">
+                            <a:latin typeface="Cambria Math" panose="02040503050406030204" pitchFamily="18" charset="0"/>
+                            <a:cs typeface="Arial" panose="020B0604020202020204" pitchFamily="34" charset="0"/>
+                          </a:rPr>
+                          <m:t>𝐿</m:t>
+                        </m:r>
+                      </m:e>
+                      <m:sub>
+                        <m:r>
+                          <a:rPr lang="it-IT" sz="2400" b="0" i="1" noProof="0" smtClean="0">
+                            <a:latin typeface="Cambria Math" panose="02040503050406030204" pitchFamily="18" charset="0"/>
+                            <a:cs typeface="Arial" panose="020B0604020202020204" pitchFamily="34" charset="0"/>
+                          </a:rPr>
+                          <m:t>𝑤</m:t>
+                        </m:r>
+                      </m:sub>
+                    </m:sSub>
+                  </m:oMath>
+                </a14:m>
+                <a:r>
+                  <a:rPr lang="en-GB" sz="2400" noProof="0" dirty="0">
+                    <a:latin typeface="Arial" panose="020B0604020202020204" pitchFamily="34" charset="0"/>
+                    <a:cs typeface="Arial" panose="020B0604020202020204" pitchFamily="34" charset="0"/>
+                  </a:rPr>
+                  <a:t> and </a:t>
+                </a:r>
+                <a14:m>
+                  <m:oMath xmlns:m="http://schemas.openxmlformats.org/officeDocument/2006/math">
+                    <m:sSub>
+                      <m:sSubPr>
+                        <m:ctrlPr>
+                          <a:rPr lang="it-IT" sz="2400" b="0" i="1" noProof="0" smtClean="0">
+                            <a:latin typeface="Cambria Math" panose="02040503050406030204" pitchFamily="18" charset="0"/>
+                            <a:cs typeface="Arial" panose="020B0604020202020204" pitchFamily="34" charset="0"/>
+                          </a:rPr>
+                        </m:ctrlPr>
+                      </m:sSubPr>
+                      <m:e>
+                        <m:r>
+                          <a:rPr lang="it-IT" sz="2400" b="0" i="1" noProof="0" smtClean="0">
+                            <a:latin typeface="Cambria Math" panose="02040503050406030204" pitchFamily="18" charset="0"/>
+                            <a:cs typeface="Arial" panose="020B0604020202020204" pitchFamily="34" charset="0"/>
+                          </a:rPr>
+                          <m:t>𝐿</m:t>
+                        </m:r>
+                      </m:e>
+                      <m:sub>
+                        <m:r>
+                          <a:rPr lang="it-IT" sz="2400" b="0" i="1" noProof="0" smtClean="0">
+                            <a:latin typeface="Cambria Math" panose="02040503050406030204" pitchFamily="18" charset="0"/>
+                            <a:cs typeface="Arial" panose="020B0604020202020204" pitchFamily="34" charset="0"/>
+                          </a:rPr>
+                          <m:t>𝑢</m:t>
+                        </m:r>
+                      </m:sub>
+                    </m:sSub>
+                  </m:oMath>
+                </a14:m>
+                <a:r>
+                  <a:rPr lang="en-GB" sz="2400" noProof="0" dirty="0">
+                    <a:latin typeface="Arial" panose="020B0604020202020204" pitchFamily="34" charset="0"/>
+                    <a:cs typeface="Arial" panose="020B0604020202020204" pitchFamily="34" charset="0"/>
+                  </a:rPr>
+                  <a:t> that solve the </a:t>
+                </a:r>
+                <a:r>
+                  <a:rPr lang="en-GB" sz="2400" dirty="0">
+                    <a:latin typeface="Arial" panose="020B0604020202020204" pitchFamily="34" charset="0"/>
+                    <a:cs typeface="Arial" panose="020B0604020202020204" pitchFamily="34" charset="0"/>
+                  </a:rPr>
+                  <a:t>least squares problem:</a:t>
+                </a:r>
+                <a:endParaRPr lang="en-GB" sz="2400" noProof="0" dirty="0">
+                  <a:latin typeface="Arial" panose="020B0604020202020204" pitchFamily="34" charset="0"/>
+                  <a:cs typeface="Arial" panose="020B0604020202020204" pitchFamily="34" charset="0"/>
+                </a:endParaRPr>
+              </a:p>
+            </p:txBody>
+          </p:sp>
+        </mc:Choice>
+        <mc:Fallback>
+          <p:sp>
+            <p:nvSpPr>
+              <p:cNvPr id="4" name="CasellaDiTesto 3">
+                <a:extLst>
+                  <a:ext uri="{FF2B5EF4-FFF2-40B4-BE49-F238E27FC236}">
+                    <a16:creationId xmlns:a16="http://schemas.microsoft.com/office/drawing/2014/main" id="{A9F1D71B-7C26-282E-A5F7-6C13EFA9D5D8}"/>
+                  </a:ext>
+                </a:extLst>
+              </p:cNvPr>
+              <p:cNvSpPr txBox="1">
+                <a:spLocks noRot="1" noChangeAspect="1" noMove="1" noResize="1" noEditPoints="1" noAdjustHandles="1" noChangeArrowheads="1" noChangeShapeType="1" noTextEdit="1"/>
+              </p:cNvSpPr>
+              <p:nvPr/>
+            </p:nvSpPr>
+            <p:spPr>
+              <a:xfrm>
+                <a:off x="762000" y="1676400"/>
+                <a:ext cx="10744200" cy="3498650"/>
+              </a:xfrm>
+              <a:prstGeom prst="rect">
+                <a:avLst/>
+              </a:prstGeom>
+              <a:blipFill>
+                <a:blip r:embed="rId2"/>
+                <a:stretch>
+                  <a:fillRect l="-851" t="-1220" r="-794" b="-2091"/>
+                </a:stretch>
+              </a:blipFill>
+            </p:spPr>
+            <p:txBody>
+              <a:bodyPr/>
+              <a:lstStyle/>
+              <a:p>
+                <a:r>
+                  <a:rPr lang="it-IT">
+                    <a:noFill/>
+                  </a:rPr>
+                  <a:t> </a:t>
+                </a:r>
+              </a:p>
+            </p:txBody>
+          </p:sp>
+        </mc:Fallback>
+      </mc:AlternateContent>
+      <p:pic>
+        <p:nvPicPr>
+          <p:cNvPr id="3074" name="Picture 2">
+            <a:extLst>
+              <a:ext uri="{FF2B5EF4-FFF2-40B4-BE49-F238E27FC236}">
+                <a16:creationId xmlns:a16="http://schemas.microsoft.com/office/drawing/2014/main" id="{888B6C39-EA51-2423-9BBE-9407BF786949}"/>
+              </a:ext>
+            </a:extLst>
+          </p:cNvPr>
+          <p:cNvPicPr>
+            <a:picLocks noChangeAspect="1" noChangeArrowheads="1"/>
+          </p:cNvPicPr>
+          <p:nvPr/>
+        </p:nvPicPr>
+        <p:blipFill>
+          <a:blip r:embed="rId3">
+            <a:extLst>
+              <a:ext uri="{28A0092B-C50C-407E-A947-70E740481C1C}">
+                <a14:useLocalDpi xmlns:a14="http://schemas.microsoft.com/office/drawing/2010/main" val="0"/>
+              </a:ext>
+            </a:extLst>
+          </a:blip>
+          <a:srcRect/>
+          <a:stretch>
+            <a:fillRect/>
+          </a:stretch>
+        </p:blipFill>
+        <p:spPr bwMode="auto">
+          <a:xfrm>
+            <a:off x="6553200" y="1559818"/>
+            <a:ext cx="1752600" cy="691816"/>
+          </a:xfrm>
+          <a:prstGeom prst="rect">
+            <a:avLst/>
+          </a:prstGeom>
+          <a:noFill/>
+          <a:extLst>
+            <a:ext uri="{909E8E84-426E-40DD-AFC4-6F175D3DCCD1}">
+              <a14:hiddenFill xmlns:a14="http://schemas.microsoft.com/office/drawing/2010/main">
+                <a:solidFill>
+                  <a:srgbClr val="FFFFFF"/>
+                </a:solidFill>
+              </a14:hiddenFill>
+            </a:ext>
+          </a:extLst>
+        </p:spPr>
+      </p:pic>
+      <p:pic>
+        <p:nvPicPr>
+          <p:cNvPr id="3076" name="Picture 4">
+            <a:extLst>
+              <a:ext uri="{FF2B5EF4-FFF2-40B4-BE49-F238E27FC236}">
+                <a16:creationId xmlns:a16="http://schemas.microsoft.com/office/drawing/2014/main" id="{49EE8198-8CC9-6E6C-4F5A-4252BDD11CC5}"/>
+              </a:ext>
+            </a:extLst>
+          </p:cNvPr>
+          <p:cNvPicPr>
+            <a:picLocks noChangeAspect="1" noChangeArrowheads="1"/>
+          </p:cNvPicPr>
+          <p:nvPr/>
+        </p:nvPicPr>
+        <p:blipFill>
+          <a:blip r:embed="rId4">
+            <a:extLst>
+              <a:ext uri="{28A0092B-C50C-407E-A947-70E740481C1C}">
+                <a14:useLocalDpi xmlns:a14="http://schemas.microsoft.com/office/drawing/2010/main" val="0"/>
+              </a:ext>
+            </a:extLst>
+          </a:blip>
+          <a:srcRect/>
+          <a:stretch>
+            <a:fillRect/>
+          </a:stretch>
+        </p:blipFill>
+        <p:spPr bwMode="auto">
+          <a:xfrm>
+            <a:off x="2652712" y="4779069"/>
+            <a:ext cx="7800975" cy="1038225"/>
+          </a:xfrm>
+          <a:prstGeom prst="rect">
+            <a:avLst/>
+          </a:prstGeom>
+          <a:noFill/>
+          <a:extLst>
+            <a:ext uri="{909E8E84-426E-40DD-AFC4-6F175D3DCCD1}">
+              <a14:hiddenFill xmlns:a14="http://schemas.microsoft.com/office/drawing/2010/main">
+                <a:solidFill>
+                  <a:srgbClr val="FFFFFF"/>
+                </a:solidFill>
+              </a14:hiddenFill>
+            </a:ext>
+          </a:extLst>
+        </p:spPr>
+      </p:pic>
+    </p:spTree>
+    <p:extLst>
+      <p:ext uri="{BB962C8B-B14F-4D97-AF65-F5344CB8AC3E}">
+        <p14:creationId xmlns:p14="http://schemas.microsoft.com/office/powerpoint/2010/main" val="2307728230"/>
+      </p:ext>
+    </p:extLst>
+  </p:cSld>
+  <p:clrMapOvr>
+    <a:masterClrMapping/>
+  </p:clrMapOvr>
+</p:sld>
+</file>
+
+<file path=ppt/slides/slide7.xml><?xml version="1.0" encoding="utf-8"?>
+<p:sld xmlns:a="http://schemas.openxmlformats.org/drawingml/2006/main" xmlns:r="http://schemas.openxmlformats.org/officeDocument/2006/relationships" xmlns:p="http://schemas.openxmlformats.org/presentationml/2006/main">
+  <p:cSld>
+    <p:spTree>
+      <p:nvGrpSpPr>
+        <p:cNvPr id="1" name="">
+          <a:extLst>
+            <a:ext uri="{FF2B5EF4-FFF2-40B4-BE49-F238E27FC236}">
+              <a16:creationId xmlns:a16="http://schemas.microsoft.com/office/drawing/2014/main" id="{C7DDC92A-4B12-4310-5445-23DD1B2635A8}"/>
+            </a:ext>
+          </a:extLst>
+        </p:cNvPr>
+        <p:cNvGrpSpPr/>
+        <p:nvPr/>
+      </p:nvGrpSpPr>
+      <p:grpSpPr>
+        <a:xfrm>
+          <a:off x="0" y="0"/>
+          <a:ext cx="0" cy="0"/>
+          <a:chOff x="0" y="0"/>
+          <a:chExt cx="0" cy="0"/>
+        </a:xfrm>
+      </p:grpSpPr>
+      <p:sp>
+        <p:nvSpPr>
+          <p:cNvPr id="10" name="Titolo 9">
+            <a:extLst>
+              <a:ext uri="{FF2B5EF4-FFF2-40B4-BE49-F238E27FC236}">
+                <a16:creationId xmlns:a16="http://schemas.microsoft.com/office/drawing/2014/main" id="{0CCEDA94-E413-B429-A6A5-E9B625CED7A5}"/>
+              </a:ext>
+            </a:extLst>
+          </p:cNvPr>
+          <p:cNvSpPr>
+            <a:spLocks noGrp="1"/>
+          </p:cNvSpPr>
+          <p:nvPr>
+            <p:ph type="title"/>
+          </p:nvPr>
+        </p:nvSpPr>
+        <p:spPr>
+          <a:xfrm>
+            <a:off x="761999" y="457200"/>
+            <a:ext cx="9691687" cy="538609"/>
+          </a:xfrm>
+        </p:spPr>
+        <p:txBody>
+          <a:bodyPr/>
+          <a:lstStyle/>
+          <a:p>
+            <a:r>
+              <a:rPr lang="en-GB" noProof="0" dirty="0">
+                <a:latin typeface="Arial Black" panose="020B0A04020102020204" pitchFamily="34" charset="0"/>
+              </a:rPr>
+              <a:t>Proposed solution – </a:t>
+            </a:r>
+            <a:r>
+              <a:rPr lang="en-GB" dirty="0">
+                <a:latin typeface="Arial Black" panose="020B0A04020102020204" pitchFamily="34" charset="0"/>
+              </a:rPr>
+              <a:t>Subspace Step 1</a:t>
+            </a:r>
+            <a:endParaRPr lang="en-GB" noProof="0" dirty="0">
+              <a:latin typeface="Arial Black" panose="020B0A04020102020204" pitchFamily="34" charset="0"/>
+            </a:endParaRPr>
           </a:p>
         </p:txBody>
       </p:sp>
       <p:sp>
         <p:nvSpPr>
-          <p:cNvPr id="4" name="CasellaDiTesto 3">
+          <p:cNvPr id="2" name="CasellaDiTesto 1">
             <a:extLst>
               <a:ext uri="{FF2B5EF4-FFF2-40B4-BE49-F238E27FC236}">
-                <a16:creationId xmlns:a16="http://schemas.microsoft.com/office/drawing/2014/main" id="{D2E4F1D8-6E3E-1635-DEBC-9C2A6FBDE9CC}"/>
+                <a16:creationId xmlns:a16="http://schemas.microsoft.com/office/drawing/2014/main" id="{C7A28961-FE8E-DBE6-658C-1CF89EA111A0}"/>
               </a:ext>
             </a:extLst>
           </p:cNvPr>
@@ -2987,8 +4614,8 @@
         </p:nvSpPr>
         <p:spPr>
           <a:xfrm>
-            <a:off x="762000" y="1676400"/>
-            <a:ext cx="9677400" cy="1200329"/>
+            <a:off x="723900" y="1191645"/>
+            <a:ext cx="10744200" cy="4154984"/>
           </a:xfrm>
           <a:prstGeom prst="rect">
             <a:avLst/>
@@ -3003,37 +4630,2489 @@
           <a:p>
             <a:pPr algn="just"/>
             <a:r>
-              <a:rPr lang="en-GB" sz="2400" noProof="0" dirty="0">
+              <a:rPr lang="it-IT" sz="2400" noProof="0" dirty="0" err="1">
                 <a:latin typeface="Arial" panose="020B0604020202020204" pitchFamily="34" charset="0"/>
                 <a:cs typeface="Arial" panose="020B0604020202020204" pitchFamily="34" charset="0"/>
               </a:rPr>
-              <a:t>a</a:t>
-            </a:r>
-            <a:endParaRPr lang="en-GB" sz="2400" i="1" noProof="0" dirty="0">
+              <a:t>We</a:t>
+            </a:r>
+            <a:r>
+              <a:rPr lang="it-IT" sz="2400" noProof="0" dirty="0">
+                <a:latin typeface="Arial" panose="020B0604020202020204" pitchFamily="34" charset="0"/>
+                <a:cs typeface="Arial" panose="020B0604020202020204" pitchFamily="34" charset="0"/>
+              </a:rPr>
+              <a:t> can solve the </a:t>
+            </a:r>
+            <a:r>
+              <a:rPr lang="it-IT" sz="2400" noProof="0" dirty="0" err="1">
+                <a:latin typeface="Arial" panose="020B0604020202020204" pitchFamily="34" charset="0"/>
+                <a:cs typeface="Arial" panose="020B0604020202020204" pitchFamily="34" charset="0"/>
+              </a:rPr>
+              <a:t>Least</a:t>
+            </a:r>
+            <a:r>
+              <a:rPr lang="it-IT" sz="2400" noProof="0" dirty="0">
+                <a:latin typeface="Arial" panose="020B0604020202020204" pitchFamily="34" charset="0"/>
+                <a:cs typeface="Arial" panose="020B0604020202020204" pitchFamily="34" charset="0"/>
+              </a:rPr>
+              <a:t> </a:t>
+            </a:r>
+            <a:r>
+              <a:rPr lang="it-IT" sz="2400" noProof="0" dirty="0" err="1">
+                <a:latin typeface="Arial" panose="020B0604020202020204" pitchFamily="34" charset="0"/>
+                <a:cs typeface="Arial" panose="020B0604020202020204" pitchFamily="34" charset="0"/>
+              </a:rPr>
+              <a:t>Squares</a:t>
+            </a:r>
+            <a:r>
+              <a:rPr lang="it-IT" sz="2400" noProof="0" dirty="0">
+                <a:latin typeface="Arial" panose="020B0604020202020204" pitchFamily="34" charset="0"/>
+                <a:cs typeface="Arial" panose="020B0604020202020204" pitchFamily="34" charset="0"/>
+              </a:rPr>
+              <a:t> </a:t>
+            </a:r>
+            <a:r>
+              <a:rPr lang="it-IT" sz="2400" noProof="0" dirty="0" err="1">
+                <a:latin typeface="Arial" panose="020B0604020202020204" pitchFamily="34" charset="0"/>
+                <a:cs typeface="Arial" panose="020B0604020202020204" pitchFamily="34" charset="0"/>
+              </a:rPr>
+              <a:t>problem</a:t>
+            </a:r>
+            <a:r>
+              <a:rPr lang="it-IT" sz="2400" noProof="0" dirty="0">
+                <a:latin typeface="Arial" panose="020B0604020202020204" pitchFamily="34" charset="0"/>
+                <a:cs typeface="Arial" panose="020B0604020202020204" pitchFamily="34" charset="0"/>
+              </a:rPr>
+              <a:t> </a:t>
+            </a:r>
+            <a:r>
+              <a:rPr lang="it-IT" sz="2400" noProof="0" dirty="0" err="1">
+                <a:latin typeface="Arial" panose="020B0604020202020204" pitchFamily="34" charset="0"/>
+                <a:cs typeface="Arial" panose="020B0604020202020204" pitchFamily="34" charset="0"/>
+              </a:rPr>
+              <a:t>using</a:t>
+            </a:r>
+            <a:r>
+              <a:rPr lang="it-IT" sz="2400" noProof="0" dirty="0">
+                <a:latin typeface="Arial" panose="020B0604020202020204" pitchFamily="34" charset="0"/>
+                <a:cs typeface="Arial" panose="020B0604020202020204" pitchFamily="34" charset="0"/>
+              </a:rPr>
+              <a:t> QR </a:t>
+            </a:r>
+            <a:r>
+              <a:rPr lang="it-IT" sz="2400" noProof="0" dirty="0" err="1">
+                <a:latin typeface="Arial" panose="020B0604020202020204" pitchFamily="34" charset="0"/>
+                <a:cs typeface="Arial" panose="020B0604020202020204" pitchFamily="34" charset="0"/>
+              </a:rPr>
+              <a:t>decomposition</a:t>
+            </a:r>
+            <a:r>
+              <a:rPr lang="it-IT" sz="2400" noProof="0" dirty="0">
+                <a:latin typeface="Arial" panose="020B0604020202020204" pitchFamily="34" charset="0"/>
+                <a:cs typeface="Arial" panose="020B0604020202020204" pitchFamily="34" charset="0"/>
+              </a:rPr>
+              <a:t> like so</a:t>
+            </a:r>
+          </a:p>
+          <a:p>
+            <a:pPr algn="just"/>
+            <a:endParaRPr lang="it-IT" sz="2400" dirty="0">
               <a:latin typeface="Arial" panose="020B0604020202020204" pitchFamily="34" charset="0"/>
               <a:cs typeface="Arial" panose="020B0604020202020204" pitchFamily="34" charset="0"/>
             </a:endParaRPr>
           </a:p>
           <a:p>
             <a:pPr algn="just"/>
-            <a:endParaRPr lang="en-GB" sz="2400" noProof="0" dirty="0">
+            <a:endParaRPr lang="it-IT" sz="2400" noProof="0" dirty="0">
               <a:latin typeface="Arial" panose="020B0604020202020204" pitchFamily="34" charset="0"/>
               <a:cs typeface="Arial" panose="020B0604020202020204" pitchFamily="34" charset="0"/>
             </a:endParaRPr>
           </a:p>
           <a:p>
             <a:pPr algn="just"/>
-            <a:endParaRPr lang="en-GB" sz="2400" noProof="0" dirty="0">
+            <a:endParaRPr lang="it-IT" sz="2400" dirty="0">
               <a:latin typeface="Arial" panose="020B0604020202020204" pitchFamily="34" charset="0"/>
               <a:cs typeface="Arial" panose="020B0604020202020204" pitchFamily="34" charset="0"/>
             </a:endParaRPr>
           </a:p>
+          <a:p>
+            <a:pPr algn="just"/>
+            <a:endParaRPr lang="it-IT" sz="2400" noProof="0" dirty="0">
+              <a:latin typeface="Arial" panose="020B0604020202020204" pitchFamily="34" charset="0"/>
+              <a:cs typeface="Arial" panose="020B0604020202020204" pitchFamily="34" charset="0"/>
+            </a:endParaRPr>
+          </a:p>
+          <a:p>
+            <a:pPr algn="just"/>
+            <a:endParaRPr lang="it-IT" sz="2400" dirty="0">
+              <a:latin typeface="Arial" panose="020B0604020202020204" pitchFamily="34" charset="0"/>
+              <a:cs typeface="Arial" panose="020B0604020202020204" pitchFamily="34" charset="0"/>
+            </a:endParaRPr>
+          </a:p>
+          <a:p>
+            <a:pPr algn="just"/>
+            <a:endParaRPr lang="it-IT" sz="2400" noProof="0" dirty="0">
+              <a:latin typeface="Arial" panose="020B0604020202020204" pitchFamily="34" charset="0"/>
+              <a:cs typeface="Arial" panose="020B0604020202020204" pitchFamily="34" charset="0"/>
+            </a:endParaRPr>
+          </a:p>
+          <a:p>
+            <a:pPr algn="just"/>
+            <a:r>
+              <a:rPr lang="it-IT" sz="2400" dirty="0">
+                <a:latin typeface="Arial" panose="020B0604020202020204" pitchFamily="34" charset="0"/>
+                <a:cs typeface="Arial" panose="020B0604020202020204" pitchFamily="34" charset="0"/>
+              </a:rPr>
+              <a:t>And </a:t>
+            </a:r>
+            <a:r>
+              <a:rPr lang="it-IT" sz="2400" dirty="0" err="1">
+                <a:latin typeface="Arial" panose="020B0604020202020204" pitchFamily="34" charset="0"/>
+                <a:cs typeface="Arial" panose="020B0604020202020204" pitchFamily="34" charset="0"/>
+              </a:rPr>
+              <a:t>then</a:t>
+            </a:r>
+            <a:r>
+              <a:rPr lang="it-IT" sz="2400" dirty="0">
+                <a:latin typeface="Arial" panose="020B0604020202020204" pitchFamily="34" charset="0"/>
+                <a:cs typeface="Arial" panose="020B0604020202020204" pitchFamily="34" charset="0"/>
+              </a:rPr>
+              <a:t> computing the </a:t>
+            </a:r>
+            <a:r>
+              <a:rPr lang="it-IT" sz="2400" dirty="0" err="1">
+                <a:latin typeface="Arial" panose="020B0604020202020204" pitchFamily="34" charset="0"/>
+                <a:cs typeface="Arial" panose="020B0604020202020204" pitchFamily="34" charset="0"/>
+              </a:rPr>
+              <a:t>matrix</a:t>
+            </a:r>
+            <a:r>
+              <a:rPr lang="it-IT" sz="2400" dirty="0">
+                <a:latin typeface="Arial" panose="020B0604020202020204" pitchFamily="34" charset="0"/>
+                <a:cs typeface="Arial" panose="020B0604020202020204" pitchFamily="34" charset="0"/>
+              </a:rPr>
+              <a:t> </a:t>
+            </a:r>
+          </a:p>
+          <a:p>
+            <a:pPr algn="just"/>
+            <a:endParaRPr lang="it-IT" sz="2400" noProof="0" dirty="0">
+              <a:latin typeface="Arial" panose="020B0604020202020204" pitchFamily="34" charset="0"/>
+              <a:cs typeface="Arial" panose="020B0604020202020204" pitchFamily="34" charset="0"/>
+            </a:endParaRPr>
+          </a:p>
+          <a:p>
+            <a:pPr algn="just"/>
+            <a:endParaRPr lang="it-IT" sz="2400" dirty="0">
+              <a:latin typeface="Arial" panose="020B0604020202020204" pitchFamily="34" charset="0"/>
+              <a:cs typeface="Arial" panose="020B0604020202020204" pitchFamily="34" charset="0"/>
+            </a:endParaRPr>
+          </a:p>
+          <a:p>
+            <a:pPr algn="just"/>
+            <a:r>
+              <a:rPr lang="it-IT" sz="2400" dirty="0">
+                <a:latin typeface="Arial" panose="020B0604020202020204" pitchFamily="34" charset="0"/>
+                <a:cs typeface="Arial" panose="020B0604020202020204" pitchFamily="34" charset="0"/>
+              </a:rPr>
+              <a:t>a</a:t>
+            </a:r>
+            <a:r>
+              <a:rPr lang="it-IT" sz="2400" noProof="0" dirty="0" err="1">
+                <a:latin typeface="Arial" panose="020B0604020202020204" pitchFamily="34" charset="0"/>
+                <a:cs typeface="Arial" panose="020B0604020202020204" pitchFamily="34" charset="0"/>
+              </a:rPr>
+              <a:t>nd</a:t>
+            </a:r>
+            <a:r>
+              <a:rPr lang="it-IT" sz="2400" noProof="0" dirty="0">
+                <a:latin typeface="Arial" panose="020B0604020202020204" pitchFamily="34" charset="0"/>
+                <a:cs typeface="Arial" panose="020B0604020202020204" pitchFamily="34" charset="0"/>
+              </a:rPr>
+              <a:t> </a:t>
+            </a:r>
+            <a:r>
+              <a:rPr lang="it-IT" sz="2400" noProof="0" dirty="0" err="1">
+                <a:latin typeface="Arial" panose="020B0604020202020204" pitchFamily="34" charset="0"/>
+                <a:cs typeface="Arial" panose="020B0604020202020204" pitchFamily="34" charset="0"/>
+              </a:rPr>
+              <a:t>thus</a:t>
+            </a:r>
+            <a:r>
+              <a:rPr lang="it-IT" sz="2400" noProof="0" dirty="0">
+                <a:latin typeface="Arial" panose="020B0604020202020204" pitchFamily="34" charset="0"/>
+                <a:cs typeface="Arial" panose="020B0604020202020204" pitchFamily="34" charset="0"/>
+              </a:rPr>
+              <a:t>:</a:t>
+            </a:r>
+          </a:p>
         </p:txBody>
       </p:sp>
+      <p:pic>
+        <p:nvPicPr>
+          <p:cNvPr id="4098" name="Picture 2">
+            <a:extLst>
+              <a:ext uri="{FF2B5EF4-FFF2-40B4-BE49-F238E27FC236}">
+                <a16:creationId xmlns:a16="http://schemas.microsoft.com/office/drawing/2014/main" id="{5E7E1F09-7C16-296C-4CF3-EFD91FD307E1}"/>
+              </a:ext>
+            </a:extLst>
+          </p:cNvPr>
+          <p:cNvPicPr>
+            <a:picLocks noChangeAspect="1" noChangeArrowheads="1"/>
+          </p:cNvPicPr>
+          <p:nvPr/>
+        </p:nvPicPr>
+        <p:blipFill>
+          <a:blip r:embed="rId2">
+            <a:extLst>
+              <a:ext uri="{28A0092B-C50C-407E-A947-70E740481C1C}">
+                <a14:useLocalDpi xmlns:a14="http://schemas.microsoft.com/office/drawing/2010/main" val="0"/>
+              </a:ext>
+            </a:extLst>
+          </a:blip>
+          <a:srcRect/>
+          <a:stretch>
+            <a:fillRect/>
+          </a:stretch>
+        </p:blipFill>
+        <p:spPr bwMode="auto">
+          <a:xfrm>
+            <a:off x="914400" y="1828800"/>
+            <a:ext cx="6400799" cy="1822630"/>
+          </a:xfrm>
+          <a:prstGeom prst="rect">
+            <a:avLst/>
+          </a:prstGeom>
+          <a:noFill/>
+          <a:extLst>
+            <a:ext uri="{909E8E84-426E-40DD-AFC4-6F175D3DCCD1}">
+              <a14:hiddenFill xmlns:a14="http://schemas.microsoft.com/office/drawing/2010/main">
+                <a:solidFill>
+                  <a:srgbClr val="FFFFFF"/>
+                </a:solidFill>
+              </a14:hiddenFill>
+            </a:ext>
+          </a:extLst>
+        </p:spPr>
+      </p:pic>
+      <p:pic>
+        <p:nvPicPr>
+          <p:cNvPr id="4100" name="Picture 4">
+            <a:extLst>
+              <a:ext uri="{FF2B5EF4-FFF2-40B4-BE49-F238E27FC236}">
+                <a16:creationId xmlns:a16="http://schemas.microsoft.com/office/drawing/2014/main" id="{03B6592E-7D46-D962-F6B1-82CF1B5303C7}"/>
+              </a:ext>
+            </a:extLst>
+          </p:cNvPr>
+          <p:cNvPicPr>
+            <a:picLocks noChangeAspect="1" noChangeArrowheads="1"/>
+          </p:cNvPicPr>
+          <p:nvPr/>
+        </p:nvPicPr>
+        <p:blipFill>
+          <a:blip r:embed="rId3">
+            <a:extLst>
+              <a:ext uri="{28A0092B-C50C-407E-A947-70E740481C1C}">
+                <a14:useLocalDpi xmlns:a14="http://schemas.microsoft.com/office/drawing/2010/main" val="0"/>
+              </a:ext>
+            </a:extLst>
+          </a:blip>
+          <a:srcRect/>
+          <a:stretch>
+            <a:fillRect/>
+          </a:stretch>
+        </p:blipFill>
+        <p:spPr bwMode="auto">
+          <a:xfrm>
+            <a:off x="5410200" y="3676830"/>
+            <a:ext cx="4343400" cy="828119"/>
+          </a:xfrm>
+          <a:prstGeom prst="rect">
+            <a:avLst/>
+          </a:prstGeom>
+          <a:noFill/>
+          <a:extLst>
+            <a:ext uri="{909E8E84-426E-40DD-AFC4-6F175D3DCCD1}">
+              <a14:hiddenFill xmlns:a14="http://schemas.microsoft.com/office/drawing/2010/main">
+                <a:solidFill>
+                  <a:srgbClr val="FFFFFF"/>
+                </a:solidFill>
+              </a14:hiddenFill>
+            </a:ext>
+          </a:extLst>
+        </p:spPr>
+      </p:pic>
+      <p:pic>
+        <p:nvPicPr>
+          <p:cNvPr id="4102" name="Picture 6">
+            <a:extLst>
+              <a:ext uri="{FF2B5EF4-FFF2-40B4-BE49-F238E27FC236}">
+                <a16:creationId xmlns:a16="http://schemas.microsoft.com/office/drawing/2014/main" id="{149A6B57-5CEE-C02B-D4BE-FCBA8BC3CC29}"/>
+              </a:ext>
+            </a:extLst>
+          </p:cNvPr>
+          <p:cNvPicPr>
+            <a:picLocks noChangeAspect="1" noChangeArrowheads="1"/>
+          </p:cNvPicPr>
+          <p:nvPr/>
+        </p:nvPicPr>
+        <p:blipFill>
+          <a:blip r:embed="rId4">
+            <a:extLst>
+              <a:ext uri="{28A0092B-C50C-407E-A947-70E740481C1C}">
+                <a14:useLocalDpi xmlns:a14="http://schemas.microsoft.com/office/drawing/2010/main" val="0"/>
+              </a:ext>
+            </a:extLst>
+          </a:blip>
+          <a:srcRect/>
+          <a:stretch>
+            <a:fillRect/>
+          </a:stretch>
+        </p:blipFill>
+        <p:spPr bwMode="auto">
+          <a:xfrm>
+            <a:off x="2743200" y="4953000"/>
+            <a:ext cx="3200400" cy="533400"/>
+          </a:xfrm>
+          <a:prstGeom prst="rect">
+            <a:avLst/>
+          </a:prstGeom>
+          <a:noFill/>
+          <a:extLst>
+            <a:ext uri="{909E8E84-426E-40DD-AFC4-6F175D3DCCD1}">
+              <a14:hiddenFill xmlns:a14="http://schemas.microsoft.com/office/drawing/2010/main">
+                <a:solidFill>
+                  <a:srgbClr val="FFFFFF"/>
+                </a:solidFill>
+              </a14:hiddenFill>
+            </a:ext>
+          </a:extLst>
+        </p:spPr>
+      </p:pic>
+      <p:pic>
+        <p:nvPicPr>
+          <p:cNvPr id="4104" name="Picture 8">
+            <a:extLst>
+              <a:ext uri="{FF2B5EF4-FFF2-40B4-BE49-F238E27FC236}">
+                <a16:creationId xmlns:a16="http://schemas.microsoft.com/office/drawing/2014/main" id="{285E648B-7359-C131-0198-9CC82275488D}"/>
+              </a:ext>
+            </a:extLst>
+          </p:cNvPr>
+          <p:cNvPicPr>
+            <a:picLocks noChangeAspect="1" noChangeArrowheads="1"/>
+          </p:cNvPicPr>
+          <p:nvPr/>
+        </p:nvPicPr>
+        <p:blipFill>
+          <a:blip r:embed="rId5">
+            <a:extLst>
+              <a:ext uri="{28A0092B-C50C-407E-A947-70E740481C1C}">
+                <a14:useLocalDpi xmlns:a14="http://schemas.microsoft.com/office/drawing/2010/main" val="0"/>
+              </a:ext>
+            </a:extLst>
+          </a:blip>
+          <a:srcRect/>
+          <a:stretch>
+            <a:fillRect/>
+          </a:stretch>
+        </p:blipFill>
+        <p:spPr bwMode="auto">
+          <a:xfrm>
+            <a:off x="6330748" y="4953000"/>
+            <a:ext cx="3492903" cy="533399"/>
+          </a:xfrm>
+          <a:prstGeom prst="rect">
+            <a:avLst/>
+          </a:prstGeom>
+          <a:noFill/>
+          <a:extLst>
+            <a:ext uri="{909E8E84-426E-40DD-AFC4-6F175D3DCCD1}">
+              <a14:hiddenFill xmlns:a14="http://schemas.microsoft.com/office/drawing/2010/main">
+                <a:solidFill>
+                  <a:srgbClr val="FFFFFF"/>
+                </a:solidFill>
+              </a14:hiddenFill>
+            </a:ext>
+          </a:extLst>
+        </p:spPr>
+      </p:pic>
     </p:spTree>
     <p:extLst>
       <p:ext uri="{BB962C8B-B14F-4D97-AF65-F5344CB8AC3E}">
-        <p14:creationId xmlns:p14="http://schemas.microsoft.com/office/powerpoint/2010/main" val="2274619447"/>
+        <p14:creationId xmlns:p14="http://schemas.microsoft.com/office/powerpoint/2010/main" val="4277720139"/>
+      </p:ext>
+    </p:extLst>
+  </p:cSld>
+  <p:clrMapOvr>
+    <a:masterClrMapping/>
+  </p:clrMapOvr>
+</p:sld>
+</file>
+
+<file path=ppt/slides/slide8.xml><?xml version="1.0" encoding="utf-8"?>
+<p:sld xmlns:a="http://schemas.openxmlformats.org/drawingml/2006/main" xmlns:r="http://schemas.openxmlformats.org/officeDocument/2006/relationships" xmlns:p="http://schemas.openxmlformats.org/presentationml/2006/main">
+  <p:cSld>
+    <p:spTree>
+      <p:nvGrpSpPr>
+        <p:cNvPr id="1" name="">
+          <a:extLst>
+            <a:ext uri="{FF2B5EF4-FFF2-40B4-BE49-F238E27FC236}">
+              <a16:creationId xmlns:a16="http://schemas.microsoft.com/office/drawing/2014/main" id="{8DC1D38E-E42A-794A-265F-EE9B02AF1D12}"/>
+            </a:ext>
+          </a:extLst>
+        </p:cNvPr>
+        <p:cNvGrpSpPr/>
+        <p:nvPr/>
+      </p:nvGrpSpPr>
+      <p:grpSpPr>
+        <a:xfrm>
+          <a:off x="0" y="0"/>
+          <a:ext cx="0" cy="0"/>
+          <a:chOff x="0" y="0"/>
+          <a:chExt cx="0" cy="0"/>
+        </a:xfrm>
+      </p:grpSpPr>
+      <p:sp>
+        <p:nvSpPr>
+          <p:cNvPr id="10" name="Titolo 9">
+            <a:extLst>
+              <a:ext uri="{FF2B5EF4-FFF2-40B4-BE49-F238E27FC236}">
+                <a16:creationId xmlns:a16="http://schemas.microsoft.com/office/drawing/2014/main" id="{2E3A97D5-B71A-83F2-FF50-EEA420BD9DCA}"/>
+              </a:ext>
+            </a:extLst>
+          </p:cNvPr>
+          <p:cNvSpPr>
+            <a:spLocks noGrp="1"/>
+          </p:cNvSpPr>
+          <p:nvPr>
+            <p:ph type="title"/>
+          </p:nvPr>
+        </p:nvSpPr>
+        <p:spPr>
+          <a:xfrm>
+            <a:off x="761999" y="457200"/>
+            <a:ext cx="9691687" cy="538609"/>
+          </a:xfrm>
+        </p:spPr>
+        <p:txBody>
+          <a:bodyPr/>
+          <a:lstStyle/>
+          <a:p>
+            <a:r>
+              <a:rPr lang="en-GB" noProof="0" dirty="0">
+                <a:latin typeface="Arial Black" panose="020B0A04020102020204" pitchFamily="34" charset="0"/>
+              </a:rPr>
+              <a:t>Proposed solution – </a:t>
+            </a:r>
+            <a:r>
+              <a:rPr lang="en-GB" dirty="0">
+                <a:latin typeface="Arial Black" panose="020B0A04020102020204" pitchFamily="34" charset="0"/>
+              </a:rPr>
+              <a:t>Subspace Step 2</a:t>
+            </a:r>
+            <a:endParaRPr lang="en-GB" noProof="0" dirty="0">
+              <a:latin typeface="Arial Black" panose="020B0A04020102020204" pitchFamily="34" charset="0"/>
+            </a:endParaRPr>
+          </a:p>
+        </p:txBody>
+      </p:sp>
+      <mc:AlternateContent xmlns:mc="http://schemas.openxmlformats.org/markup-compatibility/2006">
+        <mc:Choice xmlns:a14="http://schemas.microsoft.com/office/drawing/2010/main" Requires="a14">
+          <p:sp>
+            <p:nvSpPr>
+              <p:cNvPr id="2" name="CasellaDiTesto 1">
+                <a:extLst>
+                  <a:ext uri="{FF2B5EF4-FFF2-40B4-BE49-F238E27FC236}">
+                    <a16:creationId xmlns:a16="http://schemas.microsoft.com/office/drawing/2014/main" id="{A1B4B6DF-2C26-DCB2-E799-BC690D152E4A}"/>
+                  </a:ext>
+                </a:extLst>
+              </p:cNvPr>
+              <p:cNvSpPr txBox="1"/>
+              <p:nvPr/>
+            </p:nvSpPr>
+            <p:spPr>
+              <a:xfrm>
+                <a:off x="723900" y="1191645"/>
+                <a:ext cx="10744200" cy="3815275"/>
+              </a:xfrm>
+              <a:prstGeom prst="rect">
+                <a:avLst/>
+              </a:prstGeom>
+              <a:noFill/>
+            </p:spPr>
+            <p:txBody>
+              <a:bodyPr wrap="square">
+                <a:spAutoFit/>
+              </a:bodyPr>
+              <a:lstStyle/>
+              <a:p>
+                <a:pPr algn="just"/>
+                <a:r>
+                  <a:rPr lang="it-IT" sz="2400" dirty="0">
+                    <a:latin typeface="Arial" panose="020B0604020202020204" pitchFamily="34" charset="0"/>
+                    <a:cs typeface="Arial" panose="020B0604020202020204" pitchFamily="34" charset="0"/>
+                  </a:rPr>
+                  <a:t>The </a:t>
+                </a:r>
+                <a:r>
+                  <a:rPr lang="it-IT" sz="2400" dirty="0" err="1">
+                    <a:latin typeface="Arial" panose="020B0604020202020204" pitchFamily="34" charset="0"/>
+                    <a:cs typeface="Arial" panose="020B0604020202020204" pitchFamily="34" charset="0"/>
+                  </a:rPr>
+                  <a:t>next</a:t>
+                </a:r>
+                <a:r>
+                  <a:rPr lang="it-IT" sz="2400" dirty="0">
+                    <a:latin typeface="Arial" panose="020B0604020202020204" pitchFamily="34" charset="0"/>
+                    <a:cs typeface="Arial" panose="020B0604020202020204" pitchFamily="34" charset="0"/>
+                  </a:rPr>
+                  <a:t> step of the </a:t>
+                </a:r>
+                <a:r>
+                  <a:rPr lang="it-IT" sz="2400" dirty="0" err="1">
+                    <a:latin typeface="Arial" panose="020B0604020202020204" pitchFamily="34" charset="0"/>
+                    <a:cs typeface="Arial" panose="020B0604020202020204" pitchFamily="34" charset="0"/>
+                  </a:rPr>
+                  <a:t>algotithm</a:t>
+                </a:r>
+                <a:r>
+                  <a:rPr lang="it-IT" sz="2400" dirty="0">
+                    <a:latin typeface="Arial" panose="020B0604020202020204" pitchFamily="34" charset="0"/>
+                    <a:cs typeface="Arial" panose="020B0604020202020204" pitchFamily="34" charset="0"/>
+                  </a:rPr>
+                  <a:t> </a:t>
+                </a:r>
+                <a:r>
+                  <a:rPr lang="it-IT" sz="2400" dirty="0" err="1">
+                    <a:latin typeface="Arial" panose="020B0604020202020204" pitchFamily="34" charset="0"/>
+                    <a:cs typeface="Arial" panose="020B0604020202020204" pitchFamily="34" charset="0"/>
+                  </a:rPr>
+                  <a:t>is</a:t>
+                </a:r>
+                <a:r>
+                  <a:rPr lang="it-IT" sz="2400" dirty="0">
+                    <a:latin typeface="Arial" panose="020B0604020202020204" pitchFamily="34" charset="0"/>
+                    <a:cs typeface="Arial" panose="020B0604020202020204" pitchFamily="34" charset="0"/>
+                  </a:rPr>
+                  <a:t> to </a:t>
+                </a:r>
+                <a:r>
+                  <a:rPr lang="it-IT" sz="2400" dirty="0" err="1">
+                    <a:latin typeface="Arial" panose="020B0604020202020204" pitchFamily="34" charset="0"/>
+                    <a:cs typeface="Arial" panose="020B0604020202020204" pitchFamily="34" charset="0"/>
+                  </a:rPr>
+                  <a:t>execute</a:t>
+                </a:r>
+                <a:r>
+                  <a:rPr lang="it-IT" sz="2400" dirty="0">
+                    <a:latin typeface="Arial" panose="020B0604020202020204" pitchFamily="34" charset="0"/>
+                    <a:cs typeface="Arial" panose="020B0604020202020204" pitchFamily="34" charset="0"/>
+                  </a:rPr>
+                  <a:t> a </a:t>
+                </a:r>
+                <a:r>
+                  <a:rPr lang="it-IT" sz="2400" dirty="0" err="1">
+                    <a:latin typeface="Arial" panose="020B0604020202020204" pitchFamily="34" charset="0"/>
+                    <a:cs typeface="Arial" panose="020B0604020202020204" pitchFamily="34" charset="0"/>
+                  </a:rPr>
+                  <a:t>rank</a:t>
+                </a:r>
+                <a:r>
+                  <a:rPr lang="it-IT" sz="2400" dirty="0">
+                    <a:latin typeface="Arial" panose="020B0604020202020204" pitchFamily="34" charset="0"/>
+                    <a:cs typeface="Arial" panose="020B0604020202020204" pitchFamily="34" charset="0"/>
+                  </a:rPr>
+                  <a:t>-n </a:t>
+                </a:r>
+                <a:r>
+                  <a:rPr lang="it-IT" sz="2400" dirty="0" err="1">
+                    <a:latin typeface="Arial" panose="020B0604020202020204" pitchFamily="34" charset="0"/>
+                    <a:cs typeface="Arial" panose="020B0604020202020204" pitchFamily="34" charset="0"/>
+                  </a:rPr>
+                  <a:t>approximation</a:t>
+                </a:r>
+                <a:r>
+                  <a:rPr lang="it-IT" sz="2400" dirty="0">
+                    <a:latin typeface="Arial" panose="020B0604020202020204" pitchFamily="34" charset="0"/>
+                    <a:cs typeface="Arial" panose="020B0604020202020204" pitchFamily="34" charset="0"/>
+                  </a:rPr>
+                  <a:t> of </a:t>
+                </a:r>
+                <a14:m>
+                  <m:oMath xmlns:m="http://schemas.openxmlformats.org/officeDocument/2006/math">
+                    <m:sSub>
+                      <m:sSubPr>
+                        <m:ctrlPr>
+                          <a:rPr lang="it-IT" sz="2400" i="1" smtClean="0">
+                            <a:latin typeface="Cambria Math" panose="02040503050406030204" pitchFamily="18" charset="0"/>
+                            <a:cs typeface="Arial" panose="020B0604020202020204" pitchFamily="34" charset="0"/>
+                          </a:rPr>
+                        </m:ctrlPr>
+                      </m:sSubPr>
+                      <m:e>
+                        <m:r>
+                          <a:rPr lang="it-IT" sz="2400" b="0" i="1" smtClean="0">
+                            <a:latin typeface="Cambria Math" panose="02040503050406030204" pitchFamily="18" charset="0"/>
+                            <a:cs typeface="Arial" panose="020B0604020202020204" pitchFamily="34" charset="0"/>
+                          </a:rPr>
+                          <m:t>𝐿</m:t>
+                        </m:r>
+                      </m:e>
+                      <m:sub>
+                        <m:r>
+                          <a:rPr lang="it-IT" sz="2400" b="0" i="1" smtClean="0">
+                            <a:latin typeface="Cambria Math" panose="02040503050406030204" pitchFamily="18" charset="0"/>
+                            <a:cs typeface="Arial" panose="020B0604020202020204" pitchFamily="34" charset="0"/>
+                          </a:rPr>
+                          <m:t>𝑤</m:t>
+                        </m:r>
+                      </m:sub>
+                    </m:sSub>
+                  </m:oMath>
+                </a14:m>
+                <a:r>
+                  <a:rPr lang="it-IT" sz="2400" noProof="0" dirty="0" err="1">
+                    <a:latin typeface="Arial" panose="020B0604020202020204" pitchFamily="34" charset="0"/>
+                    <a:cs typeface="Arial" panose="020B0604020202020204" pitchFamily="34" charset="0"/>
+                  </a:rPr>
+                  <a:t>using</a:t>
+                </a:r>
+                <a:r>
+                  <a:rPr lang="it-IT" sz="2400" noProof="0" dirty="0">
+                    <a:latin typeface="Arial" panose="020B0604020202020204" pitchFamily="34" charset="0"/>
+                    <a:cs typeface="Arial" panose="020B0604020202020204" pitchFamily="34" charset="0"/>
+                  </a:rPr>
+                  <a:t> SVD </a:t>
+                </a:r>
+                <a:r>
+                  <a:rPr lang="it-IT" sz="2400" noProof="0" dirty="0" err="1">
+                    <a:latin typeface="Arial" panose="020B0604020202020204" pitchFamily="34" charset="0"/>
+                    <a:cs typeface="Arial" panose="020B0604020202020204" pitchFamily="34" charset="0"/>
+                  </a:rPr>
+                  <a:t>decomposition</a:t>
+                </a:r>
+                <a:r>
+                  <a:rPr lang="it-IT" sz="2400" noProof="0" dirty="0">
+                    <a:latin typeface="Arial" panose="020B0604020202020204" pitchFamily="34" charset="0"/>
+                    <a:cs typeface="Arial" panose="020B0604020202020204" pitchFamily="34" charset="0"/>
+                  </a:rPr>
+                  <a:t> (n </a:t>
+                </a:r>
+                <a:r>
+                  <a:rPr lang="it-IT" sz="2400" noProof="0" dirty="0" err="1">
+                    <a:latin typeface="Arial" panose="020B0604020202020204" pitchFamily="34" charset="0"/>
+                    <a:cs typeface="Arial" panose="020B0604020202020204" pitchFamily="34" charset="0"/>
+                  </a:rPr>
+                  <a:t>is</a:t>
+                </a:r>
+                <a:r>
+                  <a:rPr lang="it-IT" sz="2400" noProof="0" dirty="0">
+                    <a:latin typeface="Arial" panose="020B0604020202020204" pitchFamily="34" charset="0"/>
+                    <a:cs typeface="Arial" panose="020B0604020202020204" pitchFamily="34" charset="0"/>
+                  </a:rPr>
+                  <a:t> </a:t>
+                </a:r>
+                <a:r>
+                  <a:rPr lang="it-IT" sz="2400" noProof="0" dirty="0" err="1">
+                    <a:latin typeface="Arial" panose="020B0604020202020204" pitchFamily="34" charset="0"/>
+                    <a:cs typeface="Arial" panose="020B0604020202020204" pitchFamily="34" charset="0"/>
+                  </a:rPr>
+                  <a:t>chosen</a:t>
+                </a:r>
+                <a:r>
+                  <a:rPr lang="it-IT" sz="2400" noProof="0" dirty="0">
+                    <a:latin typeface="Arial" panose="020B0604020202020204" pitchFamily="34" charset="0"/>
+                    <a:cs typeface="Arial" panose="020B0604020202020204" pitchFamily="34" charset="0"/>
+                  </a:rPr>
+                  <a:t> by </a:t>
+                </a:r>
+                <a:r>
+                  <a:rPr lang="it-IT" sz="2400" noProof="0" dirty="0" err="1">
+                    <a:latin typeface="Arial" panose="020B0604020202020204" pitchFamily="34" charset="0"/>
+                    <a:cs typeface="Arial" panose="020B0604020202020204" pitchFamily="34" charset="0"/>
+                  </a:rPr>
+                  <a:t>inspecting</a:t>
+                </a:r>
+                <a:r>
+                  <a:rPr lang="it-IT" sz="2400" noProof="0" dirty="0">
+                    <a:latin typeface="Arial" panose="020B0604020202020204" pitchFamily="34" charset="0"/>
+                    <a:cs typeface="Arial" panose="020B0604020202020204" pitchFamily="34" charset="0"/>
+                  </a:rPr>
+                  <a:t> the </a:t>
+                </a:r>
+                <a:r>
+                  <a:rPr lang="it-IT" sz="2400" noProof="0" dirty="0" err="1">
+                    <a:latin typeface="Arial" panose="020B0604020202020204" pitchFamily="34" charset="0"/>
+                    <a:cs typeface="Arial" panose="020B0604020202020204" pitchFamily="34" charset="0"/>
+                  </a:rPr>
+                  <a:t>number</a:t>
+                </a:r>
+                <a:r>
+                  <a:rPr lang="it-IT" sz="2400" noProof="0" dirty="0">
+                    <a:latin typeface="Arial" panose="020B0604020202020204" pitchFamily="34" charset="0"/>
+                    <a:cs typeface="Arial" panose="020B0604020202020204" pitchFamily="34" charset="0"/>
+                  </a:rPr>
+                  <a:t> of </a:t>
+                </a:r>
+                <a:r>
+                  <a:rPr lang="it-IT" sz="2400" noProof="0" dirty="0" err="1">
+                    <a:latin typeface="Arial" panose="020B0604020202020204" pitchFamily="34" charset="0"/>
+                    <a:cs typeface="Arial" panose="020B0604020202020204" pitchFamily="34" charset="0"/>
+                  </a:rPr>
+                  <a:t>singular</a:t>
+                </a:r>
+                <a:r>
+                  <a:rPr lang="it-IT" sz="2400" noProof="0" dirty="0">
+                    <a:latin typeface="Arial" panose="020B0604020202020204" pitchFamily="34" charset="0"/>
+                    <a:cs typeface="Arial" panose="020B0604020202020204" pitchFamily="34" charset="0"/>
+                  </a:rPr>
+                  <a:t> </a:t>
+                </a:r>
+                <a:r>
+                  <a:rPr lang="it-IT" sz="2400" noProof="0" dirty="0" err="1">
+                    <a:latin typeface="Arial" panose="020B0604020202020204" pitchFamily="34" charset="0"/>
+                    <a:cs typeface="Arial" panose="020B0604020202020204" pitchFamily="34" charset="0"/>
+                  </a:rPr>
+                  <a:t>values</a:t>
+                </a:r>
+                <a:r>
+                  <a:rPr lang="it-IT" sz="2400" noProof="0" dirty="0">
+                    <a:latin typeface="Arial" panose="020B0604020202020204" pitchFamily="34" charset="0"/>
+                    <a:cs typeface="Arial" panose="020B0604020202020204" pitchFamily="34" charset="0"/>
+                  </a:rPr>
+                  <a:t> of S):</a:t>
+                </a:r>
+              </a:p>
+              <a:p>
+                <a:pPr algn="just"/>
+                <a:endParaRPr lang="it-IT" sz="2400" dirty="0">
+                  <a:latin typeface="Arial" panose="020B0604020202020204" pitchFamily="34" charset="0"/>
+                  <a:cs typeface="Arial" panose="020B0604020202020204" pitchFamily="34" charset="0"/>
+                </a:endParaRPr>
+              </a:p>
+              <a:p>
+                <a:pPr algn="just"/>
+                <a:endParaRPr lang="it-IT" sz="2400" noProof="0" dirty="0">
+                  <a:latin typeface="Arial" panose="020B0604020202020204" pitchFamily="34" charset="0"/>
+                  <a:cs typeface="Arial" panose="020B0604020202020204" pitchFamily="34" charset="0"/>
+                </a:endParaRPr>
+              </a:p>
+              <a:p>
+                <a:pPr algn="just"/>
+                <a:endParaRPr lang="it-IT" sz="2400" dirty="0">
+                  <a:latin typeface="Arial" panose="020B0604020202020204" pitchFamily="34" charset="0"/>
+                  <a:cs typeface="Arial" panose="020B0604020202020204" pitchFamily="34" charset="0"/>
+                </a:endParaRPr>
+              </a:p>
+              <a:p>
+                <a:pPr algn="just"/>
+                <a:endParaRPr lang="it-IT" sz="2400" noProof="0" dirty="0">
+                  <a:latin typeface="Arial" panose="020B0604020202020204" pitchFamily="34" charset="0"/>
+                  <a:cs typeface="Arial" panose="020B0604020202020204" pitchFamily="34" charset="0"/>
+                </a:endParaRPr>
+              </a:p>
+              <a:p>
+                <a:pPr algn="just"/>
+                <a:r>
+                  <a:rPr lang="it-IT" sz="2400" noProof="0" dirty="0">
+                    <a:latin typeface="Arial" panose="020B0604020202020204" pitchFamily="34" charset="0"/>
+                    <a:cs typeface="Arial" panose="020B0604020202020204" pitchFamily="34" charset="0"/>
+                  </a:rPr>
+                  <a:t>Note: under the </a:t>
+                </a:r>
+                <a:r>
+                  <a:rPr lang="it-IT" sz="2400" noProof="0" dirty="0" err="1">
+                    <a:latin typeface="Arial" panose="020B0604020202020204" pitchFamily="34" charset="0"/>
+                    <a:cs typeface="Arial" panose="020B0604020202020204" pitchFamily="34" charset="0"/>
+                  </a:rPr>
+                  <a:t>assumption</a:t>
+                </a:r>
+                <a:r>
+                  <a:rPr lang="it-IT" sz="2400" noProof="0" dirty="0">
+                    <a:latin typeface="Arial" panose="020B0604020202020204" pitchFamily="34" charset="0"/>
+                    <a:cs typeface="Arial" panose="020B0604020202020204" pitchFamily="34" charset="0"/>
+                  </a:rPr>
+                  <a:t> </a:t>
+                </a:r>
+                <a:r>
+                  <a:rPr lang="it-IT" sz="2400" noProof="0" dirty="0" err="1">
+                    <a:latin typeface="Arial" panose="020B0604020202020204" pitchFamily="34" charset="0"/>
+                    <a:cs typeface="Arial" panose="020B0604020202020204" pitchFamily="34" charset="0"/>
+                  </a:rPr>
+                  <a:t>that</a:t>
+                </a:r>
+                <a:r>
+                  <a:rPr lang="it-IT" sz="2400" noProof="0" dirty="0">
+                    <a:latin typeface="Arial" panose="020B0604020202020204" pitchFamily="34" charset="0"/>
+                    <a:cs typeface="Arial" panose="020B0604020202020204" pitchFamily="34" charset="0"/>
+                  </a:rPr>
+                  <a:t> the </a:t>
+                </a:r>
+                <a:r>
+                  <a:rPr lang="it-IT" sz="2400" noProof="0" dirty="0" err="1">
+                    <a:latin typeface="Arial" panose="020B0604020202020204" pitchFamily="34" charset="0"/>
+                    <a:cs typeface="Arial" panose="020B0604020202020204" pitchFamily="34" charset="0"/>
+                  </a:rPr>
+                  <a:t>number</a:t>
+                </a:r>
+                <a:r>
+                  <a:rPr lang="it-IT" sz="2400" noProof="0" dirty="0">
+                    <a:latin typeface="Arial" panose="020B0604020202020204" pitchFamily="34" charset="0"/>
+                    <a:cs typeface="Arial" panose="020B0604020202020204" pitchFamily="34" charset="0"/>
+                  </a:rPr>
+                  <a:t> of </a:t>
+                </a:r>
+                <a:r>
+                  <a:rPr lang="it-IT" sz="2400" noProof="0" dirty="0" err="1">
+                    <a:latin typeface="Arial" panose="020B0604020202020204" pitchFamily="34" charset="0"/>
+                    <a:cs typeface="Arial" panose="020B0604020202020204" pitchFamily="34" charset="0"/>
+                  </a:rPr>
+                  <a:t>columns</a:t>
+                </a:r>
+                <a:r>
+                  <a:rPr lang="it-IT" sz="2400" noProof="0" dirty="0">
+                    <a:latin typeface="Arial" panose="020B0604020202020204" pitchFamily="34" charset="0"/>
+                    <a:cs typeface="Arial" panose="020B0604020202020204" pitchFamily="34" charset="0"/>
+                  </a:rPr>
+                  <a:t> of		      </a:t>
+                </a:r>
+                <a:r>
+                  <a:rPr lang="it-IT" sz="2400" noProof="0" dirty="0" err="1">
+                    <a:latin typeface="Arial" panose="020B0604020202020204" pitchFamily="34" charset="0"/>
+                    <a:cs typeface="Arial" panose="020B0604020202020204" pitchFamily="34" charset="0"/>
+                  </a:rPr>
+                  <a:t>is</a:t>
+                </a:r>
+                <a:r>
+                  <a:rPr lang="it-IT" sz="2400" noProof="0" dirty="0">
+                    <a:latin typeface="Arial" panose="020B0604020202020204" pitchFamily="34" charset="0"/>
+                    <a:cs typeface="Arial" panose="020B0604020202020204" pitchFamily="34" charset="0"/>
+                  </a:rPr>
+                  <a:t> infinite		, </a:t>
+                </a:r>
+                <a:r>
+                  <a:rPr lang="it-IT" sz="2400" noProof="0" dirty="0" err="1">
+                    <a:latin typeface="Arial" panose="020B0604020202020204" pitchFamily="34" charset="0"/>
+                    <a:cs typeface="Arial" panose="020B0604020202020204" pitchFamily="34" charset="0"/>
+                  </a:rPr>
+                  <a:t>there</a:t>
+                </a:r>
+                <a:r>
+                  <a:rPr lang="it-IT" sz="2400" noProof="0" dirty="0">
+                    <a:latin typeface="Arial" panose="020B0604020202020204" pitchFamily="34" charset="0"/>
+                    <a:cs typeface="Arial" panose="020B0604020202020204" pitchFamily="34" charset="0"/>
+                  </a:rPr>
+                  <a:t> </a:t>
+                </a:r>
+                <a:r>
+                  <a:rPr lang="it-IT" sz="2400" noProof="0" dirty="0" err="1">
+                    <a:latin typeface="Arial" panose="020B0604020202020204" pitchFamily="34" charset="0"/>
+                    <a:cs typeface="Arial" panose="020B0604020202020204" pitchFamily="34" charset="0"/>
+                  </a:rPr>
+                  <a:t>is</a:t>
+                </a:r>
+                <a:r>
+                  <a:rPr lang="it-IT" sz="2400" noProof="0" dirty="0">
+                    <a:latin typeface="Arial" panose="020B0604020202020204" pitchFamily="34" charset="0"/>
+                    <a:cs typeface="Arial" panose="020B0604020202020204" pitchFamily="34" charset="0"/>
+                  </a:rPr>
+                  <a:t> a </a:t>
+                </a:r>
+                <a:r>
+                  <a:rPr lang="it-IT" sz="2400" noProof="0" dirty="0" err="1">
+                    <a:latin typeface="Arial" panose="020B0604020202020204" pitchFamily="34" charset="0"/>
+                    <a:cs typeface="Arial" panose="020B0604020202020204" pitchFamily="34" charset="0"/>
+                  </a:rPr>
+                  <a:t>direct</a:t>
+                </a:r>
+                <a:r>
+                  <a:rPr lang="it-IT" sz="2400" noProof="0" dirty="0">
+                    <a:latin typeface="Arial" panose="020B0604020202020204" pitchFamily="34" charset="0"/>
+                    <a:cs typeface="Arial" panose="020B0604020202020204" pitchFamily="34" charset="0"/>
+                  </a:rPr>
+                  <a:t> link </a:t>
+                </a:r>
+                <a:r>
+                  <a:rPr lang="it-IT" sz="2400" noProof="0" dirty="0" err="1">
+                    <a:latin typeface="Arial" panose="020B0604020202020204" pitchFamily="34" charset="0"/>
+                    <a:cs typeface="Arial" panose="020B0604020202020204" pitchFamily="34" charset="0"/>
+                  </a:rPr>
+                  <a:t>between</a:t>
+                </a:r>
+                <a:r>
+                  <a:rPr lang="it-IT" sz="2400" noProof="0" dirty="0">
+                    <a:latin typeface="Arial" panose="020B0604020202020204" pitchFamily="34" charset="0"/>
+                    <a:cs typeface="Arial" panose="020B0604020202020204" pitchFamily="34" charset="0"/>
+                  </a:rPr>
+                  <a:t> </a:t>
+                </a:r>
+                <a14:m>
+                  <m:oMath xmlns:m="http://schemas.openxmlformats.org/officeDocument/2006/math">
+                    <m:sSub>
+                      <m:sSubPr>
+                        <m:ctrlPr>
+                          <a:rPr lang="it-IT" sz="2400" i="1" noProof="0" smtClean="0">
+                            <a:latin typeface="Cambria Math" panose="02040503050406030204" pitchFamily="18" charset="0"/>
+                            <a:cs typeface="Arial" panose="020B0604020202020204" pitchFamily="34" charset="0"/>
+                          </a:rPr>
+                        </m:ctrlPr>
+                      </m:sSubPr>
+                      <m:e>
+                        <m:r>
+                          <a:rPr lang="it-IT" sz="2400" b="0" i="1" noProof="0" smtClean="0">
+                            <a:latin typeface="Cambria Math" panose="02040503050406030204" pitchFamily="18" charset="0"/>
+                            <a:cs typeface="Arial" panose="020B0604020202020204" pitchFamily="34" charset="0"/>
+                          </a:rPr>
+                          <m:t>𝐿</m:t>
+                        </m:r>
+                      </m:e>
+                      <m:sub>
+                        <m:r>
+                          <a:rPr lang="it-IT" sz="2400" b="0" i="1" noProof="0" smtClean="0">
+                            <a:latin typeface="Cambria Math" panose="02040503050406030204" pitchFamily="18" charset="0"/>
+                            <a:cs typeface="Arial" panose="020B0604020202020204" pitchFamily="34" charset="0"/>
+                          </a:rPr>
+                          <m:t>𝑤</m:t>
+                        </m:r>
+                      </m:sub>
+                    </m:sSub>
+                  </m:oMath>
+                </a14:m>
+                <a:r>
+                  <a:rPr lang="it-IT" sz="2400" dirty="0">
+                    <a:latin typeface="Arial" panose="020B0604020202020204" pitchFamily="34" charset="0"/>
+                    <a:cs typeface="Arial" panose="020B0604020202020204" pitchFamily="34" charset="0"/>
+                  </a:rPr>
+                  <a:t> </a:t>
+                </a:r>
+                <a:r>
+                  <a:rPr lang="it-IT" sz="2400" noProof="0" dirty="0">
+                    <a:latin typeface="Arial" panose="020B0604020202020204" pitchFamily="34" charset="0"/>
+                    <a:cs typeface="Arial" panose="020B0604020202020204" pitchFamily="34" charset="0"/>
+                  </a:rPr>
+                  <a:t>and the </a:t>
+                </a:r>
+                <a:r>
+                  <a:rPr lang="it-IT" sz="2400" noProof="0" dirty="0" err="1">
+                    <a:latin typeface="Arial" panose="020B0604020202020204" pitchFamily="34" charset="0"/>
+                    <a:cs typeface="Arial" panose="020B0604020202020204" pitchFamily="34" charset="0"/>
+                  </a:rPr>
+                  <a:t>observability</a:t>
+                </a:r>
+                <a:r>
+                  <a:rPr lang="it-IT" sz="2400" noProof="0" dirty="0">
+                    <a:latin typeface="Arial" panose="020B0604020202020204" pitchFamily="34" charset="0"/>
+                    <a:cs typeface="Arial" panose="020B0604020202020204" pitchFamily="34" charset="0"/>
+                  </a:rPr>
+                  <a:t> </a:t>
+                </a:r>
+                <a:r>
+                  <a:rPr lang="it-IT" sz="2400" noProof="0" dirty="0" err="1">
+                    <a:latin typeface="Arial" panose="020B0604020202020204" pitchFamily="34" charset="0"/>
+                    <a:cs typeface="Arial" panose="020B0604020202020204" pitchFamily="34" charset="0"/>
+                  </a:rPr>
+                  <a:t>matrix</a:t>
+                </a:r>
+                <a:r>
+                  <a:rPr lang="it-IT" sz="2400" noProof="0" dirty="0">
+                    <a:latin typeface="Arial" panose="020B0604020202020204" pitchFamily="34" charset="0"/>
+                    <a:cs typeface="Arial" panose="020B0604020202020204" pitchFamily="34" charset="0"/>
+                  </a:rPr>
+                  <a:t> </a:t>
+                </a:r>
+                <a14:m>
+                  <m:oMath xmlns:m="http://schemas.openxmlformats.org/officeDocument/2006/math">
+                    <m:sSub>
+                      <m:sSubPr>
+                        <m:ctrlPr>
+                          <a:rPr lang="it-IT" sz="2400" i="1" noProof="0" smtClean="0">
+                            <a:latin typeface="Cambria Math" panose="02040503050406030204" pitchFamily="18" charset="0"/>
+                            <a:cs typeface="Arial" panose="020B0604020202020204" pitchFamily="34" charset="0"/>
+                          </a:rPr>
+                        </m:ctrlPr>
+                      </m:sSubPr>
+                      <m:e>
+                        <m:r>
+                          <m:rPr>
+                            <m:sty m:val="p"/>
+                          </m:rPr>
+                          <a:rPr lang="el-GR" sz="2400" i="1" noProof="0" smtClean="0">
+                            <a:latin typeface="Cambria Math" panose="02040503050406030204" pitchFamily="18" charset="0"/>
+                            <a:ea typeface="Cambria Math" panose="02040503050406030204" pitchFamily="18" charset="0"/>
+                            <a:cs typeface="Arial" panose="020B0604020202020204" pitchFamily="34" charset="0"/>
+                          </a:rPr>
+                          <m:t>Γ</m:t>
+                        </m:r>
+                      </m:e>
+                      <m:sub>
+                        <m:r>
+                          <a:rPr lang="it-IT" sz="2400" b="0" i="1" noProof="0" smtClean="0">
+                            <a:latin typeface="Cambria Math" panose="02040503050406030204" pitchFamily="18" charset="0"/>
+                            <a:cs typeface="Arial" panose="020B0604020202020204" pitchFamily="34" charset="0"/>
+                          </a:rPr>
+                          <m:t>𝑁</m:t>
+                        </m:r>
+                      </m:sub>
+                    </m:sSub>
+                  </m:oMath>
+                </a14:m>
+                <a:r>
+                  <a:rPr lang="it-IT" sz="2400" noProof="0" dirty="0">
+                    <a:latin typeface="Arial" panose="020B0604020202020204" pitchFamily="34" charset="0"/>
+                    <a:cs typeface="Arial" panose="020B0604020202020204" pitchFamily="34" charset="0"/>
+                  </a:rPr>
+                  <a:t> and the state </a:t>
+                </a:r>
+                <a:r>
+                  <a:rPr lang="it-IT" sz="2400" noProof="0" dirty="0" err="1">
+                    <a:latin typeface="Arial" panose="020B0604020202020204" pitchFamily="34" charset="0"/>
+                    <a:cs typeface="Arial" panose="020B0604020202020204" pitchFamily="34" charset="0"/>
+                  </a:rPr>
+                  <a:t>sequence</a:t>
+                </a:r>
+                <a:r>
+                  <a:rPr lang="it-IT" sz="2400" noProof="0" dirty="0">
+                    <a:latin typeface="Arial" panose="020B0604020202020204" pitchFamily="34" charset="0"/>
+                    <a:cs typeface="Arial" panose="020B0604020202020204" pitchFamily="34" charset="0"/>
+                  </a:rPr>
+                  <a:t> </a:t>
+                </a:r>
+                <a14:m>
+                  <m:oMath xmlns:m="http://schemas.openxmlformats.org/officeDocument/2006/math">
+                    <m:sSub>
+                      <m:sSubPr>
+                        <m:ctrlPr>
+                          <a:rPr lang="it-IT" sz="2400" i="1" noProof="0" smtClean="0">
+                            <a:latin typeface="Cambria Math" panose="02040503050406030204" pitchFamily="18" charset="0"/>
+                            <a:cs typeface="Arial" panose="020B0604020202020204" pitchFamily="34" charset="0"/>
+                          </a:rPr>
+                        </m:ctrlPr>
+                      </m:sSubPr>
+                      <m:e>
+                        <m:r>
+                          <a:rPr lang="it-IT" sz="2400" b="0" i="1" noProof="0" smtClean="0">
+                            <a:latin typeface="Cambria Math" panose="02040503050406030204" pitchFamily="18" charset="0"/>
+                            <a:cs typeface="Arial" panose="020B0604020202020204" pitchFamily="34" charset="0"/>
+                          </a:rPr>
+                          <m:t>𝑋</m:t>
+                        </m:r>
+                      </m:e>
+                      <m:sub>
+                        <m:r>
+                          <a:rPr lang="it-IT" sz="2400" b="0" i="1" noProof="0" smtClean="0">
+                            <a:latin typeface="Cambria Math" panose="02040503050406030204" pitchFamily="18" charset="0"/>
+                            <a:cs typeface="Arial" panose="020B0604020202020204" pitchFamily="34" charset="0"/>
+                          </a:rPr>
+                          <m:t>𝑓</m:t>
+                        </m:r>
+                      </m:sub>
+                    </m:sSub>
+                  </m:oMath>
+                </a14:m>
+                <a:r>
+                  <a:rPr lang="it-IT" sz="2400" noProof="0" dirty="0">
+                    <a:latin typeface="Arial" panose="020B0604020202020204" pitchFamily="34" charset="0"/>
+                    <a:cs typeface="Arial" panose="020B0604020202020204" pitchFamily="34" charset="0"/>
+                  </a:rPr>
+                  <a:t>.</a:t>
+                </a:r>
+              </a:p>
+            </p:txBody>
+          </p:sp>
+        </mc:Choice>
+        <mc:Fallback>
+          <p:sp>
+            <p:nvSpPr>
+              <p:cNvPr id="2" name="CasellaDiTesto 1">
+                <a:extLst>
+                  <a:ext uri="{FF2B5EF4-FFF2-40B4-BE49-F238E27FC236}">
+                    <a16:creationId xmlns:a16="http://schemas.microsoft.com/office/drawing/2014/main" id="{A1B4B6DF-2C26-DCB2-E799-BC690D152E4A}"/>
+                  </a:ext>
+                </a:extLst>
+              </p:cNvPr>
+              <p:cNvSpPr txBox="1">
+                <a:spLocks noRot="1" noChangeAspect="1" noMove="1" noResize="1" noEditPoints="1" noAdjustHandles="1" noChangeArrowheads="1" noChangeShapeType="1" noTextEdit="1"/>
+              </p:cNvSpPr>
+              <p:nvPr/>
+            </p:nvSpPr>
+            <p:spPr>
+              <a:xfrm>
+                <a:off x="723900" y="1191645"/>
+                <a:ext cx="10744200" cy="3815275"/>
+              </a:xfrm>
+              <a:prstGeom prst="rect">
+                <a:avLst/>
+              </a:prstGeom>
+              <a:blipFill>
+                <a:blip r:embed="rId2"/>
+                <a:stretch>
+                  <a:fillRect l="-908" t="-1118" r="-851" b="-1917"/>
+                </a:stretch>
+              </a:blipFill>
+            </p:spPr>
+            <p:txBody>
+              <a:bodyPr/>
+              <a:lstStyle/>
+              <a:p>
+                <a:r>
+                  <a:rPr lang="it-IT">
+                    <a:noFill/>
+                  </a:rPr>
+                  <a:t> </a:t>
+                </a:r>
+              </a:p>
+            </p:txBody>
+          </p:sp>
+        </mc:Fallback>
+      </mc:AlternateContent>
+      <p:pic>
+        <p:nvPicPr>
+          <p:cNvPr id="5122" name="Picture 2">
+            <a:extLst>
+              <a:ext uri="{FF2B5EF4-FFF2-40B4-BE49-F238E27FC236}">
+                <a16:creationId xmlns:a16="http://schemas.microsoft.com/office/drawing/2014/main" id="{5BA532AF-A20F-2BC1-4CBE-CDD59562E30F}"/>
+              </a:ext>
+            </a:extLst>
+          </p:cNvPr>
+          <p:cNvPicPr>
+            <a:picLocks noChangeAspect="1" noChangeArrowheads="1"/>
+          </p:cNvPicPr>
+          <p:nvPr/>
+        </p:nvPicPr>
+        <p:blipFill>
+          <a:blip r:embed="rId3">
+            <a:extLst>
+              <a:ext uri="{28A0092B-C50C-407E-A947-70E740481C1C}">
+                <a14:useLocalDpi xmlns:a14="http://schemas.microsoft.com/office/drawing/2010/main" val="0"/>
+              </a:ext>
+            </a:extLst>
+          </a:blip>
+          <a:srcRect/>
+          <a:stretch>
+            <a:fillRect/>
+          </a:stretch>
+        </p:blipFill>
+        <p:spPr bwMode="auto">
+          <a:xfrm>
+            <a:off x="711842" y="2385641"/>
+            <a:ext cx="6527158" cy="1271959"/>
+          </a:xfrm>
+          <a:prstGeom prst="rect">
+            <a:avLst/>
+          </a:prstGeom>
+          <a:noFill/>
+          <a:extLst>
+            <a:ext uri="{909E8E84-426E-40DD-AFC4-6F175D3DCCD1}">
+              <a14:hiddenFill xmlns:a14="http://schemas.microsoft.com/office/drawing/2010/main">
+                <a:solidFill>
+                  <a:srgbClr val="FFFFFF"/>
+                </a:solidFill>
+              </a14:hiddenFill>
+            </a:ext>
+          </a:extLst>
+        </p:spPr>
+      </p:pic>
+      <p:pic>
+        <p:nvPicPr>
+          <p:cNvPr id="5127" name="Picture 7">
+            <a:extLst>
+              <a:ext uri="{FF2B5EF4-FFF2-40B4-BE49-F238E27FC236}">
+                <a16:creationId xmlns:a16="http://schemas.microsoft.com/office/drawing/2014/main" id="{D68969F2-E63F-B955-2D4F-6532313FE1F8}"/>
+              </a:ext>
+            </a:extLst>
+          </p:cNvPr>
+          <p:cNvPicPr>
+            <a:picLocks noChangeAspect="1" noChangeArrowheads="1"/>
+          </p:cNvPicPr>
+          <p:nvPr/>
+        </p:nvPicPr>
+        <p:blipFill>
+          <a:blip r:embed="rId4">
+            <a:extLst>
+              <a:ext uri="{28A0092B-C50C-407E-A947-70E740481C1C}">
+                <a14:useLocalDpi xmlns:a14="http://schemas.microsoft.com/office/drawing/2010/main" val="0"/>
+              </a:ext>
+            </a:extLst>
+          </a:blip>
+          <a:srcRect/>
+          <a:stretch>
+            <a:fillRect/>
+          </a:stretch>
+        </p:blipFill>
+        <p:spPr bwMode="auto">
+          <a:xfrm>
+            <a:off x="8839200" y="3810000"/>
+            <a:ext cx="1259253" cy="351852"/>
+          </a:xfrm>
+          <a:prstGeom prst="rect">
+            <a:avLst/>
+          </a:prstGeom>
+          <a:noFill/>
+          <a:extLst>
+            <a:ext uri="{909E8E84-426E-40DD-AFC4-6F175D3DCCD1}">
+              <a14:hiddenFill xmlns:a14="http://schemas.microsoft.com/office/drawing/2010/main">
+                <a:solidFill>
+                  <a:srgbClr val="FFFFFF"/>
+                </a:solidFill>
+              </a14:hiddenFill>
+            </a:ext>
+          </a:extLst>
+        </p:spPr>
+      </p:pic>
+      <p:pic>
+        <p:nvPicPr>
+          <p:cNvPr id="5128" name="Picture 8">
+            <a:extLst>
+              <a:ext uri="{FF2B5EF4-FFF2-40B4-BE49-F238E27FC236}">
+                <a16:creationId xmlns:a16="http://schemas.microsoft.com/office/drawing/2014/main" id="{F8870000-4025-7FA0-A09D-3F6C8DDFDAEF}"/>
+              </a:ext>
+            </a:extLst>
+          </p:cNvPr>
+          <p:cNvPicPr>
+            <a:picLocks noChangeAspect="1" noChangeArrowheads="1"/>
+          </p:cNvPicPr>
+          <p:nvPr/>
+        </p:nvPicPr>
+        <p:blipFill>
+          <a:blip r:embed="rId5">
+            <a:extLst>
+              <a:ext uri="{28A0092B-C50C-407E-A947-70E740481C1C}">
+                <a14:useLocalDpi xmlns:a14="http://schemas.microsoft.com/office/drawing/2010/main" val="0"/>
+              </a:ext>
+            </a:extLst>
+          </a:blip>
+          <a:srcRect/>
+          <a:stretch>
+            <a:fillRect/>
+          </a:stretch>
+        </p:blipFill>
+        <p:spPr bwMode="auto">
+          <a:xfrm>
+            <a:off x="1828800" y="4234149"/>
+            <a:ext cx="770412" cy="261651"/>
+          </a:xfrm>
+          <a:prstGeom prst="rect">
+            <a:avLst/>
+          </a:prstGeom>
+          <a:noFill/>
+          <a:extLst>
+            <a:ext uri="{909E8E84-426E-40DD-AFC4-6F175D3DCCD1}">
+              <a14:hiddenFill xmlns:a14="http://schemas.microsoft.com/office/drawing/2010/main">
+                <a:solidFill>
+                  <a:srgbClr val="FFFFFF"/>
+                </a:solidFill>
+              </a14:hiddenFill>
+            </a:ext>
+          </a:extLst>
+        </p:spPr>
+      </p:pic>
+      <p:pic>
+        <p:nvPicPr>
+          <p:cNvPr id="5134" name="Picture 14">
+            <a:extLst>
+              <a:ext uri="{FF2B5EF4-FFF2-40B4-BE49-F238E27FC236}">
+                <a16:creationId xmlns:a16="http://schemas.microsoft.com/office/drawing/2014/main" id="{CE28A8CE-E4CC-199A-A7D6-56874E14E713}"/>
+              </a:ext>
+            </a:extLst>
+          </p:cNvPr>
+          <p:cNvPicPr>
+            <a:picLocks noChangeAspect="1" noChangeArrowheads="1"/>
+          </p:cNvPicPr>
+          <p:nvPr/>
+        </p:nvPicPr>
+        <p:blipFill>
+          <a:blip r:embed="rId6">
+            <a:extLst>
+              <a:ext uri="{28A0092B-C50C-407E-A947-70E740481C1C}">
+                <a14:useLocalDpi xmlns:a14="http://schemas.microsoft.com/office/drawing/2010/main" val="0"/>
+              </a:ext>
+            </a:extLst>
+          </a:blip>
+          <a:srcRect/>
+          <a:stretch>
+            <a:fillRect/>
+          </a:stretch>
+        </p:blipFill>
+        <p:spPr bwMode="auto">
+          <a:xfrm>
+            <a:off x="723900" y="5029200"/>
+            <a:ext cx="1964724" cy="685800"/>
+          </a:xfrm>
+          <a:prstGeom prst="rect">
+            <a:avLst/>
+          </a:prstGeom>
+          <a:noFill/>
+          <a:extLst>
+            <a:ext uri="{909E8E84-426E-40DD-AFC4-6F175D3DCCD1}">
+              <a14:hiddenFill xmlns:a14="http://schemas.microsoft.com/office/drawing/2010/main">
+                <a:solidFill>
+                  <a:srgbClr val="FFFFFF"/>
+                </a:solidFill>
+              </a14:hiddenFill>
+            </a:ext>
+          </a:extLst>
+        </p:spPr>
+      </p:pic>
+      <p:pic>
+        <p:nvPicPr>
+          <p:cNvPr id="5135" name="Picture 15">
+            <a:extLst>
+              <a:ext uri="{FF2B5EF4-FFF2-40B4-BE49-F238E27FC236}">
+                <a16:creationId xmlns:a16="http://schemas.microsoft.com/office/drawing/2014/main" id="{208A52BD-01C4-AAF0-3F91-52838E9F9F31}"/>
+              </a:ext>
+            </a:extLst>
+          </p:cNvPr>
+          <p:cNvPicPr>
+            <a:picLocks noChangeAspect="1" noChangeArrowheads="1"/>
+          </p:cNvPicPr>
+          <p:nvPr/>
+        </p:nvPicPr>
+        <p:blipFill>
+          <a:blip r:embed="rId7">
+            <a:extLst>
+              <a:ext uri="{28A0092B-C50C-407E-A947-70E740481C1C}">
+                <a14:useLocalDpi xmlns:a14="http://schemas.microsoft.com/office/drawing/2010/main" val="0"/>
+              </a:ext>
+            </a:extLst>
+          </a:blip>
+          <a:srcRect/>
+          <a:stretch>
+            <a:fillRect/>
+          </a:stretch>
+        </p:blipFill>
+        <p:spPr bwMode="auto">
+          <a:xfrm>
+            <a:off x="3352800" y="5029200"/>
+            <a:ext cx="3393822" cy="685800"/>
+          </a:xfrm>
+          <a:prstGeom prst="rect">
+            <a:avLst/>
+          </a:prstGeom>
+          <a:noFill/>
+          <a:extLst>
+            <a:ext uri="{909E8E84-426E-40DD-AFC4-6F175D3DCCD1}">
+              <a14:hiddenFill xmlns:a14="http://schemas.microsoft.com/office/drawing/2010/main">
+                <a:solidFill>
+                  <a:srgbClr val="FFFFFF"/>
+                </a:solidFill>
+              </a14:hiddenFill>
+            </a:ext>
+          </a:extLst>
+        </p:spPr>
+      </p:pic>
+      <mc:AlternateContent xmlns:mc="http://schemas.openxmlformats.org/markup-compatibility/2006">
+        <mc:Choice xmlns:a14="http://schemas.microsoft.com/office/drawing/2010/main" Requires="a14">
+          <p:sp>
+            <p:nvSpPr>
+              <p:cNvPr id="6" name="CasellaDiTesto 5">
+                <a:extLst>
+                  <a:ext uri="{FF2B5EF4-FFF2-40B4-BE49-F238E27FC236}">
+                    <a16:creationId xmlns:a16="http://schemas.microsoft.com/office/drawing/2014/main" id="{1511BC54-FC04-4EF5-B6CB-DB2BC5202002}"/>
+                  </a:ext>
+                </a:extLst>
+              </p:cNvPr>
+              <p:cNvSpPr txBox="1"/>
+              <p:nvPr/>
+            </p:nvSpPr>
+            <p:spPr>
+              <a:xfrm>
+                <a:off x="7239000" y="5105400"/>
+                <a:ext cx="4229100" cy="682366"/>
+              </a:xfrm>
+              <a:prstGeom prst="rect">
+                <a:avLst/>
+              </a:prstGeom>
+              <a:noFill/>
+            </p:spPr>
+            <p:txBody>
+              <a:bodyPr wrap="square" rtlCol="0">
+                <a:spAutoFit/>
+              </a:bodyPr>
+              <a:lstStyle/>
+              <a:p>
+                <a:r>
+                  <a:rPr lang="it-IT" dirty="0"/>
+                  <a:t> </a:t>
+                </a:r>
+                <a14:m>
+                  <m:oMath xmlns:m="http://schemas.openxmlformats.org/officeDocument/2006/math">
+                    <m:sSub>
+                      <m:sSubPr>
+                        <m:ctrlPr>
+                          <a:rPr lang="it-IT" sz="1800" i="1" noProof="0" smtClean="0">
+                            <a:latin typeface="Cambria Math" panose="02040503050406030204" pitchFamily="18" charset="0"/>
+                            <a:cs typeface="Arial" panose="020B0604020202020204" pitchFamily="34" charset="0"/>
+                          </a:rPr>
+                        </m:ctrlPr>
+                      </m:sSubPr>
+                      <m:e>
+                        <m:acc>
+                          <m:accPr>
+                            <m:chr m:val="̂"/>
+                            <m:ctrlPr>
+                              <a:rPr lang="it-IT" sz="1800" b="0" i="1" noProof="0" smtClean="0">
+                                <a:latin typeface="Cambria Math" panose="02040503050406030204" pitchFamily="18" charset="0"/>
+                                <a:cs typeface="Arial" panose="020B0604020202020204" pitchFamily="34" charset="0"/>
+                              </a:rPr>
+                            </m:ctrlPr>
+                          </m:accPr>
+                          <m:e>
+                            <m:r>
+                              <a:rPr lang="it-IT" sz="1800" b="0" i="1" noProof="0" smtClean="0">
+                                <a:latin typeface="Cambria Math" panose="02040503050406030204" pitchFamily="18" charset="0"/>
+                                <a:cs typeface="Arial" panose="020B0604020202020204" pitchFamily="34" charset="0"/>
+                              </a:rPr>
+                              <m:t>𝑋</m:t>
+                            </m:r>
+                          </m:e>
+                        </m:acc>
+                      </m:e>
+                      <m:sub>
+                        <m:r>
+                          <a:rPr lang="it-IT" sz="1800" b="0" i="1" noProof="0" smtClean="0">
+                            <a:latin typeface="Cambria Math" panose="02040503050406030204" pitchFamily="18" charset="0"/>
+                            <a:cs typeface="Arial" panose="020B0604020202020204" pitchFamily="34" charset="0"/>
+                          </a:rPr>
+                          <m:t>𝑓</m:t>
+                        </m:r>
+                      </m:sub>
+                    </m:sSub>
+                    <m:r>
+                      <a:rPr lang="it-IT" sz="1800" b="0" i="1" noProof="0" smtClean="0">
+                        <a:latin typeface="Cambria Math" panose="02040503050406030204" pitchFamily="18" charset="0"/>
+                        <a:cs typeface="Arial" panose="020B0604020202020204" pitchFamily="34" charset="0"/>
+                      </a:rPr>
+                      <m:t> </m:t>
+                    </m:r>
+                  </m:oMath>
+                </a14:m>
+                <a:r>
+                  <a:rPr lang="en-US" dirty="0"/>
+                  <a:t>is a Kalman filter estimate of</a:t>
+                </a:r>
+                <a14:m>
+                  <m:oMath xmlns:m="http://schemas.openxmlformats.org/officeDocument/2006/math">
+                    <m:r>
+                      <a:rPr lang="it-IT" sz="1800" b="0" i="0" noProof="0" smtClean="0">
+                        <a:latin typeface="Cambria Math" panose="02040503050406030204" pitchFamily="18" charset="0"/>
+                        <a:cs typeface="Arial" panose="020B0604020202020204" pitchFamily="34" charset="0"/>
+                      </a:rPr>
+                      <m:t> </m:t>
+                    </m:r>
+                    <m:sSub>
+                      <m:sSubPr>
+                        <m:ctrlPr>
+                          <a:rPr lang="it-IT" sz="1800" i="1" noProof="0" smtClean="0">
+                            <a:latin typeface="Cambria Math" panose="02040503050406030204" pitchFamily="18" charset="0"/>
+                            <a:cs typeface="Arial" panose="020B0604020202020204" pitchFamily="34" charset="0"/>
+                          </a:rPr>
+                        </m:ctrlPr>
+                      </m:sSubPr>
+                      <m:e>
+                        <m:r>
+                          <a:rPr lang="it-IT" sz="1800" b="0" i="1" noProof="0" smtClean="0">
+                            <a:latin typeface="Cambria Math" panose="02040503050406030204" pitchFamily="18" charset="0"/>
+                            <a:cs typeface="Arial" panose="020B0604020202020204" pitchFamily="34" charset="0"/>
+                          </a:rPr>
+                          <m:t>𝑋</m:t>
+                        </m:r>
+                      </m:e>
+                      <m:sub>
+                        <m:r>
+                          <a:rPr lang="it-IT" sz="1800" b="0" i="1" noProof="0" smtClean="0">
+                            <a:latin typeface="Cambria Math" panose="02040503050406030204" pitchFamily="18" charset="0"/>
+                            <a:cs typeface="Arial" panose="020B0604020202020204" pitchFamily="34" charset="0"/>
+                          </a:rPr>
+                          <m:t>𝑓</m:t>
+                        </m:r>
+                      </m:sub>
+                    </m:sSub>
+                  </m:oMath>
+                </a14:m>
+                <a:endParaRPr lang="en-US" dirty="0"/>
+              </a:p>
+              <a:p>
+                <a:endParaRPr lang="it-IT" dirty="0"/>
+              </a:p>
+            </p:txBody>
+          </p:sp>
+        </mc:Choice>
+        <mc:Fallback>
+          <p:sp>
+            <p:nvSpPr>
+              <p:cNvPr id="6" name="CasellaDiTesto 5">
+                <a:extLst>
+                  <a:ext uri="{FF2B5EF4-FFF2-40B4-BE49-F238E27FC236}">
+                    <a16:creationId xmlns:a16="http://schemas.microsoft.com/office/drawing/2014/main" id="{1511BC54-FC04-4EF5-B6CB-DB2BC5202002}"/>
+                  </a:ext>
+                </a:extLst>
+              </p:cNvPr>
+              <p:cNvSpPr txBox="1">
+                <a:spLocks noRot="1" noChangeAspect="1" noMove="1" noResize="1" noEditPoints="1" noAdjustHandles="1" noChangeArrowheads="1" noChangeShapeType="1" noTextEdit="1"/>
+              </p:cNvSpPr>
+              <p:nvPr/>
+            </p:nvSpPr>
+            <p:spPr>
+              <a:xfrm>
+                <a:off x="7239000" y="5105400"/>
+                <a:ext cx="4229100" cy="682366"/>
+              </a:xfrm>
+              <a:prstGeom prst="rect">
+                <a:avLst/>
+              </a:prstGeom>
+              <a:blipFill>
+                <a:blip r:embed="rId8"/>
+                <a:stretch>
+                  <a:fillRect t="-3604"/>
+                </a:stretch>
+              </a:blipFill>
+            </p:spPr>
+            <p:txBody>
+              <a:bodyPr/>
+              <a:lstStyle/>
+              <a:p>
+                <a:r>
+                  <a:rPr lang="it-IT">
+                    <a:noFill/>
+                  </a:rPr>
+                  <a:t> </a:t>
+                </a:r>
+              </a:p>
+            </p:txBody>
+          </p:sp>
+        </mc:Fallback>
+      </mc:AlternateContent>
+    </p:spTree>
+    <p:extLst>
+      <p:ext uri="{BB962C8B-B14F-4D97-AF65-F5344CB8AC3E}">
+        <p14:creationId xmlns:p14="http://schemas.microsoft.com/office/powerpoint/2010/main" val="3530267782"/>
+      </p:ext>
+    </p:extLst>
+  </p:cSld>
+  <p:clrMapOvr>
+    <a:masterClrMapping/>
+  </p:clrMapOvr>
+</p:sld>
+</file>
+
+<file path=ppt/slides/slide9.xml><?xml version="1.0" encoding="utf-8"?>
+<p:sld xmlns:a="http://schemas.openxmlformats.org/drawingml/2006/main" xmlns:r="http://schemas.openxmlformats.org/officeDocument/2006/relationships" xmlns:p="http://schemas.openxmlformats.org/presentationml/2006/main">
+  <p:cSld>
+    <p:spTree>
+      <p:nvGrpSpPr>
+        <p:cNvPr id="1" name="">
+          <a:extLst>
+            <a:ext uri="{FF2B5EF4-FFF2-40B4-BE49-F238E27FC236}">
+              <a16:creationId xmlns:a16="http://schemas.microsoft.com/office/drawing/2014/main" id="{B22E50CC-0AE1-267D-FC4D-B9618FB63504}"/>
+            </a:ext>
+          </a:extLst>
+        </p:cNvPr>
+        <p:cNvGrpSpPr/>
+        <p:nvPr/>
+      </p:nvGrpSpPr>
+      <p:grpSpPr>
+        <a:xfrm>
+          <a:off x="0" y="0"/>
+          <a:ext cx="0" cy="0"/>
+          <a:chOff x="0" y="0"/>
+          <a:chExt cx="0" cy="0"/>
+        </a:xfrm>
+      </p:grpSpPr>
+      <p:sp>
+        <p:nvSpPr>
+          <p:cNvPr id="10" name="Titolo 9">
+            <a:extLst>
+              <a:ext uri="{FF2B5EF4-FFF2-40B4-BE49-F238E27FC236}">
+                <a16:creationId xmlns:a16="http://schemas.microsoft.com/office/drawing/2014/main" id="{177C2024-14B5-7E65-430A-6F702AF43BBC}"/>
+              </a:ext>
+            </a:extLst>
+          </p:cNvPr>
+          <p:cNvSpPr>
+            <a:spLocks noGrp="1"/>
+          </p:cNvSpPr>
+          <p:nvPr>
+            <p:ph type="title"/>
+          </p:nvPr>
+        </p:nvSpPr>
+        <p:spPr>
+          <a:xfrm>
+            <a:off x="761999" y="457200"/>
+            <a:ext cx="9691687" cy="1077218"/>
+          </a:xfrm>
+        </p:spPr>
+        <p:txBody>
+          <a:bodyPr/>
+          <a:lstStyle/>
+          <a:p>
+            <a:r>
+              <a:rPr lang="en-GB" noProof="0" dirty="0">
+                <a:latin typeface="Arial Black" panose="020B0A04020102020204" pitchFamily="34" charset="0"/>
+              </a:rPr>
+              <a:t>Proposed solution – </a:t>
+            </a:r>
+            <a:br>
+              <a:rPr lang="en-GB" noProof="0" dirty="0">
+                <a:latin typeface="Arial Black" panose="020B0A04020102020204" pitchFamily="34" charset="0"/>
+              </a:rPr>
+            </a:br>
+            <a:r>
+              <a:rPr lang="en-GB" dirty="0">
+                <a:latin typeface="Arial Black" panose="020B0A04020102020204" pitchFamily="34" charset="0"/>
+              </a:rPr>
+              <a:t>defining MPC problem</a:t>
+            </a:r>
+            <a:endParaRPr lang="en-GB" noProof="0" dirty="0">
+              <a:latin typeface="Arial Black" panose="020B0A04020102020204" pitchFamily="34" charset="0"/>
+            </a:endParaRPr>
+          </a:p>
+        </p:txBody>
+      </p:sp>
+      <mc:AlternateContent xmlns:mc="http://schemas.openxmlformats.org/markup-compatibility/2006">
+        <mc:Choice xmlns:a14="http://schemas.microsoft.com/office/drawing/2010/main" Requires="a14">
+          <p:sp>
+            <p:nvSpPr>
+              <p:cNvPr id="2" name="CasellaDiTesto 1">
+                <a:extLst>
+                  <a:ext uri="{FF2B5EF4-FFF2-40B4-BE49-F238E27FC236}">
+                    <a16:creationId xmlns:a16="http://schemas.microsoft.com/office/drawing/2014/main" id="{C6A839EB-6E78-0A60-AB09-75FB87247019}"/>
+                  </a:ext>
+                </a:extLst>
+              </p:cNvPr>
+              <p:cNvSpPr txBox="1"/>
+              <p:nvPr/>
+            </p:nvSpPr>
+            <p:spPr>
+              <a:xfrm>
+                <a:off x="723900" y="1683603"/>
+                <a:ext cx="10744200" cy="4130811"/>
+              </a:xfrm>
+              <a:prstGeom prst="rect">
+                <a:avLst/>
+              </a:prstGeom>
+              <a:noFill/>
+            </p:spPr>
+            <p:txBody>
+              <a:bodyPr wrap="square">
+                <a:spAutoFit/>
+              </a:bodyPr>
+              <a:lstStyle/>
+              <a:p>
+                <a:pPr algn="just"/>
+                <a:r>
+                  <a:rPr lang="it-IT" sz="2400" dirty="0">
+                    <a:latin typeface="Arial" panose="020B0604020202020204" pitchFamily="34" charset="0"/>
+                    <a:cs typeface="Arial" panose="020B0604020202020204" pitchFamily="34" charset="0"/>
+                  </a:rPr>
+                  <a:t>The idea of the MPC </a:t>
+                </a:r>
+                <a:r>
+                  <a:rPr lang="it-IT" sz="2400" dirty="0" err="1">
+                    <a:latin typeface="Arial" panose="020B0604020202020204" pitchFamily="34" charset="0"/>
+                    <a:cs typeface="Arial" panose="020B0604020202020204" pitchFamily="34" charset="0"/>
+                  </a:rPr>
+                  <a:t>portion</a:t>
+                </a:r>
+                <a:r>
+                  <a:rPr lang="it-IT" sz="2400" dirty="0">
+                    <a:latin typeface="Arial" panose="020B0604020202020204" pitchFamily="34" charset="0"/>
+                    <a:cs typeface="Arial" panose="020B0604020202020204" pitchFamily="34" charset="0"/>
+                  </a:rPr>
+                  <a:t> of the </a:t>
+                </a:r>
+                <a:r>
+                  <a:rPr lang="it-IT" sz="2400" dirty="0" err="1">
+                    <a:latin typeface="Arial" panose="020B0604020202020204" pitchFamily="34" charset="0"/>
+                    <a:cs typeface="Arial" panose="020B0604020202020204" pitchFamily="34" charset="0"/>
+                  </a:rPr>
+                  <a:t>algorithm</a:t>
+                </a:r>
+                <a:r>
+                  <a:rPr lang="it-IT" sz="2400" dirty="0">
+                    <a:latin typeface="Arial" panose="020B0604020202020204" pitchFamily="34" charset="0"/>
+                    <a:cs typeface="Arial" panose="020B0604020202020204" pitchFamily="34" charset="0"/>
+                  </a:rPr>
+                  <a:t> </a:t>
+                </a:r>
+                <a:r>
+                  <a:rPr lang="it-IT" sz="2400" dirty="0" err="1">
+                    <a:latin typeface="Arial" panose="020B0604020202020204" pitchFamily="34" charset="0"/>
+                    <a:cs typeface="Arial" panose="020B0604020202020204" pitchFamily="34" charset="0"/>
+                  </a:rPr>
+                  <a:t>revolves</a:t>
+                </a:r>
+                <a:r>
+                  <a:rPr lang="it-IT" sz="2400" dirty="0">
+                    <a:latin typeface="Arial" panose="020B0604020202020204" pitchFamily="34" charset="0"/>
+                    <a:cs typeface="Arial" panose="020B0604020202020204" pitchFamily="34" charset="0"/>
+                  </a:rPr>
+                  <a:t> </a:t>
+                </a:r>
+                <a:r>
+                  <a:rPr lang="it-IT" sz="2400" dirty="0" err="1">
+                    <a:latin typeface="Arial" panose="020B0604020202020204" pitchFamily="34" charset="0"/>
+                    <a:cs typeface="Arial" panose="020B0604020202020204" pitchFamily="34" charset="0"/>
+                  </a:rPr>
+                  <a:t>around</a:t>
+                </a:r>
+                <a:r>
+                  <a:rPr lang="it-IT" sz="2400" dirty="0">
+                    <a:latin typeface="Arial" panose="020B0604020202020204" pitchFamily="34" charset="0"/>
+                    <a:cs typeface="Arial" panose="020B0604020202020204" pitchFamily="34" charset="0"/>
+                  </a:rPr>
+                  <a:t> the </a:t>
+                </a:r>
+                <a:r>
+                  <a:rPr lang="it-IT" sz="2400" dirty="0" err="1">
+                    <a:latin typeface="Arial" panose="020B0604020202020204" pitchFamily="34" charset="0"/>
+                    <a:cs typeface="Arial" panose="020B0604020202020204" pitchFamily="34" charset="0"/>
+                  </a:rPr>
+                  <a:t>construction</a:t>
+                </a:r>
+                <a:r>
+                  <a:rPr lang="it-IT" sz="2400" dirty="0">
+                    <a:latin typeface="Arial" panose="020B0604020202020204" pitchFamily="34" charset="0"/>
+                    <a:cs typeface="Arial" panose="020B0604020202020204" pitchFamily="34" charset="0"/>
+                  </a:rPr>
+                  <a:t> of a controller </a:t>
+                </a:r>
+                <a:r>
+                  <a:rPr lang="it-IT" sz="2400" dirty="0" err="1">
+                    <a:latin typeface="Arial" panose="020B0604020202020204" pitchFamily="34" charset="0"/>
+                    <a:cs typeface="Arial" panose="020B0604020202020204" pitchFamily="34" charset="0"/>
+                  </a:rPr>
+                  <a:t>that</a:t>
+                </a:r>
+                <a:r>
+                  <a:rPr lang="it-IT" sz="2400" dirty="0">
+                    <a:latin typeface="Arial" panose="020B0604020202020204" pitchFamily="34" charset="0"/>
+                    <a:cs typeface="Arial" panose="020B0604020202020204" pitchFamily="34" charset="0"/>
+                  </a:rPr>
+                  <a:t> </a:t>
+                </a:r>
+                <a:r>
+                  <a:rPr lang="it-IT" sz="2400" dirty="0" err="1">
+                    <a:latin typeface="Arial" panose="020B0604020202020204" pitchFamily="34" charset="0"/>
+                    <a:cs typeface="Arial" panose="020B0604020202020204" pitchFamily="34" charset="0"/>
+                  </a:rPr>
+                  <a:t>minimizes</a:t>
+                </a:r>
+                <a:r>
+                  <a:rPr lang="it-IT" sz="2400" dirty="0">
+                    <a:latin typeface="Arial" panose="020B0604020202020204" pitchFamily="34" charset="0"/>
+                    <a:cs typeface="Arial" panose="020B0604020202020204" pitchFamily="34" charset="0"/>
+                  </a:rPr>
+                  <a:t> a cost </a:t>
+                </a:r>
+                <a:r>
+                  <a:rPr lang="it-IT" sz="2400" dirty="0" err="1">
+                    <a:latin typeface="Arial" panose="020B0604020202020204" pitchFamily="34" charset="0"/>
+                    <a:cs typeface="Arial" panose="020B0604020202020204" pitchFamily="34" charset="0"/>
+                  </a:rPr>
+                  <a:t>function</a:t>
+                </a:r>
+                <a:r>
+                  <a:rPr lang="it-IT" sz="2400" dirty="0">
+                    <a:latin typeface="Arial" panose="020B0604020202020204" pitchFamily="34" charset="0"/>
+                    <a:cs typeface="Arial" panose="020B0604020202020204" pitchFamily="34" charset="0"/>
+                  </a:rPr>
+                  <a:t> J </a:t>
+                </a:r>
+              </a:p>
+              <a:p>
+                <a:pPr algn="just"/>
+                <a14:m>
+                  <m:oMathPara xmlns:m="http://schemas.openxmlformats.org/officeDocument/2006/math">
+                    <m:oMathParaPr>
+                      <m:jc m:val="centerGroup"/>
+                    </m:oMathParaPr>
+                    <m:oMath xmlns:m="http://schemas.openxmlformats.org/officeDocument/2006/math">
+                      <m:r>
+                        <a:rPr lang="it-IT" sz="2400" b="0" i="1" smtClean="0">
+                          <a:latin typeface="Cambria Math" panose="02040503050406030204" pitchFamily="18" charset="0"/>
+                          <a:cs typeface="Arial" panose="020B0604020202020204" pitchFamily="34" charset="0"/>
+                        </a:rPr>
+                        <m:t>𝐽</m:t>
+                      </m:r>
+                      <m:r>
+                        <a:rPr lang="it-IT" sz="2400" b="0" i="1" smtClean="0">
+                          <a:latin typeface="Cambria Math" panose="02040503050406030204" pitchFamily="18" charset="0"/>
+                          <a:cs typeface="Arial" panose="020B0604020202020204" pitchFamily="34" charset="0"/>
+                        </a:rPr>
+                        <m:t>=</m:t>
+                      </m:r>
+                      <m:nary>
+                        <m:naryPr>
+                          <m:chr m:val="∑"/>
+                          <m:ctrlPr>
+                            <a:rPr lang="it-IT" sz="2400" b="0" i="1" smtClean="0">
+                              <a:latin typeface="Cambria Math" panose="02040503050406030204" pitchFamily="18" charset="0"/>
+                              <a:cs typeface="Arial" panose="020B0604020202020204" pitchFamily="34" charset="0"/>
+                            </a:rPr>
+                          </m:ctrlPr>
+                        </m:naryPr>
+                        <m:sub>
+                          <m:r>
+                            <m:rPr>
+                              <m:brk m:alnAt="23"/>
+                            </m:rPr>
+                            <a:rPr lang="it-IT" sz="2400" b="0" i="1" smtClean="0">
+                              <a:latin typeface="Cambria Math" panose="02040503050406030204" pitchFamily="18" charset="0"/>
+                              <a:cs typeface="Arial" panose="020B0604020202020204" pitchFamily="34" charset="0"/>
+                            </a:rPr>
+                            <m:t>𝐾</m:t>
+                          </m:r>
+                          <m:r>
+                            <a:rPr lang="it-IT" sz="2400" b="0" i="1" smtClean="0">
+                              <a:latin typeface="Cambria Math" panose="02040503050406030204" pitchFamily="18" charset="0"/>
+                              <a:cs typeface="Arial" panose="020B0604020202020204" pitchFamily="34" charset="0"/>
+                            </a:rPr>
+                            <m:t>=1</m:t>
+                          </m:r>
+                        </m:sub>
+                        <m:sup>
+                          <m:r>
+                            <a:rPr lang="it-IT" sz="2400" b="0" i="1" smtClean="0">
+                              <a:latin typeface="Cambria Math" panose="02040503050406030204" pitchFamily="18" charset="0"/>
+                              <a:cs typeface="Arial" panose="020B0604020202020204" pitchFamily="34" charset="0"/>
+                            </a:rPr>
+                            <m:t>𝑁</m:t>
+                          </m:r>
+                        </m:sup>
+                        <m:e>
+                          <m:sSup>
+                            <m:sSupPr>
+                              <m:ctrlPr>
+                                <a:rPr lang="it-IT" sz="2400" b="0" i="1" smtClean="0">
+                                  <a:latin typeface="Cambria Math" panose="02040503050406030204" pitchFamily="18" charset="0"/>
+                                  <a:cs typeface="Arial" panose="020B0604020202020204" pitchFamily="34" charset="0"/>
+                                </a:rPr>
+                              </m:ctrlPr>
+                            </m:sSupPr>
+                            <m:e>
+                              <m:d>
+                                <m:dPr>
+                                  <m:ctrlPr>
+                                    <a:rPr lang="it-IT" sz="2400" b="0" i="1" smtClean="0">
+                                      <a:latin typeface="Cambria Math" panose="02040503050406030204" pitchFamily="18" charset="0"/>
+                                      <a:cs typeface="Arial" panose="020B0604020202020204" pitchFamily="34" charset="0"/>
+                                    </a:rPr>
+                                  </m:ctrlPr>
+                                </m:dPr>
+                                <m:e>
+                                  <m:sSubSup>
+                                    <m:sSubSupPr>
+                                      <m:ctrlPr>
+                                        <a:rPr lang="it-IT" sz="2400" b="0" i="1" smtClean="0">
+                                          <a:latin typeface="Cambria Math" panose="02040503050406030204" pitchFamily="18" charset="0"/>
+                                          <a:cs typeface="Arial" panose="020B0604020202020204" pitchFamily="34" charset="0"/>
+                                        </a:rPr>
+                                      </m:ctrlPr>
+                                    </m:sSubSupPr>
+                                    <m:e>
+                                      <m:acc>
+                                        <m:accPr>
+                                          <m:chr m:val="̂"/>
+                                          <m:ctrlPr>
+                                            <a:rPr lang="it-IT" sz="2400" b="0" i="1" smtClean="0">
+                                              <a:latin typeface="Cambria Math" panose="02040503050406030204" pitchFamily="18" charset="0"/>
+                                              <a:cs typeface="Arial" panose="020B0604020202020204" pitchFamily="34" charset="0"/>
+                                            </a:rPr>
+                                          </m:ctrlPr>
+                                        </m:accPr>
+                                        <m:e>
+                                          <m:r>
+                                            <a:rPr lang="it-IT" sz="2400" b="0" i="1" smtClean="0">
+                                              <a:latin typeface="Cambria Math" panose="02040503050406030204" pitchFamily="18" charset="0"/>
+                                              <a:cs typeface="Arial" panose="020B0604020202020204" pitchFamily="34" charset="0"/>
+                                            </a:rPr>
+                                            <m:t>𝑦</m:t>
+                                          </m:r>
+                                        </m:e>
+                                      </m:acc>
+                                    </m:e>
+                                    <m:sub>
+                                      <m:r>
+                                        <a:rPr lang="it-IT" sz="2400" b="0" i="1" smtClean="0">
+                                          <a:latin typeface="Cambria Math" panose="02040503050406030204" pitchFamily="18" charset="0"/>
+                                          <a:cs typeface="Arial" panose="020B0604020202020204" pitchFamily="34" charset="0"/>
+                                        </a:rPr>
+                                        <m:t>𝑘</m:t>
+                                      </m:r>
+                                    </m:sub>
+                                    <m:sup/>
+                                  </m:sSubSup>
+                                  <m:r>
+                                    <a:rPr lang="it-IT" sz="2400" b="0" i="1" smtClean="0">
+                                      <a:latin typeface="Cambria Math" panose="02040503050406030204" pitchFamily="18" charset="0"/>
+                                      <a:cs typeface="Arial" panose="020B0604020202020204" pitchFamily="34" charset="0"/>
+                                    </a:rPr>
+                                    <m:t>−</m:t>
+                                  </m:r>
+                                  <m:sSubSup>
+                                    <m:sSubSupPr>
+                                      <m:ctrlPr>
+                                        <a:rPr lang="it-IT" sz="2400" b="0" i="1" smtClean="0">
+                                          <a:latin typeface="Cambria Math" panose="02040503050406030204" pitchFamily="18" charset="0"/>
+                                          <a:cs typeface="Arial" panose="020B0604020202020204" pitchFamily="34" charset="0"/>
+                                        </a:rPr>
+                                      </m:ctrlPr>
+                                    </m:sSubSupPr>
+                                    <m:e>
+                                      <m:r>
+                                        <a:rPr lang="it-IT" sz="2400" b="0" i="1" smtClean="0">
+                                          <a:latin typeface="Cambria Math" panose="02040503050406030204" pitchFamily="18" charset="0"/>
+                                          <a:cs typeface="Arial" panose="020B0604020202020204" pitchFamily="34" charset="0"/>
+                                        </a:rPr>
+                                        <m:t>𝑟</m:t>
+                                      </m:r>
+                                    </m:e>
+                                    <m:sub>
+                                      <m:r>
+                                        <a:rPr lang="it-IT" sz="2400" b="0" i="1" smtClean="0">
+                                          <a:latin typeface="Cambria Math" panose="02040503050406030204" pitchFamily="18" charset="0"/>
+                                          <a:cs typeface="Arial" panose="020B0604020202020204" pitchFamily="34" charset="0"/>
+                                        </a:rPr>
+                                        <m:t>𝑘</m:t>
+                                      </m:r>
+                                    </m:sub>
+                                    <m:sup/>
+                                  </m:sSubSup>
+                                </m:e>
+                              </m:d>
+                            </m:e>
+                            <m:sup>
+                              <m:r>
+                                <a:rPr lang="it-IT" sz="2400" b="0" i="1" smtClean="0">
+                                  <a:latin typeface="Cambria Math" panose="02040503050406030204" pitchFamily="18" charset="0"/>
+                                  <a:cs typeface="Arial" panose="020B0604020202020204" pitchFamily="34" charset="0"/>
+                                </a:rPr>
+                                <m:t>𝑇</m:t>
+                              </m:r>
+                            </m:sup>
+                          </m:sSup>
+                          <m:r>
+                            <a:rPr lang="it-IT" sz="2400" b="0" i="1" smtClean="0">
+                              <a:latin typeface="Cambria Math" panose="02040503050406030204" pitchFamily="18" charset="0"/>
+                              <a:cs typeface="Arial" panose="020B0604020202020204" pitchFamily="34" charset="0"/>
+                            </a:rPr>
+                            <m:t>∗</m:t>
+                          </m:r>
+                          <m:sSub>
+                            <m:sSubPr>
+                              <m:ctrlPr>
+                                <a:rPr lang="it-IT" sz="2400" b="0" i="1" smtClean="0">
+                                  <a:latin typeface="Cambria Math" panose="02040503050406030204" pitchFamily="18" charset="0"/>
+                                  <a:cs typeface="Arial" panose="020B0604020202020204" pitchFamily="34" charset="0"/>
+                                </a:rPr>
+                              </m:ctrlPr>
+                            </m:sSubPr>
+                            <m:e>
+                              <m:r>
+                                <a:rPr lang="it-IT" sz="2400" b="0" i="1" smtClean="0">
+                                  <a:latin typeface="Cambria Math" panose="02040503050406030204" pitchFamily="18" charset="0"/>
+                                  <a:cs typeface="Arial" panose="020B0604020202020204" pitchFamily="34" charset="0"/>
+                                </a:rPr>
+                                <m:t>𝑄</m:t>
+                              </m:r>
+                            </m:e>
+                            <m:sub>
+                              <m:r>
+                                <a:rPr lang="it-IT" sz="2400" b="0" i="1" smtClean="0">
+                                  <a:latin typeface="Cambria Math" panose="02040503050406030204" pitchFamily="18" charset="0"/>
+                                  <a:cs typeface="Arial" panose="020B0604020202020204" pitchFamily="34" charset="0"/>
+                                </a:rPr>
+                                <m:t>𝑘</m:t>
+                              </m:r>
+                            </m:sub>
+                          </m:sSub>
+                        </m:e>
+                      </m:nary>
+                      <m:d>
+                        <m:dPr>
+                          <m:ctrlPr>
+                            <a:rPr lang="it-IT" sz="2400" b="0" i="1" smtClean="0">
+                              <a:latin typeface="Cambria Math" panose="02040503050406030204" pitchFamily="18" charset="0"/>
+                              <a:cs typeface="Arial" panose="020B0604020202020204" pitchFamily="34" charset="0"/>
+                            </a:rPr>
+                          </m:ctrlPr>
+                        </m:dPr>
+                        <m:e>
+                          <m:sSubSup>
+                            <m:sSubSupPr>
+                              <m:ctrlPr>
+                                <a:rPr lang="it-IT" sz="2400" b="0" i="1" smtClean="0">
+                                  <a:latin typeface="Cambria Math" panose="02040503050406030204" pitchFamily="18" charset="0"/>
+                                  <a:cs typeface="Arial" panose="020B0604020202020204" pitchFamily="34" charset="0"/>
+                                </a:rPr>
+                              </m:ctrlPr>
+                            </m:sSubSupPr>
+                            <m:e>
+                              <m:acc>
+                                <m:accPr>
+                                  <m:chr m:val="̂"/>
+                                  <m:ctrlPr>
+                                    <a:rPr lang="it-IT" sz="2400" b="0" i="1" smtClean="0">
+                                      <a:latin typeface="Cambria Math" panose="02040503050406030204" pitchFamily="18" charset="0"/>
+                                      <a:cs typeface="Arial" panose="020B0604020202020204" pitchFamily="34" charset="0"/>
+                                    </a:rPr>
+                                  </m:ctrlPr>
+                                </m:accPr>
+                                <m:e>
+                                  <m:r>
+                                    <a:rPr lang="it-IT" sz="2400" b="0" i="1" smtClean="0">
+                                      <a:latin typeface="Cambria Math" panose="02040503050406030204" pitchFamily="18" charset="0"/>
+                                      <a:cs typeface="Arial" panose="020B0604020202020204" pitchFamily="34" charset="0"/>
+                                    </a:rPr>
+                                    <m:t>𝑦</m:t>
+                                  </m:r>
+                                </m:e>
+                              </m:acc>
+                            </m:e>
+                            <m:sub>
+                              <m:r>
+                                <a:rPr lang="it-IT" sz="2400" b="0" i="1" smtClean="0">
+                                  <a:latin typeface="Cambria Math" panose="02040503050406030204" pitchFamily="18" charset="0"/>
+                                  <a:cs typeface="Arial" panose="020B0604020202020204" pitchFamily="34" charset="0"/>
+                                </a:rPr>
+                                <m:t>𝑘</m:t>
+                              </m:r>
+                            </m:sub>
+                            <m:sup/>
+                          </m:sSubSup>
+                          <m:r>
+                            <a:rPr lang="it-IT" sz="2400" b="0" i="1" smtClean="0">
+                              <a:latin typeface="Cambria Math" panose="02040503050406030204" pitchFamily="18" charset="0"/>
+                              <a:cs typeface="Arial" panose="020B0604020202020204" pitchFamily="34" charset="0"/>
+                            </a:rPr>
+                            <m:t>−</m:t>
+                          </m:r>
+                          <m:sSubSup>
+                            <m:sSubSupPr>
+                              <m:ctrlPr>
+                                <a:rPr lang="it-IT" sz="2400" b="0" i="1" smtClean="0">
+                                  <a:latin typeface="Cambria Math" panose="02040503050406030204" pitchFamily="18" charset="0"/>
+                                  <a:cs typeface="Arial" panose="020B0604020202020204" pitchFamily="34" charset="0"/>
+                                </a:rPr>
+                              </m:ctrlPr>
+                            </m:sSubSupPr>
+                            <m:e>
+                              <m:r>
+                                <a:rPr lang="it-IT" sz="2400" b="0" i="1" smtClean="0">
+                                  <a:latin typeface="Cambria Math" panose="02040503050406030204" pitchFamily="18" charset="0"/>
+                                  <a:cs typeface="Arial" panose="020B0604020202020204" pitchFamily="34" charset="0"/>
+                                </a:rPr>
+                                <m:t>𝑟</m:t>
+                              </m:r>
+                            </m:e>
+                            <m:sub>
+                              <m:r>
+                                <a:rPr lang="it-IT" sz="2400" b="0" i="1" smtClean="0">
+                                  <a:latin typeface="Cambria Math" panose="02040503050406030204" pitchFamily="18" charset="0"/>
+                                  <a:cs typeface="Arial" panose="020B0604020202020204" pitchFamily="34" charset="0"/>
+                                </a:rPr>
+                                <m:t>𝑘</m:t>
+                              </m:r>
+                            </m:sub>
+                            <m:sup/>
+                          </m:sSubSup>
+                        </m:e>
+                      </m:d>
+                      <m:r>
+                        <a:rPr lang="it-IT" sz="2400" b="0" i="1" smtClean="0">
+                          <a:latin typeface="Cambria Math" panose="02040503050406030204" pitchFamily="18" charset="0"/>
+                          <a:cs typeface="Arial" panose="020B0604020202020204" pitchFamily="34" charset="0"/>
+                        </a:rPr>
+                        <m:t>+</m:t>
+                      </m:r>
+                      <m:sSubSup>
+                        <m:sSubSupPr>
+                          <m:ctrlPr>
+                            <a:rPr lang="it-IT" sz="2400" b="0" i="1" smtClean="0">
+                              <a:latin typeface="Cambria Math" panose="02040503050406030204" pitchFamily="18" charset="0"/>
+                              <a:cs typeface="Arial" panose="020B0604020202020204" pitchFamily="34" charset="0"/>
+                            </a:rPr>
+                          </m:ctrlPr>
+                        </m:sSubSupPr>
+                        <m:e>
+                          <m:r>
+                            <a:rPr lang="it-IT" sz="2400" b="0" i="1" smtClean="0">
+                              <a:latin typeface="Cambria Math" panose="02040503050406030204" pitchFamily="18" charset="0"/>
+                              <a:cs typeface="Arial" panose="020B0604020202020204" pitchFamily="34" charset="0"/>
+                            </a:rPr>
+                            <m:t>𝑢</m:t>
+                          </m:r>
+                        </m:e>
+                        <m:sub>
+                          <m:r>
+                            <a:rPr lang="it-IT" sz="2400" b="0" i="1" smtClean="0">
+                              <a:latin typeface="Cambria Math" panose="02040503050406030204" pitchFamily="18" charset="0"/>
+                              <a:cs typeface="Arial" panose="020B0604020202020204" pitchFamily="34" charset="0"/>
+                            </a:rPr>
+                            <m:t>𝑘</m:t>
+                          </m:r>
+                        </m:sub>
+                        <m:sup>
+                          <m:r>
+                            <a:rPr lang="it-IT" sz="2400" b="0" i="1" smtClean="0">
+                              <a:latin typeface="Cambria Math" panose="02040503050406030204" pitchFamily="18" charset="0"/>
+                              <a:cs typeface="Arial" panose="020B0604020202020204" pitchFamily="34" charset="0"/>
+                            </a:rPr>
+                            <m:t>𝑇</m:t>
+                          </m:r>
+                        </m:sup>
+                      </m:sSubSup>
+                      <m:sSub>
+                        <m:sSubPr>
+                          <m:ctrlPr>
+                            <a:rPr lang="it-IT" sz="2400" b="0" i="1" smtClean="0">
+                              <a:latin typeface="Cambria Math" panose="02040503050406030204" pitchFamily="18" charset="0"/>
+                              <a:cs typeface="Arial" panose="020B0604020202020204" pitchFamily="34" charset="0"/>
+                            </a:rPr>
+                          </m:ctrlPr>
+                        </m:sSubPr>
+                        <m:e>
+                          <m:r>
+                            <a:rPr lang="it-IT" sz="2400" b="0" i="1" smtClean="0">
+                              <a:latin typeface="Cambria Math" panose="02040503050406030204" pitchFamily="18" charset="0"/>
+                              <a:cs typeface="Arial" panose="020B0604020202020204" pitchFamily="34" charset="0"/>
+                            </a:rPr>
+                            <m:t>𝑅</m:t>
+                          </m:r>
+                        </m:e>
+                        <m:sub>
+                          <m:r>
+                            <a:rPr lang="it-IT" sz="2400" b="0" i="1" smtClean="0">
+                              <a:latin typeface="Cambria Math" panose="02040503050406030204" pitchFamily="18" charset="0"/>
+                              <a:cs typeface="Arial" panose="020B0604020202020204" pitchFamily="34" charset="0"/>
+                            </a:rPr>
+                            <m:t>𝑘</m:t>
+                          </m:r>
+                        </m:sub>
+                      </m:sSub>
+                      <m:sSub>
+                        <m:sSubPr>
+                          <m:ctrlPr>
+                            <a:rPr lang="it-IT" sz="2400" b="0" i="1" smtClean="0">
+                              <a:latin typeface="Cambria Math" panose="02040503050406030204" pitchFamily="18" charset="0"/>
+                              <a:cs typeface="Arial" panose="020B0604020202020204" pitchFamily="34" charset="0"/>
+                            </a:rPr>
+                          </m:ctrlPr>
+                        </m:sSubPr>
+                        <m:e>
+                          <m:r>
+                            <a:rPr lang="it-IT" sz="2400" b="0" i="1" smtClean="0">
+                              <a:latin typeface="Cambria Math" panose="02040503050406030204" pitchFamily="18" charset="0"/>
+                              <a:cs typeface="Arial" panose="020B0604020202020204" pitchFamily="34" charset="0"/>
+                            </a:rPr>
+                            <m:t>𝑢</m:t>
+                          </m:r>
+                        </m:e>
+                        <m:sub>
+                          <m:r>
+                            <a:rPr lang="it-IT" sz="2400" b="0" i="1" smtClean="0">
+                              <a:latin typeface="Cambria Math" panose="02040503050406030204" pitchFamily="18" charset="0"/>
+                              <a:cs typeface="Arial" panose="020B0604020202020204" pitchFamily="34" charset="0"/>
+                            </a:rPr>
+                            <m:t>𝑘</m:t>
+                          </m:r>
+                        </m:sub>
+                      </m:sSub>
+                    </m:oMath>
+                  </m:oMathPara>
+                </a14:m>
+                <a:endParaRPr lang="it-IT" sz="2400" b="0" dirty="0">
+                  <a:latin typeface="Arial" panose="020B0604020202020204" pitchFamily="34" charset="0"/>
+                  <a:cs typeface="Arial" panose="020B0604020202020204" pitchFamily="34" charset="0"/>
+                </a:endParaRPr>
+              </a:p>
+              <a:p>
+                <a:pPr algn="just"/>
+                <a:endParaRPr lang="it-IT" sz="2400" dirty="0">
+                  <a:latin typeface="Arial" panose="020B0604020202020204" pitchFamily="34" charset="0"/>
+                  <a:cs typeface="Arial" panose="020B0604020202020204" pitchFamily="34" charset="0"/>
+                </a:endParaRPr>
+              </a:p>
+              <a:p>
+                <a:pPr algn="just"/>
+                <a:r>
+                  <a:rPr lang="it-IT" sz="2400" b="0" dirty="0">
+                    <a:latin typeface="Arial" panose="020B0604020202020204" pitchFamily="34" charset="0"/>
+                    <a:cs typeface="Arial" panose="020B0604020202020204" pitchFamily="34" charset="0"/>
+                  </a:rPr>
+                  <a:t>In </a:t>
+                </a:r>
+                <a:r>
+                  <a:rPr lang="it-IT" sz="2400" b="0" dirty="0" err="1">
+                    <a:latin typeface="Arial" panose="020B0604020202020204" pitchFamily="34" charset="0"/>
+                    <a:cs typeface="Arial" panose="020B0604020202020204" pitchFamily="34" charset="0"/>
+                  </a:rPr>
+                  <a:t>this</a:t>
+                </a:r>
+                <a:r>
+                  <a:rPr lang="it-IT" sz="2400" b="0" dirty="0">
+                    <a:latin typeface="Arial" panose="020B0604020202020204" pitchFamily="34" charset="0"/>
+                    <a:cs typeface="Arial" panose="020B0604020202020204" pitchFamily="34" charset="0"/>
+                  </a:rPr>
+                  <a:t> </a:t>
+                </a:r>
+                <a:r>
+                  <a:rPr lang="it-IT" sz="2400" b="0" dirty="0" err="1">
+                    <a:latin typeface="Arial" panose="020B0604020202020204" pitchFamily="34" charset="0"/>
+                    <a:cs typeface="Arial" panose="020B0604020202020204" pitchFamily="34" charset="0"/>
+                  </a:rPr>
+                  <a:t>context</a:t>
+                </a:r>
+                <a:r>
+                  <a:rPr lang="it-IT" sz="2400" b="0" dirty="0">
+                    <a:latin typeface="Arial" panose="020B0604020202020204" pitchFamily="34" charset="0"/>
+                    <a:cs typeface="Arial" panose="020B0604020202020204" pitchFamily="34" charset="0"/>
+                  </a:rPr>
+                  <a:t> </a:t>
+                </a:r>
+                <a14:m>
+                  <m:oMath xmlns:m="http://schemas.openxmlformats.org/officeDocument/2006/math">
+                    <m:sSubSup>
+                      <m:sSubSupPr>
+                        <m:ctrlPr>
+                          <a:rPr lang="it-IT" sz="2400" b="0" i="1" smtClean="0">
+                            <a:latin typeface="Cambria Math" panose="02040503050406030204" pitchFamily="18" charset="0"/>
+                            <a:cs typeface="Arial" panose="020B0604020202020204" pitchFamily="34" charset="0"/>
+                          </a:rPr>
+                        </m:ctrlPr>
+                      </m:sSubSupPr>
+                      <m:e>
+                        <m:r>
+                          <a:rPr lang="it-IT" sz="2400" b="0" i="1" smtClean="0">
+                            <a:latin typeface="Cambria Math" panose="02040503050406030204" pitchFamily="18" charset="0"/>
+                            <a:cs typeface="Arial" panose="020B0604020202020204" pitchFamily="34" charset="0"/>
+                          </a:rPr>
+                          <m:t>𝑟</m:t>
+                        </m:r>
+                      </m:e>
+                      <m:sub>
+                        <m:r>
+                          <a:rPr lang="it-IT" sz="2400" b="0" i="1" smtClean="0">
+                            <a:latin typeface="Cambria Math" panose="02040503050406030204" pitchFamily="18" charset="0"/>
+                            <a:cs typeface="Arial" panose="020B0604020202020204" pitchFamily="34" charset="0"/>
+                          </a:rPr>
+                          <m:t>𝑘</m:t>
+                        </m:r>
+                      </m:sub>
+                      <m:sup/>
+                    </m:sSubSup>
+                  </m:oMath>
+                </a14:m>
+                <a:r>
+                  <a:rPr lang="it-IT" sz="2400" b="0" dirty="0">
+                    <a:latin typeface="Arial" panose="020B0604020202020204" pitchFamily="34" charset="0"/>
+                    <a:cs typeface="Arial" panose="020B0604020202020204" pitchFamily="34" charset="0"/>
+                  </a:rPr>
+                  <a:t> are the </a:t>
+                </a:r>
+                <a:r>
+                  <a:rPr lang="it-IT" sz="2400" b="0" dirty="0" err="1">
+                    <a:latin typeface="Arial" panose="020B0604020202020204" pitchFamily="34" charset="0"/>
+                    <a:cs typeface="Arial" panose="020B0604020202020204" pitchFamily="34" charset="0"/>
+                  </a:rPr>
+                  <a:t>reference</a:t>
+                </a:r>
+                <a:r>
+                  <a:rPr lang="it-IT" sz="2400" b="0" dirty="0">
+                    <a:latin typeface="Arial" panose="020B0604020202020204" pitchFamily="34" charset="0"/>
+                    <a:cs typeface="Arial" panose="020B0604020202020204" pitchFamily="34" charset="0"/>
+                  </a:rPr>
+                  <a:t> outputs, </a:t>
+                </a:r>
+                <a:r>
+                  <a:rPr lang="it-IT" sz="2400" b="0" dirty="0" err="1">
+                    <a:latin typeface="Arial" panose="020B0604020202020204" pitchFamily="34" charset="0"/>
+                    <a:cs typeface="Arial" panose="020B0604020202020204" pitchFamily="34" charset="0"/>
+                  </a:rPr>
+                  <a:t>while</a:t>
+                </a:r>
+                <a:r>
+                  <a:rPr lang="it-IT" sz="2400" b="0" dirty="0">
+                    <a:latin typeface="Arial" panose="020B0604020202020204" pitchFamily="34" charset="0"/>
+                    <a:cs typeface="Arial" panose="020B0604020202020204" pitchFamily="34" charset="0"/>
+                  </a:rPr>
+                  <a:t> </a:t>
+                </a:r>
+                <a14:m>
+                  <m:oMath xmlns:m="http://schemas.openxmlformats.org/officeDocument/2006/math">
+                    <m:sSubSup>
+                      <m:sSubSupPr>
+                        <m:ctrlPr>
+                          <a:rPr lang="it-IT" sz="2400" b="0" i="1" smtClean="0">
+                            <a:latin typeface="Cambria Math" panose="02040503050406030204" pitchFamily="18" charset="0"/>
+                            <a:cs typeface="Arial" panose="020B0604020202020204" pitchFamily="34" charset="0"/>
+                          </a:rPr>
+                        </m:ctrlPr>
+                      </m:sSubSupPr>
+                      <m:e>
+                        <m:acc>
+                          <m:accPr>
+                            <m:chr m:val="̂"/>
+                            <m:ctrlPr>
+                              <a:rPr lang="it-IT" sz="2400" b="0" i="1" smtClean="0">
+                                <a:latin typeface="Cambria Math" panose="02040503050406030204" pitchFamily="18" charset="0"/>
+                                <a:cs typeface="Arial" panose="020B0604020202020204" pitchFamily="34" charset="0"/>
+                              </a:rPr>
+                            </m:ctrlPr>
+                          </m:accPr>
+                          <m:e>
+                            <m:r>
+                              <a:rPr lang="it-IT" sz="2400" b="0" i="1" smtClean="0">
+                                <a:latin typeface="Cambria Math" panose="02040503050406030204" pitchFamily="18" charset="0"/>
+                                <a:cs typeface="Arial" panose="020B0604020202020204" pitchFamily="34" charset="0"/>
+                              </a:rPr>
+                              <m:t>𝑦</m:t>
+                            </m:r>
+                          </m:e>
+                        </m:acc>
+                      </m:e>
+                      <m:sub>
+                        <m:r>
+                          <a:rPr lang="it-IT" sz="2400" b="0" i="1" smtClean="0">
+                            <a:latin typeface="Cambria Math" panose="02040503050406030204" pitchFamily="18" charset="0"/>
+                            <a:cs typeface="Arial" panose="020B0604020202020204" pitchFamily="34" charset="0"/>
+                          </a:rPr>
+                          <m:t>𝑘</m:t>
+                        </m:r>
+                      </m:sub>
+                      <m:sup/>
+                    </m:sSubSup>
+                  </m:oMath>
+                </a14:m>
+                <a:r>
+                  <a:rPr lang="it-IT" sz="2400" b="0" dirty="0">
+                    <a:latin typeface="Arial" panose="020B0604020202020204" pitchFamily="34" charset="0"/>
+                    <a:cs typeface="Arial" panose="020B0604020202020204" pitchFamily="34" charset="0"/>
+                  </a:rPr>
+                  <a:t> are the </a:t>
+                </a:r>
+                <a:r>
+                  <a:rPr lang="it-IT" sz="2400" b="0" dirty="0" err="1">
+                    <a:latin typeface="Arial" panose="020B0604020202020204" pitchFamily="34" charset="0"/>
+                    <a:cs typeface="Arial" panose="020B0604020202020204" pitchFamily="34" charset="0"/>
+                  </a:rPr>
+                  <a:t>estimated</a:t>
+                </a:r>
+                <a:r>
+                  <a:rPr lang="it-IT" sz="2400" b="0" dirty="0">
+                    <a:latin typeface="Arial" panose="020B0604020202020204" pitchFamily="34" charset="0"/>
+                    <a:cs typeface="Arial" panose="020B0604020202020204" pitchFamily="34" charset="0"/>
+                  </a:rPr>
+                  <a:t> outputs of the system, and Q and R are user- </a:t>
+                </a:r>
+                <a:r>
+                  <a:rPr lang="it-IT" sz="2400" b="0" dirty="0" err="1">
+                    <a:latin typeface="Arial" panose="020B0604020202020204" pitchFamily="34" charset="0"/>
+                    <a:cs typeface="Arial" panose="020B0604020202020204" pitchFamily="34" charset="0"/>
+                  </a:rPr>
+                  <a:t>defined</a:t>
+                </a:r>
+                <a:r>
+                  <a:rPr lang="it-IT" sz="2400" b="0" dirty="0">
+                    <a:latin typeface="Arial" panose="020B0604020202020204" pitchFamily="34" charset="0"/>
+                    <a:cs typeface="Arial" panose="020B0604020202020204" pitchFamily="34" charset="0"/>
+                  </a:rPr>
+                  <a:t> </a:t>
+                </a:r>
+                <a:r>
+                  <a:rPr lang="it-IT" sz="2400" b="0" dirty="0" err="1">
+                    <a:latin typeface="Arial" panose="020B0604020202020204" pitchFamily="34" charset="0"/>
+                    <a:cs typeface="Arial" panose="020B0604020202020204" pitchFamily="34" charset="0"/>
+                  </a:rPr>
+                  <a:t>diagonal</a:t>
+                </a:r>
+                <a:r>
+                  <a:rPr lang="it-IT" sz="2400" b="0" dirty="0">
+                    <a:latin typeface="Arial" panose="020B0604020202020204" pitchFamily="34" charset="0"/>
+                    <a:cs typeface="Arial" panose="020B0604020202020204" pitchFamily="34" charset="0"/>
+                  </a:rPr>
+                  <a:t> weight </a:t>
+                </a:r>
+                <a:r>
+                  <a:rPr lang="it-IT" sz="2400" b="0" dirty="0" err="1">
+                    <a:latin typeface="Arial" panose="020B0604020202020204" pitchFamily="34" charset="0"/>
+                    <a:cs typeface="Arial" panose="020B0604020202020204" pitchFamily="34" charset="0"/>
+                  </a:rPr>
+                  <a:t>matrices</a:t>
+                </a:r>
+                <a:r>
+                  <a:rPr lang="it-IT" sz="2400" b="0" dirty="0">
+                    <a:latin typeface="Arial" panose="020B0604020202020204" pitchFamily="34" charset="0"/>
+                    <a:cs typeface="Arial" panose="020B0604020202020204" pitchFamily="34" charset="0"/>
+                  </a:rPr>
+                  <a:t>.</a:t>
+                </a:r>
+              </a:p>
+              <a:p>
+                <a:pPr algn="just"/>
+                <a:endParaRPr lang="it-IT" sz="2400" b="0" dirty="0">
+                  <a:latin typeface="Arial" panose="020B0604020202020204" pitchFamily="34" charset="0"/>
+                  <a:cs typeface="Arial" panose="020B0604020202020204" pitchFamily="34" charset="0"/>
+                </a:endParaRPr>
+              </a:p>
+              <a:p>
+                <a:pPr algn="just"/>
+                <a:endParaRPr lang="it-IT" sz="2400" dirty="0">
+                  <a:latin typeface="Arial" panose="020B0604020202020204" pitchFamily="34" charset="0"/>
+                  <a:cs typeface="Arial" panose="020B0604020202020204" pitchFamily="34" charset="0"/>
+                </a:endParaRPr>
+              </a:p>
+            </p:txBody>
+          </p:sp>
+        </mc:Choice>
+        <mc:Fallback>
+          <p:sp>
+            <p:nvSpPr>
+              <p:cNvPr id="2" name="CasellaDiTesto 1">
+                <a:extLst>
+                  <a:ext uri="{FF2B5EF4-FFF2-40B4-BE49-F238E27FC236}">
+                    <a16:creationId xmlns:a16="http://schemas.microsoft.com/office/drawing/2014/main" id="{C6A839EB-6E78-0A60-AB09-75FB87247019}"/>
+                  </a:ext>
+                </a:extLst>
+              </p:cNvPr>
+              <p:cNvSpPr txBox="1">
+                <a:spLocks noRot="1" noChangeAspect="1" noMove="1" noResize="1" noEditPoints="1" noAdjustHandles="1" noChangeArrowheads="1" noChangeShapeType="1" noTextEdit="1"/>
+              </p:cNvSpPr>
+              <p:nvPr/>
+            </p:nvSpPr>
+            <p:spPr>
+              <a:xfrm>
+                <a:off x="723900" y="1683603"/>
+                <a:ext cx="10744200" cy="4130811"/>
+              </a:xfrm>
+              <a:prstGeom prst="rect">
+                <a:avLst/>
+              </a:prstGeom>
+              <a:blipFill>
+                <a:blip r:embed="rId2"/>
+                <a:stretch>
+                  <a:fillRect l="-908" t="-1032" r="-851"/>
+                </a:stretch>
+              </a:blipFill>
+            </p:spPr>
+            <p:txBody>
+              <a:bodyPr/>
+              <a:lstStyle/>
+              <a:p>
+                <a:r>
+                  <a:rPr lang="it-IT">
+                    <a:noFill/>
+                  </a:rPr>
+                  <a:t> </a:t>
+                </a:r>
+              </a:p>
+            </p:txBody>
+          </p:sp>
+        </mc:Fallback>
+      </mc:AlternateContent>
+    </p:spTree>
+    <p:extLst>
+      <p:ext uri="{BB962C8B-B14F-4D97-AF65-F5344CB8AC3E}">
+        <p14:creationId xmlns:p14="http://schemas.microsoft.com/office/powerpoint/2010/main" val="1592071934"/>
       </p:ext>
     </p:extLst>
   </p:cSld>

</xml_diff>

<commit_message>
Completed "proposed solution" part of presentation
</commit_message>
<xml_diff>
--- a/SPC_Presentation.pptx
+++ b/SPC_Presentation.pptx
@@ -17,9 +17,9 @@
     <p:sldId id="343" r:id="rId8"/>
     <p:sldId id="344" r:id="rId9"/>
     <p:sldId id="345" r:id="rId10"/>
-    <p:sldId id="349" r:id="rId11"/>
-    <p:sldId id="346" r:id="rId12"/>
-    <p:sldId id="347" r:id="rId13"/>
+    <p:sldId id="350" r:id="rId11"/>
+    <p:sldId id="349" r:id="rId12"/>
+    <p:sldId id="346" r:id="rId13"/>
     <p:sldId id="339" r:id="rId14"/>
     <p:sldId id="340" r:id="rId15"/>
   </p:sldIdLst>
@@ -131,7 +131,7 @@
           <a:p>
             <a:fld id="{52CF3C78-BFF9-4137-8833-13E3D0B09D8B}" type="datetimeFigureOut">
               <a:rPr lang="it-IT" smtClean="0"/>
-              <a:t>27/12/2025</a:t>
+              <a:t>28/12/2025</a:t>
             </a:fld>
             <a:endParaRPr lang="it-IT" dirty="0"/>
           </a:p>
@@ -398,6 +398,282 @@
 </p:notesMaster>
 </file>
 
+<file path=ppt/notesSlides/notesSlide1.xml><?xml version="1.0" encoding="utf-8"?>
+<p:notes xmlns:a="http://schemas.openxmlformats.org/drawingml/2006/main" xmlns:r="http://schemas.openxmlformats.org/officeDocument/2006/relationships" xmlns:p="http://schemas.openxmlformats.org/presentationml/2006/main">
+  <p:cSld>
+    <p:spTree>
+      <p:nvGrpSpPr>
+        <p:cNvPr id="1" name=""/>
+        <p:cNvGrpSpPr/>
+        <p:nvPr/>
+      </p:nvGrpSpPr>
+      <p:grpSpPr>
+        <a:xfrm>
+          <a:off x="0" y="0"/>
+          <a:ext cx="0" cy="0"/>
+          <a:chOff x="0" y="0"/>
+          <a:chExt cx="0" cy="0"/>
+        </a:xfrm>
+      </p:grpSpPr>
+      <p:sp>
+        <p:nvSpPr>
+          <p:cNvPr id="2" name="Segnaposto immagine diapositiva 1"/>
+          <p:cNvSpPr>
+            <a:spLocks noGrp="1" noRot="1" noChangeAspect="1"/>
+          </p:cNvSpPr>
+          <p:nvPr>
+            <p:ph type="sldImg"/>
+          </p:nvPr>
+        </p:nvSpPr>
+        <p:spPr/>
+      </p:sp>
+      <p:sp>
+        <p:nvSpPr>
+          <p:cNvPr id="3" name="Segnaposto note 2"/>
+          <p:cNvSpPr>
+            <a:spLocks noGrp="1"/>
+          </p:cNvSpPr>
+          <p:nvPr>
+            <p:ph type="body" idx="1"/>
+          </p:nvPr>
+        </p:nvSpPr>
+        <p:spPr/>
+        <p:txBody>
+          <a:bodyPr/>
+          <a:lstStyle/>
+          <a:p>
+            <a:endParaRPr lang="it-IT" dirty="0"/>
+          </a:p>
+        </p:txBody>
+      </p:sp>
+      <p:sp>
+        <p:nvSpPr>
+          <p:cNvPr id="4" name="Segnaposto numero diapositiva 3"/>
+          <p:cNvSpPr>
+            <a:spLocks noGrp="1"/>
+          </p:cNvSpPr>
+          <p:nvPr>
+            <p:ph type="sldNum" sz="quarter" idx="5"/>
+          </p:nvPr>
+        </p:nvSpPr>
+        <p:spPr/>
+        <p:txBody>
+          <a:bodyPr/>
+          <a:lstStyle/>
+          <a:p>
+            <a:fld id="{6218F9A5-25D9-4BE4-92E4-0A5AF102D313}" type="slidenum">
+              <a:rPr lang="it-IT" smtClean="0"/>
+              <a:t>9</a:t>
+            </a:fld>
+            <a:endParaRPr lang="it-IT" dirty="0"/>
+          </a:p>
+        </p:txBody>
+      </p:sp>
+    </p:spTree>
+    <p:extLst>
+      <p:ext uri="{BB962C8B-B14F-4D97-AF65-F5344CB8AC3E}">
+        <p14:creationId xmlns:p14="http://schemas.microsoft.com/office/powerpoint/2010/main" val="2952383305"/>
+      </p:ext>
+    </p:extLst>
+  </p:cSld>
+  <p:clrMapOvr>
+    <a:masterClrMapping/>
+  </p:clrMapOvr>
+</p:notes>
+</file>
+
+<file path=ppt/notesSlides/notesSlide2.xml><?xml version="1.0" encoding="utf-8"?>
+<p:notes xmlns:a="http://schemas.openxmlformats.org/drawingml/2006/main" xmlns:r="http://schemas.openxmlformats.org/officeDocument/2006/relationships" xmlns:p="http://schemas.openxmlformats.org/presentationml/2006/main">
+  <p:cSld>
+    <p:spTree>
+      <p:nvGrpSpPr>
+        <p:cNvPr id="1" name="">
+          <a:extLst>
+            <a:ext uri="{FF2B5EF4-FFF2-40B4-BE49-F238E27FC236}">
+              <a16:creationId xmlns:a16="http://schemas.microsoft.com/office/drawing/2014/main" id="{DF58E37A-E5AE-3B54-30F2-2CD2A87C01B9}"/>
+            </a:ext>
+          </a:extLst>
+        </p:cNvPr>
+        <p:cNvGrpSpPr/>
+        <p:nvPr/>
+      </p:nvGrpSpPr>
+      <p:grpSpPr>
+        <a:xfrm>
+          <a:off x="0" y="0"/>
+          <a:ext cx="0" cy="0"/>
+          <a:chOff x="0" y="0"/>
+          <a:chExt cx="0" cy="0"/>
+        </a:xfrm>
+      </p:grpSpPr>
+      <p:sp>
+        <p:nvSpPr>
+          <p:cNvPr id="2" name="Segnaposto immagine diapositiva 1">
+            <a:extLst>
+              <a:ext uri="{FF2B5EF4-FFF2-40B4-BE49-F238E27FC236}">
+                <a16:creationId xmlns:a16="http://schemas.microsoft.com/office/drawing/2014/main" id="{EC917A1C-85FF-0465-0699-015D7F560C2E}"/>
+              </a:ext>
+            </a:extLst>
+          </p:cNvPr>
+          <p:cNvSpPr>
+            <a:spLocks noGrp="1" noRot="1" noChangeAspect="1"/>
+          </p:cNvSpPr>
+          <p:nvPr>
+            <p:ph type="sldImg"/>
+          </p:nvPr>
+        </p:nvSpPr>
+        <p:spPr/>
+      </p:sp>
+      <p:sp>
+        <p:nvSpPr>
+          <p:cNvPr id="3" name="Segnaposto note 2">
+            <a:extLst>
+              <a:ext uri="{FF2B5EF4-FFF2-40B4-BE49-F238E27FC236}">
+                <a16:creationId xmlns:a16="http://schemas.microsoft.com/office/drawing/2014/main" id="{5983BAA2-E359-E754-7AC0-F926400E73F4}"/>
+              </a:ext>
+            </a:extLst>
+          </p:cNvPr>
+          <p:cNvSpPr>
+            <a:spLocks noGrp="1"/>
+          </p:cNvSpPr>
+          <p:nvPr>
+            <p:ph type="body" idx="1"/>
+          </p:nvPr>
+        </p:nvSpPr>
+        <p:spPr/>
+        <p:txBody>
+          <a:bodyPr/>
+          <a:lstStyle/>
+          <a:p>
+            <a:endParaRPr lang="it-IT" dirty="0"/>
+          </a:p>
+        </p:txBody>
+      </p:sp>
+      <p:sp>
+        <p:nvSpPr>
+          <p:cNvPr id="4" name="Segnaposto numero diapositiva 3">
+            <a:extLst>
+              <a:ext uri="{FF2B5EF4-FFF2-40B4-BE49-F238E27FC236}">
+                <a16:creationId xmlns:a16="http://schemas.microsoft.com/office/drawing/2014/main" id="{63C5438E-F049-C5EF-C495-53D6E6584633}"/>
+              </a:ext>
+            </a:extLst>
+          </p:cNvPr>
+          <p:cNvSpPr>
+            <a:spLocks noGrp="1"/>
+          </p:cNvSpPr>
+          <p:nvPr>
+            <p:ph type="sldNum" sz="quarter" idx="5"/>
+          </p:nvPr>
+        </p:nvSpPr>
+        <p:spPr/>
+        <p:txBody>
+          <a:bodyPr/>
+          <a:lstStyle/>
+          <a:p>
+            <a:fld id="{6218F9A5-25D9-4BE4-92E4-0A5AF102D313}" type="slidenum">
+              <a:rPr lang="it-IT" smtClean="0"/>
+              <a:t>10</a:t>
+            </a:fld>
+            <a:endParaRPr lang="it-IT" dirty="0"/>
+          </a:p>
+        </p:txBody>
+      </p:sp>
+    </p:spTree>
+    <p:extLst>
+      <p:ext uri="{BB962C8B-B14F-4D97-AF65-F5344CB8AC3E}">
+        <p14:creationId xmlns:p14="http://schemas.microsoft.com/office/powerpoint/2010/main" val="2923287752"/>
+      </p:ext>
+    </p:extLst>
+  </p:cSld>
+  <p:clrMapOvr>
+    <a:masterClrMapping/>
+  </p:clrMapOvr>
+</p:notes>
+</file>
+
+<file path=ppt/notesSlides/notesSlide3.xml><?xml version="1.0" encoding="utf-8"?>
+<p:notes xmlns:a="http://schemas.openxmlformats.org/drawingml/2006/main" xmlns:r="http://schemas.openxmlformats.org/officeDocument/2006/relationships" xmlns:p="http://schemas.openxmlformats.org/presentationml/2006/main">
+  <p:cSld>
+    <p:spTree>
+      <p:nvGrpSpPr>
+        <p:cNvPr id="1" name=""/>
+        <p:cNvGrpSpPr/>
+        <p:nvPr/>
+      </p:nvGrpSpPr>
+      <p:grpSpPr>
+        <a:xfrm>
+          <a:off x="0" y="0"/>
+          <a:ext cx="0" cy="0"/>
+          <a:chOff x="0" y="0"/>
+          <a:chExt cx="0" cy="0"/>
+        </a:xfrm>
+      </p:grpSpPr>
+      <p:sp>
+        <p:nvSpPr>
+          <p:cNvPr id="2" name="Segnaposto immagine diapositiva 1"/>
+          <p:cNvSpPr>
+            <a:spLocks noGrp="1" noRot="1" noChangeAspect="1"/>
+          </p:cNvSpPr>
+          <p:nvPr>
+            <p:ph type="sldImg"/>
+          </p:nvPr>
+        </p:nvSpPr>
+        <p:spPr/>
+      </p:sp>
+      <p:sp>
+        <p:nvSpPr>
+          <p:cNvPr id="3" name="Segnaposto note 2"/>
+          <p:cNvSpPr>
+            <a:spLocks noGrp="1"/>
+          </p:cNvSpPr>
+          <p:nvPr>
+            <p:ph type="body" idx="1"/>
+          </p:nvPr>
+        </p:nvSpPr>
+        <p:spPr/>
+        <p:txBody>
+          <a:bodyPr/>
+          <a:lstStyle/>
+          <a:p>
+            <a:endParaRPr lang="it-IT" dirty="0"/>
+          </a:p>
+        </p:txBody>
+      </p:sp>
+      <p:sp>
+        <p:nvSpPr>
+          <p:cNvPr id="4" name="Segnaposto numero diapositiva 3"/>
+          <p:cNvSpPr>
+            <a:spLocks noGrp="1"/>
+          </p:cNvSpPr>
+          <p:nvPr>
+            <p:ph type="sldNum" sz="quarter" idx="5"/>
+          </p:nvPr>
+        </p:nvSpPr>
+        <p:spPr/>
+        <p:txBody>
+          <a:bodyPr/>
+          <a:lstStyle/>
+          <a:p>
+            <a:fld id="{6218F9A5-25D9-4BE4-92E4-0A5AF102D313}" type="slidenum">
+              <a:rPr lang="it-IT" smtClean="0"/>
+              <a:t>11</a:t>
+            </a:fld>
+            <a:endParaRPr lang="it-IT" dirty="0"/>
+          </a:p>
+        </p:txBody>
+      </p:sp>
+    </p:spTree>
+    <p:extLst>
+      <p:ext uri="{BB962C8B-B14F-4D97-AF65-F5344CB8AC3E}">
+        <p14:creationId xmlns:p14="http://schemas.microsoft.com/office/powerpoint/2010/main" val="398079495"/>
+      </p:ext>
+    </p:extLst>
+  </p:cSld>
+  <p:clrMapOvr>
+    <a:masterClrMapping/>
+  </p:clrMapOvr>
+</p:notes>
+</file>
+
 <file path=ppt/slideLayouts/slideLayout1.xml><?xml version="1.0" encoding="utf-8"?>
 <p:sldLayout xmlns:a="http://schemas.openxmlformats.org/drawingml/2006/main" xmlns:r="http://schemas.openxmlformats.org/officeDocument/2006/relationships" xmlns:p="http://schemas.openxmlformats.org/presentationml/2006/main" type="obj" preserve="1">
   <p:cSld name="Title Slide">
@@ -549,7 +825,7 @@
           <a:p>
             <a:fld id="{1D8BD707-D9CF-40AE-B4C6-C98DA3205C09}" type="datetimeFigureOut">
               <a:rPr lang="en-US"/>
-              <a:t>12/27/2025</a:t>
+              <a:t>12/28/2025</a:t>
             </a:fld>
             <a:endParaRPr lang="en-US" dirty="0"/>
           </a:p>
@@ -726,7 +1002,7 @@
           <a:p>
             <a:fld id="{1D8BD707-D9CF-40AE-B4C6-C98DA3205C09}" type="datetimeFigureOut">
               <a:rPr lang="en-US"/>
-              <a:t>12/27/2025</a:t>
+              <a:t>12/28/2025</a:t>
             </a:fld>
             <a:endParaRPr lang="en-US" dirty="0"/>
           </a:p>
@@ -940,7 +1216,7 @@
           <a:p>
             <a:fld id="{1D8BD707-D9CF-40AE-B4C6-C98DA3205C09}" type="datetimeFigureOut">
               <a:rPr lang="en-US"/>
-              <a:t>12/27/2025</a:t>
+              <a:t>12/28/2025</a:t>
             </a:fld>
             <a:endParaRPr lang="en-US" dirty="0"/>
           </a:p>
@@ -1088,7 +1364,7 @@
           <a:p>
             <a:fld id="{1D8BD707-D9CF-40AE-B4C6-C98DA3205C09}" type="datetimeFigureOut">
               <a:rPr lang="en-US"/>
-              <a:t>12/27/2025</a:t>
+              <a:t>12/28/2025</a:t>
             </a:fld>
             <a:endParaRPr lang="en-US" dirty="0"/>
           </a:p>
@@ -1207,7 +1483,7 @@
           <a:p>
             <a:fld id="{1D8BD707-D9CF-40AE-B4C6-C98DA3205C09}" type="datetimeFigureOut">
               <a:rPr lang="en-US"/>
-              <a:t>12/27/2025</a:t>
+              <a:t>12/28/2025</a:t>
             </a:fld>
             <a:endParaRPr lang="en-US" dirty="0"/>
           </a:p>
@@ -1504,7 +1780,7 @@
           <a:p>
             <a:fld id="{1D8BD707-D9CF-40AE-B4C6-C98DA3205C09}" type="datetimeFigureOut">
               <a:rPr lang="en-US"/>
-              <a:t>12/27/2025</a:t>
+              <a:t>12/28/2025</a:t>
             </a:fld>
             <a:endParaRPr lang="en-US" dirty="0"/>
           </a:p>
@@ -2048,6 +2324,469 @@
         <p:cNvPr id="1" name="">
           <a:extLst>
             <a:ext uri="{FF2B5EF4-FFF2-40B4-BE49-F238E27FC236}">
+              <a16:creationId xmlns:a16="http://schemas.microsoft.com/office/drawing/2014/main" id="{0F43C11E-7BCF-F721-1738-8FC042ABB33B}"/>
+            </a:ext>
+          </a:extLst>
+        </p:cNvPr>
+        <p:cNvGrpSpPr/>
+        <p:nvPr/>
+      </p:nvGrpSpPr>
+      <p:grpSpPr>
+        <a:xfrm>
+          <a:off x="0" y="0"/>
+          <a:ext cx="0" cy="0"/>
+          <a:chOff x="0" y="0"/>
+          <a:chExt cx="0" cy="0"/>
+        </a:xfrm>
+      </p:grpSpPr>
+      <p:sp>
+        <p:nvSpPr>
+          <p:cNvPr id="10" name="Titolo 9">
+            <a:extLst>
+              <a:ext uri="{FF2B5EF4-FFF2-40B4-BE49-F238E27FC236}">
+                <a16:creationId xmlns:a16="http://schemas.microsoft.com/office/drawing/2014/main" id="{D4A6EC3A-C7C0-E9D2-0113-1DBC7FBC5CC8}"/>
+              </a:ext>
+            </a:extLst>
+          </p:cNvPr>
+          <p:cNvSpPr>
+            <a:spLocks noGrp="1"/>
+          </p:cNvSpPr>
+          <p:nvPr>
+            <p:ph type="title"/>
+          </p:nvPr>
+        </p:nvSpPr>
+        <p:spPr>
+          <a:xfrm>
+            <a:off x="761999" y="457200"/>
+            <a:ext cx="9691687" cy="538609"/>
+          </a:xfrm>
+        </p:spPr>
+        <p:txBody>
+          <a:bodyPr/>
+          <a:lstStyle/>
+          <a:p>
+            <a:r>
+              <a:rPr lang="en-GB" noProof="0" dirty="0">
+                <a:latin typeface="Arial Black" panose="020B0A04020102020204" pitchFamily="34" charset="0"/>
+              </a:rPr>
+              <a:t>Proposed solution – Principle of </a:t>
+            </a:r>
+            <a:r>
+              <a:rPr lang="en-GB" dirty="0">
+                <a:latin typeface="Arial Black" panose="020B0A04020102020204" pitchFamily="34" charset="0"/>
+              </a:rPr>
+              <a:t>MPC</a:t>
+            </a:r>
+            <a:endParaRPr lang="en-GB" noProof="0" dirty="0">
+              <a:latin typeface="Arial Black" panose="020B0A04020102020204" pitchFamily="34" charset="0"/>
+            </a:endParaRPr>
+          </a:p>
+        </p:txBody>
+      </p:sp>
+      <mc:AlternateContent xmlns:mc="http://schemas.openxmlformats.org/markup-compatibility/2006">
+        <mc:Choice xmlns:a14="http://schemas.microsoft.com/office/drawing/2010/main" Requires="a14">
+          <p:sp>
+            <p:nvSpPr>
+              <p:cNvPr id="2" name="CasellaDiTesto 1">
+                <a:extLst>
+                  <a:ext uri="{FF2B5EF4-FFF2-40B4-BE49-F238E27FC236}">
+                    <a16:creationId xmlns:a16="http://schemas.microsoft.com/office/drawing/2014/main" id="{07438525-36CC-3470-CEA6-B1FF903B89EA}"/>
+                  </a:ext>
+                </a:extLst>
+              </p:cNvPr>
+              <p:cNvSpPr txBox="1"/>
+              <p:nvPr/>
+            </p:nvSpPr>
+            <p:spPr>
+              <a:xfrm>
+                <a:off x="723900" y="1185270"/>
+                <a:ext cx="10744200" cy="1599284"/>
+              </a:xfrm>
+              <a:prstGeom prst="rect">
+                <a:avLst/>
+              </a:prstGeom>
+              <a:noFill/>
+            </p:spPr>
+            <p:txBody>
+              <a:bodyPr wrap="square">
+                <a:spAutoFit/>
+              </a:bodyPr>
+              <a:lstStyle/>
+              <a:p>
+                <a:pPr algn="just"/>
+                <a:r>
+                  <a:rPr lang="it-IT" sz="2400" dirty="0">
+                    <a:latin typeface="Arial" panose="020B0604020202020204" pitchFamily="34" charset="0"/>
+                    <a:cs typeface="Arial" panose="020B0604020202020204" pitchFamily="34" charset="0"/>
+                  </a:rPr>
+                  <a:t>The </a:t>
+                </a:r>
+                <a:r>
+                  <a:rPr lang="it-IT" sz="2400" dirty="0" err="1">
+                    <a:latin typeface="Arial" panose="020B0604020202020204" pitchFamily="34" charset="0"/>
+                    <a:cs typeface="Arial" panose="020B0604020202020204" pitchFamily="34" charset="0"/>
+                  </a:rPr>
+                  <a:t>aim</a:t>
+                </a:r>
+                <a:r>
+                  <a:rPr lang="it-IT" sz="2400" dirty="0">
+                    <a:latin typeface="Arial" panose="020B0604020202020204" pitchFamily="34" charset="0"/>
+                    <a:cs typeface="Arial" panose="020B0604020202020204" pitchFamily="34" charset="0"/>
+                  </a:rPr>
+                  <a:t> </a:t>
+                </a:r>
+                <a:r>
+                  <a:rPr lang="it-IT" sz="2400" dirty="0" err="1">
+                    <a:latin typeface="Arial" panose="020B0604020202020204" pitchFamily="34" charset="0"/>
+                    <a:cs typeface="Arial" panose="020B0604020202020204" pitchFamily="34" charset="0"/>
+                  </a:rPr>
+                  <a:t>is</a:t>
+                </a:r>
+                <a:r>
+                  <a:rPr lang="it-IT" sz="2400" dirty="0">
+                    <a:latin typeface="Arial" panose="020B0604020202020204" pitchFamily="34" charset="0"/>
+                    <a:cs typeface="Arial" panose="020B0604020202020204" pitchFamily="34" charset="0"/>
+                  </a:rPr>
+                  <a:t> to </a:t>
+                </a:r>
+                <a:r>
+                  <a:rPr lang="it-IT" sz="2400" dirty="0" err="1">
+                    <a:latin typeface="Arial" panose="020B0604020202020204" pitchFamily="34" charset="0"/>
+                    <a:cs typeface="Arial" panose="020B0604020202020204" pitchFamily="34" charset="0"/>
+                  </a:rPr>
+                  <a:t>find</a:t>
+                </a:r>
+                <a:r>
+                  <a:rPr lang="it-IT" sz="2400" dirty="0">
+                    <a:latin typeface="Arial" panose="020B0604020202020204" pitchFamily="34" charset="0"/>
+                    <a:cs typeface="Arial" panose="020B0604020202020204" pitchFamily="34" charset="0"/>
+                  </a:rPr>
+                  <a:t> the feature control </a:t>
+                </a:r>
+                <a:r>
+                  <a:rPr lang="it-IT" sz="2400" dirty="0" err="1">
+                    <a:latin typeface="Arial" panose="020B0604020202020204" pitchFamily="34" charset="0"/>
+                    <a:cs typeface="Arial" panose="020B0604020202020204" pitchFamily="34" charset="0"/>
+                  </a:rPr>
+                  <a:t>sequence</a:t>
+                </a:r>
+                <a:r>
+                  <a:rPr lang="it-IT" sz="2400" dirty="0">
+                    <a:latin typeface="Arial" panose="020B0604020202020204" pitchFamily="34" charset="0"/>
+                    <a:cs typeface="Arial" panose="020B0604020202020204" pitchFamily="34" charset="0"/>
+                  </a:rPr>
+                  <a:t> </a:t>
+                </a:r>
+                <a14:m>
+                  <m:oMath xmlns:m="http://schemas.openxmlformats.org/officeDocument/2006/math">
+                    <m:sSub>
+                      <m:sSubPr>
+                        <m:ctrlPr>
+                          <a:rPr lang="it-IT" sz="2400" i="1" noProof="0" smtClean="0">
+                            <a:latin typeface="Cambria Math" panose="02040503050406030204" pitchFamily="18" charset="0"/>
+                            <a:cs typeface="Arial" panose="020B0604020202020204" pitchFamily="34" charset="0"/>
+                          </a:rPr>
+                        </m:ctrlPr>
+                      </m:sSubPr>
+                      <m:e>
+                        <m:r>
+                          <a:rPr lang="it-IT" sz="2400" b="0" i="1" noProof="0" smtClean="0">
+                            <a:latin typeface="Cambria Math" panose="02040503050406030204" pitchFamily="18" charset="0"/>
+                            <a:cs typeface="Arial" panose="020B0604020202020204" pitchFamily="34" charset="0"/>
+                          </a:rPr>
+                          <m:t>𝑢</m:t>
+                        </m:r>
+                      </m:e>
+                      <m:sub>
+                        <m:r>
+                          <a:rPr lang="it-IT" sz="2400" b="0" i="1" noProof="0" smtClean="0">
+                            <a:latin typeface="Cambria Math" panose="02040503050406030204" pitchFamily="18" charset="0"/>
+                            <a:cs typeface="Arial" panose="020B0604020202020204" pitchFamily="34" charset="0"/>
+                          </a:rPr>
+                          <m:t>𝑓</m:t>
+                        </m:r>
+                      </m:sub>
+                    </m:sSub>
+                  </m:oMath>
+                </a14:m>
+                <a:r>
+                  <a:rPr lang="it-IT" sz="2400" dirty="0">
+                    <a:latin typeface="Arial" panose="020B0604020202020204" pitchFamily="34" charset="0"/>
+                    <a:cs typeface="Arial" panose="020B0604020202020204" pitchFamily="34" charset="0"/>
+                  </a:rPr>
+                  <a:t> </a:t>
+                </a:r>
+                <a:r>
+                  <a:rPr lang="it-IT" sz="2400" dirty="0" err="1">
+                    <a:latin typeface="Arial" panose="020B0604020202020204" pitchFamily="34" charset="0"/>
+                    <a:cs typeface="Arial" panose="020B0604020202020204" pitchFamily="34" charset="0"/>
+                  </a:rPr>
+                  <a:t>that</a:t>
+                </a:r>
+                <a:r>
+                  <a:rPr lang="it-IT" sz="2400" dirty="0">
+                    <a:latin typeface="Arial" panose="020B0604020202020204" pitchFamily="34" charset="0"/>
+                    <a:cs typeface="Arial" panose="020B0604020202020204" pitchFamily="34" charset="0"/>
+                  </a:rPr>
+                  <a:t> </a:t>
+                </a:r>
+                <a:r>
+                  <a:rPr lang="it-IT" sz="2400" dirty="0" err="1">
+                    <a:latin typeface="Arial" panose="020B0604020202020204" pitchFamily="34" charset="0"/>
+                    <a:cs typeface="Arial" panose="020B0604020202020204" pitchFamily="34" charset="0"/>
+                  </a:rPr>
+                  <a:t>minimizes</a:t>
+                </a:r>
+                <a:r>
+                  <a:rPr lang="it-IT" sz="2400" dirty="0">
+                    <a:latin typeface="Arial" panose="020B0604020202020204" pitchFamily="34" charset="0"/>
+                    <a:cs typeface="Arial" panose="020B0604020202020204" pitchFamily="34" charset="0"/>
+                  </a:rPr>
+                  <a:t> the performance </a:t>
+                </a:r>
+                <a:r>
+                  <a:rPr lang="it-IT" sz="2400" dirty="0" err="1">
+                    <a:latin typeface="Arial" panose="020B0604020202020204" pitchFamily="34" charset="0"/>
+                    <a:cs typeface="Arial" panose="020B0604020202020204" pitchFamily="34" charset="0"/>
+                  </a:rPr>
+                  <a:t>criterion</a:t>
+                </a:r>
+                <a:r>
+                  <a:rPr lang="it-IT" sz="2400" dirty="0">
+                    <a:latin typeface="Arial" panose="020B0604020202020204" pitchFamily="34" charset="0"/>
+                    <a:cs typeface="Arial" panose="020B0604020202020204" pitchFamily="34" charset="0"/>
+                  </a:rPr>
+                  <a:t> J. The </a:t>
+                </a:r>
+                <a:r>
+                  <a:rPr lang="it-IT" sz="2400" dirty="0" err="1">
+                    <a:latin typeface="Arial" panose="020B0604020202020204" pitchFamily="34" charset="0"/>
+                    <a:cs typeface="Arial" panose="020B0604020202020204" pitchFamily="34" charset="0"/>
+                  </a:rPr>
+                  <a:t>prediction</a:t>
+                </a:r>
+                <a:r>
+                  <a:rPr lang="it-IT" sz="2400" dirty="0">
+                    <a:latin typeface="Arial" panose="020B0604020202020204" pitchFamily="34" charset="0"/>
+                    <a:cs typeface="Arial" panose="020B0604020202020204" pitchFamily="34" charset="0"/>
+                  </a:rPr>
+                  <a:t> of the </a:t>
+                </a:r>
+                <a:r>
+                  <a:rPr lang="it-IT" sz="2400" dirty="0" err="1">
+                    <a:latin typeface="Arial" panose="020B0604020202020204" pitchFamily="34" charset="0"/>
+                    <a:cs typeface="Arial" panose="020B0604020202020204" pitchFamily="34" charset="0"/>
+                  </a:rPr>
+                  <a:t>forward</a:t>
+                </a:r>
+                <a:r>
+                  <a:rPr lang="it-IT" sz="2400" dirty="0">
+                    <a:latin typeface="Arial" panose="020B0604020202020204" pitchFamily="34" charset="0"/>
+                    <a:cs typeface="Arial" panose="020B0604020202020204" pitchFamily="34" charset="0"/>
+                  </a:rPr>
+                  <a:t> </a:t>
+                </a:r>
+                <a:r>
+                  <a:rPr lang="it-IT" sz="2400" dirty="0" err="1">
+                    <a:latin typeface="Arial" panose="020B0604020202020204" pitchFamily="34" charset="0"/>
+                    <a:cs typeface="Arial" panose="020B0604020202020204" pitchFamily="34" charset="0"/>
+                  </a:rPr>
+                  <a:t>horizon</a:t>
+                </a:r>
+                <a:r>
+                  <a:rPr lang="it-IT" sz="2400" dirty="0">
+                    <a:latin typeface="Arial" panose="020B0604020202020204" pitchFamily="34" charset="0"/>
+                    <a:cs typeface="Arial" panose="020B0604020202020204" pitchFamily="34" charset="0"/>
+                  </a:rPr>
+                  <a:t> </a:t>
+                </a:r>
+                <a:r>
+                  <a:rPr lang="it-IT" sz="2400" dirty="0" err="1">
+                    <a:latin typeface="Arial" panose="020B0604020202020204" pitchFamily="34" charset="0"/>
+                    <a:cs typeface="Arial" panose="020B0604020202020204" pitchFamily="34" charset="0"/>
+                  </a:rPr>
+                  <a:t>is</a:t>
+                </a:r>
+                <a:r>
+                  <a:rPr lang="it-IT" sz="2400" dirty="0">
+                    <a:latin typeface="Arial" panose="020B0604020202020204" pitchFamily="34" charset="0"/>
+                    <a:cs typeface="Arial" panose="020B0604020202020204" pitchFamily="34" charset="0"/>
+                  </a:rPr>
+                  <a:t> </a:t>
+                </a:r>
+                <a:r>
+                  <a:rPr lang="it-IT" sz="2400" dirty="0" err="1">
+                    <a:latin typeface="Arial" panose="020B0604020202020204" pitchFamily="34" charset="0"/>
+                    <a:cs typeface="Arial" panose="020B0604020202020204" pitchFamily="34" charset="0"/>
+                  </a:rPr>
+                  <a:t>done</a:t>
+                </a:r>
+                <a:r>
+                  <a:rPr lang="it-IT" sz="2400" dirty="0">
+                    <a:latin typeface="Arial" panose="020B0604020202020204" pitchFamily="34" charset="0"/>
+                    <a:cs typeface="Arial" panose="020B0604020202020204" pitchFamily="34" charset="0"/>
+                  </a:rPr>
+                  <a:t> on the </a:t>
+                </a:r>
+                <a:r>
+                  <a:rPr lang="it-IT" sz="2400" dirty="0" err="1">
+                    <a:latin typeface="Arial" panose="020B0604020202020204" pitchFamily="34" charset="0"/>
+                    <a:cs typeface="Arial" panose="020B0604020202020204" pitchFamily="34" charset="0"/>
+                  </a:rPr>
+                  <a:t>basis</a:t>
+                </a:r>
+                <a:r>
+                  <a:rPr lang="it-IT" sz="2400" dirty="0">
+                    <a:latin typeface="Arial" panose="020B0604020202020204" pitchFamily="34" charset="0"/>
+                    <a:cs typeface="Arial" panose="020B0604020202020204" pitchFamily="34" charset="0"/>
+                  </a:rPr>
+                  <a:t> of the knowledge of the </a:t>
+                </a:r>
+                <a:r>
+                  <a:rPr lang="it-IT" sz="2400" dirty="0" err="1">
+                    <a:latin typeface="Arial" panose="020B0604020202020204" pitchFamily="34" charset="0"/>
+                    <a:cs typeface="Arial" panose="020B0604020202020204" pitchFamily="34" charset="0"/>
+                  </a:rPr>
+                  <a:t>backward</a:t>
+                </a:r>
+                <a:r>
+                  <a:rPr lang="it-IT" sz="2400" dirty="0">
+                    <a:latin typeface="Arial" panose="020B0604020202020204" pitchFamily="34" charset="0"/>
+                    <a:cs typeface="Arial" panose="020B0604020202020204" pitchFamily="34" charset="0"/>
+                  </a:rPr>
+                  <a:t> </a:t>
+                </a:r>
+                <a:r>
+                  <a:rPr lang="it-IT" sz="2400" dirty="0" err="1">
+                    <a:latin typeface="Arial" panose="020B0604020202020204" pitchFamily="34" charset="0"/>
+                    <a:cs typeface="Arial" panose="020B0604020202020204" pitchFamily="34" charset="0"/>
+                  </a:rPr>
+                  <a:t>horizon</a:t>
+                </a:r>
+                <a:r>
+                  <a:rPr lang="it-IT" sz="2400" dirty="0">
+                    <a:latin typeface="Arial" panose="020B0604020202020204" pitchFamily="34" charset="0"/>
+                    <a:cs typeface="Arial" panose="020B0604020202020204" pitchFamily="34" charset="0"/>
+                  </a:rPr>
+                  <a:t>.</a:t>
+                </a:r>
+                <a:endParaRPr lang="it-IT" sz="2400" b="0" dirty="0">
+                  <a:latin typeface="Arial" panose="020B0604020202020204" pitchFamily="34" charset="0"/>
+                  <a:cs typeface="Arial" panose="020B0604020202020204" pitchFamily="34" charset="0"/>
+                </a:endParaRPr>
+              </a:p>
+              <a:p>
+                <a:pPr algn="just"/>
+                <a:endParaRPr lang="it-IT" sz="2400" dirty="0">
+                  <a:latin typeface="Arial" panose="020B0604020202020204" pitchFamily="34" charset="0"/>
+                  <a:cs typeface="Arial" panose="020B0604020202020204" pitchFamily="34" charset="0"/>
+                </a:endParaRPr>
+              </a:p>
+            </p:txBody>
+          </p:sp>
+        </mc:Choice>
+        <mc:Fallback>
+          <p:sp>
+            <p:nvSpPr>
+              <p:cNvPr id="2" name="CasellaDiTesto 1">
+                <a:extLst>
+                  <a:ext uri="{FF2B5EF4-FFF2-40B4-BE49-F238E27FC236}">
+                    <a16:creationId xmlns:a16="http://schemas.microsoft.com/office/drawing/2014/main" id="{07438525-36CC-3470-CEA6-B1FF903B89EA}"/>
+                  </a:ext>
+                </a:extLst>
+              </p:cNvPr>
+              <p:cNvSpPr txBox="1">
+                <a:spLocks noRot="1" noChangeAspect="1" noMove="1" noResize="1" noEditPoints="1" noAdjustHandles="1" noChangeArrowheads="1" noChangeShapeType="1" noTextEdit="1"/>
+              </p:cNvSpPr>
+              <p:nvPr/>
+            </p:nvSpPr>
+            <p:spPr>
+              <a:xfrm>
+                <a:off x="723900" y="1185270"/>
+                <a:ext cx="10744200" cy="1599284"/>
+              </a:xfrm>
+              <a:prstGeom prst="rect">
+                <a:avLst/>
+              </a:prstGeom>
+              <a:blipFill>
+                <a:blip r:embed="rId3"/>
+                <a:stretch>
+                  <a:fillRect l="-908" t="-3042" r="-851"/>
+                </a:stretch>
+              </a:blipFill>
+            </p:spPr>
+            <p:txBody>
+              <a:bodyPr/>
+              <a:lstStyle/>
+              <a:p>
+                <a:r>
+                  <a:rPr lang="it-IT">
+                    <a:noFill/>
+                  </a:rPr>
+                  <a:t> </a:t>
+                </a:r>
+              </a:p>
+            </p:txBody>
+          </p:sp>
+        </mc:Fallback>
+      </mc:AlternateContent>
+      <p:pic>
+        <p:nvPicPr>
+          <p:cNvPr id="4" name="Immagine 3" descr="Immagine che contiene linea, diagramma, schizzo, bianco&#10;&#10;Il contenuto generato dall'IA potrebbe non essere corretto.">
+            <a:extLst>
+              <a:ext uri="{FF2B5EF4-FFF2-40B4-BE49-F238E27FC236}">
+                <a16:creationId xmlns:a16="http://schemas.microsoft.com/office/drawing/2014/main" id="{B222F164-CA94-95B8-F4E9-45391987303C}"/>
+              </a:ext>
+            </a:extLst>
+          </p:cNvPr>
+          <p:cNvPicPr>
+            <a:picLocks noChangeAspect="1"/>
+          </p:cNvPicPr>
+          <p:nvPr/>
+        </p:nvPicPr>
+        <p:blipFill>
+          <a:blip r:embed="rId4">
+            <a:extLst>
+              <a:ext uri="{28A0092B-C50C-407E-A947-70E740481C1C}">
+                <a14:useLocalDpi xmlns:a14="http://schemas.microsoft.com/office/drawing/2010/main" val="0"/>
+              </a:ext>
+            </a:extLst>
+          </a:blip>
+          <a:stretch>
+            <a:fillRect/>
+          </a:stretch>
+        </p:blipFill>
+        <p:spPr>
+          <a:xfrm>
+            <a:off x="761999" y="2624730"/>
+            <a:ext cx="6381193" cy="3048000"/>
+          </a:xfrm>
+          <a:prstGeom prst="rect">
+            <a:avLst/>
+          </a:prstGeom>
+        </p:spPr>
+      </p:pic>
+    </p:spTree>
+    <p:extLst>
+      <p:ext uri="{BB962C8B-B14F-4D97-AF65-F5344CB8AC3E}">
+        <p14:creationId xmlns:p14="http://schemas.microsoft.com/office/powerpoint/2010/main" val="4124613722"/>
+      </p:ext>
+    </p:extLst>
+  </p:cSld>
+  <p:clrMapOvr>
+    <a:masterClrMapping/>
+  </p:clrMapOvr>
+</p:sld>
+</file>
+
+<file path=ppt/slides/slide11.xml><?xml version="1.0" encoding="utf-8"?>
+<p:sld xmlns:a="http://schemas.openxmlformats.org/drawingml/2006/main" xmlns:r="http://schemas.openxmlformats.org/officeDocument/2006/relationships" xmlns:p="http://schemas.openxmlformats.org/presentationml/2006/main">
+  <p:cSld>
+    <p:spTree>
+      <p:nvGrpSpPr>
+        <p:cNvPr id="1" name="">
+          <a:extLst>
+            <a:ext uri="{FF2B5EF4-FFF2-40B4-BE49-F238E27FC236}">
               <a16:creationId xmlns:a16="http://schemas.microsoft.com/office/drawing/2014/main" id="{DE25A748-8538-F760-9E6B-4F27E13A3FAF}"/>
             </a:ext>
           </a:extLst>
@@ -2093,13 +2832,13 @@
               <a:rPr lang="en-GB" noProof="0" dirty="0">
                 <a:latin typeface="Arial Black" panose="020B0A04020102020204" pitchFamily="34" charset="0"/>
               </a:rPr>
-              <a:t>Proposed solution – </a:t>
+              <a:t>Proposed solution – Control</a:t>
             </a:r>
             <a:r>
               <a:rPr lang="en-GB" dirty="0">
                 <a:latin typeface="Arial Black" panose="020B0A04020102020204" pitchFamily="34" charset="0"/>
               </a:rPr>
-              <a:t>MPC step 1</a:t>
+              <a:t> step 1</a:t>
             </a:r>
             <a:endParaRPr lang="en-GB" noProof="0" dirty="0">
               <a:latin typeface="Arial Black" panose="020B0A04020102020204" pitchFamily="34" charset="0"/>
@@ -2107,49 +2846,1320 @@
           </a:p>
         </p:txBody>
       </p:sp>
-      <p:sp>
-        <p:nvSpPr>
-          <p:cNvPr id="2" name="CasellaDiTesto 1">
-            <a:extLst>
-              <a:ext uri="{FF2B5EF4-FFF2-40B4-BE49-F238E27FC236}">
-                <a16:creationId xmlns:a16="http://schemas.microsoft.com/office/drawing/2014/main" id="{0367F24C-DB9D-043A-C3E0-240A6426CF81}"/>
-              </a:ext>
-            </a:extLst>
-          </p:cNvPr>
-          <p:cNvSpPr txBox="1"/>
-          <p:nvPr/>
-        </p:nvSpPr>
-        <p:spPr>
-          <a:xfrm>
-            <a:off x="723900" y="1191645"/>
-            <a:ext cx="10744200" cy="461665"/>
-          </a:xfrm>
-          <a:prstGeom prst="rect">
-            <a:avLst/>
-          </a:prstGeom>
-          <a:noFill/>
-        </p:spPr>
-        <p:txBody>
-          <a:bodyPr wrap="square">
-            <a:spAutoFit/>
-          </a:bodyPr>
-          <a:lstStyle/>
-          <a:p>
-            <a:pPr algn="just"/>
-            <a:r>
-              <a:rPr lang="it-IT" sz="2400" dirty="0">
-                <a:latin typeface="Arial" panose="020B0604020202020204" pitchFamily="34" charset="0"/>
-                <a:cs typeface="Arial" panose="020B0604020202020204" pitchFamily="34" charset="0"/>
-              </a:rPr>
-              <a:t>AAA</a:t>
-            </a:r>
-            <a:endParaRPr lang="it-IT" sz="2400" noProof="0" dirty="0">
-              <a:latin typeface="Arial" panose="020B0604020202020204" pitchFamily="34" charset="0"/>
-              <a:cs typeface="Arial" panose="020B0604020202020204" pitchFamily="34" charset="0"/>
-            </a:endParaRPr>
-          </a:p>
-        </p:txBody>
-      </p:sp>
+      <mc:AlternateContent xmlns:mc="http://schemas.openxmlformats.org/markup-compatibility/2006">
+        <mc:Choice xmlns:a14="http://schemas.microsoft.com/office/drawing/2010/main" Requires="a14">
+          <p:sp>
+            <p:nvSpPr>
+              <p:cNvPr id="2" name="CasellaDiTesto 1">
+                <a:extLst>
+                  <a:ext uri="{FF2B5EF4-FFF2-40B4-BE49-F238E27FC236}">
+                    <a16:creationId xmlns:a16="http://schemas.microsoft.com/office/drawing/2014/main" id="{0367F24C-DB9D-043A-C3E0-240A6426CF81}"/>
+                  </a:ext>
+                </a:extLst>
+              </p:cNvPr>
+              <p:cNvSpPr txBox="1"/>
+              <p:nvPr/>
+            </p:nvSpPr>
+            <p:spPr>
+              <a:xfrm>
+                <a:off x="723900" y="1191645"/>
+                <a:ext cx="10744200" cy="4873001"/>
+              </a:xfrm>
+              <a:prstGeom prst="rect">
+                <a:avLst/>
+              </a:prstGeom>
+              <a:noFill/>
+            </p:spPr>
+            <p:txBody>
+              <a:bodyPr wrap="square">
+                <a:spAutoFit/>
+              </a:bodyPr>
+              <a:lstStyle/>
+              <a:p>
+                <a:pPr algn="just"/>
+                <a:r>
+                  <a:rPr lang="it-IT" sz="2400" noProof="0" dirty="0">
+                    <a:latin typeface="Arial" panose="020B0604020202020204" pitchFamily="34" charset="0"/>
+                    <a:cs typeface="Arial" panose="020B0604020202020204" pitchFamily="34" charset="0"/>
+                  </a:rPr>
+                  <a:t>We </a:t>
+                </a:r>
+                <a:r>
+                  <a:rPr lang="it-IT" sz="2400" noProof="0" dirty="0" err="1">
+                    <a:latin typeface="Arial" panose="020B0604020202020204" pitchFamily="34" charset="0"/>
+                    <a:cs typeface="Arial" panose="020B0604020202020204" pitchFamily="34" charset="0"/>
+                  </a:rPr>
+                  <a:t>need</a:t>
+                </a:r>
+                <a:r>
+                  <a:rPr lang="it-IT" sz="2400" noProof="0" dirty="0">
+                    <a:latin typeface="Arial" panose="020B0604020202020204" pitchFamily="34" charset="0"/>
+                    <a:cs typeface="Arial" panose="020B0604020202020204" pitchFamily="34" charset="0"/>
+                  </a:rPr>
+                  <a:t> to </a:t>
+                </a:r>
+                <a:r>
+                  <a:rPr lang="it-IT" sz="2400" noProof="0" dirty="0" err="1">
+                    <a:latin typeface="Arial" panose="020B0604020202020204" pitchFamily="34" charset="0"/>
+                    <a:cs typeface="Arial" panose="020B0604020202020204" pitchFamily="34" charset="0"/>
+                  </a:rPr>
+                  <a:t>define</a:t>
+                </a:r>
+                <a:r>
+                  <a:rPr lang="it-IT" sz="2400" noProof="0" dirty="0">
+                    <a:latin typeface="Arial" panose="020B0604020202020204" pitchFamily="34" charset="0"/>
+                    <a:cs typeface="Arial" panose="020B0604020202020204" pitchFamily="34" charset="0"/>
+                  </a:rPr>
+                  <a:t> the controller input, </a:t>
+                </a:r>
+                <a14:m>
+                  <m:oMath xmlns:m="http://schemas.openxmlformats.org/officeDocument/2006/math">
+                    <m:sSub>
+                      <m:sSubPr>
+                        <m:ctrlPr>
+                          <a:rPr lang="it-IT" sz="2400" i="1" noProof="0" smtClean="0">
+                            <a:latin typeface="Cambria Math" panose="02040503050406030204" pitchFamily="18" charset="0"/>
+                            <a:cs typeface="Arial" panose="020B0604020202020204" pitchFamily="34" charset="0"/>
+                          </a:rPr>
+                        </m:ctrlPr>
+                      </m:sSubPr>
+                      <m:e>
+                        <m:r>
+                          <a:rPr lang="it-IT" sz="2400" b="0" i="1" noProof="0" smtClean="0">
+                            <a:latin typeface="Cambria Math" panose="02040503050406030204" pitchFamily="18" charset="0"/>
+                            <a:cs typeface="Arial" panose="020B0604020202020204" pitchFamily="34" charset="0"/>
+                          </a:rPr>
+                          <m:t>𝑤</m:t>
+                        </m:r>
+                      </m:e>
+                      <m:sub>
+                        <m:r>
+                          <a:rPr lang="it-IT" sz="2400" b="0" i="1" noProof="0" smtClean="0">
+                            <a:latin typeface="Cambria Math" panose="02040503050406030204" pitchFamily="18" charset="0"/>
+                            <a:cs typeface="Arial" panose="020B0604020202020204" pitchFamily="34" charset="0"/>
+                          </a:rPr>
+                          <m:t>𝑝</m:t>
+                        </m:r>
+                      </m:sub>
+                    </m:sSub>
+                  </m:oMath>
+                </a14:m>
+                <a:r>
+                  <a:rPr lang="it-IT" sz="2400" noProof="0" dirty="0">
+                    <a:latin typeface="Arial" panose="020B0604020202020204" pitchFamily="34" charset="0"/>
+                    <a:cs typeface="Arial" panose="020B0604020202020204" pitchFamily="34" charset="0"/>
+                  </a:rPr>
+                  <a:t>, </a:t>
+                </a:r>
+                <a:r>
+                  <a:rPr lang="it-IT" sz="2400" dirty="0" err="1">
+                    <a:latin typeface="Arial" panose="020B0604020202020204" pitchFamily="34" charset="0"/>
+                    <a:cs typeface="Arial" panose="020B0604020202020204" pitchFamily="34" charset="0"/>
+                  </a:rPr>
+                  <a:t>using</a:t>
+                </a:r>
+                <a:r>
+                  <a:rPr lang="it-IT" sz="2400" dirty="0">
+                    <a:latin typeface="Arial" panose="020B0604020202020204" pitchFamily="34" charset="0"/>
+                    <a:cs typeface="Arial" panose="020B0604020202020204" pitchFamily="34" charset="0"/>
+                  </a:rPr>
+                  <a:t> the </a:t>
+                </a:r>
+                <a:r>
+                  <a:rPr lang="it-IT" sz="2400" dirty="0" err="1">
+                    <a:latin typeface="Arial" panose="020B0604020202020204" pitchFamily="34" charset="0"/>
+                    <a:cs typeface="Arial" panose="020B0604020202020204" pitchFamily="34" charset="0"/>
+                  </a:rPr>
+                  <a:t>past</a:t>
+                </a:r>
+                <a:r>
+                  <a:rPr lang="it-IT" sz="2400" dirty="0">
+                    <a:latin typeface="Arial" panose="020B0604020202020204" pitchFamily="34" charset="0"/>
+                    <a:cs typeface="Arial" panose="020B0604020202020204" pitchFamily="34" charset="0"/>
+                  </a:rPr>
+                  <a:t> inputs and outputs of the system:</a:t>
+                </a:r>
+              </a:p>
+              <a:p>
+                <a:pPr algn="just"/>
+                <a:endParaRPr lang="it-IT" sz="2400" noProof="0" dirty="0">
+                  <a:latin typeface="Arial" panose="020B0604020202020204" pitchFamily="34" charset="0"/>
+                  <a:cs typeface="Arial" panose="020B0604020202020204" pitchFamily="34" charset="0"/>
+                </a:endParaRPr>
+              </a:p>
+              <a:p>
+                <a:pPr algn="just"/>
+                <a14:m>
+                  <m:oMath xmlns:m="http://schemas.openxmlformats.org/officeDocument/2006/math">
+                    <m:sSub>
+                      <m:sSubPr>
+                        <m:ctrlPr>
+                          <a:rPr lang="it-IT" sz="2400" i="1" noProof="0" smtClean="0">
+                            <a:latin typeface="Cambria Math" panose="02040503050406030204" pitchFamily="18" charset="0"/>
+                            <a:cs typeface="Arial" panose="020B0604020202020204" pitchFamily="34" charset="0"/>
+                          </a:rPr>
+                        </m:ctrlPr>
+                      </m:sSubPr>
+                      <m:e>
+                        <m:r>
+                          <a:rPr lang="it-IT" sz="2400" b="0" i="1" noProof="0" smtClean="0">
+                            <a:latin typeface="Cambria Math" panose="02040503050406030204" pitchFamily="18" charset="0"/>
+                            <a:cs typeface="Arial" panose="020B0604020202020204" pitchFamily="34" charset="0"/>
+                          </a:rPr>
+                          <m:t>𝑦</m:t>
+                        </m:r>
+                      </m:e>
+                      <m:sub>
+                        <m:r>
+                          <a:rPr lang="it-IT" sz="2400" b="0" i="1" noProof="0" smtClean="0">
+                            <a:latin typeface="Cambria Math" panose="02040503050406030204" pitchFamily="18" charset="0"/>
+                            <a:cs typeface="Arial" panose="020B0604020202020204" pitchFamily="34" charset="0"/>
+                          </a:rPr>
+                          <m:t>𝑝</m:t>
+                        </m:r>
+                      </m:sub>
+                    </m:sSub>
+                    <m:r>
+                      <a:rPr lang="it-IT" sz="2400" b="0" i="1" noProof="0" smtClean="0">
+                        <a:latin typeface="Cambria Math" panose="02040503050406030204" pitchFamily="18" charset="0"/>
+                        <a:cs typeface="Arial" panose="020B0604020202020204" pitchFamily="34" charset="0"/>
+                      </a:rPr>
+                      <m:t>=</m:t>
+                    </m:r>
+                    <m:d>
+                      <m:dPr>
+                        <m:ctrlPr>
+                          <a:rPr lang="it-IT" sz="2400" b="0" i="1" noProof="0" smtClean="0">
+                            <a:latin typeface="Cambria Math" panose="02040503050406030204" pitchFamily="18" charset="0"/>
+                            <a:cs typeface="Arial" panose="020B0604020202020204" pitchFamily="34" charset="0"/>
+                          </a:rPr>
+                        </m:ctrlPr>
+                      </m:dPr>
+                      <m:e>
+                        <m:eqArr>
+                          <m:eqArrPr>
+                            <m:ctrlPr>
+                              <a:rPr lang="it-IT" sz="2400" b="0" i="1" noProof="0" smtClean="0">
+                                <a:latin typeface="Cambria Math" panose="02040503050406030204" pitchFamily="18" charset="0"/>
+                                <a:cs typeface="Arial" panose="020B0604020202020204" pitchFamily="34" charset="0"/>
+                              </a:rPr>
+                            </m:ctrlPr>
+                          </m:eqArrPr>
+                          <m:e>
+                            <m:sSub>
+                              <m:sSubPr>
+                                <m:ctrlPr>
+                                  <a:rPr lang="it-IT" sz="2400" b="0" i="1" noProof="0" smtClean="0">
+                                    <a:latin typeface="Cambria Math" panose="02040503050406030204" pitchFamily="18" charset="0"/>
+                                    <a:cs typeface="Arial" panose="020B0604020202020204" pitchFamily="34" charset="0"/>
+                                  </a:rPr>
+                                </m:ctrlPr>
+                              </m:sSubPr>
+                              <m:e>
+                                <m:r>
+                                  <a:rPr lang="it-IT" sz="2400" b="0" i="1" noProof="0" smtClean="0">
+                                    <a:latin typeface="Cambria Math" panose="02040503050406030204" pitchFamily="18" charset="0"/>
+                                    <a:cs typeface="Arial" panose="020B0604020202020204" pitchFamily="34" charset="0"/>
+                                  </a:rPr>
+                                  <m:t>𝑦</m:t>
+                                </m:r>
+                              </m:e>
+                              <m:sub>
+                                <m:r>
+                                  <a:rPr lang="it-IT" sz="2400" b="0" i="1" noProof="0" smtClean="0">
+                                    <a:latin typeface="Cambria Math" panose="02040503050406030204" pitchFamily="18" charset="0"/>
+                                    <a:cs typeface="Arial" panose="020B0604020202020204" pitchFamily="34" charset="0"/>
+                                  </a:rPr>
+                                  <m:t>−</m:t>
+                                </m:r>
+                                <m:r>
+                                  <a:rPr lang="it-IT" sz="2400" b="0" i="1" noProof="0" smtClean="0">
+                                    <a:latin typeface="Cambria Math" panose="02040503050406030204" pitchFamily="18" charset="0"/>
+                                    <a:cs typeface="Arial" panose="020B0604020202020204" pitchFamily="34" charset="0"/>
+                                  </a:rPr>
+                                  <m:t>𝑀</m:t>
+                                </m:r>
+                                <m:r>
+                                  <a:rPr lang="it-IT" sz="2400" b="0" i="1" noProof="0" smtClean="0">
+                                    <a:latin typeface="Cambria Math" panose="02040503050406030204" pitchFamily="18" charset="0"/>
+                                    <a:cs typeface="Arial" panose="020B0604020202020204" pitchFamily="34" charset="0"/>
+                                  </a:rPr>
+                                  <m:t>+1</m:t>
+                                </m:r>
+                              </m:sub>
+                            </m:sSub>
+                          </m:e>
+                          <m:e>
+                            <m:r>
+                              <a:rPr lang="it-IT" b="0" i="1" smtClean="0">
+                                <a:latin typeface="Cambria Math" panose="02040503050406030204" pitchFamily="18" charset="0"/>
+                              </a:rPr>
+                              <m:t>…</m:t>
+                            </m:r>
+                          </m:e>
+                          <m:e>
+                            <m:sSub>
+                              <m:sSubPr>
+                                <m:ctrlPr>
+                                  <a:rPr lang="it-IT" i="1" smtClean="0">
+                                    <a:latin typeface="Cambria Math" panose="02040503050406030204" pitchFamily="18" charset="0"/>
+                                  </a:rPr>
+                                </m:ctrlPr>
+                              </m:sSubPr>
+                              <m:e>
+                                <m:r>
+                                  <a:rPr lang="it-IT" b="0" i="1" smtClean="0">
+                                    <a:latin typeface="Cambria Math" panose="02040503050406030204" pitchFamily="18" charset="0"/>
+                                  </a:rPr>
+                                  <m:t>𝑦</m:t>
+                                </m:r>
+                              </m:e>
+                              <m:sub>
+                                <m:r>
+                                  <a:rPr lang="it-IT" b="0" i="1" smtClean="0">
+                                    <a:latin typeface="Cambria Math" panose="02040503050406030204" pitchFamily="18" charset="0"/>
+                                  </a:rPr>
+                                  <m:t>−1</m:t>
+                                </m:r>
+                              </m:sub>
+                            </m:sSub>
+                          </m:e>
+                          <m:e>
+                            <m:sSub>
+                              <m:sSubPr>
+                                <m:ctrlPr>
+                                  <a:rPr lang="it-IT" i="1" smtClean="0">
+                                    <a:latin typeface="Cambria Math" panose="02040503050406030204" pitchFamily="18" charset="0"/>
+                                  </a:rPr>
+                                </m:ctrlPr>
+                              </m:sSubPr>
+                              <m:e>
+                                <m:r>
+                                  <a:rPr lang="it-IT" b="0" i="1" smtClean="0">
+                                    <a:latin typeface="Cambria Math" panose="02040503050406030204" pitchFamily="18" charset="0"/>
+                                  </a:rPr>
+                                  <m:t>𝑦</m:t>
+                                </m:r>
+                              </m:e>
+                              <m:sub>
+                                <m:r>
+                                  <a:rPr lang="it-IT" b="0" i="1" smtClean="0">
+                                    <a:latin typeface="Cambria Math" panose="02040503050406030204" pitchFamily="18" charset="0"/>
+                                  </a:rPr>
+                                  <m:t>0</m:t>
+                                </m:r>
+                              </m:sub>
+                            </m:sSub>
+                          </m:e>
+                        </m:eqArr>
+                      </m:e>
+                    </m:d>
+                  </m:oMath>
+                </a14:m>
+                <a:r>
+                  <a:rPr lang="it-IT" sz="2400" noProof="0" dirty="0">
+                    <a:latin typeface="Arial" panose="020B0604020202020204" pitchFamily="34" charset="0"/>
+                    <a:cs typeface="Arial" panose="020B0604020202020204" pitchFamily="34" charset="0"/>
+                  </a:rPr>
+                  <a:t>	</a:t>
+                </a:r>
+                <a:r>
+                  <a:rPr lang="it-IT" sz="2400" noProof="0" dirty="0">
+                    <a:cs typeface="Arial" panose="020B0604020202020204" pitchFamily="34" charset="0"/>
+                  </a:rPr>
+                  <a:t> </a:t>
+                </a:r>
+                <a14:m>
+                  <m:oMath xmlns:m="http://schemas.openxmlformats.org/officeDocument/2006/math">
+                    <m:sSub>
+                      <m:sSubPr>
+                        <m:ctrlPr>
+                          <a:rPr lang="it-IT" sz="2400" i="1" noProof="0" smtClean="0">
+                            <a:latin typeface="Cambria Math" panose="02040503050406030204" pitchFamily="18" charset="0"/>
+                            <a:cs typeface="Arial" panose="020B0604020202020204" pitchFamily="34" charset="0"/>
+                          </a:rPr>
+                        </m:ctrlPr>
+                      </m:sSubPr>
+                      <m:e>
+                        <m:r>
+                          <a:rPr lang="it-IT" sz="2400" b="0" i="1" noProof="0" smtClean="0">
+                            <a:latin typeface="Cambria Math" panose="02040503050406030204" pitchFamily="18" charset="0"/>
+                            <a:cs typeface="Arial" panose="020B0604020202020204" pitchFamily="34" charset="0"/>
+                          </a:rPr>
+                          <m:t>𝑢</m:t>
+                        </m:r>
+                      </m:e>
+                      <m:sub>
+                        <m:r>
+                          <a:rPr lang="it-IT" sz="2400" b="0" i="1" noProof="0" smtClean="0">
+                            <a:latin typeface="Cambria Math" panose="02040503050406030204" pitchFamily="18" charset="0"/>
+                            <a:cs typeface="Arial" panose="020B0604020202020204" pitchFamily="34" charset="0"/>
+                          </a:rPr>
+                          <m:t>𝑝</m:t>
+                        </m:r>
+                      </m:sub>
+                    </m:sSub>
+                    <m:r>
+                      <a:rPr lang="it-IT" sz="2400" b="0" i="1" noProof="0" smtClean="0">
+                        <a:latin typeface="Cambria Math" panose="02040503050406030204" pitchFamily="18" charset="0"/>
+                        <a:cs typeface="Arial" panose="020B0604020202020204" pitchFamily="34" charset="0"/>
+                      </a:rPr>
+                      <m:t>=</m:t>
+                    </m:r>
+                    <m:d>
+                      <m:dPr>
+                        <m:ctrlPr>
+                          <a:rPr lang="it-IT" sz="2400" b="0" i="1" noProof="0" smtClean="0">
+                            <a:latin typeface="Cambria Math" panose="02040503050406030204" pitchFamily="18" charset="0"/>
+                            <a:cs typeface="Arial" panose="020B0604020202020204" pitchFamily="34" charset="0"/>
+                          </a:rPr>
+                        </m:ctrlPr>
+                      </m:dPr>
+                      <m:e>
+                        <m:eqArr>
+                          <m:eqArrPr>
+                            <m:ctrlPr>
+                              <a:rPr lang="it-IT" sz="2400" b="0" i="1" noProof="0" smtClean="0">
+                                <a:latin typeface="Cambria Math" panose="02040503050406030204" pitchFamily="18" charset="0"/>
+                                <a:cs typeface="Arial" panose="020B0604020202020204" pitchFamily="34" charset="0"/>
+                              </a:rPr>
+                            </m:ctrlPr>
+                          </m:eqArrPr>
+                          <m:e>
+                            <m:sSub>
+                              <m:sSubPr>
+                                <m:ctrlPr>
+                                  <a:rPr lang="it-IT" sz="2400" b="0" i="1" noProof="0" smtClean="0">
+                                    <a:latin typeface="Cambria Math" panose="02040503050406030204" pitchFamily="18" charset="0"/>
+                                    <a:cs typeface="Arial" panose="020B0604020202020204" pitchFamily="34" charset="0"/>
+                                  </a:rPr>
+                                </m:ctrlPr>
+                              </m:sSubPr>
+                              <m:e>
+                                <m:r>
+                                  <a:rPr lang="it-IT" sz="2400" b="0" i="1" noProof="0" smtClean="0">
+                                    <a:latin typeface="Cambria Math" panose="02040503050406030204" pitchFamily="18" charset="0"/>
+                                    <a:cs typeface="Arial" panose="020B0604020202020204" pitchFamily="34" charset="0"/>
+                                  </a:rPr>
+                                  <m:t>𝑢</m:t>
+                                </m:r>
+                              </m:e>
+                              <m:sub>
+                                <m:r>
+                                  <a:rPr lang="it-IT" sz="2400" b="0" i="1" noProof="0" smtClean="0">
+                                    <a:latin typeface="Cambria Math" panose="02040503050406030204" pitchFamily="18" charset="0"/>
+                                    <a:cs typeface="Arial" panose="020B0604020202020204" pitchFamily="34" charset="0"/>
+                                  </a:rPr>
+                                  <m:t>−</m:t>
+                                </m:r>
+                                <m:r>
+                                  <a:rPr lang="it-IT" sz="2400" b="0" i="1" noProof="0" smtClean="0">
+                                    <a:latin typeface="Cambria Math" panose="02040503050406030204" pitchFamily="18" charset="0"/>
+                                    <a:cs typeface="Arial" panose="020B0604020202020204" pitchFamily="34" charset="0"/>
+                                  </a:rPr>
+                                  <m:t>𝑀</m:t>
+                                </m:r>
+                                <m:r>
+                                  <a:rPr lang="it-IT" sz="2400" b="0" i="1" noProof="0" smtClean="0">
+                                    <a:latin typeface="Cambria Math" panose="02040503050406030204" pitchFamily="18" charset="0"/>
+                                    <a:cs typeface="Arial" panose="020B0604020202020204" pitchFamily="34" charset="0"/>
+                                  </a:rPr>
+                                  <m:t>+1</m:t>
+                                </m:r>
+                              </m:sub>
+                            </m:sSub>
+                          </m:e>
+                          <m:e>
+                            <m:r>
+                              <a:rPr lang="it-IT" sz="2400" b="0" i="1" smtClean="0">
+                                <a:latin typeface="Cambria Math" panose="02040503050406030204" pitchFamily="18" charset="0"/>
+                              </a:rPr>
+                              <m:t>…</m:t>
+                            </m:r>
+                          </m:e>
+                          <m:e>
+                            <m:sSub>
+                              <m:sSubPr>
+                                <m:ctrlPr>
+                                  <a:rPr lang="it-IT" sz="2400" i="1" smtClean="0">
+                                    <a:latin typeface="Cambria Math" panose="02040503050406030204" pitchFamily="18" charset="0"/>
+                                  </a:rPr>
+                                </m:ctrlPr>
+                              </m:sSubPr>
+                              <m:e>
+                                <m:r>
+                                  <a:rPr lang="it-IT" sz="2400" b="0" i="1" smtClean="0">
+                                    <a:latin typeface="Cambria Math" panose="02040503050406030204" pitchFamily="18" charset="0"/>
+                                  </a:rPr>
+                                  <m:t>𝑢</m:t>
+                                </m:r>
+                              </m:e>
+                              <m:sub>
+                                <m:r>
+                                  <a:rPr lang="it-IT" sz="2400" b="0" i="1" smtClean="0">
+                                    <a:latin typeface="Cambria Math" panose="02040503050406030204" pitchFamily="18" charset="0"/>
+                                  </a:rPr>
+                                  <m:t>−1</m:t>
+                                </m:r>
+                              </m:sub>
+                            </m:sSub>
+                          </m:e>
+                          <m:e>
+                            <m:sSub>
+                              <m:sSubPr>
+                                <m:ctrlPr>
+                                  <a:rPr lang="it-IT" sz="2400" i="1" smtClean="0">
+                                    <a:latin typeface="Cambria Math" panose="02040503050406030204" pitchFamily="18" charset="0"/>
+                                  </a:rPr>
+                                </m:ctrlPr>
+                              </m:sSubPr>
+                              <m:e>
+                                <m:r>
+                                  <a:rPr lang="it-IT" sz="2400" b="0" i="1" smtClean="0">
+                                    <a:latin typeface="Cambria Math" panose="02040503050406030204" pitchFamily="18" charset="0"/>
+                                  </a:rPr>
+                                  <m:t>𝑢</m:t>
+                                </m:r>
+                              </m:e>
+                              <m:sub>
+                                <m:r>
+                                  <a:rPr lang="it-IT" sz="2400" b="0" i="1" smtClean="0">
+                                    <a:latin typeface="Cambria Math" panose="02040503050406030204" pitchFamily="18" charset="0"/>
+                                  </a:rPr>
+                                  <m:t>0</m:t>
+                                </m:r>
+                              </m:sub>
+                            </m:sSub>
+                          </m:e>
+                        </m:eqArr>
+                      </m:e>
+                    </m:d>
+                  </m:oMath>
+                </a14:m>
+                <a:r>
+                  <a:rPr lang="it-IT" sz="2400" noProof="0" dirty="0">
+                    <a:latin typeface="Arial" panose="020B0604020202020204" pitchFamily="34" charset="0"/>
+                    <a:cs typeface="Arial" panose="020B0604020202020204" pitchFamily="34" charset="0"/>
+                  </a:rPr>
+                  <a:t>	</a:t>
+                </a:r>
+                <a:r>
+                  <a:rPr lang="it-IT" sz="2400" noProof="0" dirty="0">
+                    <a:cs typeface="Arial" panose="020B0604020202020204" pitchFamily="34" charset="0"/>
+                  </a:rPr>
+                  <a:t> </a:t>
+                </a:r>
+                <a14:m>
+                  <m:oMath xmlns:m="http://schemas.openxmlformats.org/officeDocument/2006/math">
+                    <m:sSub>
+                      <m:sSubPr>
+                        <m:ctrlPr>
+                          <a:rPr lang="it-IT" sz="2400" i="1" noProof="0" smtClean="0">
+                            <a:latin typeface="Cambria Math" panose="02040503050406030204" pitchFamily="18" charset="0"/>
+                            <a:cs typeface="Arial" panose="020B0604020202020204" pitchFamily="34" charset="0"/>
+                          </a:rPr>
+                        </m:ctrlPr>
+                      </m:sSubPr>
+                      <m:e>
+                        <m:r>
+                          <a:rPr lang="it-IT" sz="2400" b="0" i="1" noProof="0" smtClean="0">
+                            <a:latin typeface="Cambria Math" panose="02040503050406030204" pitchFamily="18" charset="0"/>
+                            <a:cs typeface="Arial" panose="020B0604020202020204" pitchFamily="34" charset="0"/>
+                          </a:rPr>
+                          <m:t>𝑤</m:t>
+                        </m:r>
+                      </m:e>
+                      <m:sub>
+                        <m:r>
+                          <a:rPr lang="it-IT" sz="2400" b="0" i="1" noProof="0" smtClean="0">
+                            <a:latin typeface="Cambria Math" panose="02040503050406030204" pitchFamily="18" charset="0"/>
+                            <a:cs typeface="Arial" panose="020B0604020202020204" pitchFamily="34" charset="0"/>
+                          </a:rPr>
+                          <m:t>𝑝</m:t>
+                        </m:r>
+                      </m:sub>
+                    </m:sSub>
+                    <m:r>
+                      <a:rPr lang="it-IT" sz="2400" b="0" i="1" noProof="0" smtClean="0">
+                        <a:latin typeface="Cambria Math" panose="02040503050406030204" pitchFamily="18" charset="0"/>
+                        <a:cs typeface="Arial" panose="020B0604020202020204" pitchFamily="34" charset="0"/>
+                      </a:rPr>
+                      <m:t>=</m:t>
+                    </m:r>
+                    <m:d>
+                      <m:dPr>
+                        <m:ctrlPr>
+                          <a:rPr lang="it-IT" sz="2400" b="0" i="1" noProof="0" smtClean="0">
+                            <a:latin typeface="Cambria Math" panose="02040503050406030204" pitchFamily="18" charset="0"/>
+                            <a:cs typeface="Arial" panose="020B0604020202020204" pitchFamily="34" charset="0"/>
+                          </a:rPr>
+                        </m:ctrlPr>
+                      </m:dPr>
+                      <m:e>
+                        <m:eqArr>
+                          <m:eqArrPr>
+                            <m:ctrlPr>
+                              <a:rPr lang="it-IT" sz="2400" b="0" i="1" smtClean="0">
+                                <a:latin typeface="Cambria Math" panose="02040503050406030204" pitchFamily="18" charset="0"/>
+                              </a:rPr>
+                            </m:ctrlPr>
+                          </m:eqArrPr>
+                          <m:e>
+                            <m:sSub>
+                              <m:sSubPr>
+                                <m:ctrlPr>
+                                  <a:rPr lang="it-IT" sz="1800" i="1" noProof="0" smtClean="0">
+                                    <a:latin typeface="Cambria Math" panose="02040503050406030204" pitchFamily="18" charset="0"/>
+                                    <a:cs typeface="Arial" panose="020B0604020202020204" pitchFamily="34" charset="0"/>
+                                  </a:rPr>
+                                </m:ctrlPr>
+                              </m:sSubPr>
+                              <m:e>
+                                <m:r>
+                                  <a:rPr lang="it-IT" sz="1800" b="0" i="1" noProof="0" smtClean="0">
+                                    <a:latin typeface="Cambria Math" panose="02040503050406030204" pitchFamily="18" charset="0"/>
+                                    <a:cs typeface="Arial" panose="020B0604020202020204" pitchFamily="34" charset="0"/>
+                                  </a:rPr>
+                                  <m:t>𝑦</m:t>
+                                </m:r>
+                              </m:e>
+                              <m:sub>
+                                <m:r>
+                                  <a:rPr lang="it-IT" sz="1800" b="0" i="1" noProof="0" smtClean="0">
+                                    <a:latin typeface="Cambria Math" panose="02040503050406030204" pitchFamily="18" charset="0"/>
+                                    <a:cs typeface="Arial" panose="020B0604020202020204" pitchFamily="34" charset="0"/>
+                                  </a:rPr>
+                                  <m:t>𝑝</m:t>
+                                </m:r>
+                              </m:sub>
+                            </m:sSub>
+                          </m:e>
+                          <m:e>
+                            <m:sSub>
+                              <m:sSubPr>
+                                <m:ctrlPr>
+                                  <a:rPr lang="it-IT" sz="1800" i="1" noProof="0" smtClean="0">
+                                    <a:latin typeface="Cambria Math" panose="02040503050406030204" pitchFamily="18" charset="0"/>
+                                    <a:cs typeface="Arial" panose="020B0604020202020204" pitchFamily="34" charset="0"/>
+                                  </a:rPr>
+                                </m:ctrlPr>
+                              </m:sSubPr>
+                              <m:e>
+                                <m:r>
+                                  <a:rPr lang="it-IT" sz="1800" b="0" i="1" noProof="0" smtClean="0">
+                                    <a:latin typeface="Cambria Math" panose="02040503050406030204" pitchFamily="18" charset="0"/>
+                                    <a:cs typeface="Arial" panose="020B0604020202020204" pitchFamily="34" charset="0"/>
+                                  </a:rPr>
+                                  <m:t>𝑢</m:t>
+                                </m:r>
+                              </m:e>
+                              <m:sub>
+                                <m:r>
+                                  <a:rPr lang="it-IT" sz="1800" b="0" i="1" noProof="0" smtClean="0">
+                                    <a:latin typeface="Cambria Math" panose="02040503050406030204" pitchFamily="18" charset="0"/>
+                                    <a:cs typeface="Arial" panose="020B0604020202020204" pitchFamily="34" charset="0"/>
+                                  </a:rPr>
+                                  <m:t>𝑝</m:t>
+                                </m:r>
+                              </m:sub>
+                            </m:sSub>
+                          </m:e>
+                        </m:eqArr>
+                      </m:e>
+                    </m:d>
+                  </m:oMath>
+                </a14:m>
+                <a:endParaRPr lang="it-IT" sz="2400" noProof="0" dirty="0">
+                  <a:latin typeface="Arial" panose="020B0604020202020204" pitchFamily="34" charset="0"/>
+                  <a:cs typeface="Arial" panose="020B0604020202020204" pitchFamily="34" charset="0"/>
+                </a:endParaRPr>
+              </a:p>
+              <a:p>
+                <a:pPr algn="just"/>
+                <a:endParaRPr lang="it-IT" sz="2400" dirty="0">
+                  <a:latin typeface="Arial" panose="020B0604020202020204" pitchFamily="34" charset="0"/>
+                  <a:cs typeface="Arial" panose="020B0604020202020204" pitchFamily="34" charset="0"/>
+                </a:endParaRPr>
+              </a:p>
+              <a:p>
+                <a:pPr algn="just"/>
+                <a:r>
+                  <a:rPr lang="it-IT" sz="2400" noProof="0" dirty="0" err="1">
+                    <a:latin typeface="Arial" panose="020B0604020202020204" pitchFamily="34" charset="0"/>
+                    <a:cs typeface="Arial" panose="020B0604020202020204" pitchFamily="34" charset="0"/>
+                  </a:rPr>
+                  <a:t>Where</a:t>
+                </a:r>
+                <a:r>
+                  <a:rPr lang="it-IT" sz="2400" noProof="0" dirty="0">
+                    <a:latin typeface="Arial" panose="020B0604020202020204" pitchFamily="34" charset="0"/>
+                    <a:cs typeface="Arial" panose="020B0604020202020204" pitchFamily="34" charset="0"/>
+                  </a:rPr>
+                  <a:t> M, </a:t>
+                </a:r>
+                <a:r>
+                  <a:rPr lang="it-IT" sz="2400" noProof="0" dirty="0" err="1">
+                    <a:latin typeface="Arial" panose="020B0604020202020204" pitchFamily="34" charset="0"/>
+                    <a:cs typeface="Arial" panose="020B0604020202020204" pitchFamily="34" charset="0"/>
+                  </a:rPr>
+                  <a:t>as</a:t>
+                </a:r>
+                <a:r>
+                  <a:rPr lang="it-IT" sz="2400" noProof="0" dirty="0">
+                    <a:latin typeface="Arial" panose="020B0604020202020204" pitchFamily="34" charset="0"/>
+                    <a:cs typeface="Arial" panose="020B0604020202020204" pitchFamily="34" charset="0"/>
+                  </a:rPr>
+                  <a:t> </a:t>
+                </a:r>
+                <a:r>
+                  <a:rPr lang="it-IT" sz="2400" noProof="0" dirty="0" err="1">
+                    <a:latin typeface="Arial" panose="020B0604020202020204" pitchFamily="34" charset="0"/>
+                    <a:cs typeface="Arial" panose="020B0604020202020204" pitchFamily="34" charset="0"/>
+                  </a:rPr>
+                  <a:t>defined</a:t>
+                </a:r>
+                <a:r>
+                  <a:rPr lang="it-IT" sz="2400" noProof="0" dirty="0">
+                    <a:latin typeface="Arial" panose="020B0604020202020204" pitchFamily="34" charset="0"/>
+                    <a:cs typeface="Arial" panose="020B0604020202020204" pitchFamily="34" charset="0"/>
+                  </a:rPr>
+                  <a:t> </a:t>
+                </a:r>
+                <a:r>
+                  <a:rPr lang="it-IT" sz="2400" noProof="0" dirty="0" err="1">
+                    <a:latin typeface="Arial" panose="020B0604020202020204" pitchFamily="34" charset="0"/>
+                    <a:cs typeface="Arial" panose="020B0604020202020204" pitchFamily="34" charset="0"/>
+                  </a:rPr>
+                  <a:t>previously</a:t>
+                </a:r>
+                <a:r>
+                  <a:rPr lang="it-IT" sz="2400" noProof="0" dirty="0">
+                    <a:latin typeface="Arial" panose="020B0604020202020204" pitchFamily="34" charset="0"/>
+                    <a:cs typeface="Arial" panose="020B0604020202020204" pitchFamily="34" charset="0"/>
+                  </a:rPr>
+                  <a:t>, </a:t>
+                </a:r>
+                <a:r>
+                  <a:rPr lang="it-IT" sz="2400" noProof="0" dirty="0" err="1">
+                    <a:latin typeface="Arial" panose="020B0604020202020204" pitchFamily="34" charset="0"/>
+                    <a:cs typeface="Arial" panose="020B0604020202020204" pitchFamily="34" charset="0"/>
+                  </a:rPr>
+                  <a:t>is</a:t>
+                </a:r>
+                <a:r>
+                  <a:rPr lang="it-IT" sz="2400" noProof="0" dirty="0">
+                    <a:latin typeface="Arial" panose="020B0604020202020204" pitchFamily="34" charset="0"/>
+                    <a:cs typeface="Arial" panose="020B0604020202020204" pitchFamily="34" charset="0"/>
+                  </a:rPr>
+                  <a:t> the </a:t>
+                </a:r>
+                <a:r>
+                  <a:rPr lang="it-IT" sz="2400" noProof="0" dirty="0" err="1">
+                    <a:latin typeface="Arial" panose="020B0604020202020204" pitchFamily="34" charset="0"/>
+                    <a:cs typeface="Arial" panose="020B0604020202020204" pitchFamily="34" charset="0"/>
+                  </a:rPr>
+                  <a:t>number</a:t>
+                </a:r>
+                <a:r>
+                  <a:rPr lang="it-IT" sz="2400" noProof="0" dirty="0">
+                    <a:latin typeface="Arial" panose="020B0604020202020204" pitchFamily="34" charset="0"/>
+                    <a:cs typeface="Arial" panose="020B0604020202020204" pitchFamily="34" charset="0"/>
+                  </a:rPr>
+                  <a:t> of </a:t>
+                </a:r>
+                <a:r>
+                  <a:rPr lang="it-IT" sz="2400" noProof="0" dirty="0" err="1">
+                    <a:latin typeface="Arial" panose="020B0604020202020204" pitchFamily="34" charset="0"/>
+                    <a:cs typeface="Arial" panose="020B0604020202020204" pitchFamily="34" charset="0"/>
+                  </a:rPr>
+                  <a:t>past</a:t>
+                </a:r>
+                <a:r>
+                  <a:rPr lang="it-IT" sz="2400" noProof="0" dirty="0">
+                    <a:latin typeface="Arial" panose="020B0604020202020204" pitchFamily="34" charset="0"/>
+                    <a:cs typeface="Arial" panose="020B0604020202020204" pitchFamily="34" charset="0"/>
+                  </a:rPr>
+                  <a:t> data points.</a:t>
+                </a:r>
+              </a:p>
+              <a:p>
+                <a:pPr algn="just"/>
+                <a:r>
+                  <a:rPr lang="it-IT" sz="2400" dirty="0">
+                    <a:latin typeface="Arial" panose="020B0604020202020204" pitchFamily="34" charset="0"/>
+                    <a:cs typeface="Arial" panose="020B0604020202020204" pitchFamily="34" charset="0"/>
+                  </a:rPr>
+                  <a:t>The cost </a:t>
+                </a:r>
+                <a:r>
+                  <a:rPr lang="it-IT" sz="2400" dirty="0" err="1">
+                    <a:latin typeface="Arial" panose="020B0604020202020204" pitchFamily="34" charset="0"/>
+                    <a:cs typeface="Arial" panose="020B0604020202020204" pitchFamily="34" charset="0"/>
+                  </a:rPr>
+                  <a:t>function</a:t>
+                </a:r>
+                <a:r>
+                  <a:rPr lang="it-IT" sz="2400" dirty="0">
+                    <a:latin typeface="Arial" panose="020B0604020202020204" pitchFamily="34" charset="0"/>
+                    <a:cs typeface="Arial" panose="020B0604020202020204" pitchFamily="34" charset="0"/>
+                  </a:rPr>
+                  <a:t> J can </a:t>
+                </a:r>
+                <a:r>
+                  <a:rPr lang="it-IT" sz="2400" dirty="0" err="1">
+                    <a:latin typeface="Arial" panose="020B0604020202020204" pitchFamily="34" charset="0"/>
+                    <a:cs typeface="Arial" panose="020B0604020202020204" pitchFamily="34" charset="0"/>
+                  </a:rPr>
+                  <a:t>now</a:t>
+                </a:r>
+                <a:r>
+                  <a:rPr lang="it-IT" sz="2400" dirty="0">
+                    <a:latin typeface="Arial" panose="020B0604020202020204" pitchFamily="34" charset="0"/>
+                    <a:cs typeface="Arial" panose="020B0604020202020204" pitchFamily="34" charset="0"/>
+                  </a:rPr>
+                  <a:t> be </a:t>
+                </a:r>
+                <a:r>
+                  <a:rPr lang="it-IT" sz="2400" dirty="0" err="1">
+                    <a:latin typeface="Arial" panose="020B0604020202020204" pitchFamily="34" charset="0"/>
+                    <a:cs typeface="Arial" panose="020B0604020202020204" pitchFamily="34" charset="0"/>
+                  </a:rPr>
+                  <a:t>rewritten</a:t>
+                </a:r>
+                <a:r>
+                  <a:rPr lang="it-IT" sz="2400" dirty="0">
+                    <a:latin typeface="Arial" panose="020B0604020202020204" pitchFamily="34" charset="0"/>
+                    <a:cs typeface="Arial" panose="020B0604020202020204" pitchFamily="34" charset="0"/>
+                  </a:rPr>
+                  <a:t> </a:t>
+                </a:r>
+                <a:r>
+                  <a:rPr lang="it-IT" sz="2400" dirty="0" err="1">
+                    <a:latin typeface="Arial" panose="020B0604020202020204" pitchFamily="34" charset="0"/>
+                    <a:cs typeface="Arial" panose="020B0604020202020204" pitchFamily="34" charset="0"/>
+                  </a:rPr>
+                  <a:t>as</a:t>
+                </a:r>
+                <a:endParaRPr lang="it-IT" sz="2400" dirty="0">
+                  <a:latin typeface="Arial" panose="020B0604020202020204" pitchFamily="34" charset="0"/>
+                  <a:cs typeface="Arial" panose="020B0604020202020204" pitchFamily="34" charset="0"/>
+                </a:endParaRPr>
+              </a:p>
+              <a:p>
+                <a:pPr algn="just"/>
+                <a:endParaRPr lang="it-IT" sz="2400" dirty="0">
+                  <a:latin typeface="Arial" panose="020B0604020202020204" pitchFamily="34" charset="0"/>
+                  <a:cs typeface="Arial" panose="020B0604020202020204" pitchFamily="34" charset="0"/>
+                </a:endParaRPr>
+              </a:p>
+              <a:p>
+                <a:pPr algn="just"/>
+                <a14:m>
+                  <m:oMathPara xmlns:m="http://schemas.openxmlformats.org/officeDocument/2006/math">
+                    <m:oMathParaPr>
+                      <m:jc m:val="centerGroup"/>
+                    </m:oMathParaPr>
+                    <m:oMath xmlns:m="http://schemas.openxmlformats.org/officeDocument/2006/math">
+                      <m:r>
+                        <a:rPr lang="it-IT" sz="2000" b="0" i="1" smtClean="0">
+                          <a:latin typeface="Cambria Math" panose="02040503050406030204" pitchFamily="18" charset="0"/>
+                          <a:cs typeface="Arial" panose="020B0604020202020204" pitchFamily="34" charset="0"/>
+                        </a:rPr>
+                        <m:t>𝐽</m:t>
+                      </m:r>
+                      <m:r>
+                        <a:rPr lang="it-IT" sz="2000" b="0" i="1" smtClean="0">
+                          <a:latin typeface="Cambria Math" panose="02040503050406030204" pitchFamily="18" charset="0"/>
+                          <a:cs typeface="Arial" panose="020B0604020202020204" pitchFamily="34" charset="0"/>
+                        </a:rPr>
+                        <m:t>=</m:t>
+                      </m:r>
+                      <m:sSup>
+                        <m:sSupPr>
+                          <m:ctrlPr>
+                            <a:rPr lang="it-IT" sz="2000" b="0" i="1" smtClean="0">
+                              <a:latin typeface="Cambria Math" panose="02040503050406030204" pitchFamily="18" charset="0"/>
+                              <a:cs typeface="Arial" panose="020B0604020202020204" pitchFamily="34" charset="0"/>
+                            </a:rPr>
+                          </m:ctrlPr>
+                        </m:sSupPr>
+                        <m:e>
+                          <m:r>
+                            <a:rPr lang="it-IT" sz="2000" b="0" i="1" smtClean="0">
+                              <a:latin typeface="Cambria Math" panose="02040503050406030204" pitchFamily="18" charset="0"/>
+                              <a:cs typeface="Arial" panose="020B0604020202020204" pitchFamily="34" charset="0"/>
+                            </a:rPr>
+                            <m:t>(</m:t>
+                          </m:r>
+                          <m:sSubSup>
+                            <m:sSubSupPr>
+                              <m:ctrlPr>
+                                <a:rPr lang="it-IT" sz="2000" b="0" i="1" smtClean="0">
+                                  <a:latin typeface="Cambria Math" panose="02040503050406030204" pitchFamily="18" charset="0"/>
+                                  <a:cs typeface="Arial" panose="020B0604020202020204" pitchFamily="34" charset="0"/>
+                                </a:rPr>
+                              </m:ctrlPr>
+                            </m:sSubSupPr>
+                            <m:e>
+                              <m:r>
+                                <a:rPr lang="it-IT" sz="2000" b="0" i="1" smtClean="0">
+                                  <a:latin typeface="Cambria Math" panose="02040503050406030204" pitchFamily="18" charset="0"/>
+                                  <a:cs typeface="Arial" panose="020B0604020202020204" pitchFamily="34" charset="0"/>
+                                </a:rPr>
+                                <m:t>𝐿</m:t>
+                              </m:r>
+                            </m:e>
+                            <m:sub>
+                              <m:r>
+                                <a:rPr lang="it-IT" sz="1600" b="0" i="1" smtClean="0">
+                                  <a:latin typeface="Cambria Math" panose="02040503050406030204" pitchFamily="18" charset="0"/>
+                                </a:rPr>
+                                <m:t>𝑤</m:t>
+                              </m:r>
+                            </m:sub>
+                            <m:sup/>
+                          </m:sSubSup>
+                          <m:sSubSup>
+                            <m:sSubSupPr>
+                              <m:ctrlPr>
+                                <a:rPr lang="it-IT" sz="1600" i="1" smtClean="0">
+                                  <a:latin typeface="Cambria Math" panose="02040503050406030204" pitchFamily="18" charset="0"/>
+                                </a:rPr>
+                              </m:ctrlPr>
+                            </m:sSubSupPr>
+                            <m:e>
+                              <m:r>
+                                <a:rPr lang="it-IT" sz="1600" b="0" i="1" smtClean="0">
+                                  <a:latin typeface="Cambria Math" panose="02040503050406030204" pitchFamily="18" charset="0"/>
+                                </a:rPr>
+                                <m:t>𝑤</m:t>
+                              </m:r>
+                            </m:e>
+                            <m:sub>
+                              <m:r>
+                                <a:rPr lang="it-IT" sz="1600" b="0" i="1" smtClean="0">
+                                  <a:latin typeface="Cambria Math" panose="02040503050406030204" pitchFamily="18" charset="0"/>
+                                </a:rPr>
+                                <m:t>𝑝</m:t>
+                              </m:r>
+                            </m:sub>
+                            <m:sup/>
+                          </m:sSubSup>
+                          <m:r>
+                            <a:rPr lang="it-IT" sz="1600" b="0" i="1" smtClean="0">
+                              <a:latin typeface="Cambria Math" panose="02040503050406030204" pitchFamily="18" charset="0"/>
+                            </a:rPr>
+                            <m:t>+</m:t>
+                          </m:r>
+                          <m:sSubSup>
+                            <m:sSubSupPr>
+                              <m:ctrlPr>
+                                <a:rPr lang="it-IT" sz="1600" b="0" i="1" smtClean="0">
+                                  <a:latin typeface="Cambria Math" panose="02040503050406030204" pitchFamily="18" charset="0"/>
+                                </a:rPr>
+                              </m:ctrlPr>
+                            </m:sSubSupPr>
+                            <m:e>
+                              <m:r>
+                                <a:rPr lang="it-IT" sz="1600" b="0" i="1" smtClean="0">
+                                  <a:latin typeface="Cambria Math" panose="02040503050406030204" pitchFamily="18" charset="0"/>
+                                </a:rPr>
+                                <m:t>𝐿</m:t>
+                              </m:r>
+                            </m:e>
+                            <m:sub>
+                              <m:r>
+                                <a:rPr lang="it-IT" sz="1600" b="0" i="1" smtClean="0">
+                                  <a:latin typeface="Cambria Math" panose="02040503050406030204" pitchFamily="18" charset="0"/>
+                                </a:rPr>
+                                <m:t>𝑢</m:t>
+                              </m:r>
+                            </m:sub>
+                            <m:sup/>
+                          </m:sSubSup>
+                          <m:sSubSup>
+                            <m:sSubSupPr>
+                              <m:ctrlPr>
+                                <a:rPr lang="it-IT" sz="1600" i="1" smtClean="0">
+                                  <a:latin typeface="Cambria Math" panose="02040503050406030204" pitchFamily="18" charset="0"/>
+                                </a:rPr>
+                              </m:ctrlPr>
+                            </m:sSubSupPr>
+                            <m:e>
+                              <m:r>
+                                <a:rPr lang="it-IT" sz="1600" b="0" i="1" smtClean="0">
+                                  <a:latin typeface="Cambria Math" panose="02040503050406030204" pitchFamily="18" charset="0"/>
+                                </a:rPr>
+                                <m:t>𝑢</m:t>
+                              </m:r>
+                            </m:e>
+                            <m:sub>
+                              <m:r>
+                                <a:rPr lang="it-IT" sz="1600" b="0" i="1" smtClean="0">
+                                  <a:latin typeface="Cambria Math" panose="02040503050406030204" pitchFamily="18" charset="0"/>
+                                </a:rPr>
+                                <m:t>𝑓</m:t>
+                              </m:r>
+                            </m:sub>
+                            <m:sup/>
+                          </m:sSubSup>
+                          <m:r>
+                            <a:rPr lang="it-IT" sz="1600" b="0" i="1" smtClean="0">
+                              <a:latin typeface="Cambria Math" panose="02040503050406030204" pitchFamily="18" charset="0"/>
+                            </a:rPr>
+                            <m:t>−</m:t>
+                          </m:r>
+                          <m:sSubSup>
+                            <m:sSubSupPr>
+                              <m:ctrlPr>
+                                <a:rPr lang="it-IT" sz="1600" b="0" i="1" smtClean="0">
+                                  <a:latin typeface="Cambria Math" panose="02040503050406030204" pitchFamily="18" charset="0"/>
+                                </a:rPr>
+                              </m:ctrlPr>
+                            </m:sSubSupPr>
+                            <m:e>
+                              <m:r>
+                                <a:rPr lang="it-IT" sz="1600" b="0" i="1" smtClean="0">
+                                  <a:latin typeface="Cambria Math" panose="02040503050406030204" pitchFamily="18" charset="0"/>
+                                </a:rPr>
+                                <m:t>𝑟</m:t>
+                              </m:r>
+                            </m:e>
+                            <m:sub>
+                              <m:r>
+                                <a:rPr lang="it-IT" sz="1600" b="0" i="1" smtClean="0">
+                                  <a:latin typeface="Cambria Math" panose="02040503050406030204" pitchFamily="18" charset="0"/>
+                                </a:rPr>
+                                <m:t>𝑓</m:t>
+                              </m:r>
+                            </m:sub>
+                            <m:sup/>
+                          </m:sSubSup>
+                          <m:r>
+                            <a:rPr lang="it-IT" sz="2000" b="0" i="1" smtClean="0">
+                              <a:latin typeface="Cambria Math" panose="02040503050406030204" pitchFamily="18" charset="0"/>
+                              <a:cs typeface="Arial" panose="020B0604020202020204" pitchFamily="34" charset="0"/>
+                            </a:rPr>
+                            <m:t>)</m:t>
+                          </m:r>
+                        </m:e>
+                        <m:sup>
+                          <m:r>
+                            <a:rPr lang="it-IT" sz="2000" b="0" i="1" smtClean="0">
+                              <a:latin typeface="Cambria Math" panose="02040503050406030204" pitchFamily="18" charset="0"/>
+                              <a:cs typeface="Arial" panose="020B0604020202020204" pitchFamily="34" charset="0"/>
+                            </a:rPr>
+                            <m:t>𝑇</m:t>
+                          </m:r>
+                        </m:sup>
+                      </m:sSup>
+                      <m:r>
+                        <a:rPr lang="it-IT" sz="2000" b="0" i="1" smtClean="0">
+                          <a:latin typeface="Cambria Math" panose="02040503050406030204" pitchFamily="18" charset="0"/>
+                          <a:cs typeface="Arial" panose="020B0604020202020204" pitchFamily="34" charset="0"/>
+                        </a:rPr>
+                        <m:t>𝑄</m:t>
+                      </m:r>
+                      <m:r>
+                        <a:rPr lang="it-IT" sz="2000" b="0" i="1" smtClean="0">
+                          <a:latin typeface="Cambria Math" panose="02040503050406030204" pitchFamily="18" charset="0"/>
+                          <a:cs typeface="Arial" panose="020B0604020202020204" pitchFamily="34" charset="0"/>
+                        </a:rPr>
+                        <m:t>(</m:t>
+                      </m:r>
+                      <m:sSubSup>
+                        <m:sSubSupPr>
+                          <m:ctrlPr>
+                            <a:rPr lang="it-IT" sz="2800" b="0" i="1" smtClean="0">
+                              <a:latin typeface="Cambria Math" panose="02040503050406030204" pitchFamily="18" charset="0"/>
+                              <a:cs typeface="Arial" panose="020B0604020202020204" pitchFamily="34" charset="0"/>
+                            </a:rPr>
+                          </m:ctrlPr>
+                        </m:sSubSupPr>
+                        <m:e>
+                          <m:r>
+                            <a:rPr lang="it-IT" sz="2800" b="0" i="1" smtClean="0">
+                              <a:latin typeface="Cambria Math" panose="02040503050406030204" pitchFamily="18" charset="0"/>
+                              <a:cs typeface="Arial" panose="020B0604020202020204" pitchFamily="34" charset="0"/>
+                            </a:rPr>
+                            <m:t>𝐿</m:t>
+                          </m:r>
+                        </m:e>
+                        <m:sub>
+                          <m:r>
+                            <a:rPr lang="it-IT" sz="2000" b="0" i="1" smtClean="0">
+                              <a:latin typeface="Cambria Math" panose="02040503050406030204" pitchFamily="18" charset="0"/>
+                            </a:rPr>
+                            <m:t>𝑤</m:t>
+                          </m:r>
+                        </m:sub>
+                        <m:sup/>
+                      </m:sSubSup>
+                      <m:sSubSup>
+                        <m:sSubSupPr>
+                          <m:ctrlPr>
+                            <a:rPr lang="it-IT" sz="2000" i="1" smtClean="0">
+                              <a:latin typeface="Cambria Math" panose="02040503050406030204" pitchFamily="18" charset="0"/>
+                            </a:rPr>
+                          </m:ctrlPr>
+                        </m:sSubSupPr>
+                        <m:e>
+                          <m:r>
+                            <a:rPr lang="it-IT" sz="2000" b="0" i="1" smtClean="0">
+                              <a:latin typeface="Cambria Math" panose="02040503050406030204" pitchFamily="18" charset="0"/>
+                            </a:rPr>
+                            <m:t>𝑤</m:t>
+                          </m:r>
+                        </m:e>
+                        <m:sub>
+                          <m:r>
+                            <a:rPr lang="it-IT" sz="2000" b="0" i="1" smtClean="0">
+                              <a:latin typeface="Cambria Math" panose="02040503050406030204" pitchFamily="18" charset="0"/>
+                            </a:rPr>
+                            <m:t>𝑝</m:t>
+                          </m:r>
+                        </m:sub>
+                        <m:sup/>
+                      </m:sSubSup>
+                      <m:r>
+                        <a:rPr lang="it-IT" sz="2000" b="0" i="1" smtClean="0">
+                          <a:latin typeface="Cambria Math" panose="02040503050406030204" pitchFamily="18" charset="0"/>
+                        </a:rPr>
+                        <m:t>+</m:t>
+                      </m:r>
+                      <m:sSubSup>
+                        <m:sSubSupPr>
+                          <m:ctrlPr>
+                            <a:rPr lang="it-IT" sz="2000" b="0" i="1" smtClean="0">
+                              <a:latin typeface="Cambria Math" panose="02040503050406030204" pitchFamily="18" charset="0"/>
+                            </a:rPr>
+                          </m:ctrlPr>
+                        </m:sSubSupPr>
+                        <m:e>
+                          <m:r>
+                            <a:rPr lang="it-IT" sz="2000" b="0" i="1" smtClean="0">
+                              <a:latin typeface="Cambria Math" panose="02040503050406030204" pitchFamily="18" charset="0"/>
+                            </a:rPr>
+                            <m:t>𝐿</m:t>
+                          </m:r>
+                        </m:e>
+                        <m:sub>
+                          <m:r>
+                            <a:rPr lang="it-IT" sz="2000" b="0" i="1" smtClean="0">
+                              <a:latin typeface="Cambria Math" panose="02040503050406030204" pitchFamily="18" charset="0"/>
+                            </a:rPr>
+                            <m:t>𝑢</m:t>
+                          </m:r>
+                        </m:sub>
+                        <m:sup/>
+                      </m:sSubSup>
+                      <m:sSubSup>
+                        <m:sSubSupPr>
+                          <m:ctrlPr>
+                            <a:rPr lang="it-IT" sz="2000" i="1" smtClean="0">
+                              <a:latin typeface="Cambria Math" panose="02040503050406030204" pitchFamily="18" charset="0"/>
+                            </a:rPr>
+                          </m:ctrlPr>
+                        </m:sSubSupPr>
+                        <m:e>
+                          <m:r>
+                            <a:rPr lang="it-IT" sz="2000" b="0" i="1" smtClean="0">
+                              <a:latin typeface="Cambria Math" panose="02040503050406030204" pitchFamily="18" charset="0"/>
+                            </a:rPr>
+                            <m:t>𝑢</m:t>
+                          </m:r>
+                        </m:e>
+                        <m:sub>
+                          <m:r>
+                            <a:rPr lang="it-IT" sz="2000" b="0" i="1" smtClean="0">
+                              <a:latin typeface="Cambria Math" panose="02040503050406030204" pitchFamily="18" charset="0"/>
+                            </a:rPr>
+                            <m:t>𝑓</m:t>
+                          </m:r>
+                        </m:sub>
+                        <m:sup/>
+                      </m:sSubSup>
+                      <m:r>
+                        <a:rPr lang="it-IT" sz="2000" b="0" i="1" smtClean="0">
+                          <a:latin typeface="Cambria Math" panose="02040503050406030204" pitchFamily="18" charset="0"/>
+                        </a:rPr>
+                        <m:t>−</m:t>
+                      </m:r>
+                      <m:sSubSup>
+                        <m:sSubSupPr>
+                          <m:ctrlPr>
+                            <a:rPr lang="it-IT" sz="2000" b="0" i="1" smtClean="0">
+                              <a:latin typeface="Cambria Math" panose="02040503050406030204" pitchFamily="18" charset="0"/>
+                            </a:rPr>
+                          </m:ctrlPr>
+                        </m:sSubSupPr>
+                        <m:e>
+                          <m:r>
+                            <a:rPr lang="it-IT" sz="2000" b="0" i="1" smtClean="0">
+                              <a:latin typeface="Cambria Math" panose="02040503050406030204" pitchFamily="18" charset="0"/>
+                            </a:rPr>
+                            <m:t>𝑟</m:t>
+                          </m:r>
+                        </m:e>
+                        <m:sub>
+                          <m:r>
+                            <a:rPr lang="it-IT" sz="2000" b="0" i="1" smtClean="0">
+                              <a:latin typeface="Cambria Math" panose="02040503050406030204" pitchFamily="18" charset="0"/>
+                            </a:rPr>
+                            <m:t>𝑓</m:t>
+                          </m:r>
+                        </m:sub>
+                        <m:sup/>
+                      </m:sSubSup>
+                      <m:r>
+                        <a:rPr lang="it-IT" sz="2000" b="0" i="1" smtClean="0">
+                          <a:latin typeface="Cambria Math" panose="02040503050406030204" pitchFamily="18" charset="0"/>
+                          <a:cs typeface="Arial" panose="020B0604020202020204" pitchFamily="34" charset="0"/>
+                        </a:rPr>
+                        <m:t>)</m:t>
+                      </m:r>
+                      <m:r>
+                        <a:rPr lang="it-IT" sz="2000" b="0" i="1" smtClean="0">
+                          <a:latin typeface="Cambria Math" panose="02040503050406030204" pitchFamily="18" charset="0"/>
+                          <a:cs typeface="Arial" panose="020B0604020202020204" pitchFamily="34" charset="0"/>
+                        </a:rPr>
+                        <m:t>+</m:t>
+                      </m:r>
+                      <m:sSubSup>
+                        <m:sSubSupPr>
+                          <m:ctrlPr>
+                            <a:rPr lang="it-IT" sz="2000" b="0" i="1" smtClean="0">
+                              <a:latin typeface="Cambria Math" panose="02040503050406030204" pitchFamily="18" charset="0"/>
+                              <a:cs typeface="Arial" panose="020B0604020202020204" pitchFamily="34" charset="0"/>
+                            </a:rPr>
+                          </m:ctrlPr>
+                        </m:sSubSupPr>
+                        <m:e>
+                          <m:r>
+                            <a:rPr lang="it-IT" sz="2000" b="0" i="1" smtClean="0">
+                              <a:latin typeface="Cambria Math" panose="02040503050406030204" pitchFamily="18" charset="0"/>
+                              <a:cs typeface="Arial" panose="020B0604020202020204" pitchFamily="34" charset="0"/>
+                            </a:rPr>
+                            <m:t>𝑢</m:t>
+                          </m:r>
+                        </m:e>
+                        <m:sub>
+                          <m:r>
+                            <a:rPr lang="it-IT" sz="2000" b="0" i="1" smtClean="0">
+                              <a:latin typeface="Cambria Math" panose="02040503050406030204" pitchFamily="18" charset="0"/>
+                              <a:cs typeface="Arial" panose="020B0604020202020204" pitchFamily="34" charset="0"/>
+                            </a:rPr>
+                            <m:t>𝑓</m:t>
+                          </m:r>
+                        </m:sub>
+                        <m:sup>
+                          <m:r>
+                            <a:rPr lang="it-IT" sz="2000" b="0" i="1" smtClean="0">
+                              <a:latin typeface="Cambria Math" panose="02040503050406030204" pitchFamily="18" charset="0"/>
+                              <a:cs typeface="Arial" panose="020B0604020202020204" pitchFamily="34" charset="0"/>
+                            </a:rPr>
+                            <m:t>𝑇</m:t>
+                          </m:r>
+                        </m:sup>
+                      </m:sSubSup>
+                      <m:r>
+                        <a:rPr lang="it-IT" sz="2000" b="0" i="1" smtClean="0">
+                          <a:latin typeface="Cambria Math" panose="02040503050406030204" pitchFamily="18" charset="0"/>
+                          <a:cs typeface="Arial" panose="020B0604020202020204" pitchFamily="34" charset="0"/>
+                        </a:rPr>
+                        <m:t>𝑅</m:t>
+                      </m:r>
+                      <m:sSub>
+                        <m:sSubPr>
+                          <m:ctrlPr>
+                            <a:rPr lang="it-IT" sz="2000" b="0" i="1" smtClean="0">
+                              <a:latin typeface="Cambria Math" panose="02040503050406030204" pitchFamily="18" charset="0"/>
+                              <a:cs typeface="Arial" panose="020B0604020202020204" pitchFamily="34" charset="0"/>
+                            </a:rPr>
+                          </m:ctrlPr>
+                        </m:sSubPr>
+                        <m:e>
+                          <m:r>
+                            <a:rPr lang="it-IT" sz="2000" b="0" i="1" smtClean="0">
+                              <a:latin typeface="Cambria Math" panose="02040503050406030204" pitchFamily="18" charset="0"/>
+                              <a:cs typeface="Arial" panose="020B0604020202020204" pitchFamily="34" charset="0"/>
+                            </a:rPr>
+                            <m:t>𝑢</m:t>
+                          </m:r>
+                        </m:e>
+                        <m:sub>
+                          <m:r>
+                            <a:rPr lang="it-IT" sz="2000" b="0" i="1" smtClean="0">
+                              <a:latin typeface="Cambria Math" panose="02040503050406030204" pitchFamily="18" charset="0"/>
+                              <a:cs typeface="Arial" panose="020B0604020202020204" pitchFamily="34" charset="0"/>
+                            </a:rPr>
+                            <m:t>𝑓</m:t>
+                          </m:r>
+                        </m:sub>
+                      </m:sSub>
+                    </m:oMath>
+                  </m:oMathPara>
+                </a14:m>
+                <a:endParaRPr lang="it-IT" sz="2800" dirty="0">
+                  <a:latin typeface="Arial" panose="020B0604020202020204" pitchFamily="34" charset="0"/>
+                  <a:cs typeface="Arial" panose="020B0604020202020204" pitchFamily="34" charset="0"/>
+                </a:endParaRPr>
+              </a:p>
+              <a:p>
+                <a:pPr algn="just"/>
+                <a:endParaRPr lang="it-IT" sz="2400" dirty="0">
+                  <a:latin typeface="Arial" panose="020B0604020202020204" pitchFamily="34" charset="0"/>
+                  <a:cs typeface="Arial" panose="020B0604020202020204" pitchFamily="34" charset="0"/>
+                </a:endParaRPr>
+              </a:p>
+            </p:txBody>
+          </p:sp>
+        </mc:Choice>
+        <mc:Fallback>
+          <p:sp>
+            <p:nvSpPr>
+              <p:cNvPr id="2" name="CasellaDiTesto 1">
+                <a:extLst>
+                  <a:ext uri="{FF2B5EF4-FFF2-40B4-BE49-F238E27FC236}">
+                    <a16:creationId xmlns:a16="http://schemas.microsoft.com/office/drawing/2014/main" id="{0367F24C-DB9D-043A-C3E0-240A6426CF81}"/>
+                  </a:ext>
+                </a:extLst>
+              </p:cNvPr>
+              <p:cNvSpPr txBox="1">
+                <a:spLocks noRot="1" noChangeAspect="1" noMove="1" noResize="1" noEditPoints="1" noAdjustHandles="1" noChangeArrowheads="1" noChangeShapeType="1" noTextEdit="1"/>
+              </p:cNvSpPr>
+              <p:nvPr/>
+            </p:nvSpPr>
+            <p:spPr>
+              <a:xfrm>
+                <a:off x="723900" y="1191645"/>
+                <a:ext cx="10744200" cy="4873001"/>
+              </a:xfrm>
+              <a:prstGeom prst="rect">
+                <a:avLst/>
+              </a:prstGeom>
+              <a:blipFill>
+                <a:blip r:embed="rId3"/>
+                <a:stretch>
+                  <a:fillRect l="-908" t="-1000" r="-851"/>
+                </a:stretch>
+              </a:blipFill>
+            </p:spPr>
+            <p:txBody>
+              <a:bodyPr/>
+              <a:lstStyle/>
+              <a:p>
+                <a:r>
+                  <a:rPr lang="it-IT">
+                    <a:noFill/>
+                  </a:rPr>
+                  <a:t> </a:t>
+                </a:r>
+              </a:p>
+            </p:txBody>
+          </p:sp>
+        </mc:Fallback>
+      </mc:AlternateContent>
     </p:spTree>
     <p:extLst>
       <p:ext uri="{BB962C8B-B14F-4D97-AF65-F5344CB8AC3E}">
@@ -2163,7 +4173,7 @@
 </p:sld>
 </file>
 
-<file path=ppt/slides/slide11.xml><?xml version="1.0" encoding="utf-8"?>
+<file path=ppt/slides/slide12.xml><?xml version="1.0" encoding="utf-8"?>
 <p:sld xmlns:a="http://schemas.openxmlformats.org/drawingml/2006/main" xmlns:r="http://schemas.openxmlformats.org/officeDocument/2006/relationships" xmlns:p="http://schemas.openxmlformats.org/presentationml/2006/main">
   <p:cSld>
     <p:spTree>
@@ -2216,13 +4226,13 @@
               <a:rPr lang="en-GB" noProof="0" dirty="0">
                 <a:latin typeface="Arial Black" panose="020B0A04020102020204" pitchFamily="34" charset="0"/>
               </a:rPr>
-              <a:t>Proposed solution – </a:t>
+              <a:t>Proposed solution – Control</a:t>
             </a:r>
             <a:r>
               <a:rPr lang="en-GB" dirty="0">
                 <a:latin typeface="Arial Black" panose="020B0A04020102020204" pitchFamily="34" charset="0"/>
               </a:rPr>
-              <a:t>MPC step 2</a:t>
+              <a:t> step 2</a:t>
             </a:r>
             <a:endParaRPr lang="en-GB" noProof="0" dirty="0">
               <a:latin typeface="Arial Black" panose="020B0A04020102020204" pitchFamily="34" charset="0"/>
@@ -2230,176 +4240,774 @@
           </a:p>
         </p:txBody>
       </p:sp>
-      <p:sp>
-        <p:nvSpPr>
-          <p:cNvPr id="2" name="CasellaDiTesto 1">
-            <a:extLst>
-              <a:ext uri="{FF2B5EF4-FFF2-40B4-BE49-F238E27FC236}">
-                <a16:creationId xmlns:a16="http://schemas.microsoft.com/office/drawing/2014/main" id="{1AD414A0-A715-1469-0125-37B4B3F31316}"/>
-              </a:ext>
-            </a:extLst>
-          </p:cNvPr>
-          <p:cNvSpPr txBox="1"/>
-          <p:nvPr/>
-        </p:nvSpPr>
-        <p:spPr>
-          <a:xfrm>
-            <a:off x="723900" y="1191645"/>
-            <a:ext cx="10744200" cy="461665"/>
-          </a:xfrm>
-          <a:prstGeom prst="rect">
-            <a:avLst/>
-          </a:prstGeom>
-          <a:noFill/>
-        </p:spPr>
-        <p:txBody>
-          <a:bodyPr wrap="square">
-            <a:spAutoFit/>
-          </a:bodyPr>
-          <a:lstStyle/>
-          <a:p>
-            <a:pPr algn="just"/>
-            <a:r>
-              <a:rPr lang="it-IT" sz="2400" dirty="0">
-                <a:latin typeface="Arial" panose="020B0604020202020204" pitchFamily="34" charset="0"/>
-                <a:cs typeface="Arial" panose="020B0604020202020204" pitchFamily="34" charset="0"/>
-              </a:rPr>
-              <a:t>AAA</a:t>
-            </a:r>
-            <a:endParaRPr lang="it-IT" sz="2400" noProof="0" dirty="0">
-              <a:latin typeface="Arial" panose="020B0604020202020204" pitchFamily="34" charset="0"/>
-              <a:cs typeface="Arial" panose="020B0604020202020204" pitchFamily="34" charset="0"/>
-            </a:endParaRPr>
-          </a:p>
-        </p:txBody>
-      </p:sp>
+      <mc:AlternateContent xmlns:mc="http://schemas.openxmlformats.org/markup-compatibility/2006">
+        <mc:Choice xmlns:a14="http://schemas.microsoft.com/office/drawing/2010/main" Requires="a14">
+          <p:sp>
+            <p:nvSpPr>
+              <p:cNvPr id="2" name="CasellaDiTesto 1">
+                <a:extLst>
+                  <a:ext uri="{FF2B5EF4-FFF2-40B4-BE49-F238E27FC236}">
+                    <a16:creationId xmlns:a16="http://schemas.microsoft.com/office/drawing/2014/main" id="{1AD414A0-A715-1469-0125-37B4B3F31316}"/>
+                  </a:ext>
+                </a:extLst>
+              </p:cNvPr>
+              <p:cNvSpPr txBox="1"/>
+              <p:nvPr/>
+            </p:nvSpPr>
+            <p:spPr>
+              <a:xfrm>
+                <a:off x="723900" y="1191645"/>
+                <a:ext cx="10744200" cy="3113866"/>
+              </a:xfrm>
+              <a:prstGeom prst="rect">
+                <a:avLst/>
+              </a:prstGeom>
+              <a:noFill/>
+            </p:spPr>
+            <p:txBody>
+              <a:bodyPr wrap="square">
+                <a:spAutoFit/>
+              </a:bodyPr>
+              <a:lstStyle/>
+              <a:p>
+                <a:pPr algn="just"/>
+                <a:r>
+                  <a:rPr lang="it-IT" sz="2400" dirty="0">
+                    <a:latin typeface="Arial" panose="020B0604020202020204" pitchFamily="34" charset="0"/>
+                    <a:cs typeface="Arial" panose="020B0604020202020204" pitchFamily="34" charset="0"/>
+                  </a:rPr>
+                  <a:t>Now, </a:t>
+                </a:r>
+                <a:r>
+                  <a:rPr lang="it-IT" sz="2400" dirty="0" err="1">
+                    <a:latin typeface="Arial" panose="020B0604020202020204" pitchFamily="34" charset="0"/>
+                    <a:cs typeface="Arial" panose="020B0604020202020204" pitchFamily="34" charset="0"/>
+                  </a:rPr>
+                  <a:t>we</a:t>
+                </a:r>
+                <a:r>
+                  <a:rPr lang="it-IT" sz="2400" dirty="0">
+                    <a:latin typeface="Arial" panose="020B0604020202020204" pitchFamily="34" charset="0"/>
+                    <a:cs typeface="Arial" panose="020B0604020202020204" pitchFamily="34" charset="0"/>
+                  </a:rPr>
+                  <a:t> can </a:t>
+                </a:r>
+                <a:r>
+                  <a:rPr lang="it-IT" sz="2400" dirty="0" err="1">
+                    <a:latin typeface="Arial" panose="020B0604020202020204" pitchFamily="34" charset="0"/>
+                    <a:cs typeface="Arial" panose="020B0604020202020204" pitchFamily="34" charset="0"/>
+                  </a:rPr>
+                  <a:t>implement</a:t>
+                </a:r>
+                <a:r>
+                  <a:rPr lang="it-IT" sz="2400" dirty="0">
+                    <a:latin typeface="Arial" panose="020B0604020202020204" pitchFamily="34" charset="0"/>
+                    <a:cs typeface="Arial" panose="020B0604020202020204" pitchFamily="34" charset="0"/>
+                  </a:rPr>
+                  <a:t> the first </a:t>
+                </a:r>
+                <a:r>
+                  <a:rPr lang="it-IT" sz="2400" dirty="0" err="1">
+                    <a:latin typeface="Arial" panose="020B0604020202020204" pitchFamily="34" charset="0"/>
+                    <a:cs typeface="Arial" panose="020B0604020202020204" pitchFamily="34" charset="0"/>
+                  </a:rPr>
+                  <a:t>imput</a:t>
+                </a:r>
+                <a:r>
+                  <a:rPr lang="it-IT" sz="2400" dirty="0">
+                    <a:latin typeface="Arial" panose="020B0604020202020204" pitchFamily="34" charset="0"/>
+                    <a:cs typeface="Arial" panose="020B0604020202020204" pitchFamily="34" charset="0"/>
+                  </a:rPr>
+                  <a:t>, </a:t>
+                </a:r>
+                <a14:m>
+                  <m:oMath xmlns:m="http://schemas.openxmlformats.org/officeDocument/2006/math">
+                    <m:sSub>
+                      <m:sSubPr>
+                        <m:ctrlPr>
+                          <a:rPr lang="it-IT" sz="2400" i="1" noProof="0" smtClean="0">
+                            <a:latin typeface="Cambria Math" panose="02040503050406030204" pitchFamily="18" charset="0"/>
+                            <a:cs typeface="Arial" panose="020B0604020202020204" pitchFamily="34" charset="0"/>
+                          </a:rPr>
+                        </m:ctrlPr>
+                      </m:sSubPr>
+                      <m:e>
+                        <m:r>
+                          <a:rPr lang="it-IT" sz="2400" b="0" i="1" noProof="0" smtClean="0">
+                            <a:latin typeface="Cambria Math" panose="02040503050406030204" pitchFamily="18" charset="0"/>
+                            <a:cs typeface="Arial" panose="020B0604020202020204" pitchFamily="34" charset="0"/>
+                          </a:rPr>
+                          <m:t>𝑢</m:t>
+                        </m:r>
+                      </m:e>
+                      <m:sub>
+                        <m:r>
+                          <a:rPr lang="it-IT" sz="2400" b="0" i="1" noProof="0" smtClean="0">
+                            <a:latin typeface="Cambria Math" panose="02040503050406030204" pitchFamily="18" charset="0"/>
+                            <a:cs typeface="Arial" panose="020B0604020202020204" pitchFamily="34" charset="0"/>
+                          </a:rPr>
+                          <m:t>1</m:t>
+                        </m:r>
+                      </m:sub>
+                    </m:sSub>
+                  </m:oMath>
+                </a14:m>
+                <a:r>
+                  <a:rPr lang="it-IT" sz="2400" dirty="0">
+                    <a:latin typeface="Arial" panose="020B0604020202020204" pitchFamily="34" charset="0"/>
+                    <a:cs typeface="Arial" panose="020B0604020202020204" pitchFamily="34" charset="0"/>
+                  </a:rPr>
+                  <a:t> , of the SPC controller sequence </a:t>
+                </a:r>
+                <a14:m>
+                  <m:oMath xmlns:m="http://schemas.openxmlformats.org/officeDocument/2006/math">
+                    <m:sSub>
+                      <m:sSubPr>
+                        <m:ctrlPr>
+                          <a:rPr lang="it-IT" sz="2400" i="1" noProof="0" smtClean="0">
+                            <a:latin typeface="Cambria Math" panose="02040503050406030204" pitchFamily="18" charset="0"/>
+                            <a:cs typeface="Arial" panose="020B0604020202020204" pitchFamily="34" charset="0"/>
+                          </a:rPr>
+                        </m:ctrlPr>
+                      </m:sSubPr>
+                      <m:e>
+                        <m:r>
+                          <a:rPr lang="it-IT" sz="2400" b="0" i="1" noProof="0" smtClean="0">
+                            <a:latin typeface="Cambria Math" panose="02040503050406030204" pitchFamily="18" charset="0"/>
+                            <a:cs typeface="Arial" panose="020B0604020202020204" pitchFamily="34" charset="0"/>
+                          </a:rPr>
+                          <m:t>𝑢</m:t>
+                        </m:r>
+                      </m:e>
+                      <m:sub>
+                        <m:r>
+                          <a:rPr lang="it-IT" sz="2400" b="0" i="1" noProof="0" smtClean="0">
+                            <a:latin typeface="Cambria Math" panose="02040503050406030204" pitchFamily="18" charset="0"/>
+                            <a:cs typeface="Arial" panose="020B0604020202020204" pitchFamily="34" charset="0"/>
+                          </a:rPr>
+                          <m:t>𝑓</m:t>
+                        </m:r>
+                      </m:sub>
+                    </m:sSub>
+                  </m:oMath>
+                </a14:m>
+                <a:r>
+                  <a:rPr lang="it-IT" sz="2400" dirty="0">
+                    <a:latin typeface="Arial" panose="020B0604020202020204" pitchFamily="34" charset="0"/>
+                    <a:cs typeface="Arial" panose="020B0604020202020204" pitchFamily="34" charset="0"/>
+                  </a:rPr>
+                  <a:t>, </a:t>
+                </a:r>
+                <a:r>
+                  <a:rPr lang="it-IT" sz="2400" dirty="0" err="1">
+                    <a:latin typeface="Arial" panose="020B0604020202020204" pitchFamily="34" charset="0"/>
+                    <a:cs typeface="Arial" panose="020B0604020202020204" pitchFamily="34" charset="0"/>
+                  </a:rPr>
+                  <a:t>that</a:t>
+                </a:r>
+                <a:r>
+                  <a:rPr lang="it-IT" sz="2400" dirty="0">
+                    <a:latin typeface="Arial" panose="020B0604020202020204" pitchFamily="34" charset="0"/>
+                    <a:cs typeface="Arial" panose="020B0604020202020204" pitchFamily="34" charset="0"/>
+                  </a:rPr>
+                  <a:t> can be </a:t>
+                </a:r>
+                <a:r>
+                  <a:rPr lang="it-IT" sz="2400" dirty="0" err="1">
+                    <a:latin typeface="Arial" panose="020B0604020202020204" pitchFamily="34" charset="0"/>
+                    <a:cs typeface="Arial" panose="020B0604020202020204" pitchFamily="34" charset="0"/>
+                  </a:rPr>
+                  <a:t>computed</a:t>
+                </a:r>
+                <a:r>
+                  <a:rPr lang="it-IT" sz="2400" dirty="0">
+                    <a:latin typeface="Arial" panose="020B0604020202020204" pitchFamily="34" charset="0"/>
+                    <a:cs typeface="Arial" panose="020B0604020202020204" pitchFamily="34" charset="0"/>
+                  </a:rPr>
+                  <a:t> </a:t>
+                </a:r>
+                <a:r>
+                  <a:rPr lang="it-IT" sz="2400" dirty="0" err="1">
+                    <a:latin typeface="Arial" panose="020B0604020202020204" pitchFamily="34" charset="0"/>
+                    <a:cs typeface="Arial" panose="020B0604020202020204" pitchFamily="34" charset="0"/>
+                  </a:rPr>
+                  <a:t>as</a:t>
+                </a:r>
+                <a:r>
+                  <a:rPr lang="it-IT" sz="2400" dirty="0">
+                    <a:latin typeface="Arial" panose="020B0604020202020204" pitchFamily="34" charset="0"/>
+                    <a:cs typeface="Arial" panose="020B0604020202020204" pitchFamily="34" charset="0"/>
+                  </a:rPr>
+                  <a:t>: </a:t>
+                </a:r>
+              </a:p>
+              <a:p>
+                <a:pPr algn="just"/>
+                <a:endParaRPr lang="it-IT" sz="2400" noProof="0" dirty="0">
+                  <a:latin typeface="Arial" panose="020B0604020202020204" pitchFamily="34" charset="0"/>
+                  <a:cs typeface="Arial" panose="020B0604020202020204" pitchFamily="34" charset="0"/>
+                </a:endParaRPr>
+              </a:p>
+              <a:p>
+                <a:pPr algn="just"/>
+                <a14:m>
+                  <m:oMathPara xmlns:m="http://schemas.openxmlformats.org/officeDocument/2006/math">
+                    <m:oMathParaPr>
+                      <m:jc m:val="centerGroup"/>
+                    </m:oMathParaPr>
+                    <m:oMath xmlns:m="http://schemas.openxmlformats.org/officeDocument/2006/math">
+                      <m:sSub>
+                        <m:sSubPr>
+                          <m:ctrlPr>
+                            <a:rPr lang="it-IT" sz="2400" i="1" noProof="0" smtClean="0">
+                              <a:latin typeface="Cambria Math" panose="02040503050406030204" pitchFamily="18" charset="0"/>
+                              <a:cs typeface="Arial" panose="020B0604020202020204" pitchFamily="34" charset="0"/>
+                            </a:rPr>
+                          </m:ctrlPr>
+                        </m:sSubPr>
+                        <m:e>
+                          <m:r>
+                            <a:rPr lang="it-IT" sz="2400" b="0" i="1" noProof="0" smtClean="0">
+                              <a:latin typeface="Cambria Math" panose="02040503050406030204" pitchFamily="18" charset="0"/>
+                              <a:cs typeface="Arial" panose="020B0604020202020204" pitchFamily="34" charset="0"/>
+                            </a:rPr>
+                            <m:t>𝑢</m:t>
+                          </m:r>
+                        </m:e>
+                        <m:sub>
+                          <m:r>
+                            <a:rPr lang="it-IT" sz="2400" b="0" i="1" noProof="0" smtClean="0">
+                              <a:latin typeface="Cambria Math" panose="02040503050406030204" pitchFamily="18" charset="0"/>
+                              <a:cs typeface="Arial" panose="020B0604020202020204" pitchFamily="34" charset="0"/>
+                            </a:rPr>
+                            <m:t>𝑓</m:t>
+                          </m:r>
+                        </m:sub>
+                      </m:sSub>
+                      <m:r>
+                        <a:rPr lang="it-IT" sz="2400" b="0" i="1" noProof="0" smtClean="0">
+                          <a:latin typeface="Cambria Math" panose="02040503050406030204" pitchFamily="18" charset="0"/>
+                          <a:cs typeface="Arial" panose="020B0604020202020204" pitchFamily="34" charset="0"/>
+                        </a:rPr>
+                        <m:t>=</m:t>
+                      </m:r>
+                      <m:sSup>
+                        <m:sSupPr>
+                          <m:ctrlPr>
+                            <a:rPr lang="it-IT" sz="2400" b="0" i="1" noProof="0" smtClean="0">
+                              <a:latin typeface="Cambria Math" panose="02040503050406030204" pitchFamily="18" charset="0"/>
+                              <a:cs typeface="Arial" panose="020B0604020202020204" pitchFamily="34" charset="0"/>
+                            </a:rPr>
+                          </m:ctrlPr>
+                        </m:sSupPr>
+                        <m:e>
+                          <m:d>
+                            <m:dPr>
+                              <m:ctrlPr>
+                                <a:rPr lang="it-IT" sz="2400" b="0" i="1" noProof="0" smtClean="0">
+                                  <a:latin typeface="Cambria Math" panose="02040503050406030204" pitchFamily="18" charset="0"/>
+                                  <a:cs typeface="Arial" panose="020B0604020202020204" pitchFamily="34" charset="0"/>
+                                </a:rPr>
+                              </m:ctrlPr>
+                            </m:dPr>
+                            <m:e>
+                              <m:r>
+                                <a:rPr lang="it-IT" sz="2400" b="0" i="1" noProof="0" smtClean="0">
+                                  <a:latin typeface="Cambria Math" panose="02040503050406030204" pitchFamily="18" charset="0"/>
+                                  <a:cs typeface="Arial" panose="020B0604020202020204" pitchFamily="34" charset="0"/>
+                                </a:rPr>
+                                <m:t>𝑅</m:t>
+                              </m:r>
+                              <m:r>
+                                <a:rPr lang="it-IT" sz="2400" b="0" i="1" noProof="0" smtClean="0">
+                                  <a:latin typeface="Cambria Math" panose="02040503050406030204" pitchFamily="18" charset="0"/>
+                                  <a:cs typeface="Arial" panose="020B0604020202020204" pitchFamily="34" charset="0"/>
+                                </a:rPr>
+                                <m:t>+</m:t>
+                              </m:r>
+                              <m:sSubSup>
+                                <m:sSubSupPr>
+                                  <m:ctrlPr>
+                                    <a:rPr lang="it-IT" sz="2400" b="0" i="1" noProof="0" smtClean="0">
+                                      <a:latin typeface="Cambria Math" panose="02040503050406030204" pitchFamily="18" charset="0"/>
+                                      <a:cs typeface="Arial" panose="020B0604020202020204" pitchFamily="34" charset="0"/>
+                                    </a:rPr>
+                                  </m:ctrlPr>
+                                </m:sSubSupPr>
+                                <m:e>
+                                  <m:r>
+                                    <a:rPr lang="it-IT" sz="2400" b="0" i="1" noProof="0" smtClean="0">
+                                      <a:latin typeface="Cambria Math" panose="02040503050406030204" pitchFamily="18" charset="0"/>
+                                      <a:cs typeface="Arial" panose="020B0604020202020204" pitchFamily="34" charset="0"/>
+                                    </a:rPr>
+                                    <m:t>𝐿</m:t>
+                                  </m:r>
+                                </m:e>
+                                <m:sub>
+                                  <m:r>
+                                    <a:rPr lang="it-IT" sz="2400" b="0" i="1" noProof="0" smtClean="0">
+                                      <a:latin typeface="Cambria Math" panose="02040503050406030204" pitchFamily="18" charset="0"/>
+                                      <a:cs typeface="Arial" panose="020B0604020202020204" pitchFamily="34" charset="0"/>
+                                    </a:rPr>
+                                    <m:t>𝑢</m:t>
+                                  </m:r>
+                                </m:sub>
+                                <m:sup>
+                                  <m:r>
+                                    <a:rPr lang="it-IT" sz="2400" b="0" i="1" noProof="0" smtClean="0">
+                                      <a:latin typeface="Cambria Math" panose="02040503050406030204" pitchFamily="18" charset="0"/>
+                                      <a:cs typeface="Arial" panose="020B0604020202020204" pitchFamily="34" charset="0"/>
+                                    </a:rPr>
+                                    <m:t>𝑇</m:t>
+                                  </m:r>
+                                </m:sup>
+                              </m:sSubSup>
+                              <m:r>
+                                <a:rPr lang="it-IT" sz="2400" b="0" i="1" noProof="0" smtClean="0">
+                                  <a:latin typeface="Cambria Math" panose="02040503050406030204" pitchFamily="18" charset="0"/>
+                                  <a:cs typeface="Arial" panose="020B0604020202020204" pitchFamily="34" charset="0"/>
+                                </a:rPr>
+                                <m:t>𝑄</m:t>
+                              </m:r>
+                              <m:sSub>
+                                <m:sSubPr>
+                                  <m:ctrlPr>
+                                    <a:rPr lang="it-IT" sz="2400" b="0" i="1" noProof="0" smtClean="0">
+                                      <a:latin typeface="Cambria Math" panose="02040503050406030204" pitchFamily="18" charset="0"/>
+                                      <a:cs typeface="Arial" panose="020B0604020202020204" pitchFamily="34" charset="0"/>
+                                    </a:rPr>
+                                  </m:ctrlPr>
+                                </m:sSubPr>
+                                <m:e>
+                                  <m:r>
+                                    <a:rPr lang="it-IT" sz="2400" b="0" i="1" noProof="0" smtClean="0">
+                                      <a:latin typeface="Cambria Math" panose="02040503050406030204" pitchFamily="18" charset="0"/>
+                                      <a:cs typeface="Arial" panose="020B0604020202020204" pitchFamily="34" charset="0"/>
+                                    </a:rPr>
+                                    <m:t>𝐿</m:t>
+                                  </m:r>
+                                </m:e>
+                                <m:sub>
+                                  <m:r>
+                                    <a:rPr lang="it-IT" sz="2400" b="0" i="1" noProof="0" smtClean="0">
+                                      <a:latin typeface="Cambria Math" panose="02040503050406030204" pitchFamily="18" charset="0"/>
+                                      <a:cs typeface="Arial" panose="020B0604020202020204" pitchFamily="34" charset="0"/>
+                                    </a:rPr>
+                                    <m:t>𝑢</m:t>
+                                  </m:r>
+                                </m:sub>
+                              </m:sSub>
+                            </m:e>
+                          </m:d>
+                        </m:e>
+                        <m:sup>
+                          <m:r>
+                            <a:rPr lang="it-IT" sz="2400" b="0" i="1" noProof="0" smtClean="0">
+                              <a:latin typeface="Cambria Math" panose="02040503050406030204" pitchFamily="18" charset="0"/>
+                              <a:cs typeface="Arial" panose="020B0604020202020204" pitchFamily="34" charset="0"/>
+                            </a:rPr>
+                            <m:t>−1</m:t>
+                          </m:r>
+                        </m:sup>
+                      </m:sSup>
+                      <m:sSubSup>
+                        <m:sSubSupPr>
+                          <m:ctrlPr>
+                            <a:rPr lang="it-IT" sz="2400" b="0" i="1" noProof="0" smtClean="0">
+                              <a:latin typeface="Cambria Math" panose="02040503050406030204" pitchFamily="18" charset="0"/>
+                              <a:cs typeface="Arial" panose="020B0604020202020204" pitchFamily="34" charset="0"/>
+                            </a:rPr>
+                          </m:ctrlPr>
+                        </m:sSubSupPr>
+                        <m:e>
+                          <m:r>
+                            <a:rPr lang="it-IT" sz="2400" b="0" i="1" noProof="0" smtClean="0">
+                              <a:latin typeface="Cambria Math" panose="02040503050406030204" pitchFamily="18" charset="0"/>
+                              <a:cs typeface="Arial" panose="020B0604020202020204" pitchFamily="34" charset="0"/>
+                            </a:rPr>
+                            <m:t>𝐿</m:t>
+                          </m:r>
+                        </m:e>
+                        <m:sub>
+                          <m:r>
+                            <a:rPr lang="it-IT" sz="2400" b="0" i="1" noProof="0" smtClean="0">
+                              <a:latin typeface="Cambria Math" panose="02040503050406030204" pitchFamily="18" charset="0"/>
+                              <a:cs typeface="Arial" panose="020B0604020202020204" pitchFamily="34" charset="0"/>
+                            </a:rPr>
+                            <m:t>𝑢</m:t>
+                          </m:r>
+                        </m:sub>
+                        <m:sup>
+                          <m:r>
+                            <a:rPr lang="it-IT" sz="2400" b="0" i="1" noProof="0" smtClean="0">
+                              <a:latin typeface="Cambria Math" panose="02040503050406030204" pitchFamily="18" charset="0"/>
+                              <a:cs typeface="Arial" panose="020B0604020202020204" pitchFamily="34" charset="0"/>
+                            </a:rPr>
+                            <m:t>𝑇</m:t>
+                          </m:r>
+                        </m:sup>
+                      </m:sSubSup>
+                      <m:r>
+                        <a:rPr lang="it-IT" sz="2400" b="0" i="1" noProof="0" smtClean="0">
+                          <a:latin typeface="Cambria Math" panose="02040503050406030204" pitchFamily="18" charset="0"/>
+                          <a:cs typeface="Arial" panose="020B0604020202020204" pitchFamily="34" charset="0"/>
+                        </a:rPr>
+                        <m:t>𝑄</m:t>
+                      </m:r>
+                      <m:r>
+                        <a:rPr lang="it-IT" sz="2400" b="0" i="1" noProof="0" smtClean="0">
+                          <a:latin typeface="Cambria Math" panose="02040503050406030204" pitchFamily="18" charset="0"/>
+                          <a:cs typeface="Arial" panose="020B0604020202020204" pitchFamily="34" charset="0"/>
+                        </a:rPr>
+                        <m:t>(</m:t>
+                      </m:r>
+                      <m:sSub>
+                        <m:sSubPr>
+                          <m:ctrlPr>
+                            <a:rPr lang="it-IT" sz="2400" b="0" i="1" noProof="0" smtClean="0">
+                              <a:latin typeface="Cambria Math" panose="02040503050406030204" pitchFamily="18" charset="0"/>
+                              <a:cs typeface="Arial" panose="020B0604020202020204" pitchFamily="34" charset="0"/>
+                            </a:rPr>
+                          </m:ctrlPr>
+                        </m:sSubPr>
+                        <m:e>
+                          <m:r>
+                            <a:rPr lang="it-IT" sz="2400" b="0" i="1" noProof="0" smtClean="0">
+                              <a:latin typeface="Cambria Math" panose="02040503050406030204" pitchFamily="18" charset="0"/>
+                              <a:cs typeface="Arial" panose="020B0604020202020204" pitchFamily="34" charset="0"/>
+                            </a:rPr>
+                            <m:t>𝑟</m:t>
+                          </m:r>
+                        </m:e>
+                        <m:sub>
+                          <m:r>
+                            <a:rPr lang="it-IT" sz="2400" b="0" i="1" noProof="0" smtClean="0">
+                              <a:latin typeface="Cambria Math" panose="02040503050406030204" pitchFamily="18" charset="0"/>
+                              <a:cs typeface="Arial" panose="020B0604020202020204" pitchFamily="34" charset="0"/>
+                            </a:rPr>
+                            <m:t>𝑓</m:t>
+                          </m:r>
+                        </m:sub>
+                      </m:sSub>
+                      <m:r>
+                        <a:rPr lang="it-IT" sz="2400" b="0" i="1" noProof="0" smtClean="0">
+                          <a:latin typeface="Cambria Math" panose="02040503050406030204" pitchFamily="18" charset="0"/>
+                          <a:cs typeface="Arial" panose="020B0604020202020204" pitchFamily="34" charset="0"/>
+                        </a:rPr>
+                        <m:t>−</m:t>
+                      </m:r>
+                      <m:sSub>
+                        <m:sSubPr>
+                          <m:ctrlPr>
+                            <a:rPr lang="it-IT" sz="2400" b="0" i="1" noProof="0" smtClean="0">
+                              <a:latin typeface="Cambria Math" panose="02040503050406030204" pitchFamily="18" charset="0"/>
+                              <a:cs typeface="Arial" panose="020B0604020202020204" pitchFamily="34" charset="0"/>
+                            </a:rPr>
+                          </m:ctrlPr>
+                        </m:sSubPr>
+                        <m:e>
+                          <m:r>
+                            <a:rPr lang="it-IT" sz="2400" b="0" i="1" noProof="0" smtClean="0">
+                              <a:latin typeface="Cambria Math" panose="02040503050406030204" pitchFamily="18" charset="0"/>
+                              <a:cs typeface="Arial" panose="020B0604020202020204" pitchFamily="34" charset="0"/>
+                            </a:rPr>
+                            <m:t>𝐿</m:t>
+                          </m:r>
+                        </m:e>
+                        <m:sub>
+                          <m:r>
+                            <a:rPr lang="it-IT" sz="2400" b="0" i="1" noProof="0" smtClean="0">
+                              <a:latin typeface="Cambria Math" panose="02040503050406030204" pitchFamily="18" charset="0"/>
+                              <a:cs typeface="Arial" panose="020B0604020202020204" pitchFamily="34" charset="0"/>
+                            </a:rPr>
+                            <m:t>𝑤</m:t>
+                          </m:r>
+                        </m:sub>
+                      </m:sSub>
+                      <m:sSub>
+                        <m:sSubPr>
+                          <m:ctrlPr>
+                            <a:rPr lang="it-IT" sz="2400" b="0" i="1" noProof="0" smtClean="0">
+                              <a:latin typeface="Cambria Math" panose="02040503050406030204" pitchFamily="18" charset="0"/>
+                              <a:cs typeface="Arial" panose="020B0604020202020204" pitchFamily="34" charset="0"/>
+                            </a:rPr>
+                          </m:ctrlPr>
+                        </m:sSubPr>
+                        <m:e>
+                          <m:r>
+                            <a:rPr lang="it-IT" sz="2400" b="0" i="1" noProof="0" smtClean="0">
+                              <a:latin typeface="Cambria Math" panose="02040503050406030204" pitchFamily="18" charset="0"/>
+                              <a:cs typeface="Arial" panose="020B0604020202020204" pitchFamily="34" charset="0"/>
+                            </a:rPr>
+                            <m:t>𝑤</m:t>
+                          </m:r>
+                        </m:e>
+                        <m:sub>
+                          <m:r>
+                            <a:rPr lang="it-IT" sz="2400" b="0" i="1" noProof="0" smtClean="0">
+                              <a:latin typeface="Cambria Math" panose="02040503050406030204" pitchFamily="18" charset="0"/>
+                              <a:cs typeface="Arial" panose="020B0604020202020204" pitchFamily="34" charset="0"/>
+                            </a:rPr>
+                            <m:t>𝑝</m:t>
+                          </m:r>
+                        </m:sub>
+                      </m:sSub>
+                      <m:r>
+                        <a:rPr lang="it-IT" sz="2400" b="0" i="1" noProof="0" smtClean="0">
+                          <a:latin typeface="Cambria Math" panose="02040503050406030204" pitchFamily="18" charset="0"/>
+                          <a:cs typeface="Arial" panose="020B0604020202020204" pitchFamily="34" charset="0"/>
+                        </a:rPr>
+                        <m:t>)</m:t>
+                      </m:r>
+                    </m:oMath>
+                  </m:oMathPara>
+                </a14:m>
+                <a:endParaRPr lang="it-IT" sz="2400" noProof="0" dirty="0">
+                  <a:latin typeface="Arial" panose="020B0604020202020204" pitchFamily="34" charset="0"/>
+                  <a:cs typeface="Arial" panose="020B0604020202020204" pitchFamily="34" charset="0"/>
+                </a:endParaRPr>
+              </a:p>
+              <a:p>
+                <a:pPr algn="just"/>
+                <a:endParaRPr lang="it-IT" sz="2400" noProof="0" dirty="0">
+                  <a:latin typeface="Arial" panose="020B0604020202020204" pitchFamily="34" charset="0"/>
+                  <a:cs typeface="Arial" panose="020B0604020202020204" pitchFamily="34" charset="0"/>
+                </a:endParaRPr>
+              </a:p>
+              <a:p>
+                <a:pPr algn="just"/>
+                <a:endParaRPr lang="it-IT" sz="2400" dirty="0">
+                  <a:latin typeface="Arial" panose="020B0604020202020204" pitchFamily="34" charset="0"/>
+                  <a:cs typeface="Arial" panose="020B0604020202020204" pitchFamily="34" charset="0"/>
+                </a:endParaRPr>
+              </a:p>
+              <a:p>
+                <a:pPr algn="just"/>
+                <a:r>
+                  <a:rPr lang="it-IT" sz="2400" noProof="0" dirty="0">
+                    <a:latin typeface="Arial" panose="020B0604020202020204" pitchFamily="34" charset="0"/>
+                    <a:cs typeface="Arial" panose="020B0604020202020204" pitchFamily="34" charset="0"/>
+                  </a:rPr>
+                  <a:t>And </a:t>
+                </a:r>
+                <a:r>
+                  <a:rPr lang="it-IT" sz="2400" noProof="0" dirty="0" err="1">
+                    <a:latin typeface="Arial" panose="020B0604020202020204" pitchFamily="34" charset="0"/>
+                    <a:cs typeface="Arial" panose="020B0604020202020204" pitchFamily="34" charset="0"/>
+                  </a:rPr>
+                  <a:t>then</a:t>
+                </a:r>
+                <a:r>
+                  <a:rPr lang="it-IT" sz="2400" noProof="0" dirty="0">
+                    <a:latin typeface="Arial" panose="020B0604020202020204" pitchFamily="34" charset="0"/>
+                    <a:cs typeface="Arial" panose="020B0604020202020204" pitchFamily="34" charset="0"/>
+                  </a:rPr>
+                  <a:t> </a:t>
+                </a:r>
+                <a:r>
+                  <a:rPr lang="it-IT" sz="2400" noProof="0" dirty="0" err="1">
+                    <a:latin typeface="Arial" panose="020B0604020202020204" pitchFamily="34" charset="0"/>
+                    <a:cs typeface="Arial" panose="020B0604020202020204" pitchFamily="34" charset="0"/>
+                  </a:rPr>
+                  <a:t>repeat</a:t>
+                </a:r>
+                <a:r>
+                  <a:rPr lang="it-IT" sz="2400" dirty="0">
+                    <a:latin typeface="Arial" panose="020B0604020202020204" pitchFamily="34" charset="0"/>
+                    <a:cs typeface="Arial" panose="020B0604020202020204" pitchFamily="34" charset="0"/>
+                  </a:rPr>
+                  <a:t> </a:t>
+                </a:r>
+                <a:r>
+                  <a:rPr lang="it-IT" sz="2400" dirty="0" err="1">
+                    <a:latin typeface="Arial" panose="020B0604020202020204" pitchFamily="34" charset="0"/>
+                    <a:cs typeface="Arial" panose="020B0604020202020204" pitchFamily="34" charset="0"/>
+                  </a:rPr>
+                  <a:t>these</a:t>
+                </a:r>
+                <a:r>
+                  <a:rPr lang="it-IT" sz="2400" dirty="0">
+                    <a:latin typeface="Arial" panose="020B0604020202020204" pitchFamily="34" charset="0"/>
+                    <a:cs typeface="Arial" panose="020B0604020202020204" pitchFamily="34" charset="0"/>
+                  </a:rPr>
+                  <a:t> last </a:t>
+                </a:r>
+                <a:r>
+                  <a:rPr lang="it-IT" sz="2400" dirty="0" err="1">
+                    <a:latin typeface="Arial" panose="020B0604020202020204" pitchFamily="34" charset="0"/>
+                    <a:cs typeface="Arial" panose="020B0604020202020204" pitchFamily="34" charset="0"/>
+                  </a:rPr>
+                  <a:t>two</a:t>
+                </a:r>
+                <a:r>
+                  <a:rPr lang="it-IT" sz="2400" dirty="0">
+                    <a:latin typeface="Arial" panose="020B0604020202020204" pitchFamily="34" charset="0"/>
+                    <a:cs typeface="Arial" panose="020B0604020202020204" pitchFamily="34" charset="0"/>
+                  </a:rPr>
+                  <a:t> steps </a:t>
+                </a:r>
+                <a:r>
+                  <a:rPr lang="it-IT" sz="2400" dirty="0" err="1">
+                    <a:latin typeface="Arial" panose="020B0604020202020204" pitchFamily="34" charset="0"/>
+                    <a:cs typeface="Arial" panose="020B0604020202020204" pitchFamily="34" charset="0"/>
+                  </a:rPr>
+                  <a:t>iteratively</a:t>
+                </a:r>
+                <a:r>
+                  <a:rPr lang="it-IT" sz="2400" dirty="0">
+                    <a:latin typeface="Arial" panose="020B0604020202020204" pitchFamily="34" charset="0"/>
+                    <a:cs typeface="Arial" panose="020B0604020202020204" pitchFamily="34" charset="0"/>
+                  </a:rPr>
+                  <a:t> to </a:t>
+                </a:r>
+                <a:r>
+                  <a:rPr lang="it-IT" sz="2400" dirty="0" err="1">
+                    <a:latin typeface="Arial" panose="020B0604020202020204" pitchFamily="34" charset="0"/>
+                    <a:cs typeface="Arial" panose="020B0604020202020204" pitchFamily="34" charset="0"/>
+                  </a:rPr>
+                  <a:t>implement</a:t>
+                </a:r>
+                <a:r>
+                  <a:rPr lang="it-IT" sz="2400" dirty="0">
+                    <a:latin typeface="Arial" panose="020B0604020202020204" pitchFamily="34" charset="0"/>
+                    <a:cs typeface="Arial" panose="020B0604020202020204" pitchFamily="34" charset="0"/>
+                  </a:rPr>
+                  <a:t> the following control steps, </a:t>
+                </a:r>
+                <a:r>
+                  <a:rPr lang="it-IT" sz="2400" dirty="0" err="1">
+                    <a:latin typeface="Arial" panose="020B0604020202020204" pitchFamily="34" charset="0"/>
+                    <a:cs typeface="Arial" panose="020B0604020202020204" pitchFamily="34" charset="0"/>
+                  </a:rPr>
+                  <a:t>using</a:t>
+                </a:r>
+                <a:r>
+                  <a:rPr lang="it-IT" sz="2400" dirty="0">
+                    <a:latin typeface="Arial" panose="020B0604020202020204" pitchFamily="34" charset="0"/>
+                    <a:cs typeface="Arial" panose="020B0604020202020204" pitchFamily="34" charset="0"/>
+                  </a:rPr>
+                  <a:t> the </a:t>
+                </a:r>
+                <a:r>
+                  <a:rPr lang="it-IT" sz="2400" dirty="0" err="1">
+                    <a:latin typeface="Arial" panose="020B0604020202020204" pitchFamily="34" charset="0"/>
+                    <a:cs typeface="Arial" panose="020B0604020202020204" pitchFamily="34" charset="0"/>
+                  </a:rPr>
+                  <a:t>newly</a:t>
+                </a:r>
+                <a:r>
+                  <a:rPr lang="it-IT" sz="2400" dirty="0">
+                    <a:latin typeface="Arial" panose="020B0604020202020204" pitchFamily="34" charset="0"/>
+                    <a:cs typeface="Arial" panose="020B0604020202020204" pitchFamily="34" charset="0"/>
+                  </a:rPr>
+                  <a:t> </a:t>
+                </a:r>
+                <a:r>
+                  <a:rPr lang="it-IT" sz="2400" dirty="0" err="1">
+                    <a:latin typeface="Arial" panose="020B0604020202020204" pitchFamily="34" charset="0"/>
+                    <a:cs typeface="Arial" panose="020B0604020202020204" pitchFamily="34" charset="0"/>
+                  </a:rPr>
+                  <a:t>measured</a:t>
+                </a:r>
+                <a:r>
+                  <a:rPr lang="it-IT" sz="2400" dirty="0">
+                    <a:latin typeface="Arial" panose="020B0604020202020204" pitchFamily="34" charset="0"/>
+                    <a:cs typeface="Arial" panose="020B0604020202020204" pitchFamily="34" charset="0"/>
+                  </a:rPr>
+                  <a:t> output </a:t>
+                </a:r>
+                <a14:m>
+                  <m:oMath xmlns:m="http://schemas.openxmlformats.org/officeDocument/2006/math">
+                    <m:sSub>
+                      <m:sSubPr>
+                        <m:ctrlPr>
+                          <a:rPr lang="it-IT" sz="2400" i="1" noProof="0" smtClean="0">
+                            <a:latin typeface="Cambria Math" panose="02040503050406030204" pitchFamily="18" charset="0"/>
+                            <a:cs typeface="Arial" panose="020B0604020202020204" pitchFamily="34" charset="0"/>
+                          </a:rPr>
+                        </m:ctrlPr>
+                      </m:sSubPr>
+                      <m:e>
+                        <m:r>
+                          <a:rPr lang="it-IT" sz="2400" b="0" i="1" noProof="0" smtClean="0">
+                            <a:latin typeface="Cambria Math" panose="02040503050406030204" pitchFamily="18" charset="0"/>
+                            <a:cs typeface="Arial" panose="020B0604020202020204" pitchFamily="34" charset="0"/>
+                          </a:rPr>
+                          <m:t>𝑦</m:t>
+                        </m:r>
+                      </m:e>
+                      <m:sub>
+                        <m:r>
+                          <a:rPr lang="it-IT" sz="2400" b="0" i="1" noProof="0" smtClean="0">
+                            <a:latin typeface="Cambria Math" panose="02040503050406030204" pitchFamily="18" charset="0"/>
+                            <a:cs typeface="Arial" panose="020B0604020202020204" pitchFamily="34" charset="0"/>
+                          </a:rPr>
+                          <m:t>1</m:t>
+                        </m:r>
+                      </m:sub>
+                    </m:sSub>
+                  </m:oMath>
+                </a14:m>
+                <a:r>
+                  <a:rPr lang="it-IT" sz="2400" noProof="0" dirty="0">
+                    <a:latin typeface="Arial" panose="020B0604020202020204" pitchFamily="34" charset="0"/>
+                    <a:cs typeface="Arial" panose="020B0604020202020204" pitchFamily="34" charset="0"/>
+                  </a:rPr>
+                  <a:t>.</a:t>
+                </a:r>
+              </a:p>
+            </p:txBody>
+          </p:sp>
+        </mc:Choice>
+        <mc:Fallback>
+          <p:sp>
+            <p:nvSpPr>
+              <p:cNvPr id="2" name="CasellaDiTesto 1">
+                <a:extLst>
+                  <a:ext uri="{FF2B5EF4-FFF2-40B4-BE49-F238E27FC236}">
+                    <a16:creationId xmlns:a16="http://schemas.microsoft.com/office/drawing/2014/main" id="{1AD414A0-A715-1469-0125-37B4B3F31316}"/>
+                  </a:ext>
+                </a:extLst>
+              </p:cNvPr>
+              <p:cNvSpPr txBox="1">
+                <a:spLocks noRot="1" noChangeAspect="1" noMove="1" noResize="1" noEditPoints="1" noAdjustHandles="1" noChangeArrowheads="1" noChangeShapeType="1" noTextEdit="1"/>
+              </p:cNvSpPr>
+              <p:nvPr/>
+            </p:nvSpPr>
+            <p:spPr>
+              <a:xfrm>
+                <a:off x="723900" y="1191645"/>
+                <a:ext cx="10744200" cy="3113866"/>
+              </a:xfrm>
+              <a:prstGeom prst="rect">
+                <a:avLst/>
+              </a:prstGeom>
+              <a:blipFill>
+                <a:blip r:embed="rId2"/>
+                <a:stretch>
+                  <a:fillRect l="-908" t="-1370" r="-1589" b="-3523"/>
+                </a:stretch>
+              </a:blipFill>
+            </p:spPr>
+            <p:txBody>
+              <a:bodyPr/>
+              <a:lstStyle/>
+              <a:p>
+                <a:r>
+                  <a:rPr lang="it-IT">
+                    <a:noFill/>
+                  </a:rPr>
+                  <a:t> </a:t>
+                </a:r>
+              </a:p>
+            </p:txBody>
+          </p:sp>
+        </mc:Fallback>
+      </mc:AlternateContent>
     </p:spTree>
     <p:extLst>
       <p:ext uri="{BB962C8B-B14F-4D97-AF65-F5344CB8AC3E}">
         <p14:creationId xmlns:p14="http://schemas.microsoft.com/office/powerpoint/2010/main" val="3531124739"/>
-      </p:ext>
-    </p:extLst>
-  </p:cSld>
-  <p:clrMapOvr>
-    <a:masterClrMapping/>
-  </p:clrMapOvr>
-</p:sld>
-</file>
-
-<file path=ppt/slides/slide12.xml><?xml version="1.0" encoding="utf-8"?>
-<p:sld xmlns:a="http://schemas.openxmlformats.org/drawingml/2006/main" xmlns:r="http://schemas.openxmlformats.org/officeDocument/2006/relationships" xmlns:p="http://schemas.openxmlformats.org/presentationml/2006/main">
-  <p:cSld>
-    <p:spTree>
-      <p:nvGrpSpPr>
-        <p:cNvPr id="1" name="">
-          <a:extLst>
-            <a:ext uri="{FF2B5EF4-FFF2-40B4-BE49-F238E27FC236}">
-              <a16:creationId xmlns:a16="http://schemas.microsoft.com/office/drawing/2014/main" id="{C8759C14-EBB6-6344-2910-2927E71A651A}"/>
-            </a:ext>
-          </a:extLst>
-        </p:cNvPr>
-        <p:cNvGrpSpPr/>
-        <p:nvPr/>
-      </p:nvGrpSpPr>
-      <p:grpSpPr>
-        <a:xfrm>
-          <a:off x="0" y="0"/>
-          <a:ext cx="0" cy="0"/>
-          <a:chOff x="0" y="0"/>
-          <a:chExt cx="0" cy="0"/>
-        </a:xfrm>
-      </p:grpSpPr>
-      <p:sp>
-        <p:nvSpPr>
-          <p:cNvPr id="10" name="Titolo 9">
-            <a:extLst>
-              <a:ext uri="{FF2B5EF4-FFF2-40B4-BE49-F238E27FC236}">
-                <a16:creationId xmlns:a16="http://schemas.microsoft.com/office/drawing/2014/main" id="{D2762B76-6482-5725-B41E-FD5833AEE37D}"/>
-              </a:ext>
-            </a:extLst>
-          </p:cNvPr>
-          <p:cNvSpPr>
-            <a:spLocks noGrp="1"/>
-          </p:cNvSpPr>
-          <p:nvPr>
-            <p:ph type="title"/>
-          </p:nvPr>
-        </p:nvSpPr>
-        <p:spPr>
-          <a:xfrm>
-            <a:off x="761999" y="457200"/>
-            <a:ext cx="9691687" cy="538609"/>
-          </a:xfrm>
-        </p:spPr>
-        <p:txBody>
-          <a:bodyPr/>
-          <a:lstStyle/>
-          <a:p>
-            <a:r>
-              <a:rPr lang="en-GB" noProof="0" dirty="0">
-                <a:latin typeface="Arial Black" panose="020B0A04020102020204" pitchFamily="34" charset="0"/>
-              </a:rPr>
-              <a:t>Proposed solution – </a:t>
-            </a:r>
-            <a:r>
-              <a:rPr lang="en-GB" dirty="0">
-                <a:latin typeface="Arial Black" panose="020B0A04020102020204" pitchFamily="34" charset="0"/>
-              </a:rPr>
-              <a:t>MPC step 3</a:t>
-            </a:r>
-            <a:endParaRPr lang="en-GB" noProof="0" dirty="0">
-              <a:latin typeface="Arial Black" panose="020B0A04020102020204" pitchFamily="34" charset="0"/>
-            </a:endParaRPr>
-          </a:p>
-        </p:txBody>
-      </p:sp>
-      <p:sp>
-        <p:nvSpPr>
-          <p:cNvPr id="2" name="CasellaDiTesto 1">
-            <a:extLst>
-              <a:ext uri="{FF2B5EF4-FFF2-40B4-BE49-F238E27FC236}">
-                <a16:creationId xmlns:a16="http://schemas.microsoft.com/office/drawing/2014/main" id="{3A93BD2B-FED2-0A1F-5ED0-9735CB6DBB4E}"/>
-              </a:ext>
-            </a:extLst>
-          </p:cNvPr>
-          <p:cNvSpPr txBox="1"/>
-          <p:nvPr/>
-        </p:nvSpPr>
-        <p:spPr>
-          <a:xfrm>
-            <a:off x="723900" y="1191645"/>
-            <a:ext cx="10744200" cy="461665"/>
-          </a:xfrm>
-          <a:prstGeom prst="rect">
-            <a:avLst/>
-          </a:prstGeom>
-          <a:noFill/>
-        </p:spPr>
-        <p:txBody>
-          <a:bodyPr wrap="square">
-            <a:spAutoFit/>
-          </a:bodyPr>
-          <a:lstStyle/>
-          <a:p>
-            <a:pPr algn="just"/>
-            <a:r>
-              <a:rPr lang="it-IT" sz="2400" dirty="0">
-                <a:latin typeface="Arial" panose="020B0604020202020204" pitchFamily="34" charset="0"/>
-                <a:cs typeface="Arial" panose="020B0604020202020204" pitchFamily="34" charset="0"/>
-              </a:rPr>
-              <a:t>AAA</a:t>
-            </a:r>
-            <a:endParaRPr lang="it-IT" sz="2400" noProof="0" dirty="0">
-              <a:latin typeface="Arial" panose="020B0604020202020204" pitchFamily="34" charset="0"/>
-              <a:cs typeface="Arial" panose="020B0604020202020204" pitchFamily="34" charset="0"/>
-            </a:endParaRPr>
-          </a:p>
-        </p:txBody>
-      </p:sp>
-    </p:spTree>
-    <p:extLst>
-      <p:ext uri="{BB962C8B-B14F-4D97-AF65-F5344CB8AC3E}">
-        <p14:creationId xmlns:p14="http://schemas.microsoft.com/office/powerpoint/2010/main" val="2857548665"/>
       </p:ext>
     </p:extLst>
   </p:cSld>
@@ -4012,8 +6620,8 @@
           </a:p>
         </p:txBody>
       </p:sp>
-      <mc:AlternateContent xmlns:mc="http://schemas.openxmlformats.org/markup-compatibility/2006">
-        <mc:Choice xmlns:a14="http://schemas.microsoft.com/office/drawing/2010/main" Requires="a14">
+      <mc:AlternateContent xmlns:mc="http://schemas.openxmlformats.org/markup-compatibility/2006" xmlns:a14="http://schemas.microsoft.com/office/drawing/2010/main">
+        <mc:Choice Requires="a14">
           <p:sp>
             <p:nvSpPr>
               <p:cNvPr id="4" name="CasellaDiTesto 3">
@@ -4381,7 +6989,7 @@
             </p:txBody>
           </p:sp>
         </mc:Choice>
-        <mc:Fallback>
+        <mc:Fallback xmlns="">
           <p:sp>
             <p:nvSpPr>
               <p:cNvPr id="4" name="CasellaDiTesto 3">
@@ -5116,8 +7724,8 @@
           </a:p>
         </p:txBody>
       </p:sp>
-      <mc:AlternateContent xmlns:mc="http://schemas.openxmlformats.org/markup-compatibility/2006">
-        <mc:Choice xmlns:a14="http://schemas.microsoft.com/office/drawing/2010/main" Requires="a14">
+      <mc:AlternateContent xmlns:mc="http://schemas.openxmlformats.org/markup-compatibility/2006" xmlns:a14="http://schemas.microsoft.com/office/drawing/2010/main">
+        <mc:Choice Requires="a14">
           <p:sp>
             <p:nvSpPr>
               <p:cNvPr id="2" name="CasellaDiTesto 1">
@@ -5720,7 +8328,7 @@
             </p:txBody>
           </p:sp>
         </mc:Choice>
-        <mc:Fallback>
+        <mc:Fallback xmlns="">
           <p:sp>
             <p:nvSpPr>
               <p:cNvPr id="2" name="CasellaDiTesto 1">
@@ -6000,8 +8608,8 @@
           </a:extLst>
         </p:spPr>
       </p:pic>
-      <mc:AlternateContent xmlns:mc="http://schemas.openxmlformats.org/markup-compatibility/2006">
-        <mc:Choice xmlns:a14="http://schemas.microsoft.com/office/drawing/2010/main" Requires="a14">
+      <mc:AlternateContent xmlns:mc="http://schemas.openxmlformats.org/markup-compatibility/2006" xmlns:a14="http://schemas.microsoft.com/office/drawing/2010/main">
+        <mc:Choice Requires="a14">
           <p:sp>
             <p:nvSpPr>
               <p:cNvPr id="6" name="CasellaDiTesto 5">
@@ -6137,7 +8745,7 @@
             </p:txBody>
           </p:sp>
         </mc:Choice>
-        <mc:Fallback>
+        <mc:Fallback xmlns="">
           <p:sp>
             <p:nvSpPr>
               <p:cNvPr id="6" name="CasellaDiTesto 5">
@@ -6237,7 +8845,7 @@
         <p:spPr>
           <a:xfrm>
             <a:off x="761999" y="457200"/>
-            <a:ext cx="9691687" cy="1077218"/>
+            <a:ext cx="9691687" cy="538609"/>
           </a:xfrm>
         </p:spPr>
         <p:txBody>
@@ -6250,16 +8858,11 @@
               </a:rPr>
               <a:t>Proposed solution – </a:t>
             </a:r>
-            <a:br>
-              <a:rPr lang="en-GB" noProof="0" dirty="0">
-                <a:latin typeface="Arial Black" panose="020B0A04020102020204" pitchFamily="34" charset="0"/>
-              </a:rPr>
-            </a:br>
             <a:r>
               <a:rPr lang="en-GB" dirty="0">
                 <a:latin typeface="Arial Black" panose="020B0A04020102020204" pitchFamily="34" charset="0"/>
               </a:rPr>
-              <a:t>defining MPC problem</a:t>
+              <a:t>MPC problem</a:t>
             </a:r>
             <a:endParaRPr lang="en-GB" noProof="0" dirty="0">
               <a:latin typeface="Arial Black" panose="020B0A04020102020204" pitchFamily="34" charset="0"/>
@@ -6283,8 +8886,8 @@
             </p:nvSpPr>
             <p:spPr>
               <a:xfrm>
-                <a:off x="723900" y="1683603"/>
-                <a:ext cx="10744200" cy="4130811"/>
+                <a:off x="723900" y="1185270"/>
+                <a:ext cx="10744200" cy="5215530"/>
               </a:xfrm>
               <a:prstGeom prst="rect">
                 <a:avLst/>
@@ -6427,307 +9030,229 @@
                     </m:oMathParaPr>
                     <m:oMath xmlns:m="http://schemas.openxmlformats.org/officeDocument/2006/math">
                       <m:r>
-                        <a:rPr lang="it-IT" sz="2400" b="0" i="1" smtClean="0">
+                        <a:rPr lang="it-IT" sz="3200" b="0" i="1" smtClean="0">
                           <a:latin typeface="Cambria Math" panose="02040503050406030204" pitchFamily="18" charset="0"/>
                           <a:cs typeface="Arial" panose="020B0604020202020204" pitchFamily="34" charset="0"/>
                         </a:rPr>
                         <m:t>𝐽</m:t>
                       </m:r>
                       <m:r>
-                        <a:rPr lang="it-IT" sz="2400" b="0" i="1" smtClean="0">
+                        <a:rPr lang="it-IT" sz="3200" b="0" i="1" smtClean="0">
                           <a:latin typeface="Cambria Math" panose="02040503050406030204" pitchFamily="18" charset="0"/>
                           <a:cs typeface="Arial" panose="020B0604020202020204" pitchFamily="34" charset="0"/>
                         </a:rPr>
                         <m:t>=</m:t>
                       </m:r>
-                      <m:nary>
-                        <m:naryPr>
-                          <m:chr m:val="∑"/>
+                      <m:sSup>
+                        <m:sSupPr>
                           <m:ctrlPr>
-                            <a:rPr lang="it-IT" sz="2400" b="0" i="1" smtClean="0">
+                            <a:rPr lang="it-IT" sz="3200" b="0" i="1" smtClean="0">
                               <a:latin typeface="Cambria Math" panose="02040503050406030204" pitchFamily="18" charset="0"/>
                               <a:cs typeface="Arial" panose="020B0604020202020204" pitchFamily="34" charset="0"/>
                             </a:rPr>
                           </m:ctrlPr>
-                        </m:naryPr>
-                        <m:sub>
-                          <m:r>
-                            <m:rPr>
-                              <m:brk m:alnAt="23"/>
-                            </m:rPr>
-                            <a:rPr lang="it-IT" sz="2400" b="0" i="1" smtClean="0">
-                              <a:latin typeface="Cambria Math" panose="02040503050406030204" pitchFamily="18" charset="0"/>
-                              <a:cs typeface="Arial" panose="020B0604020202020204" pitchFamily="34" charset="0"/>
-                            </a:rPr>
-                            <m:t>𝐾</m:t>
-                          </m:r>
-                          <m:r>
-                            <a:rPr lang="it-IT" sz="2400" b="0" i="1" smtClean="0">
-                              <a:latin typeface="Cambria Math" panose="02040503050406030204" pitchFamily="18" charset="0"/>
-                              <a:cs typeface="Arial" panose="020B0604020202020204" pitchFamily="34" charset="0"/>
-                            </a:rPr>
-                            <m:t>=1</m:t>
-                          </m:r>
-                        </m:sub>
-                        <m:sup>
-                          <m:r>
-                            <a:rPr lang="it-IT" sz="2400" b="0" i="1" smtClean="0">
-                              <a:latin typeface="Cambria Math" panose="02040503050406030204" pitchFamily="18" charset="0"/>
-                              <a:cs typeface="Arial" panose="020B0604020202020204" pitchFamily="34" charset="0"/>
-                            </a:rPr>
-                            <m:t>𝑁</m:t>
-                          </m:r>
-                        </m:sup>
+                        </m:sSupPr>
                         <m:e>
-                          <m:sSup>
-                            <m:sSupPr>
+                          <m:d>
+                            <m:dPr>
                               <m:ctrlPr>
-                                <a:rPr lang="it-IT" sz="2400" b="0" i="1" smtClean="0">
+                                <a:rPr lang="it-IT" sz="3200" b="0" i="1" smtClean="0">
                                   <a:latin typeface="Cambria Math" panose="02040503050406030204" pitchFamily="18" charset="0"/>
                                   <a:cs typeface="Arial" panose="020B0604020202020204" pitchFamily="34" charset="0"/>
                                 </a:rPr>
                               </m:ctrlPr>
-                            </m:sSupPr>
+                            </m:dPr>
                             <m:e>
-                              <m:d>
-                                <m:dPr>
+                              <m:sSub>
+                                <m:sSubPr>
                                   <m:ctrlPr>
-                                    <a:rPr lang="it-IT" sz="2400" b="0" i="1" smtClean="0">
+                                    <a:rPr lang="it-IT" sz="3200" b="0" i="1" smtClean="0">
                                       <a:latin typeface="Cambria Math" panose="02040503050406030204" pitchFamily="18" charset="0"/>
                                       <a:cs typeface="Arial" panose="020B0604020202020204" pitchFamily="34" charset="0"/>
                                     </a:rPr>
                                   </m:ctrlPr>
-                                </m:dPr>
+                                </m:sSubPr>
                                 <m:e>
-                                  <m:sSubSup>
-                                    <m:sSubSupPr>
+                                  <m:acc>
+                                    <m:accPr>
+                                      <m:chr m:val="̂"/>
                                       <m:ctrlPr>
-                                        <a:rPr lang="it-IT" sz="2400" b="0" i="1" smtClean="0">
+                                        <a:rPr lang="it-IT" sz="3200" b="0" i="1" smtClean="0">
                                           <a:latin typeface="Cambria Math" panose="02040503050406030204" pitchFamily="18" charset="0"/>
                                           <a:cs typeface="Arial" panose="020B0604020202020204" pitchFamily="34" charset="0"/>
                                         </a:rPr>
                                       </m:ctrlPr>
-                                    </m:sSubSupPr>
+                                    </m:accPr>
                                     <m:e>
-                                      <m:acc>
-                                        <m:accPr>
-                                          <m:chr m:val="̂"/>
-                                          <m:ctrlPr>
-                                            <a:rPr lang="it-IT" sz="2400" b="0" i="1" smtClean="0">
-                                              <a:latin typeface="Cambria Math" panose="02040503050406030204" pitchFamily="18" charset="0"/>
-                                              <a:cs typeface="Arial" panose="020B0604020202020204" pitchFamily="34" charset="0"/>
-                                            </a:rPr>
-                                          </m:ctrlPr>
-                                        </m:accPr>
-                                        <m:e>
-                                          <m:r>
-                                            <a:rPr lang="it-IT" sz="2400" b="0" i="1" smtClean="0">
-                                              <a:latin typeface="Cambria Math" panose="02040503050406030204" pitchFamily="18" charset="0"/>
-                                              <a:cs typeface="Arial" panose="020B0604020202020204" pitchFamily="34" charset="0"/>
-                                            </a:rPr>
-                                            <m:t>𝑦</m:t>
-                                          </m:r>
-                                        </m:e>
-                                      </m:acc>
-                                    </m:e>
-                                    <m:sub>
                                       <m:r>
-                                        <a:rPr lang="it-IT" sz="2400" b="0" i="1" smtClean="0">
+                                        <a:rPr lang="it-IT" sz="3200" b="0" i="1" smtClean="0">
                                           <a:latin typeface="Cambria Math" panose="02040503050406030204" pitchFamily="18" charset="0"/>
                                           <a:cs typeface="Arial" panose="020B0604020202020204" pitchFamily="34" charset="0"/>
                                         </a:rPr>
-                                        <m:t>𝑘</m:t>
+                                        <m:t>𝑦</m:t>
                                       </m:r>
-                                    </m:sub>
-                                    <m:sup/>
-                                  </m:sSubSup>
+                                    </m:e>
+                                  </m:acc>
+                                </m:e>
+                                <m:sub>
                                   <m:r>
-                                    <a:rPr lang="it-IT" sz="2400" b="0" i="1" smtClean="0">
+                                    <a:rPr lang="it-IT" sz="3200" b="0" i="1" smtClean="0">
                                       <a:latin typeface="Cambria Math" panose="02040503050406030204" pitchFamily="18" charset="0"/>
                                       <a:cs typeface="Arial" panose="020B0604020202020204" pitchFamily="34" charset="0"/>
                                     </a:rPr>
-                                    <m:t>−</m:t>
+                                    <m:t>𝑓</m:t>
                                   </m:r>
-                                  <m:sSubSup>
-                                    <m:sSubSupPr>
-                                      <m:ctrlPr>
-                                        <a:rPr lang="it-IT" sz="2400" b="0" i="1" smtClean="0">
-                                          <a:latin typeface="Cambria Math" panose="02040503050406030204" pitchFamily="18" charset="0"/>
-                                          <a:cs typeface="Arial" panose="020B0604020202020204" pitchFamily="34" charset="0"/>
-                                        </a:rPr>
-                                      </m:ctrlPr>
-                                    </m:sSubSupPr>
-                                    <m:e>
-                                      <m:r>
-                                        <a:rPr lang="it-IT" sz="2400" b="0" i="1" smtClean="0">
-                                          <a:latin typeface="Cambria Math" panose="02040503050406030204" pitchFamily="18" charset="0"/>
-                                          <a:cs typeface="Arial" panose="020B0604020202020204" pitchFamily="34" charset="0"/>
-                                        </a:rPr>
-                                        <m:t>𝑟</m:t>
-                                      </m:r>
-                                    </m:e>
-                                    <m:sub>
-                                      <m:r>
-                                        <a:rPr lang="it-IT" sz="2400" b="0" i="1" smtClean="0">
-                                          <a:latin typeface="Cambria Math" panose="02040503050406030204" pitchFamily="18" charset="0"/>
-                                          <a:cs typeface="Arial" panose="020B0604020202020204" pitchFamily="34" charset="0"/>
-                                        </a:rPr>
-                                        <m:t>𝑘</m:t>
-                                      </m:r>
-                                    </m:sub>
-                                    <m:sup/>
-                                  </m:sSubSup>
-                                </m:e>
-                              </m:d>
-                            </m:e>
-                            <m:sup>
+                                </m:sub>
+                              </m:sSub>
                               <m:r>
-                                <a:rPr lang="it-IT" sz="2400" b="0" i="1" smtClean="0">
+                                <a:rPr lang="it-IT" sz="3200" b="0" i="1" smtClean="0">
                                   <a:latin typeface="Cambria Math" panose="02040503050406030204" pitchFamily="18" charset="0"/>
                                   <a:cs typeface="Arial" panose="020B0604020202020204" pitchFamily="34" charset="0"/>
                                 </a:rPr>
-                                <m:t>𝑇</m:t>
+                                <m:t>−</m:t>
                               </m:r>
-                            </m:sup>
-                          </m:sSup>
+                              <m:sSub>
+                                <m:sSubPr>
+                                  <m:ctrlPr>
+                                    <a:rPr lang="it-IT" sz="3200" b="0" i="1" smtClean="0">
+                                      <a:latin typeface="Cambria Math" panose="02040503050406030204" pitchFamily="18" charset="0"/>
+                                      <a:cs typeface="Arial" panose="020B0604020202020204" pitchFamily="34" charset="0"/>
+                                    </a:rPr>
+                                  </m:ctrlPr>
+                                </m:sSubPr>
+                                <m:e>
+                                  <m:r>
+                                    <a:rPr lang="it-IT" sz="3200" b="0" i="1" smtClean="0">
+                                      <a:latin typeface="Cambria Math" panose="02040503050406030204" pitchFamily="18" charset="0"/>
+                                      <a:cs typeface="Arial" panose="020B0604020202020204" pitchFamily="34" charset="0"/>
+                                    </a:rPr>
+                                    <m:t>𝑟</m:t>
+                                  </m:r>
+                                </m:e>
+                                <m:sub>
+                                  <m:r>
+                                    <a:rPr lang="it-IT" sz="3200" b="0" i="1" smtClean="0">
+                                      <a:latin typeface="Cambria Math" panose="02040503050406030204" pitchFamily="18" charset="0"/>
+                                      <a:cs typeface="Arial" panose="020B0604020202020204" pitchFamily="34" charset="0"/>
+                                    </a:rPr>
+                                    <m:t>𝑓</m:t>
+                                  </m:r>
+                                </m:sub>
+                              </m:sSub>
+                            </m:e>
+                          </m:d>
+                        </m:e>
+                        <m:sup>
                           <m:r>
-                            <a:rPr lang="it-IT" sz="2400" b="0" i="1" smtClean="0">
+                            <a:rPr lang="it-IT" sz="3200" b="0" i="1" smtClean="0">
                               <a:latin typeface="Cambria Math" panose="02040503050406030204" pitchFamily="18" charset="0"/>
                               <a:cs typeface="Arial" panose="020B0604020202020204" pitchFamily="34" charset="0"/>
                             </a:rPr>
-                            <m:t>∗</m:t>
+                            <m:t>𝑇</m:t>
                           </m:r>
-                          <m:sSub>
-                            <m:sSubPr>
+                        </m:sup>
+                      </m:sSup>
+                      <m:r>
+                        <a:rPr lang="it-IT" sz="3200" b="0" i="1" smtClean="0">
+                          <a:latin typeface="Cambria Math" panose="02040503050406030204" pitchFamily="18" charset="0"/>
+                          <a:cs typeface="Arial" panose="020B0604020202020204" pitchFamily="34" charset="0"/>
+                        </a:rPr>
+                        <m:t>𝑄</m:t>
+                      </m:r>
+                      <m:r>
+                        <a:rPr lang="it-IT" sz="3200" b="0" i="1" smtClean="0">
+                          <a:latin typeface="Cambria Math" panose="02040503050406030204" pitchFamily="18" charset="0"/>
+                          <a:cs typeface="Arial" panose="020B0604020202020204" pitchFamily="34" charset="0"/>
+                        </a:rPr>
+                        <m:t>(</m:t>
+                      </m:r>
+                      <m:sSub>
+                        <m:sSubPr>
+                          <m:ctrlPr>
+                            <a:rPr lang="it-IT" sz="3200" b="0" i="1" smtClean="0">
+                              <a:latin typeface="Cambria Math" panose="02040503050406030204" pitchFamily="18" charset="0"/>
+                              <a:cs typeface="Arial" panose="020B0604020202020204" pitchFamily="34" charset="0"/>
+                            </a:rPr>
+                          </m:ctrlPr>
+                        </m:sSubPr>
+                        <m:e>
+                          <m:acc>
+                            <m:accPr>
+                              <m:chr m:val="̂"/>
                               <m:ctrlPr>
-                                <a:rPr lang="it-IT" sz="2400" b="0" i="1" smtClean="0">
+                                <a:rPr lang="it-IT" sz="3200" b="0" i="1" smtClean="0">
                                   <a:latin typeface="Cambria Math" panose="02040503050406030204" pitchFamily="18" charset="0"/>
                                   <a:cs typeface="Arial" panose="020B0604020202020204" pitchFamily="34" charset="0"/>
                                 </a:rPr>
                               </m:ctrlPr>
-                            </m:sSubPr>
+                            </m:accPr>
                             <m:e>
                               <m:r>
-                                <a:rPr lang="it-IT" sz="2400" b="0" i="1" smtClean="0">
+                                <a:rPr lang="it-IT" sz="3200" b="0" i="1" smtClean="0">
                                   <a:latin typeface="Cambria Math" panose="02040503050406030204" pitchFamily="18" charset="0"/>
                                   <a:cs typeface="Arial" panose="020B0604020202020204" pitchFamily="34" charset="0"/>
                                 </a:rPr>
-                                <m:t>𝑄</m:t>
+                                <m:t>𝑦</m:t>
                               </m:r>
                             </m:e>
-                            <m:sub>
-                              <m:r>
-                                <a:rPr lang="it-IT" sz="2400" b="0" i="1" smtClean="0">
-                                  <a:latin typeface="Cambria Math" panose="02040503050406030204" pitchFamily="18" charset="0"/>
-                                  <a:cs typeface="Arial" panose="020B0604020202020204" pitchFamily="34" charset="0"/>
-                                </a:rPr>
-                                <m:t>𝑘</m:t>
-                              </m:r>
-                            </m:sub>
-                          </m:sSub>
+                          </m:acc>
                         </m:e>
-                      </m:nary>
-                      <m:d>
-                        <m:dPr>
+                        <m:sub>
+                          <m:r>
+                            <a:rPr lang="it-IT" sz="3200" b="0" i="1" smtClean="0">
+                              <a:latin typeface="Cambria Math" panose="02040503050406030204" pitchFamily="18" charset="0"/>
+                              <a:cs typeface="Arial" panose="020B0604020202020204" pitchFamily="34" charset="0"/>
+                            </a:rPr>
+                            <m:t>𝑓</m:t>
+                          </m:r>
+                        </m:sub>
+                      </m:sSub>
+                      <m:r>
+                        <a:rPr lang="it-IT" sz="3200" b="0" i="1" smtClean="0">
+                          <a:latin typeface="Cambria Math" panose="02040503050406030204" pitchFamily="18" charset="0"/>
+                          <a:cs typeface="Arial" panose="020B0604020202020204" pitchFamily="34" charset="0"/>
+                        </a:rPr>
+                        <m:t>−</m:t>
+                      </m:r>
+                      <m:sSub>
+                        <m:sSubPr>
                           <m:ctrlPr>
-                            <a:rPr lang="it-IT" sz="2400" b="0" i="1" smtClean="0">
+                            <a:rPr lang="it-IT" sz="3200" b="0" i="1" smtClean="0">
                               <a:latin typeface="Cambria Math" panose="02040503050406030204" pitchFamily="18" charset="0"/>
                               <a:cs typeface="Arial" panose="020B0604020202020204" pitchFamily="34" charset="0"/>
                             </a:rPr>
                           </m:ctrlPr>
-                        </m:dPr>
+                        </m:sSubPr>
                         <m:e>
-                          <m:sSubSup>
-                            <m:sSubSupPr>
-                              <m:ctrlPr>
-                                <a:rPr lang="it-IT" sz="2400" b="0" i="1" smtClean="0">
-                                  <a:latin typeface="Cambria Math" panose="02040503050406030204" pitchFamily="18" charset="0"/>
-                                  <a:cs typeface="Arial" panose="020B0604020202020204" pitchFamily="34" charset="0"/>
-                                </a:rPr>
-                              </m:ctrlPr>
-                            </m:sSubSupPr>
-                            <m:e>
-                              <m:acc>
-                                <m:accPr>
-                                  <m:chr m:val="̂"/>
-                                  <m:ctrlPr>
-                                    <a:rPr lang="it-IT" sz="2400" b="0" i="1" smtClean="0">
-                                      <a:latin typeface="Cambria Math" panose="02040503050406030204" pitchFamily="18" charset="0"/>
-                                      <a:cs typeface="Arial" panose="020B0604020202020204" pitchFamily="34" charset="0"/>
-                                    </a:rPr>
-                                  </m:ctrlPr>
-                                </m:accPr>
-                                <m:e>
-                                  <m:r>
-                                    <a:rPr lang="it-IT" sz="2400" b="0" i="1" smtClean="0">
-                                      <a:latin typeface="Cambria Math" panose="02040503050406030204" pitchFamily="18" charset="0"/>
-                                      <a:cs typeface="Arial" panose="020B0604020202020204" pitchFamily="34" charset="0"/>
-                                    </a:rPr>
-                                    <m:t>𝑦</m:t>
-                                  </m:r>
-                                </m:e>
-                              </m:acc>
-                            </m:e>
-                            <m:sub>
-                              <m:r>
-                                <a:rPr lang="it-IT" sz="2400" b="0" i="1" smtClean="0">
-                                  <a:latin typeface="Cambria Math" panose="02040503050406030204" pitchFamily="18" charset="0"/>
-                                  <a:cs typeface="Arial" panose="020B0604020202020204" pitchFamily="34" charset="0"/>
-                                </a:rPr>
-                                <m:t>𝑘</m:t>
-                              </m:r>
-                            </m:sub>
-                            <m:sup/>
-                          </m:sSubSup>
                           <m:r>
-                            <a:rPr lang="it-IT" sz="2400" b="0" i="1" smtClean="0">
+                            <a:rPr lang="it-IT" sz="3200" b="0" i="1" smtClean="0">
                               <a:latin typeface="Cambria Math" panose="02040503050406030204" pitchFamily="18" charset="0"/>
                               <a:cs typeface="Arial" panose="020B0604020202020204" pitchFamily="34" charset="0"/>
                             </a:rPr>
-                            <m:t>−</m:t>
+                            <m:t>𝑟</m:t>
                           </m:r>
-                          <m:sSubSup>
-                            <m:sSubSupPr>
-                              <m:ctrlPr>
-                                <a:rPr lang="it-IT" sz="2400" b="0" i="1" smtClean="0">
-                                  <a:latin typeface="Cambria Math" panose="02040503050406030204" pitchFamily="18" charset="0"/>
-                                  <a:cs typeface="Arial" panose="020B0604020202020204" pitchFamily="34" charset="0"/>
-                                </a:rPr>
-                              </m:ctrlPr>
-                            </m:sSubSupPr>
-                            <m:e>
-                              <m:r>
-                                <a:rPr lang="it-IT" sz="2400" b="0" i="1" smtClean="0">
-                                  <a:latin typeface="Cambria Math" panose="02040503050406030204" pitchFamily="18" charset="0"/>
-                                  <a:cs typeface="Arial" panose="020B0604020202020204" pitchFamily="34" charset="0"/>
-                                </a:rPr>
-                                <m:t>𝑟</m:t>
-                              </m:r>
-                            </m:e>
-                            <m:sub>
-                              <m:r>
-                                <a:rPr lang="it-IT" sz="2400" b="0" i="1" smtClean="0">
-                                  <a:latin typeface="Cambria Math" panose="02040503050406030204" pitchFamily="18" charset="0"/>
-                                  <a:cs typeface="Arial" panose="020B0604020202020204" pitchFamily="34" charset="0"/>
-                                </a:rPr>
-                                <m:t>𝑘</m:t>
-                              </m:r>
-                            </m:sub>
-                            <m:sup/>
-                          </m:sSubSup>
                         </m:e>
-                      </m:d>
+                        <m:sub>
+                          <m:r>
+                            <a:rPr lang="it-IT" sz="3200" b="0" i="1" smtClean="0">
+                              <a:latin typeface="Cambria Math" panose="02040503050406030204" pitchFamily="18" charset="0"/>
+                              <a:cs typeface="Arial" panose="020B0604020202020204" pitchFamily="34" charset="0"/>
+                            </a:rPr>
+                            <m:t>𝑓</m:t>
+                          </m:r>
+                        </m:sub>
+                      </m:sSub>
                       <m:r>
-                        <a:rPr lang="it-IT" sz="2400" b="0" i="1" smtClean="0">
+                        <a:rPr lang="it-IT" sz="3200" b="0" i="1" smtClean="0">
                           <a:latin typeface="Cambria Math" panose="02040503050406030204" pitchFamily="18" charset="0"/>
                           <a:cs typeface="Arial" panose="020B0604020202020204" pitchFamily="34" charset="0"/>
                         </a:rPr>
-                        <m:t>+</m:t>
+                        <m:t>)+</m:t>
                       </m:r>
                       <m:sSubSup>
                         <m:sSubSupPr>
                           <m:ctrlPr>
-                            <a:rPr lang="it-IT" sz="2400" b="0" i="1" smtClean="0">
+                            <a:rPr lang="it-IT" sz="3200" b="0" i="1" smtClean="0">
                               <a:latin typeface="Cambria Math" panose="02040503050406030204" pitchFamily="18" charset="0"/>
                               <a:cs typeface="Arial" panose="020B0604020202020204" pitchFamily="34" charset="0"/>
                             </a:rPr>
@@ -6735,7 +9260,7 @@
                         </m:sSubSupPr>
                         <m:e>
                           <m:r>
-                            <a:rPr lang="it-IT" sz="2400" b="0" i="1" smtClean="0">
+                            <a:rPr lang="it-IT" sz="3200" b="0" i="1" smtClean="0">
                               <a:latin typeface="Cambria Math" panose="02040503050406030204" pitchFamily="18" charset="0"/>
                               <a:cs typeface="Arial" panose="020B0604020202020204" pitchFamily="34" charset="0"/>
                             </a:rPr>
@@ -6744,16 +9269,16 @@
                         </m:e>
                         <m:sub>
                           <m:r>
-                            <a:rPr lang="it-IT" sz="2400" b="0" i="1" smtClean="0">
+                            <a:rPr lang="it-IT" sz="3200" b="0" i="1" smtClean="0">
                               <a:latin typeface="Cambria Math" panose="02040503050406030204" pitchFamily="18" charset="0"/>
                               <a:cs typeface="Arial" panose="020B0604020202020204" pitchFamily="34" charset="0"/>
                             </a:rPr>
-                            <m:t>𝑘</m:t>
+                            <m:t>𝑓</m:t>
                           </m:r>
                         </m:sub>
                         <m:sup>
                           <m:r>
-                            <a:rPr lang="it-IT" sz="2400" b="0" i="1" smtClean="0">
+                            <a:rPr lang="it-IT" sz="3200" b="0" i="1" smtClean="0">
                               <a:latin typeface="Cambria Math" panose="02040503050406030204" pitchFamily="18" charset="0"/>
                               <a:cs typeface="Arial" panose="020B0604020202020204" pitchFamily="34" charset="0"/>
                             </a:rPr>
@@ -6761,10 +9286,17 @@
                           </m:r>
                         </m:sup>
                       </m:sSubSup>
+                      <m:r>
+                        <a:rPr lang="it-IT" sz="3200" b="0" i="1" smtClean="0">
+                          <a:latin typeface="Cambria Math" panose="02040503050406030204" pitchFamily="18" charset="0"/>
+                          <a:cs typeface="Arial" panose="020B0604020202020204" pitchFamily="34" charset="0"/>
+                        </a:rPr>
+                        <m:t>𝑅</m:t>
+                      </m:r>
                       <m:sSub>
                         <m:sSubPr>
                           <m:ctrlPr>
-                            <a:rPr lang="it-IT" sz="2400" b="0" i="1" smtClean="0">
+                            <a:rPr lang="it-IT" sz="3200" b="0" i="1" smtClean="0">
                               <a:latin typeface="Cambria Math" panose="02040503050406030204" pitchFamily="18" charset="0"/>
                               <a:cs typeface="Arial" panose="020B0604020202020204" pitchFamily="34" charset="0"/>
                             </a:rPr>
@@ -6772,35 +9304,7 @@
                         </m:sSubPr>
                         <m:e>
                           <m:r>
-                            <a:rPr lang="it-IT" sz="2400" b="0" i="1" smtClean="0">
-                              <a:latin typeface="Cambria Math" panose="02040503050406030204" pitchFamily="18" charset="0"/>
-                              <a:cs typeface="Arial" panose="020B0604020202020204" pitchFamily="34" charset="0"/>
-                            </a:rPr>
-                            <m:t>𝑅</m:t>
-                          </m:r>
-                        </m:e>
-                        <m:sub>
-                          <m:r>
-                            <a:rPr lang="it-IT" sz="2400" b="0" i="1" smtClean="0">
-                              <a:latin typeface="Cambria Math" panose="02040503050406030204" pitchFamily="18" charset="0"/>
-                              <a:cs typeface="Arial" panose="020B0604020202020204" pitchFamily="34" charset="0"/>
-                            </a:rPr>
-                            <m:t>𝑘</m:t>
-                          </m:r>
-                        </m:sub>
-                      </m:sSub>
-                      <m:sSub>
-                        <m:sSubPr>
-                          <m:ctrlPr>
-                            <a:rPr lang="it-IT" sz="2400" b="0" i="1" smtClean="0">
-                              <a:latin typeface="Cambria Math" panose="02040503050406030204" pitchFamily="18" charset="0"/>
-                              <a:cs typeface="Arial" panose="020B0604020202020204" pitchFamily="34" charset="0"/>
-                            </a:rPr>
-                          </m:ctrlPr>
-                        </m:sSubPr>
-                        <m:e>
-                          <m:r>
-                            <a:rPr lang="it-IT" sz="2400" b="0" i="1" smtClean="0">
+                            <a:rPr lang="it-IT" sz="3200" b="0" i="1" smtClean="0">
                               <a:latin typeface="Cambria Math" panose="02040503050406030204" pitchFamily="18" charset="0"/>
                               <a:cs typeface="Arial" panose="020B0604020202020204" pitchFamily="34" charset="0"/>
                             </a:rPr>
@@ -6809,18 +9313,18 @@
                         </m:e>
                         <m:sub>
                           <m:r>
-                            <a:rPr lang="it-IT" sz="2400" b="0" i="1" smtClean="0">
+                            <a:rPr lang="it-IT" sz="3200" b="0" i="1" smtClean="0">
                               <a:latin typeface="Cambria Math" panose="02040503050406030204" pitchFamily="18" charset="0"/>
                               <a:cs typeface="Arial" panose="020B0604020202020204" pitchFamily="34" charset="0"/>
                             </a:rPr>
-                            <m:t>𝑘</m:t>
+                            <m:t>𝑓</m:t>
                           </m:r>
                         </m:sub>
                       </m:sSub>
                     </m:oMath>
                   </m:oMathPara>
                 </a14:m>
-                <a:endParaRPr lang="it-IT" sz="2400" b="0" dirty="0">
+                <a:endParaRPr lang="it-IT" sz="4000" dirty="0">
                   <a:latin typeface="Arial" panose="020B0604020202020204" pitchFamily="34" charset="0"/>
                   <a:cs typeface="Arial" panose="020B0604020202020204" pitchFamily="34" charset="0"/>
                 </a:endParaRPr>
@@ -6871,15 +9375,15 @@
                 </a:r>
                 <a14:m>
                   <m:oMath xmlns:m="http://schemas.openxmlformats.org/officeDocument/2006/math">
-                    <m:sSubSup>
-                      <m:sSubSupPr>
+                    <m:sSub>
+                      <m:sSubPr>
                         <m:ctrlPr>
                           <a:rPr lang="it-IT" sz="2400" b="0" i="1" smtClean="0">
                             <a:latin typeface="Cambria Math" panose="02040503050406030204" pitchFamily="18" charset="0"/>
                             <a:cs typeface="Arial" panose="020B0604020202020204" pitchFamily="34" charset="0"/>
                           </a:rPr>
                         </m:ctrlPr>
-                      </m:sSubSupPr>
+                      </m:sSubPr>
                       <m:e>
                         <m:r>
                           <a:rPr lang="it-IT" sz="2400" b="0" i="1" smtClean="0">
@@ -6895,11 +9399,10 @@
                             <a:latin typeface="Cambria Math" panose="02040503050406030204" pitchFamily="18" charset="0"/>
                             <a:cs typeface="Arial" panose="020B0604020202020204" pitchFamily="34" charset="0"/>
                           </a:rPr>
-                          <m:t>𝑘</m:t>
+                          <m:t>𝑓</m:t>
                         </m:r>
                       </m:sub>
-                      <m:sup/>
-                    </m:sSubSup>
+                    </m:sSub>
                   </m:oMath>
                 </a14:m>
                 <a:r>
@@ -6907,7 +9410,7 @@
                     <a:latin typeface="Arial" panose="020B0604020202020204" pitchFamily="34" charset="0"/>
                     <a:cs typeface="Arial" panose="020B0604020202020204" pitchFamily="34" charset="0"/>
                   </a:rPr>
-                  <a:t> are the </a:t>
+                  <a:t>are the </a:t>
                 </a:r>
                 <a:r>
                   <a:rPr lang="it-IT" sz="2400" b="0" dirty="0" err="1">
@@ -6939,15 +9442,15 @@
                 </a:r>
                 <a14:m>
                   <m:oMath xmlns:m="http://schemas.openxmlformats.org/officeDocument/2006/math">
-                    <m:sSubSup>
-                      <m:sSubSupPr>
+                    <m:sSub>
+                      <m:sSubPr>
                         <m:ctrlPr>
                           <a:rPr lang="it-IT" sz="2400" b="0" i="1" smtClean="0">
                             <a:latin typeface="Cambria Math" panose="02040503050406030204" pitchFamily="18" charset="0"/>
                             <a:cs typeface="Arial" panose="020B0604020202020204" pitchFamily="34" charset="0"/>
                           </a:rPr>
                         </m:ctrlPr>
-                      </m:sSubSupPr>
+                      </m:sSubPr>
                       <m:e>
                         <m:acc>
                           <m:accPr>
@@ -6976,11 +9479,17 @@
                             <a:latin typeface="Cambria Math" panose="02040503050406030204" pitchFamily="18" charset="0"/>
                             <a:cs typeface="Arial" panose="020B0604020202020204" pitchFamily="34" charset="0"/>
                           </a:rPr>
-                          <m:t>𝑘</m:t>
+                          <m:t>𝑓</m:t>
                         </m:r>
                       </m:sub>
-                      <m:sup/>
-                    </m:sSubSup>
+                    </m:sSub>
+                    <m:r>
+                      <a:rPr lang="it-IT" sz="2400" b="0" i="1" smtClean="0">
+                        <a:latin typeface="Cambria Math" panose="02040503050406030204" pitchFamily="18" charset="0"/>
+                        <a:cs typeface="Arial" panose="020B0604020202020204" pitchFamily="34" charset="0"/>
+                      </a:rPr>
+                      <m:t> </m:t>
+                    </m:r>
                   </m:oMath>
                 </a14:m>
                 <a:r>
@@ -6988,7 +9497,7 @@
                     <a:latin typeface="Arial" panose="020B0604020202020204" pitchFamily="34" charset="0"/>
                     <a:cs typeface="Arial" panose="020B0604020202020204" pitchFamily="34" charset="0"/>
                   </a:rPr>
-                  <a:t> are the </a:t>
+                  <a:t>are the </a:t>
                 </a:r>
                 <a:r>
                   <a:rPr lang="it-IT" sz="2400" b="0" dirty="0" err="1">
@@ -7002,7 +9511,66 @@
                     <a:latin typeface="Arial" panose="020B0604020202020204" pitchFamily="34" charset="0"/>
                     <a:cs typeface="Arial" panose="020B0604020202020204" pitchFamily="34" charset="0"/>
                   </a:rPr>
-                  <a:t> outputs of the system, and Q and R are user- </a:t>
+                  <a:t> outputs of the system,</a:t>
+                </a:r>
+                <a:r>
+                  <a:rPr lang="it-IT" sz="2400" noProof="0" dirty="0">
+                    <a:cs typeface="Arial" panose="020B0604020202020204" pitchFamily="34" charset="0"/>
+                  </a:rPr>
+                  <a:t> </a:t>
+                </a:r>
+                <a14:m>
+                  <m:oMath xmlns:m="http://schemas.openxmlformats.org/officeDocument/2006/math">
+                    <m:sSub>
+                      <m:sSubPr>
+                        <m:ctrlPr>
+                          <a:rPr lang="it-IT" sz="2400" i="1" noProof="0" smtClean="0">
+                            <a:latin typeface="Cambria Math" panose="02040503050406030204" pitchFamily="18" charset="0"/>
+                            <a:cs typeface="Arial" panose="020B0604020202020204" pitchFamily="34" charset="0"/>
+                          </a:rPr>
+                        </m:ctrlPr>
+                      </m:sSubPr>
+                      <m:e>
+                        <m:r>
+                          <a:rPr lang="it-IT" sz="2400" b="0" i="1" noProof="0" smtClean="0">
+                            <a:latin typeface="Cambria Math" panose="02040503050406030204" pitchFamily="18" charset="0"/>
+                            <a:cs typeface="Arial" panose="020B0604020202020204" pitchFamily="34" charset="0"/>
+                          </a:rPr>
+                          <m:t>𝑢</m:t>
+                        </m:r>
+                      </m:e>
+                      <m:sub>
+                        <m:r>
+                          <a:rPr lang="it-IT" sz="2400" b="0" i="1" noProof="0" smtClean="0">
+                            <a:latin typeface="Cambria Math" panose="02040503050406030204" pitchFamily="18" charset="0"/>
+                            <a:cs typeface="Arial" panose="020B0604020202020204" pitchFamily="34" charset="0"/>
+                          </a:rPr>
+                          <m:t>𝑓</m:t>
+                        </m:r>
+                      </m:sub>
+                    </m:sSub>
+                  </m:oMath>
+                </a14:m>
+                <a:r>
+                  <a:rPr lang="it-IT" sz="2400" b="0" dirty="0">
+                    <a:latin typeface="Arial" panose="020B0604020202020204" pitchFamily="34" charset="0"/>
+                    <a:cs typeface="Arial" panose="020B0604020202020204" pitchFamily="34" charset="0"/>
+                  </a:rPr>
+                  <a:t> is the future input </a:t>
+                </a:r>
+                <a:r>
+                  <a:rPr lang="it-IT" sz="2400" b="0" dirty="0" err="1">
+                    <a:latin typeface="Arial" panose="020B0604020202020204" pitchFamily="34" charset="0"/>
+                    <a:cs typeface="Arial" panose="020B0604020202020204" pitchFamily="34" charset="0"/>
+                  </a:rPr>
+                  <a:t>sequence</a:t>
+                </a:r>
+                <a:r>
+                  <a:rPr lang="it-IT" sz="2400" b="0" dirty="0">
+                    <a:latin typeface="Arial" panose="020B0604020202020204" pitchFamily="34" charset="0"/>
+                    <a:cs typeface="Arial" panose="020B0604020202020204" pitchFamily="34" charset="0"/>
+                  </a:rPr>
+                  <a:t>, and Q and R are user- </a:t>
                 </a:r>
                 <a:r>
                   <a:rPr lang="it-IT" sz="2400" b="0" dirty="0" err="1">
@@ -7049,6 +9617,563 @@
               </a:p>
               <a:p>
                 <a:pPr algn="just"/>
+                <a:endParaRPr lang="it-IT" sz="2400" dirty="0">
+                  <a:latin typeface="Arial" panose="020B0604020202020204" pitchFamily="34" charset="0"/>
+                  <a:cs typeface="Arial" panose="020B0604020202020204" pitchFamily="34" charset="0"/>
+                </a:endParaRPr>
+              </a:p>
+              <a:p>
+                <a:pPr algn="just"/>
+                <a14:m>
+                  <m:oMath xmlns:m="http://schemas.openxmlformats.org/officeDocument/2006/math">
+                    <m:sSub>
+                      <m:sSubPr>
+                        <m:ctrlPr>
+                          <a:rPr lang="it-IT" sz="2400" i="1" noProof="0" smtClean="0">
+                            <a:latin typeface="Cambria Math" panose="02040503050406030204" pitchFamily="18" charset="0"/>
+                            <a:cs typeface="Arial" panose="020B0604020202020204" pitchFamily="34" charset="0"/>
+                          </a:rPr>
+                        </m:ctrlPr>
+                      </m:sSubPr>
+                      <m:e>
+                        <m:acc>
+                          <m:accPr>
+                            <m:chr m:val="̂"/>
+                            <m:ctrlPr>
+                              <a:rPr lang="it-IT" sz="2400" b="0" i="1" noProof="0" smtClean="0">
+                                <a:latin typeface="Cambria Math" panose="02040503050406030204" pitchFamily="18" charset="0"/>
+                                <a:cs typeface="Arial" panose="020B0604020202020204" pitchFamily="34" charset="0"/>
+                              </a:rPr>
+                            </m:ctrlPr>
+                          </m:accPr>
+                          <m:e>
+                            <m:r>
+                              <a:rPr lang="it-IT" sz="2400" b="0" i="1" noProof="0" smtClean="0">
+                                <a:latin typeface="Cambria Math" panose="02040503050406030204" pitchFamily="18" charset="0"/>
+                                <a:cs typeface="Arial" panose="020B0604020202020204" pitchFamily="34" charset="0"/>
+                              </a:rPr>
+                              <m:t>𝑦</m:t>
+                            </m:r>
+                          </m:e>
+                        </m:acc>
+                      </m:e>
+                      <m:sub>
+                        <m:r>
+                          <a:rPr lang="it-IT" sz="2400" b="0" i="1" noProof="0" smtClean="0">
+                            <a:latin typeface="Cambria Math" panose="02040503050406030204" pitchFamily="18" charset="0"/>
+                            <a:cs typeface="Arial" panose="020B0604020202020204" pitchFamily="34" charset="0"/>
+                          </a:rPr>
+                          <m:t>𝑓</m:t>
+                        </m:r>
+                      </m:sub>
+                    </m:sSub>
+                    <m:r>
+                      <a:rPr lang="it-IT" sz="2400" b="0" i="1" noProof="0" smtClean="0">
+                        <a:latin typeface="Cambria Math" panose="02040503050406030204" pitchFamily="18" charset="0"/>
+                        <a:cs typeface="Arial" panose="020B0604020202020204" pitchFamily="34" charset="0"/>
+                      </a:rPr>
+                      <m:t>=</m:t>
+                    </m:r>
+                    <m:d>
+                      <m:dPr>
+                        <m:ctrlPr>
+                          <a:rPr lang="it-IT" sz="2400" b="0" i="1" noProof="0" smtClean="0">
+                            <a:latin typeface="Cambria Math" panose="02040503050406030204" pitchFamily="18" charset="0"/>
+                            <a:cs typeface="Arial" panose="020B0604020202020204" pitchFamily="34" charset="0"/>
+                          </a:rPr>
+                        </m:ctrlPr>
+                      </m:dPr>
+                      <m:e>
+                        <m:eqArr>
+                          <m:eqArrPr>
+                            <m:ctrlPr>
+                              <a:rPr lang="it-IT" sz="2400" b="0" i="1" noProof="0" smtClean="0">
+                                <a:latin typeface="Cambria Math" panose="02040503050406030204" pitchFamily="18" charset="0"/>
+                                <a:cs typeface="Arial" panose="020B0604020202020204" pitchFamily="34" charset="0"/>
+                              </a:rPr>
+                            </m:ctrlPr>
+                          </m:eqArrPr>
+                          <m:e>
+                            <m:sSub>
+                              <m:sSubPr>
+                                <m:ctrlPr>
+                                  <a:rPr lang="it-IT" sz="2400" b="0" i="1" noProof="0" smtClean="0">
+                                    <a:latin typeface="Cambria Math" panose="02040503050406030204" pitchFamily="18" charset="0"/>
+                                    <a:cs typeface="Arial" panose="020B0604020202020204" pitchFamily="34" charset="0"/>
+                                  </a:rPr>
+                                </m:ctrlPr>
+                              </m:sSubPr>
+                              <m:e>
+                                <m:acc>
+                                  <m:accPr>
+                                    <m:chr m:val="̂"/>
+                                    <m:ctrlPr>
+                                      <a:rPr lang="it-IT" sz="2400" b="0" i="1" noProof="0" smtClean="0">
+                                        <a:latin typeface="Cambria Math" panose="02040503050406030204" pitchFamily="18" charset="0"/>
+                                        <a:cs typeface="Arial" panose="020B0604020202020204" pitchFamily="34" charset="0"/>
+                                      </a:rPr>
+                                    </m:ctrlPr>
+                                  </m:accPr>
+                                  <m:e>
+                                    <m:r>
+                                      <a:rPr lang="it-IT" sz="2400" b="0" i="1" noProof="0" smtClean="0">
+                                        <a:latin typeface="Cambria Math" panose="02040503050406030204" pitchFamily="18" charset="0"/>
+                                        <a:cs typeface="Arial" panose="020B0604020202020204" pitchFamily="34" charset="0"/>
+                                      </a:rPr>
+                                      <m:t>𝑦</m:t>
+                                    </m:r>
+                                  </m:e>
+                                </m:acc>
+                              </m:e>
+                              <m:sub>
+                                <m:r>
+                                  <a:rPr lang="it-IT" sz="2400" b="0" i="1" noProof="0" smtClean="0">
+                                    <a:latin typeface="Cambria Math" panose="02040503050406030204" pitchFamily="18" charset="0"/>
+                                    <a:cs typeface="Arial" panose="020B0604020202020204" pitchFamily="34" charset="0"/>
+                                  </a:rPr>
+                                  <m:t>1</m:t>
+                                </m:r>
+                              </m:sub>
+                            </m:sSub>
+                          </m:e>
+                          <m:e>
+                            <m:r>
+                              <a:rPr lang="it-IT" sz="2400" b="0" i="1" smtClean="0">
+                                <a:latin typeface="Cambria Math" panose="02040503050406030204" pitchFamily="18" charset="0"/>
+                              </a:rPr>
+                              <m:t>…</m:t>
+                            </m:r>
+                          </m:e>
+                          <m:e>
+                            <m:sSub>
+                              <m:sSubPr>
+                                <m:ctrlPr>
+                                  <a:rPr lang="it-IT" sz="2400" i="1" smtClean="0">
+                                    <a:latin typeface="Cambria Math" panose="02040503050406030204" pitchFamily="18" charset="0"/>
+                                  </a:rPr>
+                                </m:ctrlPr>
+                              </m:sSubPr>
+                              <m:e>
+                                <m:acc>
+                                  <m:accPr>
+                                    <m:chr m:val="̂"/>
+                                    <m:ctrlPr>
+                                      <a:rPr lang="it-IT" sz="2400" b="0" i="1" smtClean="0">
+                                        <a:latin typeface="Cambria Math" panose="02040503050406030204" pitchFamily="18" charset="0"/>
+                                        <a:cs typeface="Arial" panose="020B0604020202020204" pitchFamily="34" charset="0"/>
+                                      </a:rPr>
+                                    </m:ctrlPr>
+                                  </m:accPr>
+                                  <m:e>
+                                    <m:r>
+                                      <a:rPr lang="it-IT" sz="2400" b="0" i="1" smtClean="0">
+                                        <a:latin typeface="Cambria Math" panose="02040503050406030204" pitchFamily="18" charset="0"/>
+                                        <a:cs typeface="Arial" panose="020B0604020202020204" pitchFamily="34" charset="0"/>
+                                      </a:rPr>
+                                      <m:t>𝑦</m:t>
+                                    </m:r>
+                                  </m:e>
+                                </m:acc>
+                              </m:e>
+                              <m:sub>
+                                <m:r>
+                                  <a:rPr lang="it-IT" sz="2400" b="0" i="1" smtClean="0">
+                                    <a:latin typeface="Cambria Math" panose="02040503050406030204" pitchFamily="18" charset="0"/>
+                                  </a:rPr>
+                                  <m:t>𝑁</m:t>
+                                </m:r>
+                                <m:r>
+                                  <a:rPr lang="it-IT" sz="2400" b="0" i="1" smtClean="0">
+                                    <a:latin typeface="Cambria Math" panose="02040503050406030204" pitchFamily="18" charset="0"/>
+                                  </a:rPr>
+                                  <m:t>−1</m:t>
+                                </m:r>
+                              </m:sub>
+                            </m:sSub>
+                          </m:e>
+                          <m:e>
+                            <m:sSub>
+                              <m:sSubPr>
+                                <m:ctrlPr>
+                                  <a:rPr lang="it-IT" sz="2400" i="1" smtClean="0">
+                                    <a:latin typeface="Cambria Math" panose="02040503050406030204" pitchFamily="18" charset="0"/>
+                                  </a:rPr>
+                                </m:ctrlPr>
+                              </m:sSubPr>
+                              <m:e>
+                                <m:acc>
+                                  <m:accPr>
+                                    <m:chr m:val="̂"/>
+                                    <m:ctrlPr>
+                                      <a:rPr lang="it-IT" sz="2400" b="0" i="1" smtClean="0">
+                                        <a:latin typeface="Cambria Math" panose="02040503050406030204" pitchFamily="18" charset="0"/>
+                                        <a:cs typeface="Arial" panose="020B0604020202020204" pitchFamily="34" charset="0"/>
+                                      </a:rPr>
+                                    </m:ctrlPr>
+                                  </m:accPr>
+                                  <m:e>
+                                    <m:r>
+                                      <a:rPr lang="it-IT" sz="2400" b="0" i="1" smtClean="0">
+                                        <a:latin typeface="Cambria Math" panose="02040503050406030204" pitchFamily="18" charset="0"/>
+                                        <a:cs typeface="Arial" panose="020B0604020202020204" pitchFamily="34" charset="0"/>
+                                      </a:rPr>
+                                      <m:t>𝑦</m:t>
+                                    </m:r>
+                                  </m:e>
+                                </m:acc>
+                              </m:e>
+                              <m:sub>
+                                <m:r>
+                                  <a:rPr lang="it-IT" sz="2400" b="0" i="1" smtClean="0">
+                                    <a:latin typeface="Cambria Math" panose="02040503050406030204" pitchFamily="18" charset="0"/>
+                                  </a:rPr>
+                                  <m:t>𝑛</m:t>
+                                </m:r>
+                              </m:sub>
+                            </m:sSub>
+                          </m:e>
+                        </m:eqArr>
+                      </m:e>
+                    </m:d>
+                  </m:oMath>
+                </a14:m>
+                <a:r>
+                  <a:rPr lang="it-IT" sz="2400" noProof="0" dirty="0">
+                    <a:cs typeface="Arial" panose="020B0604020202020204" pitchFamily="34" charset="0"/>
+                  </a:rPr>
+                  <a:t> 	</a:t>
+                </a:r>
+                <a14:m>
+                  <m:oMath xmlns:m="http://schemas.openxmlformats.org/officeDocument/2006/math">
+                    <m:sSub>
+                      <m:sSubPr>
+                        <m:ctrlPr>
+                          <a:rPr lang="it-IT" sz="2400" i="1" noProof="0" smtClean="0">
+                            <a:latin typeface="Cambria Math" panose="02040503050406030204" pitchFamily="18" charset="0"/>
+                            <a:cs typeface="Arial" panose="020B0604020202020204" pitchFamily="34" charset="0"/>
+                          </a:rPr>
+                        </m:ctrlPr>
+                      </m:sSubPr>
+                      <m:e>
+                        <m:r>
+                          <a:rPr lang="it-IT" sz="2400" b="0" i="1" noProof="0" smtClean="0">
+                            <a:latin typeface="Cambria Math" panose="02040503050406030204" pitchFamily="18" charset="0"/>
+                            <a:cs typeface="Arial" panose="020B0604020202020204" pitchFamily="34" charset="0"/>
+                          </a:rPr>
+                          <m:t>𝑢</m:t>
+                        </m:r>
+                      </m:e>
+                      <m:sub>
+                        <m:r>
+                          <a:rPr lang="it-IT" sz="2400" b="0" i="1" noProof="0" smtClean="0">
+                            <a:latin typeface="Cambria Math" panose="02040503050406030204" pitchFamily="18" charset="0"/>
+                            <a:cs typeface="Arial" panose="020B0604020202020204" pitchFamily="34" charset="0"/>
+                          </a:rPr>
+                          <m:t>𝑓</m:t>
+                        </m:r>
+                      </m:sub>
+                    </m:sSub>
+                    <m:r>
+                      <a:rPr lang="it-IT" sz="2400" b="0" i="1" noProof="0" smtClean="0">
+                        <a:latin typeface="Cambria Math" panose="02040503050406030204" pitchFamily="18" charset="0"/>
+                        <a:cs typeface="Arial" panose="020B0604020202020204" pitchFamily="34" charset="0"/>
+                      </a:rPr>
+                      <m:t>=</m:t>
+                    </m:r>
+                    <m:d>
+                      <m:dPr>
+                        <m:ctrlPr>
+                          <a:rPr lang="it-IT" sz="2400" b="0" i="1" noProof="0" smtClean="0">
+                            <a:latin typeface="Cambria Math" panose="02040503050406030204" pitchFamily="18" charset="0"/>
+                            <a:cs typeface="Arial" panose="020B0604020202020204" pitchFamily="34" charset="0"/>
+                          </a:rPr>
+                        </m:ctrlPr>
+                      </m:dPr>
+                      <m:e>
+                        <m:eqArr>
+                          <m:eqArrPr>
+                            <m:ctrlPr>
+                              <a:rPr lang="it-IT" sz="2400" b="0" i="1" noProof="0" smtClean="0">
+                                <a:latin typeface="Cambria Math" panose="02040503050406030204" pitchFamily="18" charset="0"/>
+                                <a:cs typeface="Arial" panose="020B0604020202020204" pitchFamily="34" charset="0"/>
+                              </a:rPr>
+                            </m:ctrlPr>
+                          </m:eqArrPr>
+                          <m:e>
+                            <m:sSub>
+                              <m:sSubPr>
+                                <m:ctrlPr>
+                                  <a:rPr lang="it-IT" sz="2400" b="0" i="1" noProof="0" smtClean="0">
+                                    <a:latin typeface="Cambria Math" panose="02040503050406030204" pitchFamily="18" charset="0"/>
+                                    <a:cs typeface="Arial" panose="020B0604020202020204" pitchFamily="34" charset="0"/>
+                                  </a:rPr>
+                                </m:ctrlPr>
+                              </m:sSubPr>
+                              <m:e>
+                                <m:r>
+                                  <a:rPr lang="it-IT" sz="2400" b="0" i="1" noProof="0" smtClean="0">
+                                    <a:latin typeface="Cambria Math" panose="02040503050406030204" pitchFamily="18" charset="0"/>
+                                    <a:cs typeface="Arial" panose="020B0604020202020204" pitchFamily="34" charset="0"/>
+                                  </a:rPr>
+                                  <m:t>𝑢</m:t>
+                                </m:r>
+                              </m:e>
+                              <m:sub>
+                                <m:r>
+                                  <a:rPr lang="it-IT" sz="2400" b="0" i="1" noProof="0" smtClean="0">
+                                    <a:latin typeface="Cambria Math" panose="02040503050406030204" pitchFamily="18" charset="0"/>
+                                    <a:cs typeface="Arial" panose="020B0604020202020204" pitchFamily="34" charset="0"/>
+                                  </a:rPr>
+                                  <m:t>1</m:t>
+                                </m:r>
+                              </m:sub>
+                            </m:sSub>
+                          </m:e>
+                          <m:e>
+                            <m:r>
+                              <a:rPr lang="it-IT" sz="2400" b="0" i="1" smtClean="0">
+                                <a:latin typeface="Cambria Math" panose="02040503050406030204" pitchFamily="18" charset="0"/>
+                              </a:rPr>
+                              <m:t>…</m:t>
+                            </m:r>
+                          </m:e>
+                          <m:e>
+                            <m:sSub>
+                              <m:sSubPr>
+                                <m:ctrlPr>
+                                  <a:rPr lang="it-IT" sz="2400" i="1" smtClean="0">
+                                    <a:latin typeface="Cambria Math" panose="02040503050406030204" pitchFamily="18" charset="0"/>
+                                  </a:rPr>
+                                </m:ctrlPr>
+                              </m:sSubPr>
+                              <m:e>
+                                <m:r>
+                                  <a:rPr lang="it-IT" sz="2400" b="0" i="1" smtClean="0">
+                                    <a:latin typeface="Cambria Math" panose="02040503050406030204" pitchFamily="18" charset="0"/>
+                                  </a:rPr>
+                                  <m:t>𝑢</m:t>
+                                </m:r>
+                              </m:e>
+                              <m:sub>
+                                <m:r>
+                                  <a:rPr lang="it-IT" sz="2400" b="0" i="1" smtClean="0">
+                                    <a:latin typeface="Cambria Math" panose="02040503050406030204" pitchFamily="18" charset="0"/>
+                                  </a:rPr>
+                                  <m:t>𝑁</m:t>
+                                </m:r>
+                                <m:r>
+                                  <a:rPr lang="it-IT" sz="2400" b="0" i="1" smtClean="0">
+                                    <a:latin typeface="Cambria Math" panose="02040503050406030204" pitchFamily="18" charset="0"/>
+                                  </a:rPr>
+                                  <m:t>−1</m:t>
+                                </m:r>
+                              </m:sub>
+                            </m:sSub>
+                          </m:e>
+                          <m:e>
+                            <m:sSub>
+                              <m:sSubPr>
+                                <m:ctrlPr>
+                                  <a:rPr lang="it-IT" sz="2400" i="1" smtClean="0">
+                                    <a:latin typeface="Cambria Math" panose="02040503050406030204" pitchFamily="18" charset="0"/>
+                                  </a:rPr>
+                                </m:ctrlPr>
+                              </m:sSubPr>
+                              <m:e>
+                                <m:r>
+                                  <a:rPr lang="it-IT" sz="2400" b="0" i="1" smtClean="0">
+                                    <a:latin typeface="Cambria Math" panose="02040503050406030204" pitchFamily="18" charset="0"/>
+                                  </a:rPr>
+                                  <m:t>𝑢</m:t>
+                                </m:r>
+                              </m:e>
+                              <m:sub>
+                                <m:r>
+                                  <a:rPr lang="it-IT" sz="2400" b="0" i="1" smtClean="0">
+                                    <a:latin typeface="Cambria Math" panose="02040503050406030204" pitchFamily="18" charset="0"/>
+                                  </a:rPr>
+                                  <m:t>𝑁</m:t>
+                                </m:r>
+                              </m:sub>
+                            </m:sSub>
+                          </m:e>
+                        </m:eqArr>
+                      </m:e>
+                    </m:d>
+                  </m:oMath>
+                </a14:m>
+                <a:r>
+                  <a:rPr lang="it-IT" sz="2400" b="0" dirty="0">
+                    <a:latin typeface="Arial" panose="020B0604020202020204" pitchFamily="34" charset="0"/>
+                    <a:cs typeface="Arial" panose="020B0604020202020204" pitchFamily="34" charset="0"/>
+                  </a:rPr>
+                  <a:t>	</a:t>
+                </a:r>
+                <a:r>
+                  <a:rPr lang="it-IT" sz="2400" noProof="0" dirty="0">
+                    <a:cs typeface="Arial" panose="020B0604020202020204" pitchFamily="34" charset="0"/>
+                  </a:rPr>
+                  <a:t> 	</a:t>
+                </a:r>
+                <a14:m>
+                  <m:oMath xmlns:m="http://schemas.openxmlformats.org/officeDocument/2006/math">
+                    <m:sSub>
+                      <m:sSubPr>
+                        <m:ctrlPr>
+                          <a:rPr lang="it-IT" sz="2400" i="1" noProof="0" smtClean="0">
+                            <a:latin typeface="Cambria Math" panose="02040503050406030204" pitchFamily="18" charset="0"/>
+                            <a:cs typeface="Arial" panose="020B0604020202020204" pitchFamily="34" charset="0"/>
+                          </a:rPr>
+                        </m:ctrlPr>
+                      </m:sSubPr>
+                      <m:e>
+                        <m:r>
+                          <a:rPr lang="it-IT" sz="2400" b="0" i="1" noProof="0" smtClean="0">
+                            <a:latin typeface="Cambria Math" panose="02040503050406030204" pitchFamily="18" charset="0"/>
+                            <a:cs typeface="Arial" panose="020B0604020202020204" pitchFamily="34" charset="0"/>
+                          </a:rPr>
+                          <m:t>𝑟</m:t>
+                        </m:r>
+                      </m:e>
+                      <m:sub>
+                        <m:r>
+                          <a:rPr lang="it-IT" sz="2400" b="0" i="1" noProof="0" smtClean="0">
+                            <a:latin typeface="Cambria Math" panose="02040503050406030204" pitchFamily="18" charset="0"/>
+                            <a:cs typeface="Arial" panose="020B0604020202020204" pitchFamily="34" charset="0"/>
+                          </a:rPr>
+                          <m:t>𝑓</m:t>
+                        </m:r>
+                      </m:sub>
+                    </m:sSub>
+                    <m:r>
+                      <a:rPr lang="it-IT" sz="2400" b="0" i="1" noProof="0" smtClean="0">
+                        <a:latin typeface="Cambria Math" panose="02040503050406030204" pitchFamily="18" charset="0"/>
+                        <a:cs typeface="Arial" panose="020B0604020202020204" pitchFamily="34" charset="0"/>
+                      </a:rPr>
+                      <m:t>=</m:t>
+                    </m:r>
+                    <m:d>
+                      <m:dPr>
+                        <m:ctrlPr>
+                          <a:rPr lang="it-IT" sz="2400" b="0" i="1" noProof="0" smtClean="0">
+                            <a:latin typeface="Cambria Math" panose="02040503050406030204" pitchFamily="18" charset="0"/>
+                            <a:cs typeface="Arial" panose="020B0604020202020204" pitchFamily="34" charset="0"/>
+                          </a:rPr>
+                        </m:ctrlPr>
+                      </m:dPr>
+                      <m:e>
+                        <m:eqArr>
+                          <m:eqArrPr>
+                            <m:ctrlPr>
+                              <a:rPr lang="it-IT" sz="2400" b="0" i="1" noProof="0" smtClean="0">
+                                <a:latin typeface="Cambria Math" panose="02040503050406030204" pitchFamily="18" charset="0"/>
+                                <a:cs typeface="Arial" panose="020B0604020202020204" pitchFamily="34" charset="0"/>
+                              </a:rPr>
+                            </m:ctrlPr>
+                          </m:eqArrPr>
+                          <m:e>
+                            <m:sSub>
+                              <m:sSubPr>
+                                <m:ctrlPr>
+                                  <a:rPr lang="it-IT" sz="2400" b="0" i="1" noProof="0" smtClean="0">
+                                    <a:latin typeface="Cambria Math" panose="02040503050406030204" pitchFamily="18" charset="0"/>
+                                    <a:cs typeface="Arial" panose="020B0604020202020204" pitchFamily="34" charset="0"/>
+                                  </a:rPr>
+                                </m:ctrlPr>
+                              </m:sSubPr>
+                              <m:e>
+                                <m:r>
+                                  <a:rPr lang="it-IT" sz="2400" b="0" i="1" noProof="0" smtClean="0">
+                                    <a:latin typeface="Cambria Math" panose="02040503050406030204" pitchFamily="18" charset="0"/>
+                                    <a:cs typeface="Arial" panose="020B0604020202020204" pitchFamily="34" charset="0"/>
+                                  </a:rPr>
+                                  <m:t>𝑟</m:t>
+                                </m:r>
+                              </m:e>
+                              <m:sub>
+                                <m:r>
+                                  <a:rPr lang="it-IT" sz="2400" b="0" i="1" noProof="0" smtClean="0">
+                                    <a:latin typeface="Cambria Math" panose="02040503050406030204" pitchFamily="18" charset="0"/>
+                                    <a:cs typeface="Arial" panose="020B0604020202020204" pitchFamily="34" charset="0"/>
+                                  </a:rPr>
+                                  <m:t>1</m:t>
+                                </m:r>
+                              </m:sub>
+                            </m:sSub>
+                          </m:e>
+                          <m:e>
+                            <m:r>
+                              <a:rPr lang="it-IT" sz="2400" b="0" i="1" smtClean="0">
+                                <a:latin typeface="Cambria Math" panose="02040503050406030204" pitchFamily="18" charset="0"/>
+                              </a:rPr>
+                              <m:t>…</m:t>
+                            </m:r>
+                          </m:e>
+                          <m:e>
+                            <m:sSub>
+                              <m:sSubPr>
+                                <m:ctrlPr>
+                                  <a:rPr lang="it-IT" sz="2400" i="1" smtClean="0">
+                                    <a:latin typeface="Cambria Math" panose="02040503050406030204" pitchFamily="18" charset="0"/>
+                                  </a:rPr>
+                                </m:ctrlPr>
+                              </m:sSubPr>
+                              <m:e>
+                                <m:r>
+                                  <a:rPr lang="it-IT" sz="2400" b="0" i="1" smtClean="0">
+                                    <a:latin typeface="Cambria Math" panose="02040503050406030204" pitchFamily="18" charset="0"/>
+                                  </a:rPr>
+                                  <m:t>𝑟</m:t>
+                                </m:r>
+                              </m:e>
+                              <m:sub>
+                                <m:r>
+                                  <a:rPr lang="it-IT" sz="2400" b="0" i="1" smtClean="0">
+                                    <a:latin typeface="Cambria Math" panose="02040503050406030204" pitchFamily="18" charset="0"/>
+                                  </a:rPr>
+                                  <m:t>𝑁</m:t>
+                                </m:r>
+                                <m:r>
+                                  <a:rPr lang="it-IT" sz="2400" b="0" i="1" smtClean="0">
+                                    <a:latin typeface="Cambria Math" panose="02040503050406030204" pitchFamily="18" charset="0"/>
+                                  </a:rPr>
+                                  <m:t>−1</m:t>
+                                </m:r>
+                              </m:sub>
+                            </m:sSub>
+                          </m:e>
+                          <m:e>
+                            <m:sSub>
+                              <m:sSubPr>
+                                <m:ctrlPr>
+                                  <a:rPr lang="it-IT" sz="2400" i="1" smtClean="0">
+                                    <a:latin typeface="Cambria Math" panose="02040503050406030204" pitchFamily="18" charset="0"/>
+                                  </a:rPr>
+                                </m:ctrlPr>
+                              </m:sSubPr>
+                              <m:e>
+                                <m:r>
+                                  <a:rPr lang="it-IT" sz="2400" b="0" i="1" smtClean="0">
+                                    <a:latin typeface="Cambria Math" panose="02040503050406030204" pitchFamily="18" charset="0"/>
+                                  </a:rPr>
+                                  <m:t>𝑟</m:t>
+                                </m:r>
+                              </m:e>
+                              <m:sub>
+                                <m:r>
+                                  <a:rPr lang="it-IT" sz="2400" b="0" i="1" smtClean="0">
+                                    <a:latin typeface="Cambria Math" panose="02040503050406030204" pitchFamily="18" charset="0"/>
+                                  </a:rPr>
+                                  <m:t>𝑁</m:t>
+                                </m:r>
+                              </m:sub>
+                            </m:sSub>
+                          </m:e>
+                        </m:eqArr>
+                      </m:e>
+                    </m:d>
+                  </m:oMath>
+                </a14:m>
                 <a:endParaRPr lang="it-IT" sz="2400" b="0" dirty="0">
                   <a:latin typeface="Arial" panose="020B0604020202020204" pitchFamily="34" charset="0"/>
                   <a:cs typeface="Arial" panose="020B0604020202020204" pitchFamily="34" charset="0"/>
@@ -7081,16 +10206,16 @@
             </p:nvSpPr>
             <p:spPr>
               <a:xfrm>
-                <a:off x="723900" y="1683603"/>
-                <a:ext cx="10744200" cy="4130811"/>
+                <a:off x="723900" y="1185270"/>
+                <a:ext cx="10744200" cy="5215530"/>
               </a:xfrm>
               <a:prstGeom prst="rect">
                 <a:avLst/>
               </a:prstGeom>
               <a:blipFill>
-                <a:blip r:embed="rId2"/>
+                <a:blip r:embed="rId3"/>
                 <a:stretch>
-                  <a:fillRect l="-908" t="-1032" r="-851"/>
+                  <a:fillRect l="-908" t="-818" r="-1589"/>
                 </a:stretch>
               </a:blipFill>
             </p:spPr>

</xml_diff>

<commit_message>
Updates to code and presentation
Co-Authored-By: GaetanoComandatore <126972665+GaetanoComandatore@users.noreply.github.com>
</commit_message>
<xml_diff>
--- a/SPC_Presentation.pptx
+++ b/SPC_Presentation.pptx
@@ -8286,7 +8286,7 @@
         <p:spPr>
           <a:xfrm>
             <a:off x="762000" y="1676400"/>
-            <a:ext cx="9677400" cy="1200329"/>
+            <a:ext cx="9677400" cy="2308324"/>
           </a:xfrm>
           <a:prstGeom prst="rect">
             <a:avLst/>
@@ -8301,11 +8301,11 @@
           <a:p>
             <a:pPr algn="just"/>
             <a:r>
-              <a:rPr lang="en-GB" sz="2400" noProof="0" dirty="0">
+              <a:rPr lang="en-GB" sz="2400" i="1" dirty="0">
                 <a:latin typeface="Arial" panose="020B0604020202020204" pitchFamily="34" charset="0"/>
                 <a:cs typeface="Arial" panose="020B0604020202020204" pitchFamily="34" charset="0"/>
               </a:rPr>
-              <a:t>a</a:t>
+              <a:t>Note: while the paper does not treat the identification of residuals per se, the algorithm can be used to build a controller that somewhat counteracts disturbances or faults on the system, if rt is set to the desired plant output.</a:t>
             </a:r>
             <a:endParaRPr lang="en-GB" sz="2400" i="1" noProof="0" dirty="0">
               <a:latin typeface="Arial" panose="020B0604020202020204" pitchFamily="34" charset="0"/>
@@ -11044,7 +11044,25 @@
                 <a:ea typeface="+mn-ea"/>
                 <a:cs typeface="+mn-cs"/>
               </a:rPr>
-              <a:t>Predictor from the model and online residual calculation</a:t>
+              <a:t>Predictor from the model and online </a:t>
+            </a:r>
+            <a:r>
+              <a:rPr lang="en-US" sz="2400" dirty="0">
+                <a:solidFill>
+                  <a:sysClr val="windowText" lastClr="000000"/>
+                </a:solidFill>
+              </a:rPr>
+              <a:t>preferred input</a:t>
+            </a:r>
+            <a:r>
+              <a:rPr lang="en-US" sz="2400" noProof="0" dirty="0">
+                <a:solidFill>
+                  <a:sysClr val="windowText" lastClr="000000"/>
+                </a:solidFill>
+                <a:ea typeface="+mn-ea"/>
+                <a:cs typeface="+mn-cs"/>
+              </a:rPr>
+              <a:t> calculation</a:t>
             </a:r>
             <a:endParaRPr lang="en-US" sz="2400" b="0" noProof="0" dirty="0">
               <a:solidFill>
@@ -11634,7 +11652,25 @@
                 <a:ea typeface="+mn-ea"/>
                 <a:cs typeface="+mn-cs"/>
               </a:rPr>
-              <a:t>Predictor from the model and online residual calculation</a:t>
+              <a:t>Predictor from the model and online </a:t>
+            </a:r>
+            <a:r>
+              <a:rPr lang="en-US" sz="2400" dirty="0">
+                <a:solidFill>
+                  <a:sysClr val="windowText" lastClr="000000"/>
+                </a:solidFill>
+              </a:rPr>
+              <a:t>preferred input</a:t>
+            </a:r>
+            <a:r>
+              <a:rPr lang="en-US" sz="2400" noProof="0" dirty="0">
+                <a:solidFill>
+                  <a:sysClr val="windowText" lastClr="000000"/>
+                </a:solidFill>
+                <a:ea typeface="+mn-ea"/>
+                <a:cs typeface="+mn-cs"/>
+              </a:rPr>
+              <a:t> calculation</a:t>
             </a:r>
             <a:endParaRPr lang="en-US" sz="2400" b="0" noProof="0" dirty="0">
               <a:solidFill>

</xml_diff>

<commit_message>
arg il font del titolo
uniformato il font del titolo dell'ultima slide
</commit_message>
<xml_diff>
--- a/SPC_Presentation.pptx
+++ b/SPC_Presentation.pptx
@@ -12891,7 +12891,9 @@
           <a:lstStyle/>
           <a:p>
             <a:r>
-              <a:rPr lang="en-US" dirty="0"/>
+              <a:rPr lang="en-US" dirty="0">
+                <a:latin typeface="Arial Black" panose="020B0A04020102020204" pitchFamily="34" charset="0"/>
+              </a:rPr>
               <a:t>We are not reinventing the wheel</a:t>
             </a:r>
             <a:endParaRPr lang="en-GB" noProof="0" dirty="0">

</xml_diff>